<commit_message>
update talk with FDR.  Getting ready for first set of t-tests
</commit_message>
<xml_diff>
--- a/classes/ChapelHill2016/ChapelHillWorkshop_Fodor.pptx
+++ b/classes/ChapelHill2016/ChapelHillWorkshop_Fodor.pptx
@@ -30,6 +30,15 @@
     <p:sldId id="281" r:id="rId24"/>
     <p:sldId id="275" r:id="rId25"/>
     <p:sldId id="276" r:id="rId26"/>
+    <p:sldId id="283" r:id="rId27"/>
+    <p:sldId id="284" r:id="rId28"/>
+    <p:sldId id="285" r:id="rId29"/>
+    <p:sldId id="286" r:id="rId30"/>
+    <p:sldId id="287" r:id="rId31"/>
+    <p:sldId id="288" r:id="rId32"/>
+    <p:sldId id="289" r:id="rId33"/>
+    <p:sldId id="290" r:id="rId34"/>
+    <p:sldId id="291" r:id="rId35"/>
   </p:sldIdLst>
   <p:sldSz cx="12192000" cy="6858000"/>
   <p:notesSz cx="6858000" cy="9144000"/>
@@ -265,7 +274,7 @@
           <a:p>
             <a:fld id="{0270C37A-DC1B-4EF5-BFE7-3503C55803C4}" type="datetimeFigureOut">
               <a:rPr lang="en-US" smtClean="0"/>
-              <a:t>5/26/2016</a:t>
+              <a:t>5/27/2016</a:t>
             </a:fld>
             <a:endParaRPr lang="en-US"/>
           </a:p>
@@ -433,7 +442,7 @@
           <a:p>
             <a:fld id="{0270C37A-DC1B-4EF5-BFE7-3503C55803C4}" type="datetimeFigureOut">
               <a:rPr lang="en-US" smtClean="0"/>
-              <a:t>5/26/2016</a:t>
+              <a:t>5/27/2016</a:t>
             </a:fld>
             <a:endParaRPr lang="en-US"/>
           </a:p>
@@ -611,7 +620,7 @@
           <a:p>
             <a:fld id="{0270C37A-DC1B-4EF5-BFE7-3503C55803C4}" type="datetimeFigureOut">
               <a:rPr lang="en-US" smtClean="0"/>
-              <a:t>5/26/2016</a:t>
+              <a:t>5/27/2016</a:t>
             </a:fld>
             <a:endParaRPr lang="en-US"/>
           </a:p>
@@ -779,7 +788,7 @@
           <a:p>
             <a:fld id="{0270C37A-DC1B-4EF5-BFE7-3503C55803C4}" type="datetimeFigureOut">
               <a:rPr lang="en-US" smtClean="0"/>
-              <a:t>5/26/2016</a:t>
+              <a:t>5/27/2016</a:t>
             </a:fld>
             <a:endParaRPr lang="en-US"/>
           </a:p>
@@ -1024,7 +1033,7 @@
           <a:p>
             <a:fld id="{0270C37A-DC1B-4EF5-BFE7-3503C55803C4}" type="datetimeFigureOut">
               <a:rPr lang="en-US" smtClean="0"/>
-              <a:t>5/26/2016</a:t>
+              <a:t>5/27/2016</a:t>
             </a:fld>
             <a:endParaRPr lang="en-US"/>
           </a:p>
@@ -1253,7 +1262,7 @@
           <a:p>
             <a:fld id="{0270C37A-DC1B-4EF5-BFE7-3503C55803C4}" type="datetimeFigureOut">
               <a:rPr lang="en-US" smtClean="0"/>
-              <a:t>5/26/2016</a:t>
+              <a:t>5/27/2016</a:t>
             </a:fld>
             <a:endParaRPr lang="en-US"/>
           </a:p>
@@ -1617,7 +1626,7 @@
           <a:p>
             <a:fld id="{0270C37A-DC1B-4EF5-BFE7-3503C55803C4}" type="datetimeFigureOut">
               <a:rPr lang="en-US" smtClean="0"/>
-              <a:t>5/26/2016</a:t>
+              <a:t>5/27/2016</a:t>
             </a:fld>
             <a:endParaRPr lang="en-US"/>
           </a:p>
@@ -1734,7 +1743,7 @@
           <a:p>
             <a:fld id="{0270C37A-DC1B-4EF5-BFE7-3503C55803C4}" type="datetimeFigureOut">
               <a:rPr lang="en-US" smtClean="0"/>
-              <a:t>5/26/2016</a:t>
+              <a:t>5/27/2016</a:t>
             </a:fld>
             <a:endParaRPr lang="en-US"/>
           </a:p>
@@ -1829,7 +1838,7 @@
           <a:p>
             <a:fld id="{0270C37A-DC1B-4EF5-BFE7-3503C55803C4}" type="datetimeFigureOut">
               <a:rPr lang="en-US" smtClean="0"/>
-              <a:t>5/26/2016</a:t>
+              <a:t>5/27/2016</a:t>
             </a:fld>
             <a:endParaRPr lang="en-US"/>
           </a:p>
@@ -2104,7 +2113,7 @@
           <a:p>
             <a:fld id="{0270C37A-DC1B-4EF5-BFE7-3503C55803C4}" type="datetimeFigureOut">
               <a:rPr lang="en-US" smtClean="0"/>
-              <a:t>5/26/2016</a:t>
+              <a:t>5/27/2016</a:t>
             </a:fld>
             <a:endParaRPr lang="en-US"/>
           </a:p>
@@ -2356,7 +2365,7 @@
           <a:p>
             <a:fld id="{0270C37A-DC1B-4EF5-BFE7-3503C55803C4}" type="datetimeFigureOut">
               <a:rPr lang="en-US" smtClean="0"/>
-              <a:t>5/26/2016</a:t>
+              <a:t>5/27/2016</a:t>
             </a:fld>
             <a:endParaRPr lang="en-US"/>
           </a:p>
@@ -2567,7 +2576,7 @@
           <a:p>
             <a:fld id="{0270C37A-DC1B-4EF5-BFE7-3503C55803C4}" type="datetimeFigureOut">
               <a:rPr lang="en-US" smtClean="0"/>
-              <a:t>5/26/2016</a:t>
+              <a:t>5/27/2016</a:t>
             </a:fld>
             <a:endParaRPr lang="en-US"/>
           </a:p>
@@ -6648,6 +6657,852 @@
 </p:sld>
 </file>
 
+<file path=ppt/slides/slide26.xml><?xml version="1.0" encoding="utf-8"?>
+<p:sld xmlns:a="http://schemas.openxmlformats.org/drawingml/2006/main" xmlns:r="http://schemas.openxmlformats.org/officeDocument/2006/relationships" xmlns:p="http://schemas.openxmlformats.org/presentationml/2006/main">
+  <p:cSld>
+    <p:spTree>
+      <p:nvGrpSpPr>
+        <p:cNvPr id="1" name=""/>
+        <p:cNvGrpSpPr/>
+        <p:nvPr/>
+      </p:nvGrpSpPr>
+      <p:grpSpPr>
+        <a:xfrm>
+          <a:off x="0" y="0"/>
+          <a:ext cx="0" cy="0"/>
+          <a:chOff x="0" y="0"/>
+          <a:chExt cx="0" cy="0"/>
+        </a:xfrm>
+      </p:grpSpPr>
+      <p:pic>
+        <p:nvPicPr>
+          <p:cNvPr id="4" name="Picture 3"/>
+          <p:cNvPicPr>
+            <a:picLocks noChangeAspect="1"/>
+          </p:cNvPicPr>
+          <p:nvPr/>
+        </p:nvPicPr>
+        <p:blipFill>
+          <a:blip r:embed="rId2"/>
+          <a:stretch>
+            <a:fillRect/>
+          </a:stretch>
+        </p:blipFill>
+        <p:spPr>
+          <a:xfrm>
+            <a:off x="626695" y="998746"/>
+            <a:ext cx="10064641" cy="2148214"/>
+          </a:xfrm>
+          <a:prstGeom prst="rect">
+            <a:avLst/>
+          </a:prstGeom>
+        </p:spPr>
+      </p:pic>
+      <p:sp>
+        <p:nvSpPr>
+          <p:cNvPr id="5" name="TextBox 4"/>
+          <p:cNvSpPr txBox="1"/>
+          <p:nvPr/>
+        </p:nvSpPr>
+        <p:spPr>
+          <a:xfrm>
+            <a:off x="1116281" y="368135"/>
+            <a:ext cx="10247357" cy="646331"/>
+          </a:xfrm>
+          <a:prstGeom prst="rect">
+            <a:avLst/>
+          </a:prstGeom>
+          <a:noFill/>
+        </p:spPr>
+        <p:txBody>
+          <a:bodyPr wrap="none" rtlCol="0">
+            <a:spAutoFit/>
+          </a:bodyPr>
+          <a:lstStyle/>
+          <a:p>
+            <a:r>
+              <a:rPr lang="en-US" dirty="0" smtClean="0">
+                <a:latin typeface="Arial" panose="020B0604020202020204" pitchFamily="34" charset="0"/>
+                <a:cs typeface="Arial" panose="020B0604020202020204" pitchFamily="34" charset="0"/>
+              </a:rPr>
+              <a:t>If we return to our original spreadsheet, instead of asking questions about how BM vs. TD changes</a:t>
+            </a:r>
+          </a:p>
+          <a:p>
+            <a:r>
+              <a:rPr lang="en-US" dirty="0" smtClean="0">
+                <a:latin typeface="Arial" panose="020B0604020202020204" pitchFamily="34" charset="0"/>
+                <a:cs typeface="Arial" panose="020B0604020202020204" pitchFamily="34" charset="0"/>
+              </a:rPr>
+              <a:t>in ordination space, we can evaluate each row of the spreadsheet directly.</a:t>
+            </a:r>
+            <a:endParaRPr lang="en-US" dirty="0">
+              <a:latin typeface="Arial" panose="020B0604020202020204" pitchFamily="34" charset="0"/>
+              <a:cs typeface="Arial" panose="020B0604020202020204" pitchFamily="34" charset="0"/>
+            </a:endParaRPr>
+          </a:p>
+        </p:txBody>
+      </p:sp>
+      <p:sp>
+        <p:nvSpPr>
+          <p:cNvPr id="6" name="TextBox 5"/>
+          <p:cNvSpPr txBox="1"/>
+          <p:nvPr/>
+        </p:nvSpPr>
+        <p:spPr>
+          <a:xfrm>
+            <a:off x="427511" y="3526973"/>
+            <a:ext cx="11542647" cy="1477328"/>
+          </a:xfrm>
+          <a:prstGeom prst="rect">
+            <a:avLst/>
+          </a:prstGeom>
+          <a:noFill/>
+        </p:spPr>
+        <p:txBody>
+          <a:bodyPr wrap="none" rtlCol="0">
+            <a:spAutoFit/>
+          </a:bodyPr>
+          <a:lstStyle/>
+          <a:p>
+            <a:r>
+              <a:rPr lang="en-US" dirty="0" smtClean="0">
+                <a:latin typeface="Arial" panose="020B0604020202020204" pitchFamily="34" charset="0"/>
+                <a:cs typeface="Arial" panose="020B0604020202020204" pitchFamily="34" charset="0"/>
+              </a:rPr>
+              <a:t>For each row, we can form a </a:t>
+            </a:r>
+            <a:r>
+              <a:rPr lang="en-US" dirty="0" smtClean="0">
+                <a:solidFill>
+                  <a:srgbClr val="FF0000"/>
+                </a:solidFill>
+                <a:latin typeface="Arial" panose="020B0604020202020204" pitchFamily="34" charset="0"/>
+                <a:cs typeface="Arial" panose="020B0604020202020204" pitchFamily="34" charset="0"/>
+              </a:rPr>
+              <a:t>null hypothesis</a:t>
+            </a:r>
+            <a:r>
+              <a:rPr lang="en-US" dirty="0" smtClean="0">
+                <a:latin typeface="Arial" panose="020B0604020202020204" pitchFamily="34" charset="0"/>
+                <a:cs typeface="Arial" panose="020B0604020202020204" pitchFamily="34" charset="0"/>
+              </a:rPr>
+              <a:t> that the TD and BM samples are drawn from the same distribution.</a:t>
+            </a:r>
+          </a:p>
+          <a:p>
+            <a:endParaRPr lang="en-US" dirty="0">
+              <a:latin typeface="Arial" panose="020B0604020202020204" pitchFamily="34" charset="0"/>
+              <a:cs typeface="Arial" panose="020B0604020202020204" pitchFamily="34" charset="0"/>
+            </a:endParaRPr>
+          </a:p>
+          <a:p>
+            <a:r>
+              <a:rPr lang="en-US" dirty="0" smtClean="0">
+                <a:latin typeface="Arial" panose="020B0604020202020204" pitchFamily="34" charset="0"/>
+                <a:cs typeface="Arial" panose="020B0604020202020204" pitchFamily="34" charset="0"/>
+              </a:rPr>
+              <a:t>That will give us 651,705 null hypotheses to evaluate.</a:t>
+            </a:r>
+          </a:p>
+          <a:p>
+            <a:endParaRPr lang="en-US" dirty="0">
+              <a:latin typeface="Arial" panose="020B0604020202020204" pitchFamily="34" charset="0"/>
+              <a:cs typeface="Arial" panose="020B0604020202020204" pitchFamily="34" charset="0"/>
+            </a:endParaRPr>
+          </a:p>
+          <a:p>
+            <a:r>
+              <a:rPr lang="en-US" dirty="0" smtClean="0">
+                <a:latin typeface="Arial" panose="020B0604020202020204" pitchFamily="34" charset="0"/>
+                <a:cs typeface="Arial" panose="020B0604020202020204" pitchFamily="34" charset="0"/>
+              </a:rPr>
+              <a:t>We will need to correct for multiple hypothesis testing</a:t>
+            </a:r>
+            <a:endParaRPr lang="en-US" dirty="0">
+              <a:latin typeface="Arial" panose="020B0604020202020204" pitchFamily="34" charset="0"/>
+              <a:cs typeface="Arial" panose="020B0604020202020204" pitchFamily="34" charset="0"/>
+            </a:endParaRPr>
+          </a:p>
+        </p:txBody>
+      </p:sp>
+    </p:spTree>
+    <p:extLst>
+      <p:ext uri="{BB962C8B-B14F-4D97-AF65-F5344CB8AC3E}">
+        <p14:creationId xmlns:p14="http://schemas.microsoft.com/office/powerpoint/2010/main" val="3977969188"/>
+      </p:ext>
+    </p:extLst>
+  </p:cSld>
+  <p:clrMapOvr>
+    <a:masterClrMapping/>
+  </p:clrMapOvr>
+</p:sld>
+</file>
+
+<file path=ppt/slides/slide27.xml><?xml version="1.0" encoding="utf-8"?>
+<p:sld xmlns:a="http://schemas.openxmlformats.org/drawingml/2006/main" xmlns:r="http://schemas.openxmlformats.org/officeDocument/2006/relationships" xmlns:p="http://schemas.openxmlformats.org/presentationml/2006/main">
+  <p:cSld>
+    <p:spTree>
+      <p:nvGrpSpPr>
+        <p:cNvPr id="1" name=""/>
+        <p:cNvGrpSpPr/>
+        <p:nvPr/>
+      </p:nvGrpSpPr>
+      <p:grpSpPr>
+        <a:xfrm>
+          <a:off x="0" y="0"/>
+          <a:ext cx="0" cy="0"/>
+          <a:chOff x="0" y="0"/>
+          <a:chExt cx="0" cy="0"/>
+        </a:xfrm>
+      </p:grpSpPr>
+      <p:sp>
+        <p:nvSpPr>
+          <p:cNvPr id="4" name="TextBox 3"/>
+          <p:cNvSpPr txBox="1"/>
+          <p:nvPr/>
+        </p:nvSpPr>
+        <p:spPr>
+          <a:xfrm>
+            <a:off x="762989" y="740228"/>
+            <a:ext cx="6629400" cy="3416320"/>
+          </a:xfrm>
+          <a:prstGeom prst="rect">
+            <a:avLst/>
+          </a:prstGeom>
+          <a:noFill/>
+        </p:spPr>
+        <p:txBody>
+          <a:bodyPr wrap="square" rtlCol="0">
+            <a:spAutoFit/>
+          </a:bodyPr>
+          <a:lstStyle/>
+          <a:p>
+            <a:r>
+              <a:rPr lang="en-US" dirty="0"/>
+              <a:t>You have 20,000 genes in an </a:t>
+            </a:r>
+            <a:r>
+              <a:rPr lang="en-US" dirty="0" err="1"/>
+              <a:t>rna-seq</a:t>
+            </a:r>
+            <a:r>
+              <a:rPr lang="en-US" dirty="0"/>
+              <a:t> experiment.</a:t>
+            </a:r>
+          </a:p>
+          <a:p>
+            <a:r>
+              <a:rPr lang="en-US" dirty="0"/>
+              <a:t>You have two conditions (A) and (B).</a:t>
+            </a:r>
+          </a:p>
+          <a:p>
+            <a:r>
+              <a:rPr lang="en-US" dirty="0"/>
+              <a:t>You run them through </a:t>
+            </a:r>
+            <a:r>
+              <a:rPr lang="en-US" dirty="0" err="1"/>
+              <a:t>DeSeq</a:t>
+            </a:r>
+            <a:r>
+              <a:rPr lang="en-US" dirty="0"/>
+              <a:t> (or any other stats package).</a:t>
+            </a:r>
+          </a:p>
+          <a:p>
+            <a:endParaRPr lang="en-US" dirty="0"/>
+          </a:p>
+          <a:p>
+            <a:r>
+              <a:rPr lang="en-US" dirty="0"/>
+              <a:t>If the null hypothesis is always true (no difference between A and B),</a:t>
+            </a:r>
+          </a:p>
+          <a:p>
+            <a:r>
+              <a:rPr lang="en-US" dirty="0"/>
+              <a:t>the p-values will be uniformly distributed…</a:t>
+            </a:r>
+          </a:p>
+          <a:p>
+            <a:endParaRPr lang="en-US" dirty="0"/>
+          </a:p>
+          <a:p>
+            <a:r>
+              <a:rPr lang="en-US" dirty="0"/>
+              <a:t>We can model this pretty simply:</a:t>
+            </a:r>
+          </a:p>
+          <a:p>
+            <a:endParaRPr lang="en-US" dirty="0"/>
+          </a:p>
+          <a:p>
+            <a:endParaRPr lang="en-US" dirty="0"/>
+          </a:p>
+          <a:p>
+            <a:endParaRPr lang="en-US" dirty="0"/>
+          </a:p>
+          <a:p>
+            <a:r>
+              <a:rPr lang="en-US" dirty="0"/>
+              <a:t> </a:t>
+            </a:r>
+            <a:endParaRPr lang="en-US" dirty="0"/>
+          </a:p>
+        </p:txBody>
+      </p:sp>
+      <p:pic>
+        <p:nvPicPr>
+          <p:cNvPr id="1026" name="Picture 2"/>
+          <p:cNvPicPr>
+            <a:picLocks noChangeAspect="1" noChangeArrowheads="1"/>
+          </p:cNvPicPr>
+          <p:nvPr/>
+        </p:nvPicPr>
+        <p:blipFill>
+          <a:blip r:embed="rId2" cstate="print"/>
+          <a:srcRect/>
+          <a:stretch>
+            <a:fillRect/>
+          </a:stretch>
+        </p:blipFill>
+        <p:spPr bwMode="auto">
+          <a:xfrm>
+            <a:off x="2133600" y="3733800"/>
+            <a:ext cx="3177396" cy="762000"/>
+          </a:xfrm>
+          <a:prstGeom prst="rect">
+            <a:avLst/>
+          </a:prstGeom>
+          <a:noFill/>
+          <a:ln w="9525">
+            <a:noFill/>
+            <a:miter lim="800000"/>
+            <a:headEnd/>
+            <a:tailEnd/>
+          </a:ln>
+        </p:spPr>
+      </p:pic>
+      <p:pic>
+        <p:nvPicPr>
+          <p:cNvPr id="1027" name="Picture 3"/>
+          <p:cNvPicPr>
+            <a:picLocks noChangeAspect="1" noChangeArrowheads="1"/>
+          </p:cNvPicPr>
+          <p:nvPr/>
+        </p:nvPicPr>
+        <p:blipFill>
+          <a:blip r:embed="rId3" cstate="print"/>
+          <a:srcRect/>
+          <a:stretch>
+            <a:fillRect/>
+          </a:stretch>
+        </p:blipFill>
+        <p:spPr bwMode="auto">
+          <a:xfrm>
+            <a:off x="5638801" y="2667000"/>
+            <a:ext cx="4316101" cy="4043362"/>
+          </a:xfrm>
+          <a:prstGeom prst="rect">
+            <a:avLst/>
+          </a:prstGeom>
+          <a:noFill/>
+          <a:ln w="9525">
+            <a:noFill/>
+            <a:miter lim="800000"/>
+            <a:headEnd/>
+            <a:tailEnd/>
+          </a:ln>
+        </p:spPr>
+      </p:pic>
+      <p:sp>
+        <p:nvSpPr>
+          <p:cNvPr id="2" name="TextBox 1"/>
+          <p:cNvSpPr txBox="1"/>
+          <p:nvPr/>
+        </p:nvSpPr>
+        <p:spPr>
+          <a:xfrm>
+            <a:off x="1448790" y="201881"/>
+            <a:ext cx="7058343" cy="369332"/>
+          </a:xfrm>
+          <a:prstGeom prst="rect">
+            <a:avLst/>
+          </a:prstGeom>
+          <a:noFill/>
+        </p:spPr>
+        <p:txBody>
+          <a:bodyPr wrap="none" rtlCol="0">
+            <a:spAutoFit/>
+          </a:bodyPr>
+          <a:lstStyle/>
+          <a:p>
+            <a:r>
+              <a:rPr lang="en-US" dirty="0" smtClean="0">
+                <a:latin typeface="Arial" panose="020B0604020202020204" pitchFamily="34" charset="0"/>
+                <a:cs typeface="Arial" panose="020B0604020202020204" pitchFamily="34" charset="0"/>
+              </a:rPr>
+              <a:t>Not correcting for multiple hypothesis testing yields spurious results</a:t>
+            </a:r>
+            <a:endParaRPr lang="en-US" dirty="0">
+              <a:latin typeface="Arial" panose="020B0604020202020204" pitchFamily="34" charset="0"/>
+              <a:cs typeface="Arial" panose="020B0604020202020204" pitchFamily="34" charset="0"/>
+            </a:endParaRPr>
+          </a:p>
+        </p:txBody>
+      </p:sp>
+    </p:spTree>
+    <p:extLst>
+      <p:ext uri="{BB962C8B-B14F-4D97-AF65-F5344CB8AC3E}">
+        <p14:creationId xmlns:p14="http://schemas.microsoft.com/office/powerpoint/2010/main" val="888344139"/>
+      </p:ext>
+    </p:extLst>
+  </p:cSld>
+  <p:clrMapOvr>
+    <a:masterClrMapping/>
+  </p:clrMapOvr>
+</p:sld>
+</file>
+
+<file path=ppt/slides/slide28.xml><?xml version="1.0" encoding="utf-8"?>
+<p:sld xmlns:a="http://schemas.openxmlformats.org/drawingml/2006/main" xmlns:r="http://schemas.openxmlformats.org/officeDocument/2006/relationships" xmlns:p="http://schemas.openxmlformats.org/presentationml/2006/main">
+  <p:cSld>
+    <p:spTree>
+      <p:nvGrpSpPr>
+        <p:cNvPr id="1" name=""/>
+        <p:cNvGrpSpPr/>
+        <p:nvPr/>
+      </p:nvGrpSpPr>
+      <p:grpSpPr>
+        <a:xfrm>
+          <a:off x="0" y="0"/>
+          <a:ext cx="0" cy="0"/>
+          <a:chOff x="0" y="0"/>
+          <a:chExt cx="0" cy="0"/>
+        </a:xfrm>
+      </p:grpSpPr>
+      <p:sp>
+        <p:nvSpPr>
+          <p:cNvPr id="4" name="TextBox 3"/>
+          <p:cNvSpPr txBox="1"/>
+          <p:nvPr/>
+        </p:nvSpPr>
+        <p:spPr>
+          <a:xfrm>
+            <a:off x="2362200" y="457200"/>
+            <a:ext cx="6247864" cy="1477328"/>
+          </a:xfrm>
+          <a:prstGeom prst="rect">
+            <a:avLst/>
+          </a:prstGeom>
+          <a:noFill/>
+        </p:spPr>
+        <p:txBody>
+          <a:bodyPr wrap="none" rtlCol="0">
+            <a:spAutoFit/>
+          </a:bodyPr>
+          <a:lstStyle/>
+          <a:p>
+            <a:r>
+              <a:rPr lang="en-US" dirty="0"/>
+              <a:t>If we use a simple </a:t>
+            </a:r>
+            <a:r>
+              <a:rPr lang="en-US" dirty="0">
+                <a:solidFill>
+                  <a:srgbClr val="FF0000"/>
+                </a:solidFill>
+              </a:rPr>
+              <a:t>threshold of significance </a:t>
+            </a:r>
+            <a:r>
+              <a:rPr lang="en-US" dirty="0"/>
+              <a:t>of 0.05, we would </a:t>
+            </a:r>
+          </a:p>
+          <a:p>
+            <a:r>
+              <a:rPr lang="en-US" dirty="0"/>
+              <a:t>expect about 1,000 genes to be called significant even if the null </a:t>
+            </a:r>
+          </a:p>
+          <a:p>
+            <a:r>
+              <a:rPr lang="en-US" dirty="0"/>
+              <a:t>hypothesis were always true..</a:t>
+            </a:r>
+          </a:p>
+          <a:p>
+            <a:endParaRPr lang="en-US" dirty="0"/>
+          </a:p>
+          <a:p>
+            <a:endParaRPr lang="en-US" dirty="0"/>
+          </a:p>
+        </p:txBody>
+      </p:sp>
+      <p:pic>
+        <p:nvPicPr>
+          <p:cNvPr id="2050" name="Picture 2"/>
+          <p:cNvPicPr>
+            <a:picLocks noChangeAspect="1" noChangeArrowheads="1"/>
+          </p:cNvPicPr>
+          <p:nvPr/>
+        </p:nvPicPr>
+        <p:blipFill>
+          <a:blip r:embed="rId2" cstate="print"/>
+          <a:srcRect/>
+          <a:stretch>
+            <a:fillRect/>
+          </a:stretch>
+        </p:blipFill>
+        <p:spPr bwMode="auto">
+          <a:xfrm>
+            <a:off x="2438401" y="1828800"/>
+            <a:ext cx="2200275" cy="1466850"/>
+          </a:xfrm>
+          <a:prstGeom prst="rect">
+            <a:avLst/>
+          </a:prstGeom>
+          <a:noFill/>
+          <a:ln w="9525">
+            <a:noFill/>
+            <a:miter lim="800000"/>
+            <a:headEnd/>
+            <a:tailEnd/>
+          </a:ln>
+        </p:spPr>
+      </p:pic>
+      <p:sp>
+        <p:nvSpPr>
+          <p:cNvPr id="6" name="TextBox 5"/>
+          <p:cNvSpPr txBox="1"/>
+          <p:nvPr/>
+        </p:nvSpPr>
+        <p:spPr>
+          <a:xfrm>
+            <a:off x="3733800" y="3212069"/>
+            <a:ext cx="4613442" cy="646331"/>
+          </a:xfrm>
+          <a:prstGeom prst="rect">
+            <a:avLst/>
+          </a:prstGeom>
+          <a:noFill/>
+        </p:spPr>
+        <p:txBody>
+          <a:bodyPr wrap="none" rtlCol="0">
+            <a:spAutoFit/>
+          </a:bodyPr>
+          <a:lstStyle/>
+          <a:p>
+            <a:r>
+              <a:rPr lang="en-US" dirty="0"/>
+              <a:t>There are 1,016 genes that have p-values &lt;0.05</a:t>
+            </a:r>
+          </a:p>
+          <a:p>
+            <a:r>
+              <a:rPr lang="en-US" dirty="0"/>
+              <a:t>in this case where the p-values are uniform</a:t>
+            </a:r>
+            <a:endParaRPr lang="en-US" dirty="0"/>
+          </a:p>
+        </p:txBody>
+      </p:sp>
+      <p:cxnSp>
+        <p:nvCxnSpPr>
+          <p:cNvPr id="8" name="Straight Arrow Connector 7"/>
+          <p:cNvCxnSpPr/>
+          <p:nvPr/>
+        </p:nvCxnSpPr>
+        <p:spPr>
+          <a:xfrm rot="10800000">
+            <a:off x="3200400" y="3048000"/>
+            <a:ext cx="533400" cy="304800"/>
+          </a:xfrm>
+          <a:prstGeom prst="straightConnector1">
+            <a:avLst/>
+          </a:prstGeom>
+          <a:ln>
+            <a:tailEnd type="arrow"/>
+          </a:ln>
+        </p:spPr>
+        <p:style>
+          <a:lnRef idx="1">
+            <a:schemeClr val="accent1"/>
+          </a:lnRef>
+          <a:fillRef idx="0">
+            <a:schemeClr val="accent1"/>
+          </a:fillRef>
+          <a:effectRef idx="0">
+            <a:schemeClr val="accent1"/>
+          </a:effectRef>
+          <a:fontRef idx="minor">
+            <a:schemeClr val="tx1"/>
+          </a:fontRef>
+        </p:style>
+      </p:cxnSp>
+    </p:spTree>
+    <p:extLst>
+      <p:ext uri="{BB962C8B-B14F-4D97-AF65-F5344CB8AC3E}">
+        <p14:creationId xmlns:p14="http://schemas.microsoft.com/office/powerpoint/2010/main" val="2390073964"/>
+      </p:ext>
+    </p:extLst>
+  </p:cSld>
+  <p:clrMapOvr>
+    <a:masterClrMapping/>
+  </p:clrMapOvr>
+</p:sld>
+</file>
+
+<file path=ppt/slides/slide29.xml><?xml version="1.0" encoding="utf-8"?>
+<p:sld xmlns:a="http://schemas.openxmlformats.org/drawingml/2006/main" xmlns:r="http://schemas.openxmlformats.org/officeDocument/2006/relationships" xmlns:p="http://schemas.openxmlformats.org/presentationml/2006/main">
+  <p:cSld>
+    <p:spTree>
+      <p:nvGrpSpPr>
+        <p:cNvPr id="1" name=""/>
+        <p:cNvGrpSpPr/>
+        <p:nvPr/>
+      </p:nvGrpSpPr>
+      <p:grpSpPr>
+        <a:xfrm>
+          <a:off x="0" y="0"/>
+          <a:ext cx="0" cy="0"/>
+          <a:chOff x="0" y="0"/>
+          <a:chExt cx="0" cy="0"/>
+        </a:xfrm>
+      </p:grpSpPr>
+      <p:sp>
+        <p:nvSpPr>
+          <p:cNvPr id="4" name="TextBox 3"/>
+          <p:cNvSpPr txBox="1"/>
+          <p:nvPr/>
+        </p:nvSpPr>
+        <p:spPr>
+          <a:xfrm>
+            <a:off x="2133601" y="533400"/>
+            <a:ext cx="5702459" cy="2862322"/>
+          </a:xfrm>
+          <a:prstGeom prst="rect">
+            <a:avLst/>
+          </a:prstGeom>
+          <a:noFill/>
+        </p:spPr>
+        <p:txBody>
+          <a:bodyPr wrap="none" rtlCol="0">
+            <a:spAutoFit/>
+          </a:bodyPr>
+          <a:lstStyle/>
+          <a:p>
+            <a:r>
+              <a:rPr lang="en-US" dirty="0"/>
+              <a:t>One alternative:</a:t>
+            </a:r>
+          </a:p>
+          <a:p>
+            <a:endParaRPr lang="en-US" dirty="0"/>
+          </a:p>
+          <a:p>
+            <a:r>
+              <a:rPr lang="en-US" dirty="0"/>
+              <a:t>	Use as a p-value threshold </a:t>
+            </a:r>
+            <a:r>
+              <a:rPr lang="en-US" dirty="0" err="1"/>
+              <a:t>Bonferroni</a:t>
+            </a:r>
+            <a:r>
+              <a:rPr lang="en-US" dirty="0"/>
+              <a:t> correction.</a:t>
+            </a:r>
+          </a:p>
+          <a:p>
+            <a:endParaRPr lang="en-US" dirty="0"/>
+          </a:p>
+          <a:p>
+            <a:r>
+              <a:rPr lang="en-US" dirty="0"/>
+              <a:t>	The desired threshold / number of tests.</a:t>
+            </a:r>
+          </a:p>
+          <a:p>
+            <a:endParaRPr lang="en-US" dirty="0"/>
+          </a:p>
+          <a:p>
+            <a:r>
+              <a:rPr lang="en-US" dirty="0"/>
+              <a:t>	In this case  0.05 / 20000  =  2.5e-06</a:t>
+            </a:r>
+          </a:p>
+          <a:p>
+            <a:endParaRPr lang="en-US" dirty="0"/>
+          </a:p>
+          <a:p>
+            <a:endParaRPr lang="en-US" dirty="0"/>
+          </a:p>
+          <a:p>
+            <a:endParaRPr lang="en-US" dirty="0"/>
+          </a:p>
+        </p:txBody>
+      </p:sp>
+      <p:pic>
+        <p:nvPicPr>
+          <p:cNvPr id="3074" name="Picture 2"/>
+          <p:cNvPicPr>
+            <a:picLocks noChangeAspect="1" noChangeArrowheads="1"/>
+          </p:cNvPicPr>
+          <p:nvPr/>
+        </p:nvPicPr>
+        <p:blipFill>
+          <a:blip r:embed="rId2" cstate="print"/>
+          <a:srcRect/>
+          <a:stretch>
+            <a:fillRect/>
+          </a:stretch>
+        </p:blipFill>
+        <p:spPr bwMode="auto">
+          <a:xfrm>
+            <a:off x="2133601" y="2971801"/>
+            <a:ext cx="2809875" cy="2314575"/>
+          </a:xfrm>
+          <a:prstGeom prst="rect">
+            <a:avLst/>
+          </a:prstGeom>
+          <a:noFill/>
+          <a:ln w="9525">
+            <a:noFill/>
+            <a:miter lim="800000"/>
+            <a:headEnd/>
+            <a:tailEnd/>
+          </a:ln>
+        </p:spPr>
+      </p:pic>
+      <p:pic>
+        <p:nvPicPr>
+          <p:cNvPr id="3075" name="Picture 3"/>
+          <p:cNvPicPr>
+            <a:picLocks noChangeAspect="1" noChangeArrowheads="1"/>
+          </p:cNvPicPr>
+          <p:nvPr/>
+        </p:nvPicPr>
+        <p:blipFill>
+          <a:blip r:embed="rId3" cstate="print"/>
+          <a:srcRect/>
+          <a:stretch>
+            <a:fillRect/>
+          </a:stretch>
+        </p:blipFill>
+        <p:spPr bwMode="auto">
+          <a:xfrm>
+            <a:off x="2057401" y="5334000"/>
+            <a:ext cx="5743575" cy="742950"/>
+          </a:xfrm>
+          <a:prstGeom prst="rect">
+            <a:avLst/>
+          </a:prstGeom>
+          <a:noFill/>
+          <a:ln w="9525">
+            <a:noFill/>
+            <a:miter lim="800000"/>
+            <a:headEnd/>
+            <a:tailEnd/>
+          </a:ln>
+        </p:spPr>
+      </p:pic>
+      <p:sp>
+        <p:nvSpPr>
+          <p:cNvPr id="7" name="TextBox 6"/>
+          <p:cNvSpPr txBox="1"/>
+          <p:nvPr/>
+        </p:nvSpPr>
+        <p:spPr>
+          <a:xfrm>
+            <a:off x="4572000" y="4038600"/>
+            <a:ext cx="3951916" cy="369332"/>
+          </a:xfrm>
+          <a:prstGeom prst="rect">
+            <a:avLst/>
+          </a:prstGeom>
+          <a:noFill/>
+        </p:spPr>
+        <p:txBody>
+          <a:bodyPr wrap="none" rtlCol="0">
+            <a:spAutoFit/>
+          </a:bodyPr>
+          <a:lstStyle/>
+          <a:p>
+            <a:r>
+              <a:rPr lang="en-US" dirty="0"/>
+              <a:t>None of our p-</a:t>
+            </a:r>
+            <a:r>
+              <a:rPr lang="en-US" dirty="0" err="1"/>
+              <a:t>vals</a:t>
+            </a:r>
+            <a:r>
+              <a:rPr lang="en-US" dirty="0"/>
+              <a:t> reach this threshold..</a:t>
+            </a:r>
+            <a:endParaRPr lang="en-US" dirty="0"/>
+          </a:p>
+        </p:txBody>
+      </p:sp>
+      <p:sp>
+        <p:nvSpPr>
+          <p:cNvPr id="8" name="TextBox 7"/>
+          <p:cNvSpPr txBox="1"/>
+          <p:nvPr/>
+        </p:nvSpPr>
+        <p:spPr>
+          <a:xfrm>
+            <a:off x="2209800" y="6248400"/>
+            <a:ext cx="5759462" cy="369332"/>
+          </a:xfrm>
+          <a:prstGeom prst="rect">
+            <a:avLst/>
+          </a:prstGeom>
+          <a:noFill/>
+        </p:spPr>
+        <p:txBody>
+          <a:bodyPr wrap="none" rtlCol="0">
+            <a:spAutoFit/>
+          </a:bodyPr>
+          <a:lstStyle/>
+          <a:p>
+            <a:r>
+              <a:rPr lang="en-US" dirty="0"/>
+              <a:t>At this threshold, there is a 5% chance of </a:t>
+            </a:r>
+            <a:r>
+              <a:rPr lang="en-US" dirty="0">
+                <a:solidFill>
+                  <a:srgbClr val="FF0000"/>
+                </a:solidFill>
+              </a:rPr>
+              <a:t>any</a:t>
+            </a:r>
+            <a:r>
+              <a:rPr lang="en-US" dirty="0"/>
+              <a:t> false positives </a:t>
+            </a:r>
+            <a:endParaRPr lang="en-US" dirty="0"/>
+          </a:p>
+        </p:txBody>
+      </p:sp>
+    </p:spTree>
+    <p:extLst>
+      <p:ext uri="{BB962C8B-B14F-4D97-AF65-F5344CB8AC3E}">
+        <p14:creationId xmlns:p14="http://schemas.microsoft.com/office/powerpoint/2010/main" val="3667147080"/>
+      </p:ext>
+    </p:extLst>
+  </p:cSld>
+  <p:clrMapOvr>
+    <a:masterClrMapping/>
+  </p:clrMapOvr>
+</p:sld>
+</file>
+
 <file path=ppt/slides/slide3.xml><?xml version="1.0" encoding="utf-8"?>
 <p:sld xmlns:a="http://schemas.openxmlformats.org/drawingml/2006/main" xmlns:r="http://schemas.openxmlformats.org/officeDocument/2006/relationships" xmlns:p="http://schemas.openxmlformats.org/presentationml/2006/main">
   <p:cSld>
@@ -6765,6 +7620,811 @@
     <p:extLst>
       <p:ext uri="{BB962C8B-B14F-4D97-AF65-F5344CB8AC3E}">
         <p14:creationId xmlns:p14="http://schemas.microsoft.com/office/powerpoint/2010/main" val="1531458552"/>
+      </p:ext>
+    </p:extLst>
+  </p:cSld>
+  <p:clrMapOvr>
+    <a:masterClrMapping/>
+  </p:clrMapOvr>
+</p:sld>
+</file>
+
+<file path=ppt/slides/slide30.xml><?xml version="1.0" encoding="utf-8"?>
+<p:sld xmlns:a="http://schemas.openxmlformats.org/drawingml/2006/main" xmlns:r="http://schemas.openxmlformats.org/officeDocument/2006/relationships" xmlns:p="http://schemas.openxmlformats.org/presentationml/2006/main">
+  <p:cSld>
+    <p:spTree>
+      <p:nvGrpSpPr>
+        <p:cNvPr id="1" name=""/>
+        <p:cNvGrpSpPr/>
+        <p:nvPr/>
+      </p:nvGrpSpPr>
+      <p:grpSpPr>
+        <a:xfrm>
+          <a:off x="0" y="0"/>
+          <a:ext cx="0" cy="0"/>
+          <a:chOff x="0" y="0"/>
+          <a:chExt cx="0" cy="0"/>
+        </a:xfrm>
+      </p:grpSpPr>
+      <p:sp>
+        <p:nvSpPr>
+          <p:cNvPr id="4" name="Rectangle 3"/>
+          <p:cNvSpPr/>
+          <p:nvPr/>
+        </p:nvSpPr>
+        <p:spPr>
+          <a:xfrm>
+            <a:off x="1828800" y="228601"/>
+            <a:ext cx="8715014" cy="3139321"/>
+          </a:xfrm>
+          <a:prstGeom prst="rect">
+            <a:avLst/>
+          </a:prstGeom>
+        </p:spPr>
+        <p:txBody>
+          <a:bodyPr wrap="none">
+            <a:spAutoFit/>
+          </a:bodyPr>
+          <a:lstStyle/>
+          <a:p>
+            <a:r>
+              <a:rPr lang="en-US" dirty="0" err="1"/>
+              <a:t>Bonferroni</a:t>
+            </a:r>
+            <a:r>
+              <a:rPr lang="en-US" dirty="0"/>
+              <a:t> correction is sometimes considered </a:t>
+            </a:r>
+            <a:r>
+              <a:rPr lang="en-US" dirty="0">
+                <a:solidFill>
+                  <a:srgbClr val="FF0000"/>
+                </a:solidFill>
+              </a:rPr>
+              <a:t>too conservative </a:t>
+            </a:r>
+            <a:r>
+              <a:rPr lang="en-US" dirty="0"/>
+              <a:t>for genomics experiments.</a:t>
+            </a:r>
+          </a:p>
+          <a:p>
+            <a:endParaRPr lang="en-US" dirty="0"/>
+          </a:p>
+          <a:p>
+            <a:r>
+              <a:rPr lang="en-US" dirty="0"/>
+              <a:t>At small sample sizes, you might have few genes with p-values smaller than the </a:t>
+            </a:r>
+          </a:p>
+          <a:p>
+            <a:r>
+              <a:rPr lang="en-US" dirty="0" err="1"/>
+              <a:t>Bonferroni</a:t>
+            </a:r>
+            <a:r>
+              <a:rPr lang="en-US" dirty="0"/>
+              <a:t> thresholds.</a:t>
+            </a:r>
+          </a:p>
+          <a:p>
+            <a:endParaRPr lang="en-US" dirty="0"/>
+          </a:p>
+          <a:p>
+            <a:r>
+              <a:rPr lang="en-US" dirty="0"/>
+              <a:t>A less conservative alternative, false discovery rate.</a:t>
+            </a:r>
+          </a:p>
+          <a:p>
+            <a:endParaRPr lang="en-US" dirty="0"/>
+          </a:p>
+          <a:p>
+            <a:r>
+              <a:rPr lang="en-US" dirty="0"/>
+              <a:t>At a 5% false discovery rate, we expect 5% of our hits to be false positives.</a:t>
+            </a:r>
+          </a:p>
+          <a:p>
+            <a:endParaRPr lang="en-US" dirty="0"/>
+          </a:p>
+          <a:p>
+            <a:r>
+              <a:rPr lang="en-US" dirty="0"/>
+              <a:t>This is less conservative than </a:t>
+            </a:r>
+            <a:r>
+              <a:rPr lang="en-US" dirty="0" err="1"/>
+              <a:t>Bonferroni</a:t>
+            </a:r>
+            <a:r>
+              <a:rPr lang="en-US" dirty="0"/>
+              <a:t> correction, where there is a 5% chance</a:t>
+            </a:r>
+          </a:p>
+          <a:p>
+            <a:r>
+              <a:rPr lang="en-US" dirty="0"/>
+              <a:t>that </a:t>
+            </a:r>
+            <a:r>
+              <a:rPr lang="en-US" dirty="0">
+                <a:solidFill>
+                  <a:srgbClr val="FF0000"/>
+                </a:solidFill>
+              </a:rPr>
+              <a:t>any</a:t>
+            </a:r>
+            <a:r>
+              <a:rPr lang="en-US" dirty="0"/>
+              <a:t> of our hits are false positives.</a:t>
+            </a:r>
+            <a:endParaRPr lang="en-US" dirty="0"/>
+          </a:p>
+        </p:txBody>
+      </p:sp>
+    </p:spTree>
+    <p:extLst>
+      <p:ext uri="{BB962C8B-B14F-4D97-AF65-F5344CB8AC3E}">
+        <p14:creationId xmlns:p14="http://schemas.microsoft.com/office/powerpoint/2010/main" val="1983821229"/>
+      </p:ext>
+    </p:extLst>
+  </p:cSld>
+  <p:clrMapOvr>
+    <a:masterClrMapping/>
+  </p:clrMapOvr>
+</p:sld>
+</file>
+
+<file path=ppt/slides/slide31.xml><?xml version="1.0" encoding="utf-8"?>
+<p:sld xmlns:a="http://schemas.openxmlformats.org/drawingml/2006/main" xmlns:r="http://schemas.openxmlformats.org/officeDocument/2006/relationships" xmlns:p="http://schemas.openxmlformats.org/presentationml/2006/main">
+  <p:cSld>
+    <p:spTree>
+      <p:nvGrpSpPr>
+        <p:cNvPr id="1" name=""/>
+        <p:cNvGrpSpPr/>
+        <p:nvPr/>
+      </p:nvGrpSpPr>
+      <p:grpSpPr>
+        <a:xfrm>
+          <a:off x="0" y="0"/>
+          <a:ext cx="0" cy="0"/>
+          <a:chOff x="0" y="0"/>
+          <a:chExt cx="0" cy="0"/>
+        </a:xfrm>
+      </p:grpSpPr>
+      <p:sp>
+        <p:nvSpPr>
+          <p:cNvPr id="4" name="TextBox 3"/>
+          <p:cNvSpPr txBox="1"/>
+          <p:nvPr/>
+        </p:nvSpPr>
+        <p:spPr>
+          <a:xfrm flipH="1">
+            <a:off x="1904999" y="228600"/>
+            <a:ext cx="7696201" cy="3416320"/>
+          </a:xfrm>
+          <a:prstGeom prst="rect">
+            <a:avLst/>
+          </a:prstGeom>
+          <a:noFill/>
+        </p:spPr>
+        <p:txBody>
+          <a:bodyPr wrap="square" rtlCol="0">
+            <a:spAutoFit/>
+          </a:bodyPr>
+          <a:lstStyle/>
+          <a:p>
+            <a:r>
+              <a:rPr lang="en-US" dirty="0"/>
+              <a:t>One straight-forward approach to finding genes at a given false-discovery rate</a:t>
+            </a:r>
+          </a:p>
+          <a:p>
+            <a:endParaRPr lang="en-US" dirty="0"/>
+          </a:p>
+          <a:p>
+            <a:r>
+              <a:rPr lang="en-US" dirty="0" err="1"/>
+              <a:t>Benjamini</a:t>
+            </a:r>
+            <a:r>
+              <a:rPr lang="en-US" dirty="0"/>
+              <a:t> and Hochberg FDR</a:t>
+            </a:r>
+          </a:p>
+          <a:p>
+            <a:endParaRPr lang="en-US" dirty="0"/>
+          </a:p>
+          <a:p>
+            <a:r>
+              <a:rPr lang="en-US" dirty="0"/>
+              <a:t>	1.  Rank all the p-values (smallest first).  The rank of each value = K</a:t>
+            </a:r>
+          </a:p>
+          <a:p>
+            <a:endParaRPr lang="en-US" dirty="0"/>
+          </a:p>
+          <a:p>
+            <a:r>
+              <a:rPr lang="en-US" dirty="0"/>
+              <a:t>	2.  Calculate N * p / k </a:t>
+            </a:r>
+          </a:p>
+          <a:p>
+            <a:r>
+              <a:rPr lang="en-US" dirty="0"/>
+              <a:t>		where N = the # of hypotheses that you are testing</a:t>
+            </a:r>
+          </a:p>
+          <a:p>
+            <a:r>
+              <a:rPr lang="en-US" dirty="0"/>
+              <a:t>		             p = the “raw” (uncorrected) p-value.</a:t>
+            </a:r>
+          </a:p>
+          <a:p>
+            <a:endParaRPr lang="en-US" dirty="0"/>
+          </a:p>
+          <a:p>
+            <a:r>
+              <a:rPr lang="en-US" dirty="0"/>
+              <a:t>	3.  Start at the top of the list.  Go down to N * p / k &gt; threshold </a:t>
+            </a:r>
+          </a:p>
+          <a:p>
+            <a:r>
+              <a:rPr lang="en-US" dirty="0"/>
+              <a:t>		(e.g. 0.10 for 10% FDR). </a:t>
+            </a:r>
+            <a:endParaRPr lang="en-US" dirty="0"/>
+          </a:p>
+        </p:txBody>
+      </p:sp>
+      <p:pic>
+        <p:nvPicPr>
+          <p:cNvPr id="4098" name="Picture 2"/>
+          <p:cNvPicPr>
+            <a:picLocks noChangeAspect="1" noChangeArrowheads="1"/>
+          </p:cNvPicPr>
+          <p:nvPr/>
+        </p:nvPicPr>
+        <p:blipFill>
+          <a:blip r:embed="rId2" cstate="print"/>
+          <a:srcRect/>
+          <a:stretch>
+            <a:fillRect/>
+          </a:stretch>
+        </p:blipFill>
+        <p:spPr bwMode="auto">
+          <a:xfrm>
+            <a:off x="1981200" y="4114801"/>
+            <a:ext cx="5448300" cy="1304925"/>
+          </a:xfrm>
+          <a:prstGeom prst="rect">
+            <a:avLst/>
+          </a:prstGeom>
+          <a:noFill/>
+          <a:ln w="9525">
+            <a:noFill/>
+            <a:miter lim="800000"/>
+            <a:headEnd/>
+            <a:tailEnd/>
+          </a:ln>
+        </p:spPr>
+      </p:pic>
+      <p:pic>
+        <p:nvPicPr>
+          <p:cNvPr id="4099" name="Picture 3"/>
+          <p:cNvPicPr>
+            <a:picLocks noChangeAspect="1" noChangeArrowheads="1"/>
+          </p:cNvPicPr>
+          <p:nvPr/>
+        </p:nvPicPr>
+        <p:blipFill>
+          <a:blip r:embed="rId3" cstate="print"/>
+          <a:srcRect/>
+          <a:stretch>
+            <a:fillRect/>
+          </a:stretch>
+        </p:blipFill>
+        <p:spPr bwMode="auto">
+          <a:xfrm>
+            <a:off x="7696200" y="3352800"/>
+            <a:ext cx="2189468" cy="3276600"/>
+          </a:xfrm>
+          <a:prstGeom prst="rect">
+            <a:avLst/>
+          </a:prstGeom>
+          <a:noFill/>
+          <a:ln w="9525">
+            <a:noFill/>
+            <a:miter lim="800000"/>
+            <a:headEnd/>
+            <a:tailEnd/>
+          </a:ln>
+        </p:spPr>
+      </p:pic>
+      <p:sp>
+        <p:nvSpPr>
+          <p:cNvPr id="8" name="TextBox 7"/>
+          <p:cNvSpPr txBox="1"/>
+          <p:nvPr/>
+        </p:nvSpPr>
+        <p:spPr>
+          <a:xfrm>
+            <a:off x="1828801" y="5562601"/>
+            <a:ext cx="5236113" cy="646331"/>
+          </a:xfrm>
+          <a:prstGeom prst="rect">
+            <a:avLst/>
+          </a:prstGeom>
+          <a:noFill/>
+        </p:spPr>
+        <p:txBody>
+          <a:bodyPr wrap="none" rtlCol="0">
+            <a:spAutoFit/>
+          </a:bodyPr>
+          <a:lstStyle/>
+          <a:p>
+            <a:r>
+              <a:rPr lang="en-US" dirty="0"/>
+              <a:t>N * p = # of expected false positives at a given p-value</a:t>
+            </a:r>
+          </a:p>
+          <a:p>
+            <a:r>
+              <a:rPr lang="en-US" dirty="0"/>
+              <a:t> k = # of genes actually observed at that p-value</a:t>
+            </a:r>
+            <a:endParaRPr lang="en-US" dirty="0"/>
+          </a:p>
+        </p:txBody>
+      </p:sp>
+    </p:spTree>
+    <p:extLst>
+      <p:ext uri="{BB962C8B-B14F-4D97-AF65-F5344CB8AC3E}">
+        <p14:creationId xmlns:p14="http://schemas.microsoft.com/office/powerpoint/2010/main" val="1718486779"/>
+      </p:ext>
+    </p:extLst>
+  </p:cSld>
+  <p:clrMapOvr>
+    <a:masterClrMapping/>
+  </p:clrMapOvr>
+</p:sld>
+</file>
+
+<file path=ppt/slides/slide32.xml><?xml version="1.0" encoding="utf-8"?>
+<p:sld xmlns:a="http://schemas.openxmlformats.org/drawingml/2006/main" xmlns:r="http://schemas.openxmlformats.org/officeDocument/2006/relationships" xmlns:p="http://schemas.openxmlformats.org/presentationml/2006/main">
+  <p:cSld>
+    <p:spTree>
+      <p:nvGrpSpPr>
+        <p:cNvPr id="1" name=""/>
+        <p:cNvGrpSpPr/>
+        <p:nvPr/>
+      </p:nvGrpSpPr>
+      <p:grpSpPr>
+        <a:xfrm>
+          <a:off x="0" y="0"/>
+          <a:ext cx="0" cy="0"/>
+          <a:chOff x="0" y="0"/>
+          <a:chExt cx="0" cy="0"/>
+        </a:xfrm>
+      </p:grpSpPr>
+      <p:sp>
+        <p:nvSpPr>
+          <p:cNvPr id="4" name="TextBox 3"/>
+          <p:cNvSpPr txBox="1"/>
+          <p:nvPr/>
+        </p:nvSpPr>
+        <p:spPr>
+          <a:xfrm>
+            <a:off x="2362201" y="533401"/>
+            <a:ext cx="7449603" cy="2585323"/>
+          </a:xfrm>
+          <a:prstGeom prst="rect">
+            <a:avLst/>
+          </a:prstGeom>
+          <a:noFill/>
+        </p:spPr>
+        <p:txBody>
+          <a:bodyPr wrap="none" rtlCol="0">
+            <a:spAutoFit/>
+          </a:bodyPr>
+          <a:lstStyle/>
+          <a:p>
+            <a:r>
+              <a:rPr lang="en-US" dirty="0"/>
+              <a:t>Note that for the first hit (smallest p-value), </a:t>
+            </a:r>
+          </a:p>
+          <a:p>
+            <a:r>
+              <a:rPr lang="en-US" dirty="0" err="1"/>
+              <a:t>Bonferroni</a:t>
+            </a:r>
+            <a:r>
+              <a:rPr lang="en-US" dirty="0"/>
+              <a:t> correction is the same as BH FDR.</a:t>
+            </a:r>
+          </a:p>
+          <a:p>
+            <a:endParaRPr lang="en-US" dirty="0"/>
+          </a:p>
+          <a:p>
+            <a:r>
+              <a:rPr lang="en-US" dirty="0"/>
+              <a:t>(Since if k=1,</a:t>
+            </a:r>
+          </a:p>
+          <a:p>
+            <a:endParaRPr lang="en-US" dirty="0"/>
+          </a:p>
+          <a:p>
+            <a:r>
+              <a:rPr lang="en-US" dirty="0"/>
+              <a:t>	N * p / K = N * p</a:t>
+            </a:r>
+          </a:p>
+          <a:p>
+            <a:endParaRPr lang="en-US" dirty="0"/>
+          </a:p>
+          <a:p>
+            <a:r>
+              <a:rPr lang="en-US" dirty="0"/>
+              <a:t>which is the same as multiplying the p-value by the number of hypotheses to </a:t>
+            </a:r>
+          </a:p>
+          <a:p>
+            <a:r>
+              <a:rPr lang="en-US" dirty="0"/>
+              <a:t>do the correction)</a:t>
+            </a:r>
+            <a:endParaRPr lang="en-US" dirty="0"/>
+          </a:p>
+        </p:txBody>
+      </p:sp>
+    </p:spTree>
+    <p:extLst>
+      <p:ext uri="{BB962C8B-B14F-4D97-AF65-F5344CB8AC3E}">
+        <p14:creationId xmlns:p14="http://schemas.microsoft.com/office/powerpoint/2010/main" val="910842781"/>
+      </p:ext>
+    </p:extLst>
+  </p:cSld>
+  <p:clrMapOvr>
+    <a:masterClrMapping/>
+  </p:clrMapOvr>
+</p:sld>
+</file>
+
+<file path=ppt/slides/slide33.xml><?xml version="1.0" encoding="utf-8"?>
+<p:sld xmlns:a="http://schemas.openxmlformats.org/drawingml/2006/main" xmlns:r="http://schemas.openxmlformats.org/officeDocument/2006/relationships" xmlns:p="http://schemas.openxmlformats.org/presentationml/2006/main">
+  <p:cSld>
+    <p:spTree>
+      <p:nvGrpSpPr>
+        <p:cNvPr id="1" name=""/>
+        <p:cNvGrpSpPr/>
+        <p:nvPr/>
+      </p:nvGrpSpPr>
+      <p:grpSpPr>
+        <a:xfrm>
+          <a:off x="0" y="0"/>
+          <a:ext cx="0" cy="0"/>
+          <a:chOff x="0" y="0"/>
+          <a:chExt cx="0" cy="0"/>
+        </a:xfrm>
+      </p:grpSpPr>
+      <p:pic>
+        <p:nvPicPr>
+          <p:cNvPr id="4" name="Picture 3"/>
+          <p:cNvPicPr>
+            <a:picLocks noChangeAspect="1" noChangeArrowheads="1"/>
+          </p:cNvPicPr>
+          <p:nvPr/>
+        </p:nvPicPr>
+        <p:blipFill>
+          <a:blip r:embed="rId2" cstate="print"/>
+          <a:srcRect/>
+          <a:stretch>
+            <a:fillRect/>
+          </a:stretch>
+        </p:blipFill>
+        <p:spPr bwMode="auto">
+          <a:xfrm>
+            <a:off x="1752601" y="1219201"/>
+            <a:ext cx="8639175" cy="4439833"/>
+          </a:xfrm>
+          <a:prstGeom prst="rect">
+            <a:avLst/>
+          </a:prstGeom>
+          <a:noFill/>
+          <a:ln w="9525">
+            <a:noFill/>
+            <a:miter lim="800000"/>
+            <a:headEnd/>
+            <a:tailEnd/>
+          </a:ln>
+        </p:spPr>
+      </p:pic>
+      <p:sp>
+        <p:nvSpPr>
+          <p:cNvPr id="5" name="TextBox 4"/>
+          <p:cNvSpPr txBox="1"/>
+          <p:nvPr/>
+        </p:nvSpPr>
+        <p:spPr>
+          <a:xfrm>
+            <a:off x="323602" y="152400"/>
+            <a:ext cx="6987106" cy="369332"/>
+          </a:xfrm>
+          <a:prstGeom prst="rect">
+            <a:avLst/>
+          </a:prstGeom>
+          <a:noFill/>
+        </p:spPr>
+        <p:txBody>
+          <a:bodyPr wrap="none" rtlCol="0">
+            <a:spAutoFit/>
+          </a:bodyPr>
+          <a:lstStyle/>
+          <a:p>
+            <a:r>
+              <a:rPr lang="en-US" dirty="0" smtClean="0"/>
+              <a:t>Here are example results from </a:t>
+            </a:r>
+            <a:r>
+              <a:rPr lang="en-US" dirty="0" err="1" smtClean="0"/>
+              <a:t>DeSeq</a:t>
+            </a:r>
+            <a:r>
+              <a:rPr lang="en-US" dirty="0" smtClean="0"/>
+              <a:t> (a popular RNA-</a:t>
+            </a:r>
+            <a:r>
+              <a:rPr lang="en-US" dirty="0" err="1" smtClean="0"/>
+              <a:t>seq</a:t>
+            </a:r>
+            <a:r>
+              <a:rPr lang="en-US" dirty="0" smtClean="0"/>
+              <a:t> analysis tool)…</a:t>
+            </a:r>
+            <a:endParaRPr lang="en-US" dirty="0"/>
+          </a:p>
+        </p:txBody>
+      </p:sp>
+      <p:cxnSp>
+        <p:nvCxnSpPr>
+          <p:cNvPr id="7" name="Straight Arrow Connector 6"/>
+          <p:cNvCxnSpPr/>
+          <p:nvPr/>
+        </p:nvCxnSpPr>
+        <p:spPr>
+          <a:xfrm rot="16200000" flipH="1">
+            <a:off x="7848600" y="990600"/>
+            <a:ext cx="457200" cy="304800"/>
+          </a:xfrm>
+          <a:prstGeom prst="straightConnector1">
+            <a:avLst/>
+          </a:prstGeom>
+          <a:ln>
+            <a:tailEnd type="arrow"/>
+          </a:ln>
+        </p:spPr>
+        <p:style>
+          <a:lnRef idx="1">
+            <a:schemeClr val="accent1"/>
+          </a:lnRef>
+          <a:fillRef idx="0">
+            <a:schemeClr val="accent1"/>
+          </a:fillRef>
+          <a:effectRef idx="0">
+            <a:schemeClr val="accent1"/>
+          </a:effectRef>
+          <a:fontRef idx="minor">
+            <a:schemeClr val="tx1"/>
+          </a:fontRef>
+        </p:style>
+      </p:cxnSp>
+      <p:sp>
+        <p:nvSpPr>
+          <p:cNvPr id="8" name="TextBox 7"/>
+          <p:cNvSpPr txBox="1"/>
+          <p:nvPr/>
+        </p:nvSpPr>
+        <p:spPr>
+          <a:xfrm>
+            <a:off x="6629401" y="609600"/>
+            <a:ext cx="1420389" cy="369332"/>
+          </a:xfrm>
+          <a:prstGeom prst="rect">
+            <a:avLst/>
+          </a:prstGeom>
+          <a:noFill/>
+        </p:spPr>
+        <p:txBody>
+          <a:bodyPr wrap="none" rtlCol="0">
+            <a:spAutoFit/>
+          </a:bodyPr>
+          <a:lstStyle/>
+          <a:p>
+            <a:r>
+              <a:rPr lang="en-US" dirty="0"/>
+              <a:t>Raw p-values</a:t>
+            </a:r>
+            <a:endParaRPr lang="en-US" dirty="0"/>
+          </a:p>
+        </p:txBody>
+      </p:sp>
+      <p:cxnSp>
+        <p:nvCxnSpPr>
+          <p:cNvPr id="10" name="Straight Arrow Connector 9"/>
+          <p:cNvCxnSpPr/>
+          <p:nvPr/>
+        </p:nvCxnSpPr>
+        <p:spPr>
+          <a:xfrm rot="5400000">
+            <a:off x="9563100" y="952500"/>
+            <a:ext cx="304800" cy="76200"/>
+          </a:xfrm>
+          <a:prstGeom prst="straightConnector1">
+            <a:avLst/>
+          </a:prstGeom>
+          <a:ln>
+            <a:tailEnd type="arrow"/>
+          </a:ln>
+        </p:spPr>
+        <p:style>
+          <a:lnRef idx="1">
+            <a:schemeClr val="accent1"/>
+          </a:lnRef>
+          <a:fillRef idx="0">
+            <a:schemeClr val="accent1"/>
+          </a:fillRef>
+          <a:effectRef idx="0">
+            <a:schemeClr val="accent1"/>
+          </a:effectRef>
+          <a:fontRef idx="minor">
+            <a:schemeClr val="tx1"/>
+          </a:fontRef>
+        </p:style>
+      </p:cxnSp>
+      <p:sp>
+        <p:nvSpPr>
+          <p:cNvPr id="11" name="TextBox 10"/>
+          <p:cNvSpPr txBox="1"/>
+          <p:nvPr/>
+        </p:nvSpPr>
+        <p:spPr>
+          <a:xfrm>
+            <a:off x="8967780" y="304801"/>
+            <a:ext cx="1471621" cy="646331"/>
+          </a:xfrm>
+          <a:prstGeom prst="rect">
+            <a:avLst/>
+          </a:prstGeom>
+          <a:noFill/>
+        </p:spPr>
+        <p:txBody>
+          <a:bodyPr wrap="none" rtlCol="0">
+            <a:spAutoFit/>
+          </a:bodyPr>
+          <a:lstStyle/>
+          <a:p>
+            <a:r>
+              <a:rPr lang="en-US" dirty="0"/>
+              <a:t>FDR adjusted </a:t>
+            </a:r>
+          </a:p>
+          <a:p>
+            <a:r>
+              <a:rPr lang="en-US" dirty="0"/>
+              <a:t>p-values..</a:t>
+            </a:r>
+            <a:endParaRPr lang="en-US" dirty="0"/>
+          </a:p>
+        </p:txBody>
+      </p:sp>
+    </p:spTree>
+    <p:extLst>
+      <p:ext uri="{BB962C8B-B14F-4D97-AF65-F5344CB8AC3E}">
+        <p14:creationId xmlns:p14="http://schemas.microsoft.com/office/powerpoint/2010/main" val="3483583720"/>
+      </p:ext>
+    </p:extLst>
+  </p:cSld>
+  <p:clrMapOvr>
+    <a:masterClrMapping/>
+  </p:clrMapOvr>
+</p:sld>
+</file>
+
+<file path=ppt/slides/slide34.xml><?xml version="1.0" encoding="utf-8"?>
+<p:sld xmlns:a="http://schemas.openxmlformats.org/drawingml/2006/main" xmlns:r="http://schemas.openxmlformats.org/officeDocument/2006/relationships" xmlns:p="http://schemas.openxmlformats.org/presentationml/2006/main">
+  <p:cSld>
+    <p:spTree>
+      <p:nvGrpSpPr>
+        <p:cNvPr id="1" name=""/>
+        <p:cNvGrpSpPr/>
+        <p:nvPr/>
+      </p:nvGrpSpPr>
+      <p:grpSpPr>
+        <a:xfrm>
+          <a:off x="0" y="0"/>
+          <a:ext cx="0" cy="0"/>
+          <a:chOff x="0" y="0"/>
+          <a:chExt cx="0" cy="0"/>
+        </a:xfrm>
+      </p:grpSpPr>
+      <p:sp>
+        <p:nvSpPr>
+          <p:cNvPr id="5" name="TextBox 4"/>
+          <p:cNvSpPr txBox="1"/>
+          <p:nvPr/>
+        </p:nvSpPr>
+        <p:spPr>
+          <a:xfrm>
+            <a:off x="1199408" y="617517"/>
+            <a:ext cx="9452268" cy="1200329"/>
+          </a:xfrm>
+          <a:prstGeom prst="rect">
+            <a:avLst/>
+          </a:prstGeom>
+          <a:noFill/>
+        </p:spPr>
+        <p:txBody>
+          <a:bodyPr wrap="none" rtlCol="0">
+            <a:spAutoFit/>
+          </a:bodyPr>
+          <a:lstStyle/>
+          <a:p>
+            <a:r>
+              <a:rPr lang="en-US" dirty="0" smtClean="0">
+                <a:latin typeface="Arial" panose="020B0604020202020204" pitchFamily="34" charset="0"/>
+                <a:cs typeface="Arial" panose="020B0604020202020204" pitchFamily="34" charset="0"/>
+              </a:rPr>
+              <a:t>If we have 651,705 tests to correct for, we will adversely impact our power.</a:t>
+            </a:r>
+          </a:p>
+          <a:p>
+            <a:endParaRPr lang="en-US" dirty="0">
+              <a:latin typeface="Arial" panose="020B0604020202020204" pitchFamily="34" charset="0"/>
+              <a:cs typeface="Arial" panose="020B0604020202020204" pitchFamily="34" charset="0"/>
+            </a:endParaRPr>
+          </a:p>
+          <a:p>
+            <a:r>
+              <a:rPr lang="en-US" dirty="0" smtClean="0">
+                <a:latin typeface="Arial" panose="020B0604020202020204" pitchFamily="34" charset="0"/>
+                <a:cs typeface="Arial" panose="020B0604020202020204" pitchFamily="34" charset="0"/>
+              </a:rPr>
+              <a:t>Also, a lot of our genes have mostly zeros.  We don’t want to waste our power on rows that</a:t>
+            </a:r>
+          </a:p>
+          <a:p>
+            <a:r>
+              <a:rPr lang="en-US" dirty="0" smtClean="0">
+                <a:latin typeface="Arial" panose="020B0604020202020204" pitchFamily="34" charset="0"/>
+                <a:cs typeface="Arial" panose="020B0604020202020204" pitchFamily="34" charset="0"/>
+              </a:rPr>
+              <a:t>only  have one or two non-zeros.  We can’t do meaningful inference on </a:t>
+            </a:r>
+            <a:r>
+              <a:rPr lang="en-US" smtClean="0">
+                <a:latin typeface="Arial" panose="020B0604020202020204" pitchFamily="34" charset="0"/>
+                <a:cs typeface="Arial" panose="020B0604020202020204" pitchFamily="34" charset="0"/>
+              </a:rPr>
+              <a:t>those rows.</a:t>
+            </a:r>
+            <a:endParaRPr lang="en-US" dirty="0">
+              <a:latin typeface="Arial" panose="020B0604020202020204" pitchFamily="34" charset="0"/>
+              <a:cs typeface="Arial" panose="020B0604020202020204" pitchFamily="34" charset="0"/>
+            </a:endParaRPr>
+          </a:p>
+        </p:txBody>
+      </p:sp>
+    </p:spTree>
+    <p:extLst>
+      <p:ext uri="{BB962C8B-B14F-4D97-AF65-F5344CB8AC3E}">
+        <p14:creationId xmlns:p14="http://schemas.microsoft.com/office/powerpoint/2010/main" val="3681003907"/>
       </p:ext>
     </p:extLst>
   </p:cSld>

</xml_diff>

<commit_message>
towards t-test by t-test
</commit_message>
<xml_diff>
--- a/classes/ChapelHill2016/ChapelHillWorkshop_Fodor.pptx
+++ b/classes/ChapelHill2016/ChapelHillWorkshop_Fodor.pptx
@@ -39,6 +39,8 @@
     <p:sldId id="289" r:id="rId33"/>
     <p:sldId id="290" r:id="rId34"/>
     <p:sldId id="291" r:id="rId35"/>
+    <p:sldId id="292" r:id="rId36"/>
+    <p:sldId id="293" r:id="rId37"/>
   </p:sldIdLst>
   <p:sldSz cx="12192000" cy="6858000"/>
   <p:notesSz cx="6858000" cy="9144000"/>
@@ -6949,7 +6951,6 @@
               <a:rPr lang="en-US" dirty="0"/>
               <a:t> </a:t>
             </a:r>
-            <a:endParaRPr lang="en-US" dirty="0"/>
           </a:p>
         </p:txBody>
       </p:sp>
@@ -7206,7 +7207,6 @@
               <a:rPr lang="en-US" dirty="0"/>
               <a:t>in this case where the p-values are uniform</a:t>
             </a:r>
-            <a:endParaRPr lang="en-US" dirty="0"/>
           </a:p>
         </p:txBody>
       </p:sp>
@@ -7444,7 +7444,6 @@
               <a:rPr lang="en-US" dirty="0"/>
               <a:t> reach this threshold..</a:t>
             </a:r>
-            <a:endParaRPr lang="en-US" dirty="0"/>
           </a:p>
         </p:txBody>
       </p:sp>
@@ -7486,7 +7485,6 @@
               <a:rPr lang="en-US" dirty="0"/>
               <a:t> false positives </a:t>
             </a:r>
-            <a:endParaRPr lang="en-US" dirty="0"/>
           </a:p>
         </p:txBody>
       </p:sp>
@@ -7759,7 +7757,6 @@
               <a:rPr lang="en-US" dirty="0"/>
               <a:t> of our hits are false positives.</a:t>
             </a:r>
-            <a:endParaRPr lang="en-US" dirty="0"/>
           </a:p>
         </p:txBody>
       </p:sp>
@@ -7877,7 +7874,6 @@
               <a:rPr lang="en-US" dirty="0"/>
               <a:t>		(e.g. 0.10 for 10% FDR). </a:t>
             </a:r>
-            <a:endParaRPr lang="en-US" dirty="0"/>
           </a:p>
         </p:txBody>
       </p:sp>
@@ -7977,7 +7973,6 @@
               <a:rPr lang="en-US" dirty="0"/>
               <a:t> k = # of genes actually observed at that p-value</a:t>
             </a:r>
-            <a:endParaRPr lang="en-US" dirty="0"/>
           </a:p>
         </p:txBody>
       </p:sp>
@@ -8080,7 +8075,6 @@
               <a:rPr lang="en-US" dirty="0"/>
               <a:t>do the correction)</a:t>
             </a:r>
-            <a:endParaRPr lang="en-US" dirty="0"/>
           </a:p>
         </p:txBody>
       </p:sp>
@@ -8251,7 +8245,6 @@
               <a:rPr lang="en-US" dirty="0"/>
               <a:t>Raw p-values</a:t>
             </a:r>
-            <a:endParaRPr lang="en-US" dirty="0"/>
           </a:p>
         </p:txBody>
       </p:sp>
@@ -8320,7 +8313,6 @@
               <a:rPr lang="en-US" dirty="0"/>
               <a:t>p-values..</a:t>
             </a:r>
-            <a:endParaRPr lang="en-US" dirty="0"/>
           </a:p>
         </p:txBody>
       </p:sp>
@@ -8362,7 +8354,7 @@
         </p:nvSpPr>
         <p:spPr>
           <a:xfrm>
-            <a:off x="1199408" y="617517"/>
+            <a:off x="71251" y="71252"/>
             <a:ext cx="9452268" cy="1200329"/>
           </a:xfrm>
           <a:prstGeom prst="rect">
@@ -8405,14 +8397,7 @@
                 <a:latin typeface="Arial" panose="020B0604020202020204" pitchFamily="34" charset="0"/>
                 <a:cs typeface="Arial" panose="020B0604020202020204" pitchFamily="34" charset="0"/>
               </a:rPr>
-              <a:t>only  have one or two non-zeros.  We can’t do meaningful inference on </a:t>
-            </a:r>
-            <a:r>
-              <a:rPr lang="en-US" smtClean="0">
-                <a:latin typeface="Arial" panose="020B0604020202020204" pitchFamily="34" charset="0"/>
-                <a:cs typeface="Arial" panose="020B0604020202020204" pitchFamily="34" charset="0"/>
-              </a:rPr>
-              <a:t>those rows.</a:t>
+              <a:t>only  have one or two non-zeros.  We can’t do meaningful inference on those rows.</a:t>
             </a:r>
             <a:endParaRPr lang="en-US" dirty="0">
               <a:latin typeface="Arial" panose="020B0604020202020204" pitchFamily="34" charset="0"/>
@@ -8421,10 +8406,514 @@
           </a:p>
         </p:txBody>
       </p:sp>
+      <p:sp>
+        <p:nvSpPr>
+          <p:cNvPr id="2" name="TextBox 1"/>
+          <p:cNvSpPr txBox="1"/>
+          <p:nvPr/>
+        </p:nvSpPr>
+        <p:spPr>
+          <a:xfrm>
+            <a:off x="1045029" y="1246910"/>
+            <a:ext cx="5900013" cy="369332"/>
+          </a:xfrm>
+          <a:prstGeom prst="rect">
+            <a:avLst/>
+          </a:prstGeom>
+          <a:noFill/>
+        </p:spPr>
+        <p:txBody>
+          <a:bodyPr wrap="none" rtlCol="0">
+            <a:spAutoFit/>
+          </a:bodyPr>
+          <a:lstStyle/>
+          <a:p>
+            <a:r>
+              <a:rPr lang="en-US" dirty="0" smtClean="0">
+                <a:latin typeface="Arial" panose="020B0604020202020204" pitchFamily="34" charset="0"/>
+                <a:cs typeface="Arial" panose="020B0604020202020204" pitchFamily="34" charset="0"/>
+              </a:rPr>
+              <a:t>We can use R to examine and filter out the rare genes…</a:t>
+            </a:r>
+            <a:endParaRPr lang="en-US" dirty="0">
+              <a:latin typeface="Arial" panose="020B0604020202020204" pitchFamily="34" charset="0"/>
+              <a:cs typeface="Arial" panose="020B0604020202020204" pitchFamily="34" charset="0"/>
+            </a:endParaRPr>
+          </a:p>
+        </p:txBody>
+      </p:sp>
+      <p:sp>
+        <p:nvSpPr>
+          <p:cNvPr id="3" name="Rectangle 2"/>
+          <p:cNvSpPr/>
+          <p:nvPr/>
+        </p:nvSpPr>
+        <p:spPr>
+          <a:xfrm>
+            <a:off x="356260" y="1830001"/>
+            <a:ext cx="6096000" cy="3693319"/>
+          </a:xfrm>
+          <a:prstGeom prst="rect">
+            <a:avLst/>
+          </a:prstGeom>
+        </p:spPr>
+        <p:txBody>
+          <a:bodyPr>
+            <a:spAutoFit/>
+          </a:bodyPr>
+          <a:lstStyle/>
+          <a:p>
+            <a:r>
+              <a:rPr lang="en-US" dirty="0" err="1" smtClean="0"/>
+              <a:t>rm</a:t>
+            </a:r>
+            <a:r>
+              <a:rPr lang="en-US" dirty="0" smtClean="0"/>
+              <a:t>(list=ls</a:t>
+            </a:r>
+            <a:r>
+              <a:rPr lang="en-US" dirty="0"/>
+              <a:t>())</a:t>
+            </a:r>
+          </a:p>
+          <a:p>
+            <a:r>
+              <a:rPr lang="en-US" dirty="0" smtClean="0"/>
+              <a:t> </a:t>
+            </a:r>
+            <a:endParaRPr lang="en-US" dirty="0"/>
+          </a:p>
+          <a:p>
+            <a:r>
+              <a:rPr lang="en-US" dirty="0" err="1" smtClean="0"/>
+              <a:t>setwd</a:t>
+            </a:r>
+            <a:r>
+              <a:rPr lang="en-US" dirty="0"/>
+              <a:t>("C:\\ChapelHillWorkshop")</a:t>
+            </a:r>
+          </a:p>
+          <a:p>
+            <a:r>
+              <a:rPr lang="en-US" dirty="0" smtClean="0"/>
+              <a:t>library</a:t>
+            </a:r>
+            <a:r>
+              <a:rPr lang="en-US" dirty="0"/>
+              <a:t>("vegan")</a:t>
+            </a:r>
+          </a:p>
+          <a:p>
+            <a:r>
+              <a:rPr lang="en-US" dirty="0" smtClean="0"/>
+              <a:t> </a:t>
+            </a:r>
+            <a:endParaRPr lang="en-US" dirty="0"/>
+          </a:p>
+          <a:p>
+            <a:r>
+              <a:rPr lang="en-US" dirty="0" err="1" smtClean="0"/>
+              <a:t>inFileName</a:t>
+            </a:r>
+            <a:r>
+              <a:rPr lang="en-US" dirty="0" smtClean="0"/>
+              <a:t> </a:t>
+            </a:r>
+            <a:r>
+              <a:rPr lang="en-US" dirty="0"/>
+              <a:t>&lt;- "humann2_genefamilies-IdsAsPrimaryKey.tsv"</a:t>
+            </a:r>
+          </a:p>
+          <a:p>
+            <a:r>
+              <a:rPr lang="en-US" dirty="0" err="1" smtClean="0"/>
+              <a:t>myT</a:t>
+            </a:r>
+            <a:r>
+              <a:rPr lang="en-US" dirty="0" smtClean="0"/>
+              <a:t> </a:t>
+            </a:r>
+            <a:r>
+              <a:rPr lang="en-US" dirty="0"/>
+              <a:t>&lt;-</a:t>
+            </a:r>
+            <a:r>
+              <a:rPr lang="en-US" dirty="0" err="1"/>
+              <a:t>read.table</a:t>
+            </a:r>
+            <a:r>
+              <a:rPr lang="en-US" dirty="0"/>
+              <a:t>(</a:t>
+            </a:r>
+            <a:r>
+              <a:rPr lang="en-US" dirty="0" err="1"/>
+              <a:t>inFileName,header</a:t>
+            </a:r>
+            <a:r>
+              <a:rPr lang="en-US" dirty="0"/>
+              <a:t>=</a:t>
+            </a:r>
+            <a:r>
+              <a:rPr lang="en-US" dirty="0" err="1"/>
+              <a:t>TRUE,sep</a:t>
+            </a:r>
+            <a:r>
+              <a:rPr lang="en-US" dirty="0"/>
+              <a:t>="\t",</a:t>
+            </a:r>
+            <a:r>
+              <a:rPr lang="en-US" dirty="0" err="1"/>
+              <a:t>row.names</a:t>
+            </a:r>
+            <a:r>
+              <a:rPr lang="en-US" dirty="0"/>
+              <a:t>=1,</a:t>
+            </a:r>
+          </a:p>
+          <a:p>
+            <a:r>
+              <a:rPr lang="en-US" dirty="0"/>
+              <a:t>+ </a:t>
+            </a:r>
+            <a:r>
+              <a:rPr lang="en-US" dirty="0" err="1"/>
+              <a:t>colClasses</a:t>
+            </a:r>
+            <a:r>
+              <a:rPr lang="en-US" dirty="0"/>
+              <a:t>=c("character", rep("numeric", 20)))</a:t>
+            </a:r>
+          </a:p>
+          <a:p>
+            <a:r>
+              <a:rPr lang="en-US" dirty="0" smtClean="0"/>
+              <a:t> </a:t>
+            </a:r>
+            <a:endParaRPr lang="en-US" dirty="0"/>
+          </a:p>
+          <a:p>
+            <a:r>
+              <a:rPr lang="en-US" dirty="0" smtClean="0"/>
+              <a:t>sums </a:t>
+            </a:r>
+            <a:r>
+              <a:rPr lang="en-US" dirty="0"/>
+              <a:t>&lt;- apply(myT,1,sum</a:t>
+            </a:r>
+            <a:r>
+              <a:rPr lang="en-US" dirty="0" smtClean="0"/>
+              <a:t>)</a:t>
+            </a:r>
+          </a:p>
+          <a:p>
+            <a:r>
+              <a:rPr lang="en-US" dirty="0" err="1"/>
+              <a:t>logSums</a:t>
+            </a:r>
+            <a:r>
+              <a:rPr lang="en-US" dirty="0"/>
+              <a:t> &lt;- log10( sums + 0.000001)</a:t>
+            </a:r>
+          </a:p>
+          <a:p>
+            <a:r>
+              <a:rPr lang="en-US" dirty="0" err="1"/>
+              <a:t>hist</a:t>
+            </a:r>
+            <a:r>
+              <a:rPr lang="en-US" dirty="0"/>
+              <a:t>(</a:t>
+            </a:r>
+            <a:r>
+              <a:rPr lang="en-US" dirty="0" err="1"/>
+              <a:t>logSums</a:t>
+            </a:r>
+            <a:r>
+              <a:rPr lang="en-US" dirty="0"/>
+              <a:t>[2:length(</a:t>
+            </a:r>
+            <a:r>
+              <a:rPr lang="en-US" dirty="0" err="1"/>
+              <a:t>logSums</a:t>
+            </a:r>
+            <a:r>
+              <a:rPr lang="en-US" dirty="0"/>
+              <a:t>)],breaks=30)</a:t>
+            </a:r>
+          </a:p>
+        </p:txBody>
+      </p:sp>
+      <p:sp>
+        <p:nvSpPr>
+          <p:cNvPr id="7" name="TextBox 6"/>
+          <p:cNvSpPr txBox="1"/>
+          <p:nvPr/>
+        </p:nvSpPr>
+        <p:spPr>
+          <a:xfrm>
+            <a:off x="878776" y="5925787"/>
+            <a:ext cx="4682051" cy="369332"/>
+          </a:xfrm>
+          <a:prstGeom prst="rect">
+            <a:avLst/>
+          </a:prstGeom>
+          <a:noFill/>
+        </p:spPr>
+        <p:txBody>
+          <a:bodyPr wrap="none" rtlCol="0">
+            <a:spAutoFit/>
+          </a:bodyPr>
+          <a:lstStyle/>
+          <a:p>
+            <a:r>
+              <a:rPr lang="en-US" dirty="0" smtClean="0"/>
+              <a:t>Ignore the “unassigned” row in our spreadsheet</a:t>
+            </a:r>
+            <a:endParaRPr lang="en-US" dirty="0"/>
+          </a:p>
+        </p:txBody>
+      </p:sp>
+      <p:pic>
+        <p:nvPicPr>
+          <p:cNvPr id="8" name="Picture 7"/>
+          <p:cNvPicPr>
+            <a:picLocks noChangeAspect="1"/>
+          </p:cNvPicPr>
+          <p:nvPr/>
+        </p:nvPicPr>
+        <p:blipFill>
+          <a:blip r:embed="rId2"/>
+          <a:stretch>
+            <a:fillRect/>
+          </a:stretch>
+        </p:blipFill>
+        <p:spPr>
+          <a:xfrm>
+            <a:off x="6666115" y="1489678"/>
+            <a:ext cx="5173583" cy="5169331"/>
+          </a:xfrm>
+          <a:prstGeom prst="rect">
+            <a:avLst/>
+          </a:prstGeom>
+        </p:spPr>
+      </p:pic>
+      <p:cxnSp>
+        <p:nvCxnSpPr>
+          <p:cNvPr id="10" name="Straight Arrow Connector 9"/>
+          <p:cNvCxnSpPr/>
+          <p:nvPr/>
+        </p:nvCxnSpPr>
+        <p:spPr>
+          <a:xfrm flipH="1" flipV="1">
+            <a:off x="2826327" y="5523320"/>
+            <a:ext cx="577933" cy="402467"/>
+          </a:xfrm>
+          <a:prstGeom prst="straightConnector1">
+            <a:avLst/>
+          </a:prstGeom>
+          <a:ln>
+            <a:tailEnd type="triangle"/>
+          </a:ln>
+        </p:spPr>
+        <p:style>
+          <a:lnRef idx="1">
+            <a:schemeClr val="accent1"/>
+          </a:lnRef>
+          <a:fillRef idx="0">
+            <a:schemeClr val="accent1"/>
+          </a:fillRef>
+          <a:effectRef idx="0">
+            <a:schemeClr val="accent1"/>
+          </a:effectRef>
+          <a:fontRef idx="minor">
+            <a:schemeClr val="tx1"/>
+          </a:fontRef>
+        </p:style>
+      </p:cxnSp>
     </p:spTree>
     <p:extLst>
       <p:ext uri="{BB962C8B-B14F-4D97-AF65-F5344CB8AC3E}">
         <p14:creationId xmlns:p14="http://schemas.microsoft.com/office/powerpoint/2010/main" val="3681003907"/>
+      </p:ext>
+    </p:extLst>
+  </p:cSld>
+  <p:clrMapOvr>
+    <a:masterClrMapping/>
+  </p:clrMapOvr>
+</p:sld>
+</file>
+
+<file path=ppt/slides/slide35.xml><?xml version="1.0" encoding="utf-8"?>
+<p:sld xmlns:a="http://schemas.openxmlformats.org/drawingml/2006/main" xmlns:r="http://schemas.openxmlformats.org/officeDocument/2006/relationships" xmlns:p="http://schemas.openxmlformats.org/presentationml/2006/main">
+  <p:cSld>
+    <p:spTree>
+      <p:nvGrpSpPr>
+        <p:cNvPr id="1" name=""/>
+        <p:cNvGrpSpPr/>
+        <p:nvPr/>
+      </p:nvGrpSpPr>
+      <p:grpSpPr>
+        <a:xfrm>
+          <a:off x="0" y="0"/>
+          <a:ext cx="0" cy="0"/>
+          <a:chOff x="0" y="0"/>
+          <a:chExt cx="0" cy="0"/>
+        </a:xfrm>
+      </p:grpSpPr>
+      <p:pic>
+        <p:nvPicPr>
+          <p:cNvPr id="4" name="Picture 3"/>
+          <p:cNvPicPr>
+            <a:picLocks noChangeAspect="1"/>
+          </p:cNvPicPr>
+          <p:nvPr/>
+        </p:nvPicPr>
+        <p:blipFill>
+          <a:blip r:embed="rId2"/>
+          <a:stretch>
+            <a:fillRect/>
+          </a:stretch>
+        </p:blipFill>
+        <p:spPr>
+          <a:xfrm>
+            <a:off x="1647764" y="774370"/>
+            <a:ext cx="5888973" cy="2206337"/>
+          </a:xfrm>
+          <a:prstGeom prst="rect">
+            <a:avLst/>
+          </a:prstGeom>
+        </p:spPr>
+      </p:pic>
+      <p:sp>
+        <p:nvSpPr>
+          <p:cNvPr id="5" name="TextBox 4"/>
+          <p:cNvSpPr txBox="1"/>
+          <p:nvPr/>
+        </p:nvSpPr>
+        <p:spPr>
+          <a:xfrm>
+            <a:off x="1199408" y="273133"/>
+            <a:ext cx="9747220" cy="369332"/>
+          </a:xfrm>
+          <a:prstGeom prst="rect">
+            <a:avLst/>
+          </a:prstGeom>
+          <a:noFill/>
+        </p:spPr>
+        <p:txBody>
+          <a:bodyPr wrap="none" rtlCol="0">
+            <a:spAutoFit/>
+          </a:bodyPr>
+          <a:lstStyle/>
+          <a:p>
+            <a:r>
+              <a:rPr lang="en-US" dirty="0" smtClean="0">
+                <a:latin typeface="Arial" panose="020B0604020202020204" pitchFamily="34" charset="0"/>
+                <a:cs typeface="Arial" panose="020B0604020202020204" pitchFamily="34" charset="0"/>
+              </a:rPr>
+              <a:t>Setting a cutoff of a row-sum of 1e-04 yields a manageable number of 52,016 null hypotheses</a:t>
+            </a:r>
+            <a:endParaRPr lang="en-US" dirty="0">
+              <a:latin typeface="Arial" panose="020B0604020202020204" pitchFamily="34" charset="0"/>
+              <a:cs typeface="Arial" panose="020B0604020202020204" pitchFamily="34" charset="0"/>
+            </a:endParaRPr>
+          </a:p>
+        </p:txBody>
+      </p:sp>
+      <p:pic>
+        <p:nvPicPr>
+          <p:cNvPr id="6" name="Picture 5"/>
+          <p:cNvPicPr>
+            <a:picLocks noChangeAspect="1"/>
+          </p:cNvPicPr>
+          <p:nvPr/>
+        </p:nvPicPr>
+        <p:blipFill>
+          <a:blip r:embed="rId3"/>
+          <a:stretch>
+            <a:fillRect/>
+          </a:stretch>
+        </p:blipFill>
+        <p:spPr>
+          <a:xfrm>
+            <a:off x="1510480" y="4023570"/>
+            <a:ext cx="5472211" cy="2038038"/>
+          </a:xfrm>
+          <a:prstGeom prst="rect">
+            <a:avLst/>
+          </a:prstGeom>
+        </p:spPr>
+      </p:pic>
+      <p:sp>
+        <p:nvSpPr>
+          <p:cNvPr id="7" name="TextBox 6"/>
+          <p:cNvSpPr txBox="1"/>
+          <p:nvPr/>
+        </p:nvSpPr>
+        <p:spPr>
+          <a:xfrm>
+            <a:off x="1647764" y="3431969"/>
+            <a:ext cx="9905276" cy="369332"/>
+          </a:xfrm>
+          <a:prstGeom prst="rect">
+            <a:avLst/>
+          </a:prstGeom>
+          <a:noFill/>
+        </p:spPr>
+        <p:txBody>
+          <a:bodyPr wrap="none" rtlCol="0">
+            <a:spAutoFit/>
+          </a:bodyPr>
+          <a:lstStyle/>
+          <a:p>
+            <a:r>
+              <a:rPr lang="en-US" dirty="0" smtClean="0">
+                <a:latin typeface="Arial" panose="020B0604020202020204" pitchFamily="34" charset="0"/>
+                <a:cs typeface="Arial" panose="020B0604020202020204" pitchFamily="34" charset="0"/>
+              </a:rPr>
+              <a:t>One line of r-code quickly removes the low abundance genes and leaves us with 52,016 rows.. </a:t>
+            </a:r>
+            <a:endParaRPr lang="en-US" dirty="0">
+              <a:latin typeface="Arial" panose="020B0604020202020204" pitchFamily="34" charset="0"/>
+              <a:cs typeface="Arial" panose="020B0604020202020204" pitchFamily="34" charset="0"/>
+            </a:endParaRPr>
+          </a:p>
+        </p:txBody>
+      </p:sp>
+    </p:spTree>
+    <p:extLst>
+      <p:ext uri="{BB962C8B-B14F-4D97-AF65-F5344CB8AC3E}">
+        <p14:creationId xmlns:p14="http://schemas.microsoft.com/office/powerpoint/2010/main" val="2889951366"/>
+      </p:ext>
+    </p:extLst>
+  </p:cSld>
+  <p:clrMapOvr>
+    <a:masterClrMapping/>
+  </p:clrMapOvr>
+</p:sld>
+</file>
+
+<file path=ppt/slides/slide36.xml><?xml version="1.0" encoding="utf-8"?>
+<p:sld xmlns:a="http://schemas.openxmlformats.org/drawingml/2006/main" xmlns:r="http://schemas.openxmlformats.org/officeDocument/2006/relationships" xmlns:p="http://schemas.openxmlformats.org/presentationml/2006/main">
+  <p:cSld>
+    <p:spTree>
+      <p:nvGrpSpPr>
+        <p:cNvPr id="1" name=""/>
+        <p:cNvGrpSpPr/>
+        <p:nvPr/>
+      </p:nvGrpSpPr>
+      <p:grpSpPr>
+        <a:xfrm>
+          <a:off x="0" y="0"/>
+          <a:ext cx="0" cy="0"/>
+          <a:chOff x="0" y="0"/>
+          <a:chExt cx="0" cy="0"/>
+        </a:xfrm>
+      </p:grpSpPr>
+    </p:spTree>
+    <p:extLst>
+      <p:ext uri="{BB962C8B-B14F-4D97-AF65-F5344CB8AC3E}">
+        <p14:creationId xmlns:p14="http://schemas.microsoft.com/office/powerpoint/2010/main" val="3975342407"/>
       </p:ext>
     </p:extLst>
   </p:cSld>

</xml_diff>

<commit_message>
first attempt at graphing
</commit_message>
<xml_diff>
--- a/classes/ChapelHill2016/ChapelHillWorkshop_Fodor.pptx
+++ b/classes/ChapelHill2016/ChapelHillWorkshop_Fodor.pptx
@@ -6723,7 +6723,7 @@
           <a:lstStyle/>
           <a:p>
             <a:r>
-              <a:rPr lang="en-US" dirty="0" smtClean="0">
+              <a:rPr lang="en-US" dirty="0">
                 <a:latin typeface="Arial" panose="020B0604020202020204" pitchFamily="34" charset="0"/>
                 <a:cs typeface="Arial" panose="020B0604020202020204" pitchFamily="34" charset="0"/>
               </a:rPr>
@@ -6732,64 +6732,75 @@
           </a:p>
           <a:p>
             <a:r>
-              <a:rPr lang="en-US" dirty="0" smtClean="0">
+              <a:rPr lang="en-US" dirty="0">
                 <a:latin typeface="Arial" panose="020B0604020202020204" pitchFamily="34" charset="0"/>
                 <a:cs typeface="Arial" panose="020B0604020202020204" pitchFamily="34" charset="0"/>
               </a:rPr>
               <a:t>in ordination space, we can evaluate each row of the spreadsheet directly.</a:t>
             </a:r>
+          </a:p>
+        </p:txBody>
+      </p:sp>
+      <p:sp>
+        <p:nvSpPr>
+          <p:cNvPr id="6" name="TextBox 5"/>
+          <p:cNvSpPr txBox="1"/>
+          <p:nvPr/>
+        </p:nvSpPr>
+        <p:spPr>
+          <a:xfrm>
+            <a:off x="427511" y="3526973"/>
+            <a:ext cx="11542647" cy="1477328"/>
+          </a:xfrm>
+          <a:prstGeom prst="rect">
+            <a:avLst/>
+          </a:prstGeom>
+          <a:noFill/>
+        </p:spPr>
+        <p:txBody>
+          <a:bodyPr wrap="none" rtlCol="0">
+            <a:spAutoFit/>
+          </a:bodyPr>
+          <a:lstStyle/>
+          <a:p>
+            <a:r>
+              <a:rPr lang="en-US" dirty="0">
+                <a:latin typeface="Arial" panose="020B0604020202020204" pitchFamily="34" charset="0"/>
+                <a:cs typeface="Arial" panose="020B0604020202020204" pitchFamily="34" charset="0"/>
+              </a:rPr>
+              <a:t>For each row, we can form a </a:t>
+            </a:r>
+            <a:r>
+              <a:rPr lang="en-US" dirty="0">
+                <a:solidFill>
+                  <a:srgbClr val="FF0000"/>
+                </a:solidFill>
+                <a:latin typeface="Arial" panose="020B0604020202020204" pitchFamily="34" charset="0"/>
+                <a:cs typeface="Arial" panose="020B0604020202020204" pitchFamily="34" charset="0"/>
+              </a:rPr>
+              <a:t>null hypothesis</a:t>
+            </a:r>
+            <a:r>
+              <a:rPr lang="en-US" dirty="0">
+                <a:latin typeface="Arial" panose="020B0604020202020204" pitchFamily="34" charset="0"/>
+                <a:cs typeface="Arial" panose="020B0604020202020204" pitchFamily="34" charset="0"/>
+              </a:rPr>
+              <a:t> that the TD and BM samples are drawn from the same distribution.</a:t>
+            </a:r>
+          </a:p>
+          <a:p>
             <a:endParaRPr lang="en-US" dirty="0">
               <a:latin typeface="Arial" panose="020B0604020202020204" pitchFamily="34" charset="0"/>
               <a:cs typeface="Arial" panose="020B0604020202020204" pitchFamily="34" charset="0"/>
             </a:endParaRPr>
           </a:p>
-        </p:txBody>
-      </p:sp>
-      <p:sp>
-        <p:nvSpPr>
-          <p:cNvPr id="6" name="TextBox 5"/>
-          <p:cNvSpPr txBox="1"/>
-          <p:nvPr/>
-        </p:nvSpPr>
-        <p:spPr>
-          <a:xfrm>
-            <a:off x="427511" y="3526973"/>
-            <a:ext cx="11542647" cy="1477328"/>
-          </a:xfrm>
-          <a:prstGeom prst="rect">
-            <a:avLst/>
-          </a:prstGeom>
-          <a:noFill/>
-        </p:spPr>
-        <p:txBody>
-          <a:bodyPr wrap="none" rtlCol="0">
-            <a:spAutoFit/>
-          </a:bodyPr>
-          <a:lstStyle/>
-          <a:p>
-            <a:r>
-              <a:rPr lang="en-US" dirty="0" smtClean="0">
-                <a:latin typeface="Arial" panose="020B0604020202020204" pitchFamily="34" charset="0"/>
-                <a:cs typeface="Arial" panose="020B0604020202020204" pitchFamily="34" charset="0"/>
-              </a:rPr>
-              <a:t>For each row, we can form a </a:t>
-            </a:r>
-            <a:r>
-              <a:rPr lang="en-US" dirty="0" smtClean="0">
-                <a:solidFill>
-                  <a:srgbClr val="FF0000"/>
-                </a:solidFill>
-                <a:latin typeface="Arial" panose="020B0604020202020204" pitchFamily="34" charset="0"/>
-                <a:cs typeface="Arial" panose="020B0604020202020204" pitchFamily="34" charset="0"/>
-              </a:rPr>
-              <a:t>null hypothesis</a:t>
-            </a:r>
-            <a:r>
-              <a:rPr lang="en-US" dirty="0" smtClean="0">
-                <a:latin typeface="Arial" panose="020B0604020202020204" pitchFamily="34" charset="0"/>
-                <a:cs typeface="Arial" panose="020B0604020202020204" pitchFamily="34" charset="0"/>
-              </a:rPr>
-              <a:t> that the TD and BM samples are drawn from the same distribution.</a:t>
+          <a:p>
+            <a:r>
+              <a:rPr lang="en-US" dirty="0">
+                <a:latin typeface="Arial" panose="020B0604020202020204" pitchFamily="34" charset="0"/>
+                <a:cs typeface="Arial" panose="020B0604020202020204" pitchFamily="34" charset="0"/>
+              </a:rPr>
+              <a:t>That will give us 651,705 null hypotheses to evaluate.</a:t>
             </a:r>
           </a:p>
           <a:p>
@@ -6800,31 +6811,12 @@
           </a:p>
           <a:p>
             <a:r>
-              <a:rPr lang="en-US" dirty="0" smtClean="0">
-                <a:latin typeface="Arial" panose="020B0604020202020204" pitchFamily="34" charset="0"/>
-                <a:cs typeface="Arial" panose="020B0604020202020204" pitchFamily="34" charset="0"/>
-              </a:rPr>
-              <a:t>That will give us 651,705 null hypotheses to evaluate.</a:t>
-            </a:r>
-          </a:p>
-          <a:p>
-            <a:endParaRPr lang="en-US" dirty="0">
-              <a:latin typeface="Arial" panose="020B0604020202020204" pitchFamily="34" charset="0"/>
-              <a:cs typeface="Arial" panose="020B0604020202020204" pitchFamily="34" charset="0"/>
-            </a:endParaRPr>
-          </a:p>
-          <a:p>
-            <a:r>
-              <a:rPr lang="en-US" dirty="0" smtClean="0">
+              <a:rPr lang="en-US" dirty="0">
                 <a:latin typeface="Arial" panose="020B0604020202020204" pitchFamily="34" charset="0"/>
                 <a:cs typeface="Arial" panose="020B0604020202020204" pitchFamily="34" charset="0"/>
               </a:rPr>
               <a:t>We will need to correct for multiple hypothesis testing</a:t>
             </a:r>
-            <a:endParaRPr lang="en-US" dirty="0">
-              <a:latin typeface="Arial" panose="020B0604020202020204" pitchFamily="34" charset="0"/>
-              <a:cs typeface="Arial" panose="020B0604020202020204" pitchFamily="34" charset="0"/>
-            </a:endParaRPr>
           </a:p>
         </p:txBody>
       </p:sp>
@@ -7041,16 +7033,12 @@
           <a:lstStyle/>
           <a:p>
             <a:r>
-              <a:rPr lang="en-US" dirty="0" smtClean="0">
+              <a:rPr lang="en-US" dirty="0">
                 <a:latin typeface="Arial" panose="020B0604020202020204" pitchFamily="34" charset="0"/>
                 <a:cs typeface="Arial" panose="020B0604020202020204" pitchFamily="34" charset="0"/>
               </a:rPr>
               <a:t>Not correcting for multiple hypothesis testing yields spurious results</a:t>
             </a:r>
-            <a:endParaRPr lang="en-US" dirty="0">
-              <a:latin typeface="Arial" panose="020B0604020202020204" pitchFamily="34" charset="0"/>
-              <a:cs typeface="Arial" panose="020B0604020202020204" pitchFamily="34" charset="0"/>
-            </a:endParaRPr>
           </a:p>
         </p:txBody>
       </p:sp>
@@ -7183,7 +7171,7 @@
         </p:nvSpPr>
         <p:spPr>
           <a:xfrm>
-            <a:off x="3733800" y="3212069"/>
+            <a:off x="3733800" y="3218332"/>
             <a:ext cx="4613442" cy="646331"/>
           </a:xfrm>
           <a:prstGeom prst="rect">
@@ -8163,26 +8151,25 @@
           <a:lstStyle/>
           <a:p>
             <a:r>
-              <a:rPr lang="en-US" dirty="0" smtClean="0"/>
+              <a:rPr lang="en-US" dirty="0"/>
               <a:t>Here are example results from </a:t>
             </a:r>
             <a:r>
-              <a:rPr lang="en-US" dirty="0" err="1" smtClean="0"/>
+              <a:rPr lang="en-US" dirty="0" err="1"/>
               <a:t>DeSeq</a:t>
             </a:r>
             <a:r>
-              <a:rPr lang="en-US" dirty="0" smtClean="0"/>
+              <a:rPr lang="en-US" dirty="0"/>
               <a:t> (a popular RNA-</a:t>
             </a:r>
             <a:r>
-              <a:rPr lang="en-US" dirty="0" err="1" smtClean="0"/>
+              <a:rPr lang="en-US" dirty="0" err="1"/>
               <a:t>seq</a:t>
             </a:r>
             <a:r>
-              <a:rPr lang="en-US" dirty="0" smtClean="0"/>
+              <a:rPr lang="en-US" dirty="0"/>
               <a:t> analysis tool)…</a:t>
             </a:r>
-            <a:endParaRPr lang="en-US" dirty="0"/>
           </a:p>
         </p:txBody>
       </p:sp>
@@ -8369,7 +8356,7 @@
           <a:lstStyle/>
           <a:p>
             <a:r>
-              <a:rPr lang="en-US" dirty="0" smtClean="0">
+              <a:rPr lang="en-US" dirty="0">
                 <a:latin typeface="Arial" panose="020B0604020202020204" pitchFamily="34" charset="0"/>
                 <a:cs typeface="Arial" panose="020B0604020202020204" pitchFamily="34" charset="0"/>
               </a:rPr>
@@ -8384,7 +8371,7 @@
           </a:p>
           <a:p>
             <a:r>
-              <a:rPr lang="en-US" dirty="0" smtClean="0">
+              <a:rPr lang="en-US" dirty="0">
                 <a:latin typeface="Arial" panose="020B0604020202020204" pitchFamily="34" charset="0"/>
                 <a:cs typeface="Arial" panose="020B0604020202020204" pitchFamily="34" charset="0"/>
               </a:rPr>
@@ -8393,16 +8380,12 @@
           </a:p>
           <a:p>
             <a:r>
-              <a:rPr lang="en-US" dirty="0" smtClean="0">
+              <a:rPr lang="en-US" dirty="0">
                 <a:latin typeface="Arial" panose="020B0604020202020204" pitchFamily="34" charset="0"/>
                 <a:cs typeface="Arial" panose="020B0604020202020204" pitchFamily="34" charset="0"/>
               </a:rPr>
               <a:t>only  have one or two non-zeros.  We can’t do meaningful inference on those rows.</a:t>
             </a:r>
-            <a:endParaRPr lang="en-US" dirty="0">
-              <a:latin typeface="Arial" panose="020B0604020202020204" pitchFamily="34" charset="0"/>
-              <a:cs typeface="Arial" panose="020B0604020202020204" pitchFamily="34" charset="0"/>
-            </a:endParaRPr>
           </a:p>
         </p:txBody>
       </p:sp>
@@ -8429,16 +8412,12 @@
           <a:lstStyle/>
           <a:p>
             <a:r>
-              <a:rPr lang="en-US" dirty="0" smtClean="0">
+              <a:rPr lang="en-US" dirty="0">
                 <a:latin typeface="Arial" panose="020B0604020202020204" pitchFamily="34" charset="0"/>
                 <a:cs typeface="Arial" panose="020B0604020202020204" pitchFamily="34" charset="0"/>
               </a:rPr>
               <a:t>We can use R to examine and filter out the rare genes…</a:t>
             </a:r>
-            <a:endParaRPr lang="en-US" dirty="0">
-              <a:latin typeface="Arial" panose="020B0604020202020204" pitchFamily="34" charset="0"/>
-              <a:cs typeface="Arial" panose="020B0604020202020204" pitchFamily="34" charset="0"/>
-            </a:endParaRPr>
           </a:p>
         </p:txBody>
       </p:sp>
@@ -8464,28 +8443,23 @@
           <a:lstStyle/>
           <a:p>
             <a:r>
-              <a:rPr lang="en-US" dirty="0" err="1" smtClean="0"/>
+              <a:rPr lang="en-US" dirty="0" err="1"/>
               <a:t>rm</a:t>
             </a:r>
             <a:r>
-              <a:rPr lang="en-US" dirty="0" smtClean="0"/>
-              <a:t>(list=ls</a:t>
-            </a:r>
-            <a:r>
               <a:rPr lang="en-US" dirty="0"/>
-              <a:t>())</a:t>
-            </a:r>
-          </a:p>
-          <a:p>
-            <a:r>
-              <a:rPr lang="en-US" dirty="0" smtClean="0"/>
+              <a:t>(list=ls())</a:t>
+            </a:r>
+          </a:p>
+          <a:p>
+            <a:r>
+              <a:rPr lang="en-US" dirty="0"/>
               <a:t> </a:t>
             </a:r>
-            <a:endParaRPr lang="en-US" dirty="0"/>
-          </a:p>
-          <a:p>
-            <a:r>
-              <a:rPr lang="en-US" dirty="0" err="1" smtClean="0"/>
+          </a:p>
+          <a:p>
+            <a:r>
+              <a:rPr lang="en-US" dirty="0" err="1"/>
               <a:t>setwd</a:t>
             </a:r>
             <a:r>
@@ -8495,47 +8469,34 @@
           </a:p>
           <a:p>
             <a:r>
-              <a:rPr lang="en-US" dirty="0" smtClean="0"/>
-              <a:t>library</a:t>
-            </a:r>
-            <a:r>
               <a:rPr lang="en-US" dirty="0"/>
-              <a:t>("vegan")</a:t>
-            </a:r>
-          </a:p>
-          <a:p>
-            <a:r>
-              <a:rPr lang="en-US" dirty="0" smtClean="0"/>
+              <a:t>library("vegan")</a:t>
+            </a:r>
+          </a:p>
+          <a:p>
+            <a:r>
+              <a:rPr lang="en-US" dirty="0"/>
               <a:t> </a:t>
             </a:r>
-            <a:endParaRPr lang="en-US" dirty="0"/>
-          </a:p>
-          <a:p>
-            <a:r>
-              <a:rPr lang="en-US" dirty="0" err="1" smtClean="0"/>
+          </a:p>
+          <a:p>
+            <a:r>
+              <a:rPr lang="en-US" dirty="0" err="1"/>
               <a:t>inFileName</a:t>
             </a:r>
             <a:r>
-              <a:rPr lang="en-US" dirty="0" smtClean="0"/>
-              <a:t> </a:t>
-            </a:r>
-            <a:r>
               <a:rPr lang="en-US" dirty="0"/>
-              <a:t>&lt;- "humann2_genefamilies-IdsAsPrimaryKey.tsv"</a:t>
-            </a:r>
-          </a:p>
-          <a:p>
-            <a:r>
-              <a:rPr lang="en-US" dirty="0" err="1" smtClean="0"/>
+              <a:t> &lt;- "humann2_genefamilies-IdsAsPrimaryKey.tsv"</a:t>
+            </a:r>
+          </a:p>
+          <a:p>
+            <a:r>
+              <a:rPr lang="en-US" dirty="0" err="1"/>
               <a:t>myT</a:t>
             </a:r>
             <a:r>
-              <a:rPr lang="en-US" dirty="0" smtClean="0"/>
-              <a:t> </a:t>
-            </a:r>
-            <a:r>
               <a:rPr lang="en-US" dirty="0"/>
-              <a:t>&lt;-</a:t>
+              <a:t> &lt;-</a:t>
             </a:r>
             <a:r>
               <a:rPr lang="en-US" dirty="0" err="1"/>
@@ -8586,23 +8547,14 @@
           </a:p>
           <a:p>
             <a:r>
-              <a:rPr lang="en-US" dirty="0" smtClean="0"/>
+              <a:rPr lang="en-US" dirty="0"/>
               <a:t> </a:t>
             </a:r>
-            <a:endParaRPr lang="en-US" dirty="0"/>
-          </a:p>
-          <a:p>
-            <a:r>
-              <a:rPr lang="en-US" dirty="0" smtClean="0"/>
-              <a:t>sums </a:t>
-            </a:r>
+          </a:p>
+          <a:p>
             <a:r>
               <a:rPr lang="en-US" dirty="0"/>
-              <a:t>&lt;- apply(myT,1,sum</a:t>
-            </a:r>
-            <a:r>
-              <a:rPr lang="en-US" dirty="0" smtClean="0"/>
-              <a:t>)</a:t>
+              <a:t>sums &lt;- apply(myT,1,sum)</a:t>
             </a:r>
           </a:p>
           <a:p>
@@ -8666,10 +8618,9 @@
           <a:lstStyle/>
           <a:p>
             <a:r>
-              <a:rPr lang="en-US" dirty="0" smtClean="0"/>
+              <a:rPr lang="en-US" dirty="0"/>
               <a:t>Ignore the “unassigned” row in our spreadsheet</a:t>
             </a:r>
-            <a:endParaRPr lang="en-US" dirty="0"/>
           </a:p>
         </p:txBody>
       </p:sp>
@@ -8807,16 +8758,12 @@
           <a:lstStyle/>
           <a:p>
             <a:r>
-              <a:rPr lang="en-US" dirty="0" smtClean="0">
+              <a:rPr lang="en-US" dirty="0">
                 <a:latin typeface="Arial" panose="020B0604020202020204" pitchFamily="34" charset="0"/>
                 <a:cs typeface="Arial" panose="020B0604020202020204" pitchFamily="34" charset="0"/>
               </a:rPr>
               <a:t>Setting a cutoff of a row-sum of 1e-04 yields a manageable number of 52,016 null hypotheses</a:t>
             </a:r>
-            <a:endParaRPr lang="en-US" dirty="0">
-              <a:latin typeface="Arial" panose="020B0604020202020204" pitchFamily="34" charset="0"/>
-              <a:cs typeface="Arial" panose="020B0604020202020204" pitchFamily="34" charset="0"/>
-            </a:endParaRPr>
           </a:p>
         </p:txBody>
       </p:sp>
@@ -8836,7 +8783,7 @@
         </p:blipFill>
         <p:spPr>
           <a:xfrm>
-            <a:off x="1510480" y="4023570"/>
+            <a:off x="1510480" y="4004781"/>
             <a:ext cx="5472211" cy="2038038"/>
           </a:xfrm>
           <a:prstGeom prst="rect">
@@ -8867,16 +8814,12 @@
           <a:lstStyle/>
           <a:p>
             <a:r>
-              <a:rPr lang="en-US" dirty="0" smtClean="0">
+              <a:rPr lang="en-US" dirty="0">
                 <a:latin typeface="Arial" panose="020B0604020202020204" pitchFamily="34" charset="0"/>
                 <a:cs typeface="Arial" panose="020B0604020202020204" pitchFamily="34" charset="0"/>
               </a:rPr>
               <a:t>One line of r-code quickly removes the low abundance genes and leaves us with 52,016 rows.. </a:t>
             </a:r>
-            <a:endParaRPr lang="en-US" dirty="0">
-              <a:latin typeface="Arial" panose="020B0604020202020204" pitchFamily="34" charset="0"/>
-              <a:cs typeface="Arial" panose="020B0604020202020204" pitchFamily="34" charset="0"/>
-            </a:endParaRPr>
           </a:p>
         </p:txBody>
       </p:sp>
@@ -8910,6 +8853,280 @@
           <a:chExt cx="0" cy="0"/>
         </a:xfrm>
       </p:grpSpPr>
+      <p:sp>
+        <p:nvSpPr>
+          <p:cNvPr id="2" name="TextBox 1"/>
+          <p:cNvSpPr txBox="1"/>
+          <p:nvPr/>
+        </p:nvSpPr>
+        <p:spPr>
+          <a:xfrm>
+            <a:off x="275573" y="-31314"/>
+            <a:ext cx="10311541" cy="1754326"/>
+          </a:xfrm>
+          <a:prstGeom prst="rect">
+            <a:avLst/>
+          </a:prstGeom>
+          <a:noFill/>
+        </p:spPr>
+        <p:txBody>
+          <a:bodyPr wrap="none" rtlCol="0">
+            <a:spAutoFit/>
+          </a:bodyPr>
+          <a:lstStyle/>
+          <a:p>
+            <a:r>
+              <a:rPr lang="en-US" dirty="0">
+                <a:latin typeface="Arial" panose="020B0604020202020204" pitchFamily="34" charset="0"/>
+                <a:cs typeface="Arial" panose="020B0604020202020204" pitchFamily="34" charset="0"/>
+              </a:rPr>
+              <a:t>We will instead filter out rare genes in the Java layer </a:t>
+            </a:r>
+          </a:p>
+          <a:p>
+            <a:r>
+              <a:rPr lang="en-US" dirty="0">
+                <a:latin typeface="Arial" panose="020B0604020202020204" pitchFamily="34" charset="0"/>
+                <a:cs typeface="Arial" panose="020B0604020202020204" pitchFamily="34" charset="0"/>
+              </a:rPr>
+              <a:t>(code note shown but is here: </a:t>
+            </a:r>
+          </a:p>
+          <a:p>
+            <a:r>
+              <a:rPr lang="en-US" dirty="0">
+                <a:latin typeface="Arial" panose="020B0604020202020204" pitchFamily="34" charset="0"/>
+                <a:cs typeface="Arial" panose="020B0604020202020204" pitchFamily="34" charset="0"/>
+                <a:hlinkClick r:id="rId2"/>
+              </a:rPr>
+              <a:t>https://github.com/afodor/metagenomicsTools/blob/master/src/chapelHillWorkshop/RowSums.java</a:t>
+            </a:r>
+            <a:r>
+              <a:rPr lang="en-US" dirty="0">
+                <a:latin typeface="Arial" panose="020B0604020202020204" pitchFamily="34" charset="0"/>
+                <a:cs typeface="Arial" panose="020B0604020202020204" pitchFamily="34" charset="0"/>
+              </a:rPr>
+              <a:t> )</a:t>
+            </a:r>
+          </a:p>
+          <a:p>
+            <a:endParaRPr lang="en-US" dirty="0">
+              <a:latin typeface="Arial" panose="020B0604020202020204" pitchFamily="34" charset="0"/>
+              <a:cs typeface="Arial" panose="020B0604020202020204" pitchFamily="34" charset="0"/>
+            </a:endParaRPr>
+          </a:p>
+          <a:p>
+            <a:r>
+              <a:rPr lang="en-US" dirty="0">
+                <a:latin typeface="Arial" panose="020B0604020202020204" pitchFamily="34" charset="0"/>
+                <a:cs typeface="Arial" panose="020B0604020202020204" pitchFamily="34" charset="0"/>
+              </a:rPr>
+              <a:t>To end up with a spreadsheet that has genes with sum &gt; 1e-04 with the names attached</a:t>
+            </a:r>
+          </a:p>
+          <a:p>
+            <a:r>
+              <a:rPr lang="en-US" dirty="0">
+                <a:latin typeface="Arial" panose="020B0604020202020204" pitchFamily="34" charset="0"/>
+                <a:cs typeface="Arial" panose="020B0604020202020204" pitchFamily="34" charset="0"/>
+              </a:rPr>
+              <a:t>(since we won’t be using ordination to compress away each row in the following examples…)</a:t>
+            </a:r>
+          </a:p>
+        </p:txBody>
+      </p:sp>
+      <p:pic>
+        <p:nvPicPr>
+          <p:cNvPr id="3" name="Picture 2"/>
+          <p:cNvPicPr>
+            <a:picLocks noChangeAspect="1"/>
+          </p:cNvPicPr>
+          <p:nvPr/>
+        </p:nvPicPr>
+        <p:blipFill>
+          <a:blip r:embed="rId3"/>
+          <a:stretch>
+            <a:fillRect/>
+          </a:stretch>
+        </p:blipFill>
+        <p:spPr>
+          <a:xfrm>
+            <a:off x="1486435" y="2472902"/>
+            <a:ext cx="9449272" cy="3220177"/>
+          </a:xfrm>
+          <a:prstGeom prst="rect">
+            <a:avLst/>
+          </a:prstGeom>
+        </p:spPr>
+      </p:pic>
+      <p:sp>
+        <p:nvSpPr>
+          <p:cNvPr id="4" name="TextBox 3"/>
+          <p:cNvSpPr txBox="1"/>
+          <p:nvPr/>
+        </p:nvSpPr>
+        <p:spPr>
+          <a:xfrm>
+            <a:off x="3181611" y="2140073"/>
+            <a:ext cx="2336104" cy="369332"/>
+          </a:xfrm>
+          <a:prstGeom prst="rect">
+            <a:avLst/>
+          </a:prstGeom>
+          <a:noFill/>
+        </p:spPr>
+        <p:txBody>
+          <a:bodyPr wrap="square" rtlCol="0">
+            <a:spAutoFit/>
+          </a:bodyPr>
+          <a:lstStyle/>
+          <a:p>
+            <a:r>
+              <a:rPr lang="en-US" dirty="0">
+                <a:latin typeface="Arial" panose="020B0604020202020204" pitchFamily="34" charset="0"/>
+                <a:cs typeface="Arial" panose="020B0604020202020204" pitchFamily="34" charset="0"/>
+              </a:rPr>
+              <a:t> 20 columns</a:t>
+            </a:r>
+          </a:p>
+        </p:txBody>
+      </p:sp>
+      <p:cxnSp>
+        <p:nvCxnSpPr>
+          <p:cNvPr id="6" name="Straight Arrow Connector 5"/>
+          <p:cNvCxnSpPr/>
+          <p:nvPr/>
+        </p:nvCxnSpPr>
+        <p:spPr>
+          <a:xfrm flipV="1">
+            <a:off x="4722312" y="2273474"/>
+            <a:ext cx="5768236" cy="37578"/>
+          </a:xfrm>
+          <a:prstGeom prst="straightConnector1">
+            <a:avLst/>
+          </a:prstGeom>
+          <a:ln>
+            <a:tailEnd type="triangle"/>
+          </a:ln>
+        </p:spPr>
+        <p:style>
+          <a:lnRef idx="1">
+            <a:schemeClr val="accent1"/>
+          </a:lnRef>
+          <a:fillRef idx="0">
+            <a:schemeClr val="accent1"/>
+          </a:fillRef>
+          <a:effectRef idx="0">
+            <a:schemeClr val="accent1"/>
+          </a:effectRef>
+          <a:fontRef idx="minor">
+            <a:schemeClr val="tx1"/>
+          </a:fontRef>
+        </p:style>
+      </p:cxnSp>
+      <p:sp>
+        <p:nvSpPr>
+          <p:cNvPr id="7" name="TextBox 6"/>
+          <p:cNvSpPr txBox="1"/>
+          <p:nvPr/>
+        </p:nvSpPr>
+        <p:spPr>
+          <a:xfrm>
+            <a:off x="75156" y="2780778"/>
+            <a:ext cx="1330557" cy="369332"/>
+          </a:xfrm>
+          <a:prstGeom prst="rect">
+            <a:avLst/>
+          </a:prstGeom>
+          <a:noFill/>
+        </p:spPr>
+        <p:txBody>
+          <a:bodyPr wrap="none" rtlCol="0">
+            <a:spAutoFit/>
+          </a:bodyPr>
+          <a:lstStyle/>
+          <a:p>
+            <a:r>
+              <a:rPr lang="en-US" dirty="0"/>
+              <a:t>52,016 rows</a:t>
+            </a:r>
+          </a:p>
+        </p:txBody>
+      </p:sp>
+      <p:cxnSp>
+        <p:nvCxnSpPr>
+          <p:cNvPr id="9" name="Straight Arrow Connector 8"/>
+          <p:cNvCxnSpPr/>
+          <p:nvPr/>
+        </p:nvCxnSpPr>
+        <p:spPr>
+          <a:xfrm>
+            <a:off x="964504" y="3219189"/>
+            <a:ext cx="0" cy="2430049"/>
+          </a:xfrm>
+          <a:prstGeom prst="straightConnector1">
+            <a:avLst/>
+          </a:prstGeom>
+          <a:ln>
+            <a:tailEnd type="triangle"/>
+          </a:ln>
+        </p:spPr>
+        <p:style>
+          <a:lnRef idx="1">
+            <a:schemeClr val="accent1"/>
+          </a:lnRef>
+          <a:fillRef idx="0">
+            <a:schemeClr val="accent1"/>
+          </a:fillRef>
+          <a:effectRef idx="0">
+            <a:schemeClr val="accent1"/>
+          </a:effectRef>
+          <a:fontRef idx="minor">
+            <a:schemeClr val="tx1"/>
+          </a:fontRef>
+        </p:style>
+      </p:cxnSp>
+      <p:sp>
+        <p:nvSpPr>
+          <p:cNvPr id="10" name="TextBox 9"/>
+          <p:cNvSpPr txBox="1"/>
+          <p:nvPr/>
+        </p:nvSpPr>
+        <p:spPr>
+          <a:xfrm>
+            <a:off x="225469" y="5987442"/>
+            <a:ext cx="10451387" cy="584775"/>
+          </a:xfrm>
+          <a:prstGeom prst="rect">
+            <a:avLst/>
+          </a:prstGeom>
+          <a:noFill/>
+        </p:spPr>
+        <p:txBody>
+          <a:bodyPr wrap="none" rtlCol="0">
+            <a:spAutoFit/>
+          </a:bodyPr>
+          <a:lstStyle/>
+          <a:p>
+            <a:r>
+              <a:rPr lang="en-US" sz="1600" dirty="0">
+                <a:latin typeface="Arial" panose="020B0604020202020204" pitchFamily="34" charset="0"/>
+                <a:cs typeface="Arial" panose="020B0604020202020204" pitchFamily="34" charset="0"/>
+              </a:rPr>
+              <a:t>This file is here: </a:t>
+            </a:r>
+          </a:p>
+          <a:p>
+            <a:r>
+              <a:rPr lang="en-US" sz="1600" dirty="0">
+                <a:latin typeface="Arial" panose="020B0604020202020204" pitchFamily="34" charset="0"/>
+                <a:cs typeface="Arial" panose="020B0604020202020204" pitchFamily="34" charset="0"/>
+              </a:rPr>
+              <a:t>https://github.com/afodor/ChapelHillWorkshop/blob/master/humann2_genefamilies.LABELS2OnlyAbundant.txt.gz</a:t>
+            </a:r>
+          </a:p>
+        </p:txBody>
+      </p:sp>
     </p:spTree>
     <p:extLst>
       <p:ext uri="{BB962C8B-B14F-4D97-AF65-F5344CB8AC3E}">

</xml_diff>

<commit_message>
transitioning to last dataset...
</commit_message>
<xml_diff>
--- a/classes/ChapelHill2016/ChapelHillWorkshop_Fodor.pptx
+++ b/classes/ChapelHill2016/ChapelHillWorkshop_Fodor.pptx
@@ -41,6 +41,13 @@
     <p:sldId id="291" r:id="rId35"/>
     <p:sldId id="292" r:id="rId36"/>
     <p:sldId id="293" r:id="rId37"/>
+    <p:sldId id="294" r:id="rId38"/>
+    <p:sldId id="295" r:id="rId39"/>
+    <p:sldId id="296" r:id="rId40"/>
+    <p:sldId id="297" r:id="rId41"/>
+    <p:sldId id="298" r:id="rId42"/>
+    <p:sldId id="299" r:id="rId43"/>
+    <p:sldId id="300" r:id="rId44"/>
   </p:sldIdLst>
   <p:sldSz cx="12192000" cy="6858000"/>
   <p:notesSz cx="6858000" cy="9144000"/>
@@ -9140,6 +9147,2576 @@
 </p:sld>
 </file>
 
+<file path=ppt/slides/slide37.xml><?xml version="1.0" encoding="utf-8"?>
+<p:sld xmlns:a="http://schemas.openxmlformats.org/drawingml/2006/main" xmlns:r="http://schemas.openxmlformats.org/officeDocument/2006/relationships" xmlns:p="http://schemas.openxmlformats.org/presentationml/2006/main">
+  <p:cSld>
+    <p:spTree>
+      <p:nvGrpSpPr>
+        <p:cNvPr id="1" name=""/>
+        <p:cNvGrpSpPr/>
+        <p:nvPr/>
+      </p:nvGrpSpPr>
+      <p:grpSpPr>
+        <a:xfrm>
+          <a:off x="0" y="0"/>
+          <a:ext cx="0" cy="0"/>
+          <a:chOff x="0" y="0"/>
+          <a:chExt cx="0" cy="0"/>
+        </a:xfrm>
+      </p:grpSpPr>
+      <p:sp>
+        <p:nvSpPr>
+          <p:cNvPr id="4" name="TextBox 3"/>
+          <p:cNvSpPr txBox="1"/>
+          <p:nvPr/>
+        </p:nvSpPr>
+        <p:spPr>
+          <a:xfrm>
+            <a:off x="593766" y="166256"/>
+            <a:ext cx="11251798" cy="369332"/>
+          </a:xfrm>
+          <a:prstGeom prst="rect">
+            <a:avLst/>
+          </a:prstGeom>
+          <a:noFill/>
+        </p:spPr>
+        <p:txBody>
+          <a:bodyPr wrap="none" rtlCol="0">
+            <a:spAutoFit/>
+          </a:bodyPr>
+          <a:lstStyle/>
+          <a:p>
+            <a:r>
+              <a:rPr lang="en-US" dirty="0" smtClean="0">
+                <a:latin typeface="Arial" panose="020B0604020202020204" pitchFamily="34" charset="0"/>
+                <a:cs typeface="Arial" panose="020B0604020202020204" pitchFamily="34" charset="0"/>
+              </a:rPr>
+              <a:t>With a modest amount of coding we can run a t-test on every row of our spreadsheet and collect the results…</a:t>
+            </a:r>
+            <a:endParaRPr lang="en-US" dirty="0">
+              <a:latin typeface="Arial" panose="020B0604020202020204" pitchFamily="34" charset="0"/>
+              <a:cs typeface="Arial" panose="020B0604020202020204" pitchFamily="34" charset="0"/>
+            </a:endParaRPr>
+          </a:p>
+        </p:txBody>
+      </p:sp>
+      <p:sp>
+        <p:nvSpPr>
+          <p:cNvPr id="5" name="Rectangle 4"/>
+          <p:cNvSpPr/>
+          <p:nvPr/>
+        </p:nvSpPr>
+        <p:spPr>
+          <a:xfrm>
+            <a:off x="292924" y="6294796"/>
+            <a:ext cx="11772406" cy="369332"/>
+          </a:xfrm>
+          <a:prstGeom prst="rect">
+            <a:avLst/>
+          </a:prstGeom>
+        </p:spPr>
+        <p:txBody>
+          <a:bodyPr wrap="square">
+            <a:spAutoFit/>
+          </a:bodyPr>
+          <a:lstStyle/>
+          <a:p>
+            <a:r>
+              <a:rPr lang="en-US" dirty="0"/>
+              <a:t>https://github.com/afodor/metagenomicsTools/blob/master/src/chapelHillWorkshop/quick_TTest</a:t>
+            </a:r>
+          </a:p>
+        </p:txBody>
+      </p:sp>
+      <p:sp>
+        <p:nvSpPr>
+          <p:cNvPr id="6" name="Rectangle 5"/>
+          <p:cNvSpPr/>
+          <p:nvPr/>
+        </p:nvSpPr>
+        <p:spPr>
+          <a:xfrm>
+            <a:off x="593766" y="713787"/>
+            <a:ext cx="9516094" cy="5355312"/>
+          </a:xfrm>
+          <a:prstGeom prst="rect">
+            <a:avLst/>
+          </a:prstGeom>
+        </p:spPr>
+        <p:txBody>
+          <a:bodyPr wrap="square">
+            <a:spAutoFit/>
+          </a:bodyPr>
+          <a:lstStyle/>
+          <a:p>
+            <a:r>
+              <a:rPr lang="en-US" dirty="0" err="1">
+                <a:solidFill>
+                  <a:srgbClr val="000000"/>
+                </a:solidFill>
+                <a:latin typeface="Courier New" panose="02070309020205020404" pitchFamily="49" charset="0"/>
+              </a:rPr>
+              <a:t>rm</a:t>
+            </a:r>
+            <a:r>
+              <a:rPr lang="en-US" dirty="0">
+                <a:solidFill>
+                  <a:srgbClr val="000000"/>
+                </a:solidFill>
+                <a:latin typeface="Courier New" panose="02070309020205020404" pitchFamily="49" charset="0"/>
+              </a:rPr>
+              <a:t>(list=ls())</a:t>
+            </a:r>
+          </a:p>
+          <a:p>
+            <a:endParaRPr lang="en-US" dirty="0">
+              <a:latin typeface="Courier New" panose="02070309020205020404" pitchFamily="49" charset="0"/>
+            </a:endParaRPr>
+          </a:p>
+          <a:p>
+            <a:r>
+              <a:rPr lang="en-US" dirty="0" err="1">
+                <a:solidFill>
+                  <a:srgbClr val="000000"/>
+                </a:solidFill>
+                <a:latin typeface="Courier New" panose="02070309020205020404" pitchFamily="49" charset="0"/>
+              </a:rPr>
+              <a:t>setwd</a:t>
+            </a:r>
+            <a:r>
+              <a:rPr lang="en-US" dirty="0">
+                <a:solidFill>
+                  <a:srgbClr val="000000"/>
+                </a:solidFill>
+                <a:latin typeface="Courier New" panose="02070309020205020404" pitchFamily="49" charset="0"/>
+              </a:rPr>
+              <a:t>("C:\\ChapelHillWorkshop")</a:t>
+            </a:r>
+          </a:p>
+          <a:p>
+            <a:r>
+              <a:rPr lang="en-US" dirty="0">
+                <a:latin typeface="Courier New" panose="02070309020205020404" pitchFamily="49" charset="0"/>
+              </a:rPr>
+              <a:t>library("</a:t>
+            </a:r>
+            <a:r>
+              <a:rPr lang="en-US" dirty="0">
+                <a:solidFill>
+                  <a:srgbClr val="000000"/>
+                </a:solidFill>
+                <a:latin typeface="Courier New" panose="02070309020205020404" pitchFamily="49" charset="0"/>
+              </a:rPr>
+              <a:t>vegan")</a:t>
+            </a:r>
+          </a:p>
+          <a:p>
+            <a:endParaRPr lang="en-US" dirty="0">
+              <a:latin typeface="Courier New" panose="02070309020205020404" pitchFamily="49" charset="0"/>
+            </a:endParaRPr>
+          </a:p>
+          <a:p>
+            <a:r>
+              <a:rPr lang="en-US" dirty="0" err="1">
+                <a:latin typeface="Courier New" panose="02070309020205020404" pitchFamily="49" charset="0"/>
+              </a:rPr>
+              <a:t>inFileName</a:t>
+            </a:r>
+            <a:r>
+              <a:rPr lang="en-US" dirty="0">
+                <a:latin typeface="Courier New" panose="02070309020205020404" pitchFamily="49" charset="0"/>
+              </a:rPr>
+              <a:t> &lt;- "humann2_genefamilies.LABELS2OnlyAbundant.txt"</a:t>
+            </a:r>
+          </a:p>
+          <a:p>
+            <a:r>
+              <a:rPr lang="en-US" dirty="0" err="1">
+                <a:latin typeface="Courier New" panose="02070309020205020404" pitchFamily="49" charset="0"/>
+              </a:rPr>
+              <a:t>myT</a:t>
+            </a:r>
+            <a:r>
+              <a:rPr lang="en-US" dirty="0">
+                <a:latin typeface="Courier New" panose="02070309020205020404" pitchFamily="49" charset="0"/>
+              </a:rPr>
+              <a:t> &lt;-</a:t>
+            </a:r>
+            <a:r>
+              <a:rPr lang="en-US" dirty="0" err="1">
+                <a:latin typeface="Courier New" panose="02070309020205020404" pitchFamily="49" charset="0"/>
+              </a:rPr>
+              <a:t>read.table</a:t>
+            </a:r>
+            <a:r>
+              <a:rPr lang="en-US" dirty="0">
+                <a:latin typeface="Courier New" panose="02070309020205020404" pitchFamily="49" charset="0"/>
+              </a:rPr>
+              <a:t>(</a:t>
+            </a:r>
+            <a:r>
+              <a:rPr lang="en-US" dirty="0" err="1">
+                <a:latin typeface="Courier New" panose="02070309020205020404" pitchFamily="49" charset="0"/>
+              </a:rPr>
+              <a:t>inFileName,header</a:t>
+            </a:r>
+            <a:r>
+              <a:rPr lang="en-US" dirty="0">
+                <a:latin typeface="Courier New" panose="02070309020205020404" pitchFamily="49" charset="0"/>
+              </a:rPr>
+              <a:t>=</a:t>
+            </a:r>
+            <a:r>
+              <a:rPr lang="en-US" dirty="0" err="1">
+                <a:latin typeface="Courier New" panose="02070309020205020404" pitchFamily="49" charset="0"/>
+              </a:rPr>
+              <a:t>TRUE,</a:t>
+            </a:r>
+            <a:r>
+              <a:rPr lang="en-US" dirty="0" err="1">
+                <a:solidFill>
+                  <a:srgbClr val="000000"/>
+                </a:solidFill>
+                <a:latin typeface="Courier New" panose="02070309020205020404" pitchFamily="49" charset="0"/>
+              </a:rPr>
+              <a:t>sep</a:t>
+            </a:r>
+            <a:r>
+              <a:rPr lang="en-US" dirty="0">
+                <a:solidFill>
+                  <a:srgbClr val="000000"/>
+                </a:solidFill>
+                <a:latin typeface="Courier New" panose="02070309020205020404" pitchFamily="49" charset="0"/>
+              </a:rPr>
+              <a:t>="\</a:t>
+            </a:r>
+            <a:r>
+              <a:rPr lang="en-US" dirty="0" err="1">
+                <a:solidFill>
+                  <a:srgbClr val="000000"/>
+                </a:solidFill>
+                <a:latin typeface="Courier New" panose="02070309020205020404" pitchFamily="49" charset="0"/>
+              </a:rPr>
+              <a:t>t",quote</a:t>
+            </a:r>
+            <a:r>
+              <a:rPr lang="en-US" dirty="0">
+                <a:solidFill>
+                  <a:srgbClr val="000000"/>
+                </a:solidFill>
+                <a:latin typeface="Courier New" panose="02070309020205020404" pitchFamily="49" charset="0"/>
+              </a:rPr>
+              <a:t>="",</a:t>
+            </a:r>
+            <a:r>
+              <a:rPr lang="en-US" dirty="0" err="1">
+                <a:solidFill>
+                  <a:srgbClr val="000000"/>
+                </a:solidFill>
+                <a:latin typeface="Courier New" panose="02070309020205020404" pitchFamily="49" charset="0"/>
+              </a:rPr>
+              <a:t>row.names</a:t>
+            </a:r>
+            <a:r>
+              <a:rPr lang="en-US" dirty="0">
+                <a:solidFill>
+                  <a:srgbClr val="000000"/>
+                </a:solidFill>
+                <a:latin typeface="Courier New" panose="02070309020205020404" pitchFamily="49" charset="0"/>
+              </a:rPr>
+              <a:t>=1,</a:t>
+            </a:r>
+          </a:p>
+          <a:p>
+            <a:r>
+              <a:rPr lang="en-US" dirty="0" err="1">
+                <a:latin typeface="Courier New" panose="02070309020205020404" pitchFamily="49" charset="0"/>
+              </a:rPr>
+              <a:t>colClasses</a:t>
+            </a:r>
+            <a:r>
+              <a:rPr lang="en-US" dirty="0">
+                <a:latin typeface="Courier New" panose="02070309020205020404" pitchFamily="49" charset="0"/>
+              </a:rPr>
+              <a:t>=c("character", </a:t>
+            </a:r>
+            <a:r>
+              <a:rPr lang="en-US" dirty="0">
+                <a:solidFill>
+                  <a:srgbClr val="000000"/>
+                </a:solidFill>
+                <a:latin typeface="Courier New" panose="02070309020205020404" pitchFamily="49" charset="0"/>
+              </a:rPr>
+              <a:t>rep("numeric", 20)))</a:t>
+            </a:r>
+          </a:p>
+          <a:p>
+            <a:endParaRPr lang="en-US" dirty="0">
+              <a:latin typeface="Courier New" panose="02070309020205020404" pitchFamily="49" charset="0"/>
+            </a:endParaRPr>
+          </a:p>
+          <a:p>
+            <a:r>
+              <a:rPr lang="en-US" dirty="0" err="1">
+                <a:latin typeface="Courier New" panose="02070309020205020404" pitchFamily="49" charset="0"/>
+              </a:rPr>
+              <a:t>pValues</a:t>
+            </a:r>
+            <a:r>
+              <a:rPr lang="en-US" dirty="0">
+                <a:latin typeface="Courier New" panose="02070309020205020404" pitchFamily="49" charset="0"/>
+              </a:rPr>
+              <a:t> &lt;- vector(length=</a:t>
+            </a:r>
+            <a:r>
+              <a:rPr lang="en-US" dirty="0" err="1">
+                <a:solidFill>
+                  <a:srgbClr val="000000"/>
+                </a:solidFill>
+                <a:latin typeface="Courier New" panose="02070309020205020404" pitchFamily="49" charset="0"/>
+              </a:rPr>
+              <a:t>nrow</a:t>
+            </a:r>
+            <a:r>
+              <a:rPr lang="en-US" dirty="0">
+                <a:solidFill>
+                  <a:srgbClr val="000000"/>
+                </a:solidFill>
+                <a:latin typeface="Courier New" panose="02070309020205020404" pitchFamily="49" charset="0"/>
+              </a:rPr>
+              <a:t>(</a:t>
+            </a:r>
+            <a:r>
+              <a:rPr lang="en-US" dirty="0" err="1">
+                <a:solidFill>
+                  <a:srgbClr val="000000"/>
+                </a:solidFill>
+                <a:latin typeface="Courier New" panose="02070309020205020404" pitchFamily="49" charset="0"/>
+              </a:rPr>
+              <a:t>myT</a:t>
+            </a:r>
+            <a:r>
+              <a:rPr lang="en-US" dirty="0">
+                <a:solidFill>
+                  <a:srgbClr val="000000"/>
+                </a:solidFill>
+                <a:latin typeface="Courier New" panose="02070309020205020404" pitchFamily="49" charset="0"/>
+              </a:rPr>
+              <a:t>))</a:t>
+            </a:r>
+          </a:p>
+          <a:p>
+            <a:r>
+              <a:rPr lang="en-US" dirty="0" err="1">
+                <a:latin typeface="Courier New" panose="02070309020205020404" pitchFamily="49" charset="0"/>
+              </a:rPr>
+              <a:t>pValuesWilcoxon</a:t>
+            </a:r>
+            <a:r>
+              <a:rPr lang="en-US" dirty="0">
+                <a:latin typeface="Courier New" panose="02070309020205020404" pitchFamily="49" charset="0"/>
+              </a:rPr>
+              <a:t> &lt;- vector(length=</a:t>
+            </a:r>
+            <a:r>
+              <a:rPr lang="en-US" dirty="0" err="1">
+                <a:solidFill>
+                  <a:srgbClr val="000000"/>
+                </a:solidFill>
+                <a:latin typeface="Courier New" panose="02070309020205020404" pitchFamily="49" charset="0"/>
+              </a:rPr>
+              <a:t>nrow</a:t>
+            </a:r>
+            <a:r>
+              <a:rPr lang="en-US" dirty="0">
+                <a:solidFill>
+                  <a:srgbClr val="000000"/>
+                </a:solidFill>
+                <a:latin typeface="Courier New" panose="02070309020205020404" pitchFamily="49" charset="0"/>
+              </a:rPr>
+              <a:t>(</a:t>
+            </a:r>
+            <a:r>
+              <a:rPr lang="en-US" dirty="0" err="1">
+                <a:solidFill>
+                  <a:srgbClr val="000000"/>
+                </a:solidFill>
+                <a:latin typeface="Courier New" panose="02070309020205020404" pitchFamily="49" charset="0"/>
+              </a:rPr>
+              <a:t>myT</a:t>
+            </a:r>
+            <a:r>
+              <a:rPr lang="en-US" dirty="0">
+                <a:solidFill>
+                  <a:srgbClr val="000000"/>
+                </a:solidFill>
+                <a:latin typeface="Courier New" panose="02070309020205020404" pitchFamily="49" charset="0"/>
+              </a:rPr>
+              <a:t>))</a:t>
+            </a:r>
+          </a:p>
+          <a:p>
+            <a:r>
+              <a:rPr lang="en-US" dirty="0">
+                <a:latin typeface="Courier New" panose="02070309020205020404" pitchFamily="49" charset="0"/>
+              </a:rPr>
+              <a:t>names &lt;- vector(length=</a:t>
+            </a:r>
+            <a:r>
+              <a:rPr lang="en-US" dirty="0" err="1">
+                <a:solidFill>
+                  <a:srgbClr val="000000"/>
+                </a:solidFill>
+                <a:latin typeface="Courier New" panose="02070309020205020404" pitchFamily="49" charset="0"/>
+              </a:rPr>
+              <a:t>nrow</a:t>
+            </a:r>
+            <a:r>
+              <a:rPr lang="en-US" dirty="0">
+                <a:solidFill>
+                  <a:srgbClr val="000000"/>
+                </a:solidFill>
+                <a:latin typeface="Courier New" panose="02070309020205020404" pitchFamily="49" charset="0"/>
+              </a:rPr>
+              <a:t>(</a:t>
+            </a:r>
+            <a:r>
+              <a:rPr lang="en-US" dirty="0" err="1">
+                <a:solidFill>
+                  <a:srgbClr val="000000"/>
+                </a:solidFill>
+                <a:latin typeface="Courier New" panose="02070309020205020404" pitchFamily="49" charset="0"/>
+              </a:rPr>
+              <a:t>myT</a:t>
+            </a:r>
+            <a:r>
+              <a:rPr lang="en-US" dirty="0">
+                <a:solidFill>
+                  <a:srgbClr val="000000"/>
+                </a:solidFill>
+                <a:latin typeface="Courier New" panose="02070309020205020404" pitchFamily="49" charset="0"/>
+              </a:rPr>
+              <a:t>))</a:t>
+            </a:r>
+          </a:p>
+          <a:p>
+            <a:r>
+              <a:rPr lang="en-US" dirty="0" err="1">
+                <a:latin typeface="Courier New" panose="02070309020205020404" pitchFamily="49" charset="0"/>
+              </a:rPr>
+              <a:t>meanTD</a:t>
+            </a:r>
+            <a:r>
+              <a:rPr lang="en-US" dirty="0">
+                <a:latin typeface="Courier New" panose="02070309020205020404" pitchFamily="49" charset="0"/>
+              </a:rPr>
+              <a:t> &lt;- vector(length=</a:t>
+            </a:r>
+            <a:r>
+              <a:rPr lang="en-US" dirty="0" err="1">
+                <a:solidFill>
+                  <a:srgbClr val="000000"/>
+                </a:solidFill>
+                <a:latin typeface="Courier New" panose="02070309020205020404" pitchFamily="49" charset="0"/>
+              </a:rPr>
+              <a:t>nrow</a:t>
+            </a:r>
+            <a:r>
+              <a:rPr lang="en-US" dirty="0">
+                <a:solidFill>
+                  <a:srgbClr val="000000"/>
+                </a:solidFill>
+                <a:latin typeface="Courier New" panose="02070309020205020404" pitchFamily="49" charset="0"/>
+              </a:rPr>
+              <a:t>(</a:t>
+            </a:r>
+            <a:r>
+              <a:rPr lang="en-US" dirty="0" err="1">
+                <a:solidFill>
+                  <a:srgbClr val="000000"/>
+                </a:solidFill>
+                <a:latin typeface="Courier New" panose="02070309020205020404" pitchFamily="49" charset="0"/>
+              </a:rPr>
+              <a:t>myT</a:t>
+            </a:r>
+            <a:r>
+              <a:rPr lang="en-US" dirty="0">
+                <a:solidFill>
+                  <a:srgbClr val="000000"/>
+                </a:solidFill>
+                <a:latin typeface="Courier New" panose="02070309020205020404" pitchFamily="49" charset="0"/>
+              </a:rPr>
+              <a:t>))</a:t>
+            </a:r>
+          </a:p>
+          <a:p>
+            <a:r>
+              <a:rPr lang="en-US" dirty="0" err="1">
+                <a:latin typeface="Courier New" panose="02070309020205020404" pitchFamily="49" charset="0"/>
+              </a:rPr>
+              <a:t>meanBM</a:t>
+            </a:r>
+            <a:r>
+              <a:rPr lang="en-US" dirty="0">
+                <a:latin typeface="Courier New" panose="02070309020205020404" pitchFamily="49" charset="0"/>
+              </a:rPr>
+              <a:t> &lt;- vector(length=</a:t>
+            </a:r>
+            <a:r>
+              <a:rPr lang="en-US" dirty="0" err="1">
+                <a:solidFill>
+                  <a:srgbClr val="000000"/>
+                </a:solidFill>
+                <a:latin typeface="Courier New" panose="02070309020205020404" pitchFamily="49" charset="0"/>
+              </a:rPr>
+              <a:t>nrow</a:t>
+            </a:r>
+            <a:r>
+              <a:rPr lang="en-US" dirty="0">
+                <a:solidFill>
+                  <a:srgbClr val="000000"/>
+                </a:solidFill>
+                <a:latin typeface="Courier New" panose="02070309020205020404" pitchFamily="49" charset="0"/>
+              </a:rPr>
+              <a:t>(</a:t>
+            </a:r>
+            <a:r>
+              <a:rPr lang="en-US" dirty="0" err="1">
+                <a:solidFill>
+                  <a:srgbClr val="000000"/>
+                </a:solidFill>
+                <a:latin typeface="Courier New" panose="02070309020205020404" pitchFamily="49" charset="0"/>
+              </a:rPr>
+              <a:t>myT</a:t>
+            </a:r>
+            <a:r>
+              <a:rPr lang="en-US" dirty="0">
+                <a:solidFill>
+                  <a:srgbClr val="000000"/>
+                </a:solidFill>
+                <a:latin typeface="Courier New" panose="02070309020205020404" pitchFamily="49" charset="0"/>
+              </a:rPr>
+              <a:t>))</a:t>
+            </a:r>
+          </a:p>
+          <a:p>
+            <a:endParaRPr lang="en-US" dirty="0">
+              <a:latin typeface="Courier New" panose="02070309020205020404" pitchFamily="49" charset="0"/>
+            </a:endParaRPr>
+          </a:p>
+          <a:p>
+            <a:r>
+              <a:rPr lang="en-US" dirty="0" err="1">
+                <a:latin typeface="Courier New" panose="02070309020205020404" pitchFamily="49" charset="0"/>
+              </a:rPr>
+              <a:t>isTD</a:t>
+            </a:r>
+            <a:r>
+              <a:rPr lang="en-US" dirty="0">
+                <a:latin typeface="Courier New" panose="02070309020205020404" pitchFamily="49" charset="0"/>
+              </a:rPr>
+              <a:t> &lt;- </a:t>
+            </a:r>
+            <a:r>
+              <a:rPr lang="en-US" dirty="0" err="1">
+                <a:solidFill>
+                  <a:srgbClr val="000000"/>
+                </a:solidFill>
+                <a:latin typeface="Courier New" panose="02070309020205020404" pitchFamily="49" charset="0"/>
+              </a:rPr>
+              <a:t>grepl</a:t>
+            </a:r>
+            <a:r>
+              <a:rPr lang="en-US" dirty="0">
+                <a:solidFill>
+                  <a:srgbClr val="000000"/>
+                </a:solidFill>
+                <a:latin typeface="Courier New" panose="02070309020205020404" pitchFamily="49" charset="0"/>
+              </a:rPr>
+              <a:t>("TD", names(</a:t>
+            </a:r>
+            <a:r>
+              <a:rPr lang="en-US" dirty="0" err="1">
+                <a:solidFill>
+                  <a:srgbClr val="000000"/>
+                </a:solidFill>
+                <a:latin typeface="Courier New" panose="02070309020205020404" pitchFamily="49" charset="0"/>
+              </a:rPr>
+              <a:t>myT</a:t>
+            </a:r>
+            <a:r>
+              <a:rPr lang="en-US" dirty="0">
+                <a:solidFill>
+                  <a:srgbClr val="000000"/>
+                </a:solidFill>
+                <a:latin typeface="Courier New" panose="02070309020205020404" pitchFamily="49" charset="0"/>
+              </a:rPr>
+              <a:t>))</a:t>
+            </a:r>
+          </a:p>
+          <a:p>
+            <a:endParaRPr lang="en-US" dirty="0">
+              <a:latin typeface="Courier New" panose="02070309020205020404" pitchFamily="49" charset="0"/>
+            </a:endParaRPr>
+          </a:p>
+          <a:p>
+            <a:r>
+              <a:rPr lang="en-US" dirty="0">
+                <a:solidFill>
+                  <a:srgbClr val="000000"/>
+                </a:solidFill>
+                <a:latin typeface="Courier New" panose="02070309020205020404" pitchFamily="49" charset="0"/>
+              </a:rPr>
+              <a:t>pdf("topHits.pdf")</a:t>
+            </a:r>
+            <a:endParaRPr lang="en-US" dirty="0"/>
+          </a:p>
+        </p:txBody>
+      </p:sp>
+      <p:cxnSp>
+        <p:nvCxnSpPr>
+          <p:cNvPr id="8" name="Straight Arrow Connector 7"/>
+          <p:cNvCxnSpPr/>
+          <p:nvPr/>
+        </p:nvCxnSpPr>
+        <p:spPr>
+          <a:xfrm flipH="1">
+            <a:off x="6115794" y="3586347"/>
+            <a:ext cx="973776" cy="0"/>
+          </a:xfrm>
+          <a:prstGeom prst="straightConnector1">
+            <a:avLst/>
+          </a:prstGeom>
+          <a:ln>
+            <a:tailEnd type="triangle"/>
+          </a:ln>
+        </p:spPr>
+        <p:style>
+          <a:lnRef idx="1">
+            <a:schemeClr val="accent1"/>
+          </a:lnRef>
+          <a:fillRef idx="0">
+            <a:schemeClr val="accent1"/>
+          </a:fillRef>
+          <a:effectRef idx="0">
+            <a:schemeClr val="accent1"/>
+          </a:effectRef>
+          <a:fontRef idx="minor">
+            <a:schemeClr val="tx1"/>
+          </a:fontRef>
+        </p:style>
+      </p:cxnSp>
+      <p:sp>
+        <p:nvSpPr>
+          <p:cNvPr id="9" name="TextBox 8"/>
+          <p:cNvSpPr txBox="1"/>
+          <p:nvPr/>
+        </p:nvSpPr>
+        <p:spPr>
+          <a:xfrm>
+            <a:off x="6947066" y="4037610"/>
+            <a:ext cx="4339650" cy="369332"/>
+          </a:xfrm>
+          <a:prstGeom prst="rect">
+            <a:avLst/>
+          </a:prstGeom>
+          <a:noFill/>
+        </p:spPr>
+        <p:txBody>
+          <a:bodyPr wrap="none" rtlCol="0">
+            <a:spAutoFit/>
+          </a:bodyPr>
+          <a:lstStyle/>
+          <a:p>
+            <a:r>
+              <a:rPr lang="en-US" dirty="0" smtClean="0">
+                <a:latin typeface="Arial" panose="020B0604020202020204" pitchFamily="34" charset="0"/>
+                <a:cs typeface="Arial" panose="020B0604020202020204" pitchFamily="34" charset="0"/>
+              </a:rPr>
+              <a:t>Set up data structures to hold our results</a:t>
+            </a:r>
+            <a:endParaRPr lang="en-US" dirty="0">
+              <a:latin typeface="Arial" panose="020B0604020202020204" pitchFamily="34" charset="0"/>
+              <a:cs typeface="Arial" panose="020B0604020202020204" pitchFamily="34" charset="0"/>
+            </a:endParaRPr>
+          </a:p>
+        </p:txBody>
+      </p:sp>
+      <p:cxnSp>
+        <p:nvCxnSpPr>
+          <p:cNvPr id="10" name="Straight Arrow Connector 9"/>
+          <p:cNvCxnSpPr/>
+          <p:nvPr/>
+        </p:nvCxnSpPr>
+        <p:spPr>
+          <a:xfrm flipH="1">
+            <a:off x="6066313" y="4819398"/>
+            <a:ext cx="973776" cy="0"/>
+          </a:xfrm>
+          <a:prstGeom prst="straightConnector1">
+            <a:avLst/>
+          </a:prstGeom>
+          <a:ln>
+            <a:tailEnd type="triangle"/>
+          </a:ln>
+        </p:spPr>
+        <p:style>
+          <a:lnRef idx="1">
+            <a:schemeClr val="accent1"/>
+          </a:lnRef>
+          <a:fillRef idx="0">
+            <a:schemeClr val="accent1"/>
+          </a:fillRef>
+          <a:effectRef idx="0">
+            <a:schemeClr val="accent1"/>
+          </a:effectRef>
+          <a:fontRef idx="minor">
+            <a:schemeClr val="tx1"/>
+          </a:fontRef>
+        </p:style>
+      </p:cxnSp>
+      <p:cxnSp>
+        <p:nvCxnSpPr>
+          <p:cNvPr id="12" name="Straight Arrow Connector 11"/>
+          <p:cNvCxnSpPr/>
+          <p:nvPr/>
+        </p:nvCxnSpPr>
+        <p:spPr>
+          <a:xfrm flipH="1">
+            <a:off x="3313216" y="5771408"/>
+            <a:ext cx="938150" cy="23750"/>
+          </a:xfrm>
+          <a:prstGeom prst="straightConnector1">
+            <a:avLst/>
+          </a:prstGeom>
+          <a:ln>
+            <a:tailEnd type="triangle"/>
+          </a:ln>
+        </p:spPr>
+        <p:style>
+          <a:lnRef idx="1">
+            <a:schemeClr val="accent1"/>
+          </a:lnRef>
+          <a:fillRef idx="0">
+            <a:schemeClr val="accent1"/>
+          </a:fillRef>
+          <a:effectRef idx="0">
+            <a:schemeClr val="accent1"/>
+          </a:effectRef>
+          <a:fontRef idx="minor">
+            <a:schemeClr val="tx1"/>
+          </a:fontRef>
+        </p:style>
+      </p:cxnSp>
+      <p:sp>
+        <p:nvSpPr>
+          <p:cNvPr id="13" name="TextBox 12"/>
+          <p:cNvSpPr txBox="1"/>
+          <p:nvPr/>
+        </p:nvSpPr>
+        <p:spPr>
+          <a:xfrm>
+            <a:off x="4332519" y="5615052"/>
+            <a:ext cx="5044971" cy="369332"/>
+          </a:xfrm>
+          <a:prstGeom prst="rect">
+            <a:avLst/>
+          </a:prstGeom>
+          <a:noFill/>
+        </p:spPr>
+        <p:txBody>
+          <a:bodyPr wrap="none" rtlCol="0">
+            <a:spAutoFit/>
+          </a:bodyPr>
+          <a:lstStyle/>
+          <a:p>
+            <a:r>
+              <a:rPr lang="en-US" dirty="0" smtClean="0">
+                <a:latin typeface="Arial" panose="020B0604020202020204" pitchFamily="34" charset="0"/>
+                <a:cs typeface="Arial" panose="020B0604020202020204" pitchFamily="34" charset="0"/>
+              </a:rPr>
+              <a:t>Set up an output file to capture our visualization</a:t>
+            </a:r>
+            <a:endParaRPr lang="en-US" dirty="0">
+              <a:latin typeface="Arial" panose="020B0604020202020204" pitchFamily="34" charset="0"/>
+              <a:cs typeface="Arial" panose="020B0604020202020204" pitchFamily="34" charset="0"/>
+            </a:endParaRPr>
+          </a:p>
+        </p:txBody>
+      </p:sp>
+    </p:spTree>
+    <p:extLst>
+      <p:ext uri="{BB962C8B-B14F-4D97-AF65-F5344CB8AC3E}">
+        <p14:creationId xmlns:p14="http://schemas.microsoft.com/office/powerpoint/2010/main" val="3381457566"/>
+      </p:ext>
+    </p:extLst>
+  </p:cSld>
+  <p:clrMapOvr>
+    <a:masterClrMapping/>
+  </p:clrMapOvr>
+</p:sld>
+</file>
+
+<file path=ppt/slides/slide38.xml><?xml version="1.0" encoding="utf-8"?>
+<p:sld xmlns:a="http://schemas.openxmlformats.org/drawingml/2006/main" xmlns:r="http://schemas.openxmlformats.org/officeDocument/2006/relationships" xmlns:p="http://schemas.openxmlformats.org/presentationml/2006/main">
+  <p:cSld>
+    <p:spTree>
+      <p:nvGrpSpPr>
+        <p:cNvPr id="1" name=""/>
+        <p:cNvGrpSpPr/>
+        <p:nvPr/>
+      </p:nvGrpSpPr>
+      <p:grpSpPr>
+        <a:xfrm>
+          <a:off x="0" y="0"/>
+          <a:ext cx="0" cy="0"/>
+          <a:chOff x="0" y="0"/>
+          <a:chExt cx="0" cy="0"/>
+        </a:xfrm>
+      </p:grpSpPr>
+      <p:sp>
+        <p:nvSpPr>
+          <p:cNvPr id="12" name="Rectangle 11"/>
+          <p:cNvSpPr/>
+          <p:nvPr/>
+        </p:nvSpPr>
+        <p:spPr>
+          <a:xfrm>
+            <a:off x="451262" y="689665"/>
+            <a:ext cx="11394302" cy="5355312"/>
+          </a:xfrm>
+          <a:prstGeom prst="rect">
+            <a:avLst/>
+          </a:prstGeom>
+        </p:spPr>
+        <p:txBody>
+          <a:bodyPr wrap="square">
+            <a:spAutoFit/>
+          </a:bodyPr>
+          <a:lstStyle/>
+          <a:p>
+            <a:endParaRPr lang="en-US" dirty="0">
+              <a:latin typeface="Courier New" panose="02070309020205020404" pitchFamily="49" charset="0"/>
+            </a:endParaRPr>
+          </a:p>
+          <a:p>
+            <a:r>
+              <a:rPr lang="en-US" dirty="0">
+                <a:latin typeface="Courier New" panose="02070309020205020404" pitchFamily="49" charset="0"/>
+              </a:rPr>
+              <a:t>for( </a:t>
+            </a:r>
+            <a:r>
+              <a:rPr lang="en-US" dirty="0" err="1">
+                <a:latin typeface="Courier New" panose="02070309020205020404" pitchFamily="49" charset="0"/>
+              </a:rPr>
+              <a:t>i</a:t>
+            </a:r>
+            <a:r>
+              <a:rPr lang="en-US" dirty="0">
+                <a:latin typeface="Courier New" panose="02070309020205020404" pitchFamily="49" charset="0"/>
+              </a:rPr>
+              <a:t> in 1:</a:t>
+            </a:r>
+            <a:r>
+              <a:rPr lang="en-US" dirty="0">
+                <a:solidFill>
+                  <a:srgbClr val="000000"/>
+                </a:solidFill>
+                <a:latin typeface="Courier New" panose="02070309020205020404" pitchFamily="49" charset="0"/>
+              </a:rPr>
+              <a:t>nrow(</a:t>
+            </a:r>
+            <a:r>
+              <a:rPr lang="en-US" dirty="0" err="1">
+                <a:solidFill>
+                  <a:srgbClr val="000000"/>
+                </a:solidFill>
+                <a:latin typeface="Courier New" panose="02070309020205020404" pitchFamily="49" charset="0"/>
+              </a:rPr>
+              <a:t>myT</a:t>
+            </a:r>
+            <a:r>
+              <a:rPr lang="en-US" dirty="0">
+                <a:solidFill>
+                  <a:srgbClr val="000000"/>
+                </a:solidFill>
+                <a:latin typeface="Courier New" panose="02070309020205020404" pitchFamily="49" charset="0"/>
+              </a:rPr>
+              <a:t>))</a:t>
+            </a:r>
+          </a:p>
+          <a:p>
+            <a:r>
+              <a:rPr lang="en-US" dirty="0">
+                <a:latin typeface="Courier New" panose="02070309020205020404" pitchFamily="49" charset="0"/>
+              </a:rPr>
+              <a:t>{</a:t>
+            </a:r>
+          </a:p>
+          <a:p>
+            <a:pPr lvl="1"/>
+            <a:r>
+              <a:rPr lang="en-US" dirty="0">
+                <a:latin typeface="Courier New" panose="02070309020205020404" pitchFamily="49" charset="0"/>
+              </a:rPr>
+              <a:t>bug &lt;- </a:t>
+            </a:r>
+            <a:r>
+              <a:rPr lang="en-US" dirty="0" err="1">
+                <a:latin typeface="Courier New" panose="02070309020205020404" pitchFamily="49" charset="0"/>
+              </a:rPr>
+              <a:t>as.numeric</a:t>
+            </a:r>
+            <a:r>
+              <a:rPr lang="en-US" dirty="0">
+                <a:latin typeface="Courier New" panose="02070309020205020404" pitchFamily="49" charset="0"/>
+              </a:rPr>
+              <a:t>(</a:t>
+            </a:r>
+            <a:r>
+              <a:rPr lang="en-US" dirty="0" err="1">
+                <a:latin typeface="Courier New" panose="02070309020205020404" pitchFamily="49" charset="0"/>
+              </a:rPr>
+              <a:t>myT</a:t>
+            </a:r>
+            <a:r>
+              <a:rPr lang="en-US" dirty="0">
+                <a:latin typeface="Courier New" panose="02070309020205020404" pitchFamily="49" charset="0"/>
+              </a:rPr>
+              <a:t>[</a:t>
+            </a:r>
+            <a:r>
+              <a:rPr lang="en-US" dirty="0" err="1">
+                <a:latin typeface="Courier New" panose="02070309020205020404" pitchFamily="49" charset="0"/>
+              </a:rPr>
+              <a:t>i</a:t>
+            </a:r>
+            <a:r>
+              <a:rPr lang="en-US" dirty="0">
+                <a:latin typeface="Courier New" panose="02070309020205020404" pitchFamily="49" charset="0"/>
+              </a:rPr>
+              <a:t>,])</a:t>
+            </a:r>
+          </a:p>
+          <a:p>
+            <a:pPr lvl="1"/>
+            <a:r>
+              <a:rPr lang="en-US" dirty="0" err="1">
+                <a:latin typeface="Courier New" panose="02070309020205020404" pitchFamily="49" charset="0"/>
+              </a:rPr>
+              <a:t>pValues</a:t>
+            </a:r>
+            <a:r>
+              <a:rPr lang="en-US" dirty="0">
+                <a:latin typeface="Courier New" panose="02070309020205020404" pitchFamily="49" charset="0"/>
+              </a:rPr>
+              <a:t>[</a:t>
+            </a:r>
+            <a:r>
+              <a:rPr lang="en-US" dirty="0" err="1">
+                <a:latin typeface="Courier New" panose="02070309020205020404" pitchFamily="49" charset="0"/>
+              </a:rPr>
+              <a:t>i</a:t>
+            </a:r>
+            <a:r>
+              <a:rPr lang="en-US" dirty="0">
+                <a:latin typeface="Courier New" panose="02070309020205020404" pitchFamily="49" charset="0"/>
+              </a:rPr>
+              <a:t>] &lt;- </a:t>
+            </a:r>
+            <a:r>
+              <a:rPr lang="en-US" dirty="0" err="1">
+                <a:latin typeface="Courier New" panose="02070309020205020404" pitchFamily="49" charset="0"/>
+              </a:rPr>
+              <a:t>t.test</a:t>
+            </a:r>
+            <a:r>
+              <a:rPr lang="en-US" dirty="0">
+                <a:latin typeface="Courier New" panose="02070309020205020404" pitchFamily="49" charset="0"/>
+              </a:rPr>
+              <a:t>( bug[ </a:t>
+            </a:r>
+            <a:r>
+              <a:rPr lang="en-US" dirty="0" err="1">
+                <a:latin typeface="Courier New" panose="02070309020205020404" pitchFamily="49" charset="0"/>
+              </a:rPr>
+              <a:t>isTD</a:t>
+            </a:r>
+            <a:r>
+              <a:rPr lang="en-US" dirty="0">
+                <a:latin typeface="Courier New" panose="02070309020205020404" pitchFamily="49" charset="0"/>
+              </a:rPr>
+              <a:t> ] ,bug[ ! </a:t>
+            </a:r>
+            <a:r>
+              <a:rPr lang="en-US" dirty="0" err="1">
+                <a:latin typeface="Courier New" panose="02070309020205020404" pitchFamily="49" charset="0"/>
+              </a:rPr>
+              <a:t>isTD</a:t>
+            </a:r>
+            <a:r>
+              <a:rPr lang="en-US" dirty="0">
+                <a:latin typeface="Courier New" panose="02070309020205020404" pitchFamily="49" charset="0"/>
+              </a:rPr>
+              <a:t> ]  )$</a:t>
+            </a:r>
+            <a:r>
+              <a:rPr lang="en-US" dirty="0" err="1">
+                <a:latin typeface="Courier New" panose="02070309020205020404" pitchFamily="49" charset="0"/>
+              </a:rPr>
+              <a:t>p.value</a:t>
+            </a:r>
+            <a:endParaRPr lang="en-US" dirty="0">
+              <a:latin typeface="Courier New" panose="02070309020205020404" pitchFamily="49" charset="0"/>
+            </a:endParaRPr>
+          </a:p>
+          <a:p>
+            <a:pPr lvl="1"/>
+            <a:r>
+              <a:rPr lang="en-US" dirty="0" err="1">
+                <a:latin typeface="Courier New" panose="02070309020205020404" pitchFamily="49" charset="0"/>
+              </a:rPr>
+              <a:t>pValuesWilcoxon</a:t>
+            </a:r>
+            <a:r>
+              <a:rPr lang="en-US" dirty="0">
+                <a:latin typeface="Courier New" panose="02070309020205020404" pitchFamily="49" charset="0"/>
+              </a:rPr>
+              <a:t>[</a:t>
+            </a:r>
+            <a:r>
+              <a:rPr lang="en-US" dirty="0" err="1">
+                <a:latin typeface="Courier New" panose="02070309020205020404" pitchFamily="49" charset="0"/>
+              </a:rPr>
+              <a:t>i</a:t>
+            </a:r>
+            <a:r>
+              <a:rPr lang="en-US" dirty="0">
+                <a:latin typeface="Courier New" panose="02070309020205020404" pitchFamily="49" charset="0"/>
+              </a:rPr>
+              <a:t>] &lt;- </a:t>
+            </a:r>
+            <a:r>
+              <a:rPr lang="en-US" dirty="0" err="1">
+                <a:latin typeface="Courier New" panose="02070309020205020404" pitchFamily="49" charset="0"/>
+              </a:rPr>
+              <a:t>wilcox.test</a:t>
+            </a:r>
+            <a:r>
+              <a:rPr lang="en-US" dirty="0">
+                <a:latin typeface="Courier New" panose="02070309020205020404" pitchFamily="49" charset="0"/>
+              </a:rPr>
+              <a:t>( bug[ </a:t>
+            </a:r>
+            <a:r>
+              <a:rPr lang="en-US" dirty="0" err="1">
+                <a:latin typeface="Courier New" panose="02070309020205020404" pitchFamily="49" charset="0"/>
+              </a:rPr>
+              <a:t>isTD</a:t>
+            </a:r>
+            <a:r>
+              <a:rPr lang="en-US" dirty="0">
+                <a:latin typeface="Courier New" panose="02070309020205020404" pitchFamily="49" charset="0"/>
+              </a:rPr>
+              <a:t> ] ,bug[ ! </a:t>
+            </a:r>
+            <a:r>
+              <a:rPr lang="en-US" dirty="0" err="1">
+                <a:latin typeface="Courier New" panose="02070309020205020404" pitchFamily="49" charset="0"/>
+              </a:rPr>
+              <a:t>isTD</a:t>
+            </a:r>
+            <a:r>
+              <a:rPr lang="en-US" dirty="0">
+                <a:latin typeface="Courier New" panose="02070309020205020404" pitchFamily="49" charset="0"/>
+              </a:rPr>
+              <a:t> ]  )$</a:t>
+            </a:r>
+            <a:r>
+              <a:rPr lang="en-US" dirty="0" err="1">
+                <a:latin typeface="Courier New" panose="02070309020205020404" pitchFamily="49" charset="0"/>
+              </a:rPr>
+              <a:t>p.value</a:t>
+            </a:r>
+            <a:endParaRPr lang="en-US" dirty="0">
+              <a:latin typeface="Courier New" panose="02070309020205020404" pitchFamily="49" charset="0"/>
+            </a:endParaRPr>
+          </a:p>
+          <a:p>
+            <a:pPr lvl="1"/>
+            <a:r>
+              <a:rPr lang="en-US" dirty="0" err="1">
+                <a:latin typeface="Courier New" panose="02070309020205020404" pitchFamily="49" charset="0"/>
+              </a:rPr>
+              <a:t>meanTD</a:t>
+            </a:r>
+            <a:r>
+              <a:rPr lang="en-US" dirty="0">
+                <a:latin typeface="Courier New" panose="02070309020205020404" pitchFamily="49" charset="0"/>
+              </a:rPr>
+              <a:t>[</a:t>
+            </a:r>
+            <a:r>
+              <a:rPr lang="en-US" dirty="0" err="1">
+                <a:latin typeface="Courier New" panose="02070309020205020404" pitchFamily="49" charset="0"/>
+              </a:rPr>
+              <a:t>i</a:t>
+            </a:r>
+            <a:r>
+              <a:rPr lang="en-US" dirty="0">
+                <a:latin typeface="Courier New" panose="02070309020205020404" pitchFamily="49" charset="0"/>
+              </a:rPr>
+              <a:t>] &lt;- mean(bug[ </a:t>
+            </a:r>
+            <a:r>
+              <a:rPr lang="en-US" dirty="0" err="1">
+                <a:latin typeface="Courier New" panose="02070309020205020404" pitchFamily="49" charset="0"/>
+              </a:rPr>
+              <a:t>isTD</a:t>
+            </a:r>
+            <a:r>
+              <a:rPr lang="en-US" dirty="0">
+                <a:latin typeface="Courier New" panose="02070309020205020404" pitchFamily="49" charset="0"/>
+              </a:rPr>
+              <a:t> ]) </a:t>
+            </a:r>
+          </a:p>
+          <a:p>
+            <a:pPr lvl="1"/>
+            <a:r>
+              <a:rPr lang="en-US" dirty="0" err="1">
+                <a:latin typeface="Courier New" panose="02070309020205020404" pitchFamily="49" charset="0"/>
+              </a:rPr>
+              <a:t>meanBM</a:t>
+            </a:r>
+            <a:r>
+              <a:rPr lang="en-US" dirty="0">
+                <a:latin typeface="Courier New" panose="02070309020205020404" pitchFamily="49" charset="0"/>
+              </a:rPr>
+              <a:t>[</a:t>
+            </a:r>
+            <a:r>
+              <a:rPr lang="en-US" dirty="0" err="1">
+                <a:latin typeface="Courier New" panose="02070309020205020404" pitchFamily="49" charset="0"/>
+              </a:rPr>
+              <a:t>i</a:t>
+            </a:r>
+            <a:r>
+              <a:rPr lang="en-US" dirty="0">
+                <a:latin typeface="Courier New" panose="02070309020205020404" pitchFamily="49" charset="0"/>
+              </a:rPr>
+              <a:t>] &lt;- mean(bug[ ! </a:t>
+            </a:r>
+            <a:r>
+              <a:rPr lang="en-US" dirty="0" err="1">
+                <a:latin typeface="Courier New" panose="02070309020205020404" pitchFamily="49" charset="0"/>
+              </a:rPr>
+              <a:t>isTD</a:t>
+            </a:r>
+            <a:r>
+              <a:rPr lang="en-US" dirty="0">
+                <a:latin typeface="Courier New" panose="02070309020205020404" pitchFamily="49" charset="0"/>
+              </a:rPr>
+              <a:t> ])</a:t>
+            </a:r>
+          </a:p>
+          <a:p>
+            <a:pPr lvl="1"/>
+            <a:r>
+              <a:rPr lang="en-US" dirty="0">
+                <a:latin typeface="Courier New" panose="02070309020205020404" pitchFamily="49" charset="0"/>
+              </a:rPr>
+              <a:t>names[</a:t>
+            </a:r>
+            <a:r>
+              <a:rPr lang="en-US" dirty="0" err="1">
+                <a:latin typeface="Courier New" panose="02070309020205020404" pitchFamily="49" charset="0"/>
+              </a:rPr>
+              <a:t>i</a:t>
+            </a:r>
+            <a:r>
+              <a:rPr lang="en-US" dirty="0">
+                <a:latin typeface="Courier New" panose="02070309020205020404" pitchFamily="49" charset="0"/>
+              </a:rPr>
+              <a:t>] &lt;- </a:t>
+            </a:r>
+            <a:r>
+              <a:rPr lang="en-US" dirty="0" err="1">
+                <a:latin typeface="Courier New" panose="02070309020205020404" pitchFamily="49" charset="0"/>
+              </a:rPr>
+              <a:t>row.names</a:t>
+            </a:r>
+            <a:r>
+              <a:rPr lang="en-US" dirty="0">
+                <a:latin typeface="Courier New" panose="02070309020205020404" pitchFamily="49" charset="0"/>
+              </a:rPr>
+              <a:t>(</a:t>
+            </a:r>
+            <a:r>
+              <a:rPr lang="en-US" dirty="0" err="1">
+                <a:latin typeface="Courier New" panose="02070309020205020404" pitchFamily="49" charset="0"/>
+              </a:rPr>
+              <a:t>myT</a:t>
+            </a:r>
+            <a:r>
+              <a:rPr lang="en-US" dirty="0">
+                <a:latin typeface="Courier New" panose="02070309020205020404" pitchFamily="49" charset="0"/>
+              </a:rPr>
+              <a:t>)[</a:t>
+            </a:r>
+            <a:r>
+              <a:rPr lang="en-US" dirty="0" err="1">
+                <a:latin typeface="Courier New" panose="02070309020205020404" pitchFamily="49" charset="0"/>
+              </a:rPr>
+              <a:t>i</a:t>
+            </a:r>
+            <a:r>
+              <a:rPr lang="en-US" dirty="0">
+                <a:latin typeface="Courier New" panose="02070309020205020404" pitchFamily="49" charset="0"/>
+              </a:rPr>
+              <a:t>]</a:t>
+            </a:r>
+          </a:p>
+          <a:p>
+            <a:pPr lvl="1"/>
+            <a:endParaRPr lang="en-US" dirty="0">
+              <a:latin typeface="Courier New" panose="02070309020205020404" pitchFamily="49" charset="0"/>
+            </a:endParaRPr>
+          </a:p>
+          <a:p>
+            <a:pPr lvl="1"/>
+            <a:r>
+              <a:rPr lang="en-US" dirty="0">
+                <a:latin typeface="Courier New" panose="02070309020205020404" pitchFamily="49" charset="0"/>
+              </a:rPr>
+              <a:t>if( </a:t>
+            </a:r>
+            <a:r>
+              <a:rPr lang="en-US" dirty="0" err="1">
+                <a:latin typeface="Courier New" panose="02070309020205020404" pitchFamily="49" charset="0"/>
+              </a:rPr>
+              <a:t>pValues</a:t>
+            </a:r>
+            <a:r>
+              <a:rPr lang="en-US" dirty="0">
+                <a:latin typeface="Courier New" panose="02070309020205020404" pitchFamily="49" charset="0"/>
+              </a:rPr>
+              <a:t>[</a:t>
+            </a:r>
+            <a:r>
+              <a:rPr lang="en-US" dirty="0" err="1">
+                <a:latin typeface="Courier New" panose="02070309020205020404" pitchFamily="49" charset="0"/>
+              </a:rPr>
+              <a:t>i</a:t>
+            </a:r>
+            <a:r>
+              <a:rPr lang="en-US" dirty="0">
+                <a:latin typeface="Courier New" panose="02070309020205020404" pitchFamily="49" charset="0"/>
+              </a:rPr>
+              <a:t>] &lt; 1e-07 ) </a:t>
+            </a:r>
+            <a:endParaRPr lang="en-US" dirty="0" smtClean="0">
+              <a:latin typeface="Courier New" panose="02070309020205020404" pitchFamily="49" charset="0"/>
+            </a:endParaRPr>
+          </a:p>
+          <a:p>
+            <a:pPr lvl="1"/>
+            <a:r>
+              <a:rPr lang="en-US" dirty="0" smtClean="0">
+                <a:latin typeface="Courier New" panose="02070309020205020404" pitchFamily="49" charset="0"/>
+              </a:rPr>
+              <a:t>	{</a:t>
+            </a:r>
+            <a:endParaRPr lang="en-US" dirty="0">
+              <a:latin typeface="Courier New" panose="02070309020205020404" pitchFamily="49" charset="0"/>
+            </a:endParaRPr>
+          </a:p>
+          <a:p>
+            <a:pPr lvl="2"/>
+            <a:r>
+              <a:rPr lang="en-US" dirty="0" err="1">
+                <a:latin typeface="Courier New" panose="02070309020205020404" pitchFamily="49" charset="0"/>
+              </a:rPr>
+              <a:t>graphMain</a:t>
+            </a:r>
+            <a:r>
+              <a:rPr lang="en-US" dirty="0">
+                <a:latin typeface="Courier New" panose="02070309020205020404" pitchFamily="49" charset="0"/>
+              </a:rPr>
+              <a:t> &lt;- paste( "p=" , format(</a:t>
+            </a:r>
+            <a:r>
+              <a:rPr lang="en-US" dirty="0" err="1">
+                <a:latin typeface="Courier New" panose="02070309020205020404" pitchFamily="49" charset="0"/>
+              </a:rPr>
+              <a:t>pValues</a:t>
+            </a:r>
+            <a:r>
+              <a:rPr lang="en-US" dirty="0">
+                <a:latin typeface="Courier New" panose="02070309020205020404" pitchFamily="49" charset="0"/>
+              </a:rPr>
+              <a:t>[</a:t>
+            </a:r>
+            <a:r>
+              <a:rPr lang="en-US" dirty="0" err="1">
+                <a:latin typeface="Courier New" panose="02070309020205020404" pitchFamily="49" charset="0"/>
+              </a:rPr>
+              <a:t>i</a:t>
+            </a:r>
+            <a:r>
+              <a:rPr lang="en-US" dirty="0">
+                <a:latin typeface="Courier New" panose="02070309020205020404" pitchFamily="49" charset="0"/>
+              </a:rPr>
+              <a:t>],digits=3), "</a:t>
+            </a:r>
+            <a:r>
+              <a:rPr lang="en-US" dirty="0" err="1">
+                <a:latin typeface="Courier New" panose="02070309020205020404" pitchFamily="49" charset="0"/>
+              </a:rPr>
+              <a:t>wilcoxon_p</a:t>
+            </a:r>
+            <a:r>
+              <a:rPr lang="en-US" dirty="0">
+                <a:latin typeface="Courier New" panose="02070309020205020404" pitchFamily="49" charset="0"/>
+              </a:rPr>
+              <a:t>=" ,</a:t>
+            </a:r>
+          </a:p>
+          <a:p>
+            <a:pPr lvl="2"/>
+            <a:r>
+              <a:rPr lang="en-US" dirty="0">
+                <a:latin typeface="Courier New" panose="02070309020205020404" pitchFamily="49" charset="0"/>
+              </a:rPr>
+              <a:t> format(</a:t>
+            </a:r>
+            <a:r>
+              <a:rPr lang="en-US" dirty="0" err="1">
+                <a:latin typeface="Courier New" panose="02070309020205020404" pitchFamily="49" charset="0"/>
+              </a:rPr>
+              <a:t>pValuesWilcoxon</a:t>
+            </a:r>
+            <a:r>
+              <a:rPr lang="en-US" dirty="0">
+                <a:latin typeface="Courier New" panose="02070309020205020404" pitchFamily="49" charset="0"/>
+              </a:rPr>
+              <a:t>[</a:t>
+            </a:r>
+            <a:r>
+              <a:rPr lang="en-US" dirty="0" err="1">
+                <a:latin typeface="Courier New" panose="02070309020205020404" pitchFamily="49" charset="0"/>
+              </a:rPr>
+              <a:t>i</a:t>
+            </a:r>
+            <a:r>
+              <a:rPr lang="en-US" dirty="0">
+                <a:latin typeface="Courier New" panose="02070309020205020404" pitchFamily="49" charset="0"/>
+              </a:rPr>
+              <a:t>],digits=3))</a:t>
+            </a:r>
+          </a:p>
+          <a:p>
+            <a:pPr lvl="2"/>
+            <a:r>
+              <a:rPr lang="en-US" dirty="0">
+                <a:solidFill>
+                  <a:srgbClr val="000000"/>
+                </a:solidFill>
+                <a:latin typeface="Courier New" panose="02070309020205020404" pitchFamily="49" charset="0"/>
+              </a:rPr>
+              <a:t>boxplot( bug ~ </a:t>
+            </a:r>
+            <a:r>
+              <a:rPr lang="en-US" dirty="0" err="1">
+                <a:solidFill>
+                  <a:srgbClr val="000000"/>
+                </a:solidFill>
+                <a:latin typeface="Courier New" panose="02070309020205020404" pitchFamily="49" charset="0"/>
+              </a:rPr>
+              <a:t>isTD</a:t>
+            </a:r>
+            <a:r>
+              <a:rPr lang="en-US" dirty="0">
+                <a:solidFill>
+                  <a:srgbClr val="000000"/>
+                </a:solidFill>
+                <a:latin typeface="Courier New" panose="02070309020205020404" pitchFamily="49" charset="0"/>
+              </a:rPr>
+              <a:t>, </a:t>
+            </a:r>
+            <a:r>
+              <a:rPr lang="en-US" dirty="0" err="1">
+                <a:solidFill>
+                  <a:srgbClr val="000000"/>
+                </a:solidFill>
+                <a:latin typeface="Courier New" panose="02070309020205020404" pitchFamily="49" charset="0"/>
+              </a:rPr>
+              <a:t>ylab</a:t>
+            </a:r>
+            <a:r>
+              <a:rPr lang="en-US" dirty="0">
+                <a:solidFill>
+                  <a:srgbClr val="000000"/>
+                </a:solidFill>
+                <a:latin typeface="Courier New" panose="02070309020205020404" pitchFamily="49" charset="0"/>
+              </a:rPr>
+              <a:t> = names[</a:t>
+            </a:r>
+            <a:r>
+              <a:rPr lang="en-US" dirty="0" err="1">
+                <a:solidFill>
+                  <a:srgbClr val="000000"/>
+                </a:solidFill>
+                <a:latin typeface="Courier New" panose="02070309020205020404" pitchFamily="49" charset="0"/>
+              </a:rPr>
+              <a:t>i</a:t>
+            </a:r>
+            <a:r>
+              <a:rPr lang="en-US" dirty="0">
+                <a:solidFill>
+                  <a:srgbClr val="000000"/>
+                </a:solidFill>
+                <a:latin typeface="Courier New" panose="02070309020205020404" pitchFamily="49" charset="0"/>
+              </a:rPr>
+              <a:t>],main = </a:t>
+            </a:r>
+            <a:r>
+              <a:rPr lang="en-US" dirty="0" err="1">
+                <a:solidFill>
+                  <a:srgbClr val="000000"/>
+                </a:solidFill>
+                <a:latin typeface="Courier New" panose="02070309020205020404" pitchFamily="49" charset="0"/>
+              </a:rPr>
+              <a:t>graphMain</a:t>
+            </a:r>
+            <a:r>
+              <a:rPr lang="en-US" dirty="0">
+                <a:solidFill>
+                  <a:srgbClr val="000000"/>
+                </a:solidFill>
+                <a:latin typeface="Courier New" panose="02070309020205020404" pitchFamily="49" charset="0"/>
+              </a:rPr>
+              <a:t> , </a:t>
+            </a:r>
+            <a:r>
+              <a:rPr lang="en-US" dirty="0" err="1">
+                <a:solidFill>
+                  <a:srgbClr val="000000"/>
+                </a:solidFill>
+                <a:latin typeface="Courier New" panose="02070309020205020404" pitchFamily="49" charset="0"/>
+              </a:rPr>
+              <a:t>xlab</a:t>
+            </a:r>
+            <a:r>
+              <a:rPr lang="en-US" dirty="0">
+                <a:solidFill>
+                  <a:srgbClr val="000000"/>
+                </a:solidFill>
+                <a:latin typeface="Courier New" panose="02070309020205020404" pitchFamily="49" charset="0"/>
+              </a:rPr>
+              <a:t>="is TD")</a:t>
+            </a:r>
+          </a:p>
+          <a:p>
+            <a:pPr lvl="2"/>
+            <a:r>
+              <a:rPr lang="en-US" dirty="0" err="1">
+                <a:latin typeface="Courier New" panose="02070309020205020404" pitchFamily="49" charset="0"/>
+              </a:rPr>
+              <a:t>myFrame</a:t>
+            </a:r>
+            <a:r>
+              <a:rPr lang="en-US" dirty="0">
+                <a:latin typeface="Courier New" panose="02070309020205020404" pitchFamily="49" charset="0"/>
+              </a:rPr>
+              <a:t> &lt;- </a:t>
+            </a:r>
+            <a:r>
+              <a:rPr lang="en-US" dirty="0" err="1">
+                <a:latin typeface="Courier New" panose="02070309020205020404" pitchFamily="49" charset="0"/>
+              </a:rPr>
+              <a:t>data.frame</a:t>
+            </a:r>
+            <a:r>
+              <a:rPr lang="en-US" dirty="0">
+                <a:latin typeface="Courier New" panose="02070309020205020404" pitchFamily="49" charset="0"/>
+              </a:rPr>
+              <a:t>( bug, </a:t>
+            </a:r>
+            <a:r>
+              <a:rPr lang="en-US" dirty="0" err="1">
+                <a:latin typeface="Courier New" panose="02070309020205020404" pitchFamily="49" charset="0"/>
+              </a:rPr>
+              <a:t>isTD</a:t>
+            </a:r>
+            <a:r>
+              <a:rPr lang="en-US" dirty="0">
+                <a:latin typeface="Courier New" panose="02070309020205020404" pitchFamily="49" charset="0"/>
+              </a:rPr>
+              <a:t>)</a:t>
+            </a:r>
+          </a:p>
+          <a:p>
+            <a:pPr lvl="2"/>
+            <a:r>
+              <a:rPr lang="en-US" dirty="0" err="1">
+                <a:solidFill>
+                  <a:srgbClr val="000000"/>
+                </a:solidFill>
+                <a:latin typeface="Courier New" panose="02070309020205020404" pitchFamily="49" charset="0"/>
+              </a:rPr>
+              <a:t>stripchart</a:t>
+            </a:r>
+            <a:r>
+              <a:rPr lang="en-US" dirty="0">
+                <a:solidFill>
+                  <a:srgbClr val="000000"/>
+                </a:solidFill>
+                <a:latin typeface="Courier New" panose="02070309020205020404" pitchFamily="49" charset="0"/>
+              </a:rPr>
+              <a:t>(bug ~ </a:t>
+            </a:r>
+            <a:r>
+              <a:rPr lang="en-US" dirty="0" err="1">
+                <a:solidFill>
+                  <a:srgbClr val="000000"/>
+                </a:solidFill>
+                <a:latin typeface="Courier New" panose="02070309020205020404" pitchFamily="49" charset="0"/>
+              </a:rPr>
+              <a:t>isTD</a:t>
+            </a:r>
+            <a:r>
+              <a:rPr lang="en-US" dirty="0">
+                <a:solidFill>
+                  <a:srgbClr val="000000"/>
+                </a:solidFill>
+                <a:latin typeface="Courier New" panose="02070309020205020404" pitchFamily="49" charset="0"/>
+              </a:rPr>
+              <a:t>, data = </a:t>
+            </a:r>
+            <a:r>
+              <a:rPr lang="en-US" dirty="0" err="1">
+                <a:solidFill>
+                  <a:srgbClr val="000000"/>
+                </a:solidFill>
+                <a:latin typeface="Courier New" panose="02070309020205020404" pitchFamily="49" charset="0"/>
+              </a:rPr>
+              <a:t>myFrame,vertical</a:t>
+            </a:r>
+            <a:r>
+              <a:rPr lang="en-US" dirty="0">
+                <a:solidFill>
+                  <a:srgbClr val="000000"/>
+                </a:solidFill>
+                <a:latin typeface="Courier New" panose="02070309020205020404" pitchFamily="49" charset="0"/>
+              </a:rPr>
+              <a:t> = TRUE, </a:t>
+            </a:r>
+            <a:r>
+              <a:rPr lang="en-US" dirty="0" err="1">
+                <a:solidFill>
+                  <a:srgbClr val="000000"/>
+                </a:solidFill>
+                <a:latin typeface="Courier New" panose="02070309020205020404" pitchFamily="49" charset="0"/>
+              </a:rPr>
+              <a:t>pch</a:t>
+            </a:r>
+            <a:r>
+              <a:rPr lang="en-US" dirty="0">
+                <a:solidFill>
+                  <a:srgbClr val="000000"/>
+                </a:solidFill>
+                <a:latin typeface="Courier New" panose="02070309020205020404" pitchFamily="49" charset="0"/>
+              </a:rPr>
+              <a:t> = 21, add=TRUE </a:t>
+            </a:r>
+            <a:r>
+              <a:rPr lang="en-US" dirty="0" smtClean="0">
+                <a:solidFill>
+                  <a:srgbClr val="000000"/>
+                </a:solidFill>
+                <a:latin typeface="Courier New" panose="02070309020205020404" pitchFamily="49" charset="0"/>
+              </a:rPr>
+              <a:t>)</a:t>
+            </a:r>
+          </a:p>
+          <a:p>
+            <a:pPr lvl="2"/>
+            <a:r>
+              <a:rPr lang="en-US" dirty="0" smtClean="0">
+                <a:latin typeface="Courier New" panose="02070309020205020404" pitchFamily="49" charset="0"/>
+              </a:rPr>
+              <a:t>}</a:t>
+            </a:r>
+          </a:p>
+          <a:p>
+            <a:r>
+              <a:rPr lang="en-US" dirty="0" smtClean="0">
+                <a:latin typeface="Courier New" panose="02070309020205020404" pitchFamily="49" charset="0"/>
+              </a:rPr>
+              <a:t>}</a:t>
+            </a:r>
+            <a:endParaRPr lang="en-US" dirty="0">
+              <a:latin typeface="Courier New" panose="02070309020205020404" pitchFamily="49" charset="0"/>
+            </a:endParaRPr>
+          </a:p>
+        </p:txBody>
+      </p:sp>
+      <p:sp>
+        <p:nvSpPr>
+          <p:cNvPr id="4" name="TextBox 3"/>
+          <p:cNvSpPr txBox="1"/>
+          <p:nvPr/>
+        </p:nvSpPr>
+        <p:spPr>
+          <a:xfrm>
+            <a:off x="593766" y="166256"/>
+            <a:ext cx="11251798" cy="369332"/>
+          </a:xfrm>
+          <a:prstGeom prst="rect">
+            <a:avLst/>
+          </a:prstGeom>
+          <a:noFill/>
+        </p:spPr>
+        <p:txBody>
+          <a:bodyPr wrap="none" rtlCol="0">
+            <a:spAutoFit/>
+          </a:bodyPr>
+          <a:lstStyle/>
+          <a:p>
+            <a:r>
+              <a:rPr lang="en-US" dirty="0" smtClean="0">
+                <a:latin typeface="Arial" panose="020B0604020202020204" pitchFamily="34" charset="0"/>
+                <a:cs typeface="Arial" panose="020B0604020202020204" pitchFamily="34" charset="0"/>
+              </a:rPr>
+              <a:t>With a modest amount of coding we can run a t-test on every row of our spreadsheet and collect the results…</a:t>
+            </a:r>
+            <a:endParaRPr lang="en-US" dirty="0">
+              <a:latin typeface="Arial" panose="020B0604020202020204" pitchFamily="34" charset="0"/>
+              <a:cs typeface="Arial" panose="020B0604020202020204" pitchFamily="34" charset="0"/>
+            </a:endParaRPr>
+          </a:p>
+        </p:txBody>
+      </p:sp>
+      <p:sp>
+        <p:nvSpPr>
+          <p:cNvPr id="5" name="Rectangle 4"/>
+          <p:cNvSpPr/>
+          <p:nvPr/>
+        </p:nvSpPr>
+        <p:spPr>
+          <a:xfrm>
+            <a:off x="292924" y="6294796"/>
+            <a:ext cx="11772406" cy="369332"/>
+          </a:xfrm>
+          <a:prstGeom prst="rect">
+            <a:avLst/>
+          </a:prstGeom>
+        </p:spPr>
+        <p:txBody>
+          <a:bodyPr wrap="square">
+            <a:spAutoFit/>
+          </a:bodyPr>
+          <a:lstStyle/>
+          <a:p>
+            <a:r>
+              <a:rPr lang="en-US" dirty="0"/>
+              <a:t>https://github.com/afodor/metagenomicsTools/blob/master/src/chapelHillWorkshop/quick_TTest</a:t>
+            </a:r>
+          </a:p>
+        </p:txBody>
+      </p:sp>
+      <p:cxnSp>
+        <p:nvCxnSpPr>
+          <p:cNvPr id="7" name="Straight Arrow Connector 6"/>
+          <p:cNvCxnSpPr/>
+          <p:nvPr/>
+        </p:nvCxnSpPr>
+        <p:spPr>
+          <a:xfrm flipH="1">
+            <a:off x="3562597" y="1140030"/>
+            <a:ext cx="973776" cy="0"/>
+          </a:xfrm>
+          <a:prstGeom prst="straightConnector1">
+            <a:avLst/>
+          </a:prstGeom>
+          <a:ln>
+            <a:tailEnd type="triangle"/>
+          </a:ln>
+        </p:spPr>
+        <p:style>
+          <a:lnRef idx="1">
+            <a:schemeClr val="accent1"/>
+          </a:lnRef>
+          <a:fillRef idx="0">
+            <a:schemeClr val="accent1"/>
+          </a:fillRef>
+          <a:effectRef idx="0">
+            <a:schemeClr val="accent1"/>
+          </a:effectRef>
+          <a:fontRef idx="minor">
+            <a:schemeClr val="tx1"/>
+          </a:fontRef>
+        </p:style>
+      </p:cxnSp>
+      <p:cxnSp>
+        <p:nvCxnSpPr>
+          <p:cNvPr id="9" name="Straight Arrow Connector 8"/>
+          <p:cNvCxnSpPr/>
+          <p:nvPr/>
+        </p:nvCxnSpPr>
+        <p:spPr>
+          <a:xfrm flipH="1">
+            <a:off x="9106394" y="4819398"/>
+            <a:ext cx="973776" cy="0"/>
+          </a:xfrm>
+          <a:prstGeom prst="straightConnector1">
+            <a:avLst/>
+          </a:prstGeom>
+          <a:ln>
+            <a:tailEnd type="triangle"/>
+          </a:ln>
+        </p:spPr>
+        <p:style>
+          <a:lnRef idx="1">
+            <a:schemeClr val="accent1"/>
+          </a:lnRef>
+          <a:fillRef idx="0">
+            <a:schemeClr val="accent1"/>
+          </a:fillRef>
+          <a:effectRef idx="0">
+            <a:schemeClr val="accent1"/>
+          </a:effectRef>
+          <a:fontRef idx="minor">
+            <a:schemeClr val="tx1"/>
+          </a:fontRef>
+        </p:style>
+      </p:cxnSp>
+      <p:sp>
+        <p:nvSpPr>
+          <p:cNvPr id="13" name="TextBox 12"/>
+          <p:cNvSpPr txBox="1"/>
+          <p:nvPr/>
+        </p:nvSpPr>
+        <p:spPr>
+          <a:xfrm>
+            <a:off x="4488871" y="950028"/>
+            <a:ext cx="4925387" cy="369332"/>
+          </a:xfrm>
+          <a:prstGeom prst="rect">
+            <a:avLst/>
+          </a:prstGeom>
+          <a:noFill/>
+        </p:spPr>
+        <p:txBody>
+          <a:bodyPr wrap="none" rtlCol="0">
+            <a:spAutoFit/>
+          </a:bodyPr>
+          <a:lstStyle/>
+          <a:p>
+            <a:r>
+              <a:rPr lang="en-US" dirty="0" smtClean="0">
+                <a:latin typeface="Arial" panose="020B0604020202020204" pitchFamily="34" charset="0"/>
+                <a:cs typeface="Arial" panose="020B0604020202020204" pitchFamily="34" charset="0"/>
+              </a:rPr>
+              <a:t>We walk through every row in the spreadsheet</a:t>
+            </a:r>
+            <a:endParaRPr lang="en-US" dirty="0">
+              <a:latin typeface="Arial" panose="020B0604020202020204" pitchFamily="34" charset="0"/>
+              <a:cs typeface="Arial" panose="020B0604020202020204" pitchFamily="34" charset="0"/>
+            </a:endParaRPr>
+          </a:p>
+        </p:txBody>
+      </p:sp>
+      <p:cxnSp>
+        <p:nvCxnSpPr>
+          <p:cNvPr id="15" name="Straight Arrow Connector 14"/>
+          <p:cNvCxnSpPr/>
+          <p:nvPr/>
+        </p:nvCxnSpPr>
+        <p:spPr>
+          <a:xfrm flipH="1" flipV="1">
+            <a:off x="5557652" y="2458192"/>
+            <a:ext cx="1341912" cy="380012"/>
+          </a:xfrm>
+          <a:prstGeom prst="straightConnector1">
+            <a:avLst/>
+          </a:prstGeom>
+          <a:ln>
+            <a:tailEnd type="triangle"/>
+          </a:ln>
+        </p:spPr>
+        <p:style>
+          <a:lnRef idx="1">
+            <a:schemeClr val="accent1"/>
+          </a:lnRef>
+          <a:fillRef idx="0">
+            <a:schemeClr val="accent1"/>
+          </a:fillRef>
+          <a:effectRef idx="0">
+            <a:schemeClr val="accent1"/>
+          </a:effectRef>
+          <a:fontRef idx="minor">
+            <a:schemeClr val="tx1"/>
+          </a:fontRef>
+        </p:style>
+      </p:cxnSp>
+      <p:sp>
+        <p:nvSpPr>
+          <p:cNvPr id="18" name="TextBox 17"/>
+          <p:cNvSpPr txBox="1"/>
+          <p:nvPr/>
+        </p:nvSpPr>
+        <p:spPr>
+          <a:xfrm>
+            <a:off x="6792686" y="2873829"/>
+            <a:ext cx="4891083" cy="369332"/>
+          </a:xfrm>
+          <a:prstGeom prst="rect">
+            <a:avLst/>
+          </a:prstGeom>
+          <a:noFill/>
+        </p:spPr>
+        <p:txBody>
+          <a:bodyPr wrap="none" rtlCol="0">
+            <a:spAutoFit/>
+          </a:bodyPr>
+          <a:lstStyle/>
+          <a:p>
+            <a:r>
+              <a:rPr lang="en-US" dirty="0" smtClean="0">
+                <a:latin typeface="Arial" panose="020B0604020202020204" pitchFamily="34" charset="0"/>
+                <a:cs typeface="Arial" panose="020B0604020202020204" pitchFamily="34" charset="0"/>
+              </a:rPr>
+              <a:t>run our statistical tests and capture the results</a:t>
+            </a:r>
+            <a:endParaRPr lang="en-US" dirty="0">
+              <a:latin typeface="Arial" panose="020B0604020202020204" pitchFamily="34" charset="0"/>
+              <a:cs typeface="Arial" panose="020B0604020202020204" pitchFamily="34" charset="0"/>
+            </a:endParaRPr>
+          </a:p>
+        </p:txBody>
+      </p:sp>
+      <p:cxnSp>
+        <p:nvCxnSpPr>
+          <p:cNvPr id="22" name="Straight Arrow Connector 21"/>
+          <p:cNvCxnSpPr/>
+          <p:nvPr/>
+        </p:nvCxnSpPr>
+        <p:spPr>
+          <a:xfrm flipH="1">
+            <a:off x="4251366" y="3586348"/>
+            <a:ext cx="641268" cy="11875"/>
+          </a:xfrm>
+          <a:prstGeom prst="straightConnector1">
+            <a:avLst/>
+          </a:prstGeom>
+          <a:ln>
+            <a:tailEnd type="triangle"/>
+          </a:ln>
+        </p:spPr>
+        <p:style>
+          <a:lnRef idx="1">
+            <a:schemeClr val="accent1"/>
+          </a:lnRef>
+          <a:fillRef idx="0">
+            <a:schemeClr val="accent1"/>
+          </a:fillRef>
+          <a:effectRef idx="0">
+            <a:schemeClr val="accent1"/>
+          </a:effectRef>
+          <a:fontRef idx="minor">
+            <a:schemeClr val="tx1"/>
+          </a:fontRef>
+        </p:style>
+      </p:cxnSp>
+      <p:sp>
+        <p:nvSpPr>
+          <p:cNvPr id="23" name="TextBox 22"/>
+          <p:cNvSpPr txBox="1"/>
+          <p:nvPr/>
+        </p:nvSpPr>
+        <p:spPr>
+          <a:xfrm>
+            <a:off x="4963889" y="3408220"/>
+            <a:ext cx="4172937" cy="369332"/>
+          </a:xfrm>
+          <a:prstGeom prst="rect">
+            <a:avLst/>
+          </a:prstGeom>
+          <a:noFill/>
+        </p:spPr>
+        <p:txBody>
+          <a:bodyPr wrap="none" rtlCol="0">
+            <a:spAutoFit/>
+          </a:bodyPr>
+          <a:lstStyle/>
+          <a:p>
+            <a:r>
+              <a:rPr lang="en-US" dirty="0" smtClean="0">
+                <a:latin typeface="Arial" panose="020B0604020202020204" pitchFamily="34" charset="0"/>
+                <a:cs typeface="Arial" panose="020B0604020202020204" pitchFamily="34" charset="0"/>
+              </a:rPr>
+              <a:t>This will write about 100 plots to a PDF</a:t>
+            </a:r>
+            <a:endParaRPr lang="en-US" dirty="0">
+              <a:latin typeface="Arial" panose="020B0604020202020204" pitchFamily="34" charset="0"/>
+              <a:cs typeface="Arial" panose="020B0604020202020204" pitchFamily="34" charset="0"/>
+            </a:endParaRPr>
+          </a:p>
+        </p:txBody>
+      </p:sp>
+    </p:spTree>
+    <p:extLst>
+      <p:ext uri="{BB962C8B-B14F-4D97-AF65-F5344CB8AC3E}">
+        <p14:creationId xmlns:p14="http://schemas.microsoft.com/office/powerpoint/2010/main" val="546579722"/>
+      </p:ext>
+    </p:extLst>
+  </p:cSld>
+  <p:clrMapOvr>
+    <a:masterClrMapping/>
+  </p:clrMapOvr>
+</p:sld>
+</file>
+
+<file path=ppt/slides/slide39.xml><?xml version="1.0" encoding="utf-8"?>
+<p:sld xmlns:a="http://schemas.openxmlformats.org/drawingml/2006/main" xmlns:r="http://schemas.openxmlformats.org/officeDocument/2006/relationships" xmlns:p="http://schemas.openxmlformats.org/presentationml/2006/main">
+  <p:cSld>
+    <p:spTree>
+      <p:nvGrpSpPr>
+        <p:cNvPr id="1" name=""/>
+        <p:cNvGrpSpPr/>
+        <p:nvPr/>
+      </p:nvGrpSpPr>
+      <p:grpSpPr>
+        <a:xfrm>
+          <a:off x="0" y="0"/>
+          <a:ext cx="0" cy="0"/>
+          <a:chOff x="0" y="0"/>
+          <a:chExt cx="0" cy="0"/>
+        </a:xfrm>
+      </p:grpSpPr>
+      <p:sp>
+        <p:nvSpPr>
+          <p:cNvPr id="4" name="Rectangle 3"/>
+          <p:cNvSpPr/>
+          <p:nvPr/>
+        </p:nvSpPr>
+        <p:spPr>
+          <a:xfrm>
+            <a:off x="197921" y="1883091"/>
+            <a:ext cx="10644249" cy="2031325"/>
+          </a:xfrm>
+          <a:prstGeom prst="rect">
+            <a:avLst/>
+          </a:prstGeom>
+        </p:spPr>
+        <p:txBody>
+          <a:bodyPr wrap="square">
+            <a:spAutoFit/>
+          </a:bodyPr>
+          <a:lstStyle/>
+          <a:p>
+            <a:r>
+              <a:rPr lang="en-US" dirty="0" err="1">
+                <a:latin typeface="Courier New" panose="02070309020205020404" pitchFamily="49" charset="0"/>
+              </a:rPr>
+              <a:t>myFrame</a:t>
+            </a:r>
+            <a:r>
+              <a:rPr lang="en-US" dirty="0">
+                <a:latin typeface="Courier New" panose="02070309020205020404" pitchFamily="49" charset="0"/>
+              </a:rPr>
+              <a:t> &lt;- </a:t>
+            </a:r>
+            <a:r>
+              <a:rPr lang="en-US" dirty="0" err="1">
+                <a:latin typeface="Courier New" panose="02070309020205020404" pitchFamily="49" charset="0"/>
+              </a:rPr>
+              <a:t>data.frame</a:t>
+            </a:r>
+            <a:r>
+              <a:rPr lang="en-US" dirty="0">
+                <a:latin typeface="Courier New" panose="02070309020205020404" pitchFamily="49" charset="0"/>
+              </a:rPr>
+              <a:t>(</a:t>
+            </a:r>
+            <a:r>
+              <a:rPr lang="en-US" dirty="0" err="1">
+                <a:latin typeface="Courier New" panose="02070309020205020404" pitchFamily="49" charset="0"/>
+              </a:rPr>
+              <a:t>names,meanTD</a:t>
+            </a:r>
+            <a:r>
+              <a:rPr lang="en-US" dirty="0">
+                <a:latin typeface="Courier New" panose="02070309020205020404" pitchFamily="49" charset="0"/>
+              </a:rPr>
+              <a:t> ,</a:t>
+            </a:r>
+            <a:r>
+              <a:rPr lang="en-US" dirty="0" err="1">
+                <a:latin typeface="Courier New" panose="02070309020205020404" pitchFamily="49" charset="0"/>
+              </a:rPr>
+              <a:t>meanBM</a:t>
+            </a:r>
+            <a:r>
+              <a:rPr lang="en-US" dirty="0">
+                <a:latin typeface="Courier New" panose="02070309020205020404" pitchFamily="49" charset="0"/>
+              </a:rPr>
+              <a:t> ,</a:t>
+            </a:r>
+            <a:r>
+              <a:rPr lang="en-US" dirty="0" err="1">
+                <a:latin typeface="Courier New" panose="02070309020205020404" pitchFamily="49" charset="0"/>
+              </a:rPr>
+              <a:t>pValuesWilcoxon</a:t>
+            </a:r>
+            <a:r>
+              <a:rPr lang="en-US" dirty="0">
+                <a:latin typeface="Courier New" panose="02070309020205020404" pitchFamily="49" charset="0"/>
+              </a:rPr>
+              <a:t>, </a:t>
+            </a:r>
+            <a:r>
+              <a:rPr lang="en-US" dirty="0" err="1">
+                <a:latin typeface="Courier New" panose="02070309020205020404" pitchFamily="49" charset="0"/>
+              </a:rPr>
+              <a:t>pValues</a:t>
+            </a:r>
+            <a:r>
+              <a:rPr lang="en-US" dirty="0">
+                <a:latin typeface="Courier New" panose="02070309020205020404" pitchFamily="49" charset="0"/>
+              </a:rPr>
+              <a:t>)</a:t>
+            </a:r>
+          </a:p>
+          <a:p>
+            <a:r>
+              <a:rPr lang="en-US" dirty="0" err="1">
+                <a:latin typeface="Courier New" panose="02070309020205020404" pitchFamily="49" charset="0"/>
+              </a:rPr>
+              <a:t>myFrame</a:t>
+            </a:r>
+            <a:r>
+              <a:rPr lang="en-US" dirty="0">
+                <a:latin typeface="Courier New" panose="02070309020205020404" pitchFamily="49" charset="0"/>
+              </a:rPr>
+              <a:t> &lt;- </a:t>
+            </a:r>
+            <a:r>
+              <a:rPr lang="en-US" dirty="0" err="1">
+                <a:latin typeface="Courier New" panose="02070309020205020404" pitchFamily="49" charset="0"/>
+              </a:rPr>
+              <a:t>myFrame</a:t>
+            </a:r>
+            <a:r>
+              <a:rPr lang="en-US" dirty="0">
+                <a:latin typeface="Courier New" panose="02070309020205020404" pitchFamily="49" charset="0"/>
+              </a:rPr>
+              <a:t> [order(</a:t>
+            </a:r>
+            <a:r>
+              <a:rPr lang="en-US" dirty="0" err="1">
+                <a:latin typeface="Courier New" panose="02070309020205020404" pitchFamily="49" charset="0"/>
+              </a:rPr>
+              <a:t>myFrame$pValues</a:t>
+            </a:r>
+            <a:r>
+              <a:rPr lang="en-US" dirty="0">
+                <a:latin typeface="Courier New" panose="02070309020205020404" pitchFamily="49" charset="0"/>
+              </a:rPr>
+              <a:t>),]</a:t>
+            </a:r>
+          </a:p>
+          <a:p>
+            <a:r>
+              <a:rPr lang="en-US" dirty="0" err="1">
+                <a:latin typeface="Courier New" panose="02070309020205020404" pitchFamily="49" charset="0"/>
+              </a:rPr>
+              <a:t>myFrame$adjustedP</a:t>
+            </a:r>
+            <a:r>
+              <a:rPr lang="en-US" dirty="0">
+                <a:latin typeface="Courier New" panose="02070309020205020404" pitchFamily="49" charset="0"/>
+              </a:rPr>
+              <a:t> &lt;- </a:t>
+            </a:r>
+            <a:r>
+              <a:rPr lang="en-US" dirty="0" err="1">
+                <a:latin typeface="Courier New" panose="02070309020205020404" pitchFamily="49" charset="0"/>
+              </a:rPr>
+              <a:t>p.adjust</a:t>
+            </a:r>
+            <a:r>
+              <a:rPr lang="en-US" dirty="0">
+                <a:latin typeface="Courier New" panose="02070309020205020404" pitchFamily="49" charset="0"/>
+              </a:rPr>
+              <a:t>( </a:t>
+            </a:r>
+            <a:r>
+              <a:rPr lang="en-US" dirty="0" err="1">
+                <a:latin typeface="Courier New" panose="02070309020205020404" pitchFamily="49" charset="0"/>
+              </a:rPr>
+              <a:t>myFrame$pValues</a:t>
+            </a:r>
+            <a:r>
+              <a:rPr lang="en-US" dirty="0">
+                <a:latin typeface="Courier New" panose="02070309020205020404" pitchFamily="49" charset="0"/>
+              </a:rPr>
+              <a:t>, method = "BH" )</a:t>
+            </a:r>
+          </a:p>
+          <a:p>
+            <a:endParaRPr lang="en-US" dirty="0">
+              <a:latin typeface="Courier New" panose="02070309020205020404" pitchFamily="49" charset="0"/>
+            </a:endParaRPr>
+          </a:p>
+          <a:p>
+            <a:r>
+              <a:rPr lang="en-US" dirty="0" err="1">
+                <a:latin typeface="Courier New" panose="02070309020205020404" pitchFamily="49" charset="0"/>
+              </a:rPr>
+              <a:t>write.table</a:t>
+            </a:r>
+            <a:r>
+              <a:rPr lang="en-US" dirty="0">
+                <a:latin typeface="Courier New" panose="02070309020205020404" pitchFamily="49" charset="0"/>
+              </a:rPr>
+              <a:t>(</a:t>
+            </a:r>
+            <a:r>
+              <a:rPr lang="en-US" dirty="0" err="1">
+                <a:latin typeface="Courier New" panose="02070309020205020404" pitchFamily="49" charset="0"/>
+              </a:rPr>
+              <a:t>myFrame</a:t>
+            </a:r>
+            <a:r>
+              <a:rPr lang="en-US" dirty="0">
+                <a:latin typeface="Courier New" panose="02070309020205020404" pitchFamily="49" charset="0"/>
+              </a:rPr>
+              <a:t>, file="pValuesFromTTest.txt", </a:t>
+            </a:r>
+            <a:r>
+              <a:rPr lang="en-US" dirty="0" err="1">
+                <a:solidFill>
+                  <a:srgbClr val="000000"/>
+                </a:solidFill>
+                <a:latin typeface="Courier New" panose="02070309020205020404" pitchFamily="49" charset="0"/>
+              </a:rPr>
+              <a:t>sep</a:t>
+            </a:r>
+            <a:r>
+              <a:rPr lang="en-US" dirty="0">
+                <a:solidFill>
+                  <a:srgbClr val="000000"/>
+                </a:solidFill>
+                <a:latin typeface="Courier New" panose="02070309020205020404" pitchFamily="49" charset="0"/>
+              </a:rPr>
+              <a:t>="\t",</a:t>
+            </a:r>
+            <a:r>
+              <a:rPr lang="en-US" dirty="0" err="1">
+                <a:solidFill>
+                  <a:srgbClr val="000000"/>
+                </a:solidFill>
+                <a:latin typeface="Courier New" panose="02070309020205020404" pitchFamily="49" charset="0"/>
+              </a:rPr>
+              <a:t>row.names</a:t>
+            </a:r>
+            <a:r>
+              <a:rPr lang="en-US" dirty="0">
+                <a:solidFill>
+                  <a:srgbClr val="000000"/>
+                </a:solidFill>
+                <a:latin typeface="Courier New" panose="02070309020205020404" pitchFamily="49" charset="0"/>
+              </a:rPr>
+              <a:t>=FALSE)</a:t>
+            </a:r>
+          </a:p>
+          <a:p>
+            <a:endParaRPr lang="en-US" dirty="0" smtClean="0">
+              <a:latin typeface="Courier New" panose="02070309020205020404" pitchFamily="49" charset="0"/>
+            </a:endParaRPr>
+          </a:p>
+          <a:p>
+            <a:r>
+              <a:rPr lang="en-US" dirty="0" err="1" smtClean="0">
+                <a:latin typeface="Courier New" panose="02070309020205020404" pitchFamily="49" charset="0"/>
+              </a:rPr>
+              <a:t>dev.off</a:t>
+            </a:r>
+            <a:r>
+              <a:rPr lang="en-US" dirty="0">
+                <a:latin typeface="Courier New" panose="02070309020205020404" pitchFamily="49" charset="0"/>
+              </a:rPr>
+              <a:t>()</a:t>
+            </a:r>
+          </a:p>
+        </p:txBody>
+      </p:sp>
+      <p:sp>
+        <p:nvSpPr>
+          <p:cNvPr id="5" name="TextBox 4"/>
+          <p:cNvSpPr txBox="1"/>
+          <p:nvPr/>
+        </p:nvSpPr>
+        <p:spPr>
+          <a:xfrm>
+            <a:off x="1080655" y="522514"/>
+            <a:ext cx="7250703" cy="369332"/>
+          </a:xfrm>
+          <a:prstGeom prst="rect">
+            <a:avLst/>
+          </a:prstGeom>
+          <a:noFill/>
+        </p:spPr>
+        <p:txBody>
+          <a:bodyPr wrap="none" rtlCol="0">
+            <a:spAutoFit/>
+          </a:bodyPr>
+          <a:lstStyle/>
+          <a:p>
+            <a:r>
+              <a:rPr lang="en-US" dirty="0" smtClean="0">
+                <a:latin typeface="Arial" panose="020B0604020202020204" pitchFamily="34" charset="0"/>
+                <a:cs typeface="Arial" panose="020B0604020202020204" pitchFamily="34" charset="0"/>
+              </a:rPr>
+              <a:t>Finally write our results to a spreadsheet (including FDR adjustment )</a:t>
+            </a:r>
+            <a:endParaRPr lang="en-US" dirty="0">
+              <a:latin typeface="Arial" panose="020B0604020202020204" pitchFamily="34" charset="0"/>
+              <a:cs typeface="Arial" panose="020B0604020202020204" pitchFamily="34" charset="0"/>
+            </a:endParaRPr>
+          </a:p>
+        </p:txBody>
+      </p:sp>
+      <p:cxnSp>
+        <p:nvCxnSpPr>
+          <p:cNvPr id="7" name="Straight Arrow Connector 6"/>
+          <p:cNvCxnSpPr/>
+          <p:nvPr/>
+        </p:nvCxnSpPr>
+        <p:spPr>
+          <a:xfrm flipH="1">
+            <a:off x="9167751" y="2327564"/>
+            <a:ext cx="748145" cy="11875"/>
+          </a:xfrm>
+          <a:prstGeom prst="straightConnector1">
+            <a:avLst/>
+          </a:prstGeom>
+          <a:ln>
+            <a:tailEnd type="triangle"/>
+          </a:ln>
+        </p:spPr>
+        <p:style>
+          <a:lnRef idx="1">
+            <a:schemeClr val="accent1"/>
+          </a:lnRef>
+          <a:fillRef idx="0">
+            <a:schemeClr val="accent1"/>
+          </a:fillRef>
+          <a:effectRef idx="0">
+            <a:schemeClr val="accent1"/>
+          </a:effectRef>
+          <a:fontRef idx="minor">
+            <a:schemeClr val="tx1"/>
+          </a:fontRef>
+        </p:style>
+      </p:cxnSp>
+      <p:sp>
+        <p:nvSpPr>
+          <p:cNvPr id="8" name="TextBox 7"/>
+          <p:cNvSpPr txBox="1"/>
+          <p:nvPr/>
+        </p:nvSpPr>
+        <p:spPr>
+          <a:xfrm>
+            <a:off x="9892146" y="2137559"/>
+            <a:ext cx="1569660" cy="369332"/>
+          </a:xfrm>
+          <a:prstGeom prst="rect">
+            <a:avLst/>
+          </a:prstGeom>
+          <a:noFill/>
+        </p:spPr>
+        <p:txBody>
+          <a:bodyPr wrap="none" rtlCol="0">
+            <a:spAutoFit/>
+          </a:bodyPr>
+          <a:lstStyle/>
+          <a:p>
+            <a:r>
+              <a:rPr lang="en-US" dirty="0" smtClean="0">
+                <a:latin typeface="Arial" panose="020B0604020202020204" pitchFamily="34" charset="0"/>
+                <a:cs typeface="Arial" panose="020B0604020202020204" pitchFamily="34" charset="0"/>
+              </a:rPr>
+              <a:t>Best hits first!</a:t>
+            </a:r>
+            <a:endParaRPr lang="en-US" dirty="0">
+              <a:latin typeface="Arial" panose="020B0604020202020204" pitchFamily="34" charset="0"/>
+              <a:cs typeface="Arial" panose="020B0604020202020204" pitchFamily="34" charset="0"/>
+            </a:endParaRPr>
+          </a:p>
+        </p:txBody>
+      </p:sp>
+      <p:cxnSp>
+        <p:nvCxnSpPr>
+          <p:cNvPr id="10" name="Straight Arrow Connector 9"/>
+          <p:cNvCxnSpPr/>
+          <p:nvPr/>
+        </p:nvCxnSpPr>
+        <p:spPr>
+          <a:xfrm flipH="1" flipV="1">
+            <a:off x="8882743" y="2600696"/>
+            <a:ext cx="546265" cy="83127"/>
+          </a:xfrm>
+          <a:prstGeom prst="straightConnector1">
+            <a:avLst/>
+          </a:prstGeom>
+          <a:ln>
+            <a:tailEnd type="triangle"/>
+          </a:ln>
+        </p:spPr>
+        <p:style>
+          <a:lnRef idx="1">
+            <a:schemeClr val="accent1"/>
+          </a:lnRef>
+          <a:fillRef idx="0">
+            <a:schemeClr val="accent1"/>
+          </a:fillRef>
+          <a:effectRef idx="0">
+            <a:schemeClr val="accent1"/>
+          </a:effectRef>
+          <a:fontRef idx="minor">
+            <a:schemeClr val="tx1"/>
+          </a:fontRef>
+        </p:style>
+      </p:cxnSp>
+      <p:sp>
+        <p:nvSpPr>
+          <p:cNvPr id="11" name="TextBox 10"/>
+          <p:cNvSpPr txBox="1"/>
+          <p:nvPr/>
+        </p:nvSpPr>
+        <p:spPr>
+          <a:xfrm>
+            <a:off x="9488386" y="2529445"/>
+            <a:ext cx="2056973" cy="369332"/>
+          </a:xfrm>
+          <a:prstGeom prst="rect">
+            <a:avLst/>
+          </a:prstGeom>
+          <a:noFill/>
+        </p:spPr>
+        <p:txBody>
+          <a:bodyPr wrap="none" rtlCol="0">
+            <a:spAutoFit/>
+          </a:bodyPr>
+          <a:lstStyle/>
+          <a:p>
+            <a:r>
+              <a:rPr lang="en-US" dirty="0" smtClean="0">
+                <a:latin typeface="Arial" panose="020B0604020202020204" pitchFamily="34" charset="0"/>
+                <a:cs typeface="Arial" panose="020B0604020202020204" pitchFamily="34" charset="0"/>
+              </a:rPr>
+              <a:t>Add BH correction</a:t>
+            </a:r>
+            <a:endParaRPr lang="en-US" dirty="0">
+              <a:latin typeface="Arial" panose="020B0604020202020204" pitchFamily="34" charset="0"/>
+              <a:cs typeface="Arial" panose="020B0604020202020204" pitchFamily="34" charset="0"/>
+            </a:endParaRPr>
+          </a:p>
+        </p:txBody>
+      </p:sp>
+      <p:sp>
+        <p:nvSpPr>
+          <p:cNvPr id="12" name="TextBox 11"/>
+          <p:cNvSpPr txBox="1"/>
+          <p:nvPr/>
+        </p:nvSpPr>
+        <p:spPr>
+          <a:xfrm>
+            <a:off x="6745184" y="3515097"/>
+            <a:ext cx="1415772" cy="369332"/>
+          </a:xfrm>
+          <a:prstGeom prst="rect">
+            <a:avLst/>
+          </a:prstGeom>
+          <a:noFill/>
+        </p:spPr>
+        <p:txBody>
+          <a:bodyPr wrap="none" rtlCol="0">
+            <a:spAutoFit/>
+          </a:bodyPr>
+          <a:lstStyle/>
+          <a:p>
+            <a:r>
+              <a:rPr lang="en-US" dirty="0" smtClean="0">
+                <a:latin typeface="Arial" panose="020B0604020202020204" pitchFamily="34" charset="0"/>
+                <a:cs typeface="Arial" panose="020B0604020202020204" pitchFamily="34" charset="0"/>
+              </a:rPr>
+              <a:t>Dump to file</a:t>
+            </a:r>
+            <a:endParaRPr lang="en-US" dirty="0">
+              <a:latin typeface="Arial" panose="020B0604020202020204" pitchFamily="34" charset="0"/>
+              <a:cs typeface="Arial" panose="020B0604020202020204" pitchFamily="34" charset="0"/>
+            </a:endParaRPr>
+          </a:p>
+        </p:txBody>
+      </p:sp>
+      <p:cxnSp>
+        <p:nvCxnSpPr>
+          <p:cNvPr id="14" name="Straight Arrow Connector 13"/>
+          <p:cNvCxnSpPr/>
+          <p:nvPr/>
+        </p:nvCxnSpPr>
+        <p:spPr>
+          <a:xfrm flipH="1" flipV="1">
+            <a:off x="4868883" y="3313216"/>
+            <a:ext cx="1935678" cy="201880"/>
+          </a:xfrm>
+          <a:prstGeom prst="straightConnector1">
+            <a:avLst/>
+          </a:prstGeom>
+          <a:ln>
+            <a:tailEnd type="triangle"/>
+          </a:ln>
+        </p:spPr>
+        <p:style>
+          <a:lnRef idx="1">
+            <a:schemeClr val="accent1"/>
+          </a:lnRef>
+          <a:fillRef idx="0">
+            <a:schemeClr val="accent1"/>
+          </a:fillRef>
+          <a:effectRef idx="0">
+            <a:schemeClr val="accent1"/>
+          </a:effectRef>
+          <a:fontRef idx="minor">
+            <a:schemeClr val="tx1"/>
+          </a:fontRef>
+        </p:style>
+      </p:cxnSp>
+      <p:cxnSp>
+        <p:nvCxnSpPr>
+          <p:cNvPr id="16" name="Straight Arrow Connector 15"/>
+          <p:cNvCxnSpPr/>
+          <p:nvPr/>
+        </p:nvCxnSpPr>
+        <p:spPr>
+          <a:xfrm flipH="1" flipV="1">
+            <a:off x="1413164" y="3914416"/>
+            <a:ext cx="320633" cy="562581"/>
+          </a:xfrm>
+          <a:prstGeom prst="straightConnector1">
+            <a:avLst/>
+          </a:prstGeom>
+          <a:ln>
+            <a:tailEnd type="triangle"/>
+          </a:ln>
+        </p:spPr>
+        <p:style>
+          <a:lnRef idx="1">
+            <a:schemeClr val="accent1"/>
+          </a:lnRef>
+          <a:fillRef idx="0">
+            <a:schemeClr val="accent1"/>
+          </a:fillRef>
+          <a:effectRef idx="0">
+            <a:schemeClr val="accent1"/>
+          </a:effectRef>
+          <a:fontRef idx="minor">
+            <a:schemeClr val="tx1"/>
+          </a:fontRef>
+        </p:style>
+      </p:cxnSp>
+      <p:sp>
+        <p:nvSpPr>
+          <p:cNvPr id="17" name="TextBox 16"/>
+          <p:cNvSpPr txBox="1"/>
+          <p:nvPr/>
+        </p:nvSpPr>
+        <p:spPr>
+          <a:xfrm>
+            <a:off x="1816927" y="4488873"/>
+            <a:ext cx="8058616" cy="646331"/>
+          </a:xfrm>
+          <a:prstGeom prst="rect">
+            <a:avLst/>
+          </a:prstGeom>
+          <a:noFill/>
+        </p:spPr>
+        <p:txBody>
+          <a:bodyPr wrap="none" rtlCol="0">
+            <a:spAutoFit/>
+          </a:bodyPr>
+          <a:lstStyle/>
+          <a:p>
+            <a:r>
+              <a:rPr lang="en-US" dirty="0" smtClean="0">
+                <a:latin typeface="Arial" panose="020B0604020202020204" pitchFamily="34" charset="0"/>
+                <a:cs typeface="Arial" panose="020B0604020202020204" pitchFamily="34" charset="0"/>
+              </a:rPr>
+              <a:t>This is important; you won’t be able to open the PDF without closing it from R</a:t>
+            </a:r>
+          </a:p>
+          <a:p>
+            <a:r>
+              <a:rPr lang="en-US" dirty="0" smtClean="0">
+                <a:latin typeface="Arial" panose="020B0604020202020204" pitchFamily="34" charset="0"/>
+                <a:cs typeface="Arial" panose="020B0604020202020204" pitchFamily="34" charset="0"/>
+              </a:rPr>
+              <a:t>(which is what this line does)</a:t>
+            </a:r>
+            <a:endParaRPr lang="en-US" dirty="0">
+              <a:latin typeface="Arial" panose="020B0604020202020204" pitchFamily="34" charset="0"/>
+              <a:cs typeface="Arial" panose="020B0604020202020204" pitchFamily="34" charset="0"/>
+            </a:endParaRPr>
+          </a:p>
+        </p:txBody>
+      </p:sp>
+      <p:sp>
+        <p:nvSpPr>
+          <p:cNvPr id="18" name="Rectangle 17"/>
+          <p:cNvSpPr/>
+          <p:nvPr/>
+        </p:nvSpPr>
+        <p:spPr>
+          <a:xfrm>
+            <a:off x="292924" y="6294796"/>
+            <a:ext cx="11772406" cy="369332"/>
+          </a:xfrm>
+          <a:prstGeom prst="rect">
+            <a:avLst/>
+          </a:prstGeom>
+        </p:spPr>
+        <p:txBody>
+          <a:bodyPr wrap="square">
+            <a:spAutoFit/>
+          </a:bodyPr>
+          <a:lstStyle/>
+          <a:p>
+            <a:r>
+              <a:rPr lang="en-US" dirty="0"/>
+              <a:t>https://github.com/afodor/metagenomicsTools/blob/master/src/chapelHillWorkshop/quick_TTest</a:t>
+            </a:r>
+          </a:p>
+        </p:txBody>
+      </p:sp>
+    </p:spTree>
+    <p:extLst>
+      <p:ext uri="{BB962C8B-B14F-4D97-AF65-F5344CB8AC3E}">
+        <p14:creationId xmlns:p14="http://schemas.microsoft.com/office/powerpoint/2010/main" val="2260837048"/>
+      </p:ext>
+    </p:extLst>
+  </p:cSld>
+  <p:clrMapOvr>
+    <a:masterClrMapping/>
+  </p:clrMapOvr>
+</p:sld>
+</file>
+
 <file path=ppt/slides/slide4.xml><?xml version="1.0" encoding="utf-8"?>
 <p:sld xmlns:a="http://schemas.openxmlformats.org/drawingml/2006/main" xmlns:r="http://schemas.openxmlformats.org/officeDocument/2006/relationships" xmlns:p="http://schemas.openxmlformats.org/presentationml/2006/main">
   <p:cSld>
@@ -9399,6 +11976,936 @@
     <p:extLst>
       <p:ext uri="{BB962C8B-B14F-4D97-AF65-F5344CB8AC3E}">
         <p14:creationId xmlns:p14="http://schemas.microsoft.com/office/powerpoint/2010/main" val="3772308476"/>
+      </p:ext>
+    </p:extLst>
+  </p:cSld>
+  <p:clrMapOvr>
+    <a:masterClrMapping/>
+  </p:clrMapOvr>
+</p:sld>
+</file>
+
+<file path=ppt/slides/slide40.xml><?xml version="1.0" encoding="utf-8"?>
+<p:sld xmlns:a="http://schemas.openxmlformats.org/drawingml/2006/main" xmlns:r="http://schemas.openxmlformats.org/officeDocument/2006/relationships" xmlns:p="http://schemas.openxmlformats.org/presentationml/2006/main">
+  <p:cSld>
+    <p:spTree>
+      <p:nvGrpSpPr>
+        <p:cNvPr id="1" name=""/>
+        <p:cNvGrpSpPr/>
+        <p:nvPr/>
+      </p:nvGrpSpPr>
+      <p:grpSpPr>
+        <a:xfrm>
+          <a:off x="0" y="0"/>
+          <a:ext cx="0" cy="0"/>
+          <a:chOff x="0" y="0"/>
+          <a:chExt cx="0" cy="0"/>
+        </a:xfrm>
+      </p:grpSpPr>
+      <p:sp>
+        <p:nvSpPr>
+          <p:cNvPr id="4" name="TextBox 3"/>
+          <p:cNvSpPr txBox="1"/>
+          <p:nvPr/>
+        </p:nvSpPr>
+        <p:spPr>
+          <a:xfrm>
+            <a:off x="629392" y="106878"/>
+            <a:ext cx="5284460" cy="369332"/>
+          </a:xfrm>
+          <a:prstGeom prst="rect">
+            <a:avLst/>
+          </a:prstGeom>
+          <a:noFill/>
+        </p:spPr>
+        <p:txBody>
+          <a:bodyPr wrap="none" rtlCol="0">
+            <a:spAutoFit/>
+          </a:bodyPr>
+          <a:lstStyle/>
+          <a:p>
+            <a:r>
+              <a:rPr lang="en-US" dirty="0" smtClean="0">
+                <a:latin typeface="Arial" panose="020B0604020202020204" pitchFamily="34" charset="0"/>
+                <a:cs typeface="Arial" panose="020B0604020202020204" pitchFamily="34" charset="0"/>
+              </a:rPr>
+              <a:t>We end up with a nice, ordered list of all our hits…</a:t>
+            </a:r>
+            <a:endParaRPr lang="en-US" dirty="0">
+              <a:latin typeface="Arial" panose="020B0604020202020204" pitchFamily="34" charset="0"/>
+              <a:cs typeface="Arial" panose="020B0604020202020204" pitchFamily="34" charset="0"/>
+            </a:endParaRPr>
+          </a:p>
+        </p:txBody>
+      </p:sp>
+      <p:pic>
+        <p:nvPicPr>
+          <p:cNvPr id="5" name="Picture 4"/>
+          <p:cNvPicPr>
+            <a:picLocks noChangeAspect="1"/>
+          </p:cNvPicPr>
+          <p:nvPr/>
+        </p:nvPicPr>
+        <p:blipFill>
+          <a:blip r:embed="rId2"/>
+          <a:stretch>
+            <a:fillRect/>
+          </a:stretch>
+        </p:blipFill>
+        <p:spPr>
+          <a:xfrm>
+            <a:off x="157346" y="1155988"/>
+            <a:ext cx="10914413" cy="4092905"/>
+          </a:xfrm>
+          <a:prstGeom prst="rect">
+            <a:avLst/>
+          </a:prstGeom>
+        </p:spPr>
+      </p:pic>
+      <p:cxnSp>
+        <p:nvCxnSpPr>
+          <p:cNvPr id="9" name="Straight Arrow Connector 8"/>
+          <p:cNvCxnSpPr/>
+          <p:nvPr/>
+        </p:nvCxnSpPr>
+        <p:spPr>
+          <a:xfrm flipH="1" flipV="1">
+            <a:off x="10331532" y="5355771"/>
+            <a:ext cx="534390" cy="415637"/>
+          </a:xfrm>
+          <a:prstGeom prst="straightConnector1">
+            <a:avLst/>
+          </a:prstGeom>
+          <a:ln>
+            <a:tailEnd type="triangle"/>
+          </a:ln>
+        </p:spPr>
+        <p:style>
+          <a:lnRef idx="1">
+            <a:schemeClr val="accent1"/>
+          </a:lnRef>
+          <a:fillRef idx="0">
+            <a:schemeClr val="accent1"/>
+          </a:fillRef>
+          <a:effectRef idx="0">
+            <a:schemeClr val="accent1"/>
+          </a:effectRef>
+          <a:fontRef idx="minor">
+            <a:schemeClr val="tx1"/>
+          </a:fontRef>
+        </p:style>
+      </p:cxnSp>
+      <p:sp>
+        <p:nvSpPr>
+          <p:cNvPr id="10" name="TextBox 9"/>
+          <p:cNvSpPr txBox="1"/>
+          <p:nvPr/>
+        </p:nvSpPr>
+        <p:spPr>
+          <a:xfrm>
+            <a:off x="190005" y="5640780"/>
+            <a:ext cx="11632352" cy="646331"/>
+          </a:xfrm>
+          <a:prstGeom prst="rect">
+            <a:avLst/>
+          </a:prstGeom>
+          <a:noFill/>
+        </p:spPr>
+        <p:txBody>
+          <a:bodyPr wrap="none" rtlCol="0">
+            <a:spAutoFit/>
+          </a:bodyPr>
+          <a:lstStyle/>
+          <a:p>
+            <a:r>
+              <a:rPr lang="en-US" dirty="0" smtClean="0">
+                <a:latin typeface="Arial" panose="020B0604020202020204" pitchFamily="34" charset="0"/>
+                <a:cs typeface="Arial" panose="020B0604020202020204" pitchFamily="34" charset="0"/>
+              </a:rPr>
+              <a:t>Even after correction, these hits are highly significant!</a:t>
+            </a:r>
+          </a:p>
+          <a:p>
+            <a:r>
+              <a:rPr lang="en-US" dirty="0" smtClean="0">
+                <a:latin typeface="Arial" panose="020B0604020202020204" pitchFamily="34" charset="0"/>
+                <a:cs typeface="Arial" panose="020B0604020202020204" pitchFamily="34" charset="0"/>
+              </a:rPr>
+              <a:t>(This is because comparing two tissues reliably produces some of the biggest difference in microbiome research)</a:t>
+            </a:r>
+            <a:endParaRPr lang="en-US" dirty="0">
+              <a:latin typeface="Arial" panose="020B0604020202020204" pitchFamily="34" charset="0"/>
+              <a:cs typeface="Arial" panose="020B0604020202020204" pitchFamily="34" charset="0"/>
+            </a:endParaRPr>
+          </a:p>
+        </p:txBody>
+      </p:sp>
+    </p:spTree>
+    <p:extLst>
+      <p:ext uri="{BB962C8B-B14F-4D97-AF65-F5344CB8AC3E}">
+        <p14:creationId xmlns:p14="http://schemas.microsoft.com/office/powerpoint/2010/main" val="282276688"/>
+      </p:ext>
+    </p:extLst>
+  </p:cSld>
+  <p:clrMapOvr>
+    <a:masterClrMapping/>
+  </p:clrMapOvr>
+</p:sld>
+</file>
+
+<file path=ppt/slides/slide41.xml><?xml version="1.0" encoding="utf-8"?>
+<p:sld xmlns:a="http://schemas.openxmlformats.org/drawingml/2006/main" xmlns:r="http://schemas.openxmlformats.org/officeDocument/2006/relationships" xmlns:p="http://schemas.openxmlformats.org/presentationml/2006/main">
+  <p:cSld>
+    <p:spTree>
+      <p:nvGrpSpPr>
+        <p:cNvPr id="1" name=""/>
+        <p:cNvGrpSpPr/>
+        <p:nvPr/>
+      </p:nvGrpSpPr>
+      <p:grpSpPr>
+        <a:xfrm>
+          <a:off x="0" y="0"/>
+          <a:ext cx="0" cy="0"/>
+          <a:chOff x="0" y="0"/>
+          <a:chExt cx="0" cy="0"/>
+        </a:xfrm>
+      </p:grpSpPr>
+      <p:sp>
+        <p:nvSpPr>
+          <p:cNvPr id="4" name="TextBox 3"/>
+          <p:cNvSpPr txBox="1"/>
+          <p:nvPr/>
+        </p:nvSpPr>
+        <p:spPr>
+          <a:xfrm>
+            <a:off x="1187532" y="-47502"/>
+            <a:ext cx="6481261" cy="1477328"/>
+          </a:xfrm>
+          <a:prstGeom prst="rect">
+            <a:avLst/>
+          </a:prstGeom>
+          <a:noFill/>
+        </p:spPr>
+        <p:txBody>
+          <a:bodyPr wrap="none" rtlCol="0">
+            <a:spAutoFit/>
+          </a:bodyPr>
+          <a:lstStyle/>
+          <a:p>
+            <a:r>
+              <a:rPr lang="en-US" dirty="0" smtClean="0">
+                <a:latin typeface="Arial" panose="020B0604020202020204" pitchFamily="34" charset="0"/>
+                <a:cs typeface="Arial" panose="020B0604020202020204" pitchFamily="34" charset="0"/>
+              </a:rPr>
+              <a:t>How many genes are significant at a 5% false discovery rate?</a:t>
+            </a:r>
+          </a:p>
+          <a:p>
+            <a:endParaRPr lang="en-US" dirty="0">
+              <a:latin typeface="Arial" panose="020B0604020202020204" pitchFamily="34" charset="0"/>
+              <a:cs typeface="Arial" panose="020B0604020202020204" pitchFamily="34" charset="0"/>
+            </a:endParaRPr>
+          </a:p>
+          <a:p>
+            <a:r>
+              <a:rPr lang="en-US" dirty="0" smtClean="0">
+                <a:latin typeface="Arial" panose="020B0604020202020204" pitchFamily="34" charset="0"/>
+                <a:cs typeface="Arial" panose="020B0604020202020204" pitchFamily="34" charset="0"/>
+              </a:rPr>
+              <a:t>We can have R tell us really quickly…</a:t>
+            </a:r>
+          </a:p>
+          <a:p>
+            <a:endParaRPr lang="en-US" dirty="0">
+              <a:latin typeface="Arial" panose="020B0604020202020204" pitchFamily="34" charset="0"/>
+              <a:cs typeface="Arial" panose="020B0604020202020204" pitchFamily="34" charset="0"/>
+            </a:endParaRPr>
+          </a:p>
+          <a:p>
+            <a:endParaRPr lang="en-US" dirty="0">
+              <a:latin typeface="Arial" panose="020B0604020202020204" pitchFamily="34" charset="0"/>
+              <a:cs typeface="Arial" panose="020B0604020202020204" pitchFamily="34" charset="0"/>
+            </a:endParaRPr>
+          </a:p>
+        </p:txBody>
+      </p:sp>
+      <p:pic>
+        <p:nvPicPr>
+          <p:cNvPr id="5" name="Picture 4"/>
+          <p:cNvPicPr>
+            <a:picLocks noChangeAspect="1"/>
+          </p:cNvPicPr>
+          <p:nvPr/>
+        </p:nvPicPr>
+        <p:blipFill>
+          <a:blip r:embed="rId2"/>
+          <a:stretch>
+            <a:fillRect/>
+          </a:stretch>
+        </p:blipFill>
+        <p:spPr>
+          <a:xfrm>
+            <a:off x="681841" y="920770"/>
+            <a:ext cx="8945936" cy="2665577"/>
+          </a:xfrm>
+          <a:prstGeom prst="rect">
+            <a:avLst/>
+          </a:prstGeom>
+        </p:spPr>
+      </p:pic>
+      <p:cxnSp>
+        <p:nvCxnSpPr>
+          <p:cNvPr id="7" name="Straight Arrow Connector 6"/>
+          <p:cNvCxnSpPr/>
+          <p:nvPr/>
+        </p:nvCxnSpPr>
+        <p:spPr>
+          <a:xfrm flipH="1" flipV="1">
+            <a:off x="5759532" y="3040083"/>
+            <a:ext cx="617517" cy="546264"/>
+          </a:xfrm>
+          <a:prstGeom prst="straightConnector1">
+            <a:avLst/>
+          </a:prstGeom>
+          <a:ln>
+            <a:tailEnd type="triangle"/>
+          </a:ln>
+        </p:spPr>
+        <p:style>
+          <a:lnRef idx="1">
+            <a:schemeClr val="accent1"/>
+          </a:lnRef>
+          <a:fillRef idx="0">
+            <a:schemeClr val="accent1"/>
+          </a:fillRef>
+          <a:effectRef idx="0">
+            <a:schemeClr val="accent1"/>
+          </a:effectRef>
+          <a:fontRef idx="minor">
+            <a:schemeClr val="tx1"/>
+          </a:fontRef>
+        </p:style>
+      </p:cxnSp>
+      <p:sp>
+        <p:nvSpPr>
+          <p:cNvPr id="8" name="TextBox 7"/>
+          <p:cNvSpPr txBox="1"/>
+          <p:nvPr/>
+        </p:nvSpPr>
+        <p:spPr>
+          <a:xfrm>
+            <a:off x="3634767" y="3586347"/>
+            <a:ext cx="7366119" cy="369332"/>
+          </a:xfrm>
+          <a:prstGeom prst="rect">
+            <a:avLst/>
+          </a:prstGeom>
+          <a:noFill/>
+        </p:spPr>
+        <p:txBody>
+          <a:bodyPr wrap="none" rtlCol="0">
+            <a:spAutoFit/>
+          </a:bodyPr>
+          <a:lstStyle/>
+          <a:p>
+            <a:r>
+              <a:rPr lang="en-US" dirty="0" smtClean="0">
+                <a:latin typeface="Arial" panose="020B0604020202020204" pitchFamily="34" charset="0"/>
+                <a:cs typeface="Arial" panose="020B0604020202020204" pitchFamily="34" charset="0"/>
+              </a:rPr>
+              <a:t>Even using “stringent” Bonferroni correction, there are many </a:t>
+            </a:r>
+            <a:r>
+              <a:rPr lang="en-US" dirty="0" err="1" smtClean="0">
+                <a:latin typeface="Arial" panose="020B0604020202020204" pitchFamily="34" charset="0"/>
+                <a:cs typeface="Arial" panose="020B0604020202020204" pitchFamily="34" charset="0"/>
+              </a:rPr>
+              <a:t>many</a:t>
+            </a:r>
+            <a:r>
+              <a:rPr lang="en-US" dirty="0" smtClean="0">
+                <a:latin typeface="Arial" panose="020B0604020202020204" pitchFamily="34" charset="0"/>
+                <a:cs typeface="Arial" panose="020B0604020202020204" pitchFamily="34" charset="0"/>
+              </a:rPr>
+              <a:t> hits</a:t>
+            </a:r>
+            <a:endParaRPr lang="en-US" dirty="0">
+              <a:latin typeface="Arial" panose="020B0604020202020204" pitchFamily="34" charset="0"/>
+              <a:cs typeface="Arial" panose="020B0604020202020204" pitchFamily="34" charset="0"/>
+            </a:endParaRPr>
+          </a:p>
+        </p:txBody>
+      </p:sp>
+      <p:sp>
+        <p:nvSpPr>
+          <p:cNvPr id="9" name="TextBox 8"/>
+          <p:cNvSpPr txBox="1"/>
+          <p:nvPr/>
+        </p:nvSpPr>
+        <p:spPr>
+          <a:xfrm>
+            <a:off x="681841" y="3811984"/>
+            <a:ext cx="2198038" cy="923330"/>
+          </a:xfrm>
+          <a:prstGeom prst="rect">
+            <a:avLst/>
+          </a:prstGeom>
+          <a:noFill/>
+        </p:spPr>
+        <p:txBody>
+          <a:bodyPr wrap="none" rtlCol="0">
+            <a:spAutoFit/>
+          </a:bodyPr>
+          <a:lstStyle/>
+          <a:p>
+            <a:r>
+              <a:rPr lang="en-US" dirty="0" smtClean="0">
+                <a:latin typeface="Arial" panose="020B0604020202020204" pitchFamily="34" charset="0"/>
+                <a:cs typeface="Arial" panose="020B0604020202020204" pitchFamily="34" charset="0"/>
+              </a:rPr>
+              <a:t>As an exercise:</a:t>
+            </a:r>
+          </a:p>
+          <a:p>
+            <a:endParaRPr lang="en-US" dirty="0">
+              <a:latin typeface="Arial" panose="020B0604020202020204" pitchFamily="34" charset="0"/>
+              <a:cs typeface="Arial" panose="020B0604020202020204" pitchFamily="34" charset="0"/>
+            </a:endParaRPr>
+          </a:p>
+          <a:p>
+            <a:r>
+              <a:rPr lang="en-US" dirty="0" smtClean="0">
+                <a:latin typeface="Arial" panose="020B0604020202020204" pitchFamily="34" charset="0"/>
+                <a:cs typeface="Arial" panose="020B0604020202020204" pitchFamily="34" charset="0"/>
+              </a:rPr>
+              <a:t>Run this code in R: </a:t>
+            </a:r>
+            <a:endParaRPr lang="en-US" dirty="0">
+              <a:latin typeface="Arial" panose="020B0604020202020204" pitchFamily="34" charset="0"/>
+              <a:cs typeface="Arial" panose="020B0604020202020204" pitchFamily="34" charset="0"/>
+            </a:endParaRPr>
+          </a:p>
+        </p:txBody>
+      </p:sp>
+      <p:sp>
+        <p:nvSpPr>
+          <p:cNvPr id="10" name="Rectangle 9"/>
+          <p:cNvSpPr/>
+          <p:nvPr/>
+        </p:nvSpPr>
+        <p:spPr>
+          <a:xfrm>
+            <a:off x="447303" y="4620373"/>
+            <a:ext cx="11772406" cy="369332"/>
+          </a:xfrm>
+          <a:prstGeom prst="rect">
+            <a:avLst/>
+          </a:prstGeom>
+        </p:spPr>
+        <p:txBody>
+          <a:bodyPr wrap="square">
+            <a:spAutoFit/>
+          </a:bodyPr>
+          <a:lstStyle/>
+          <a:p>
+            <a:r>
+              <a:rPr lang="en-US" dirty="0"/>
+              <a:t>https://github.com/afodor/metagenomicsTools/blob/master/src/chapelHillWorkshop/quick_TTest</a:t>
+            </a:r>
+          </a:p>
+        </p:txBody>
+      </p:sp>
+      <p:sp>
+        <p:nvSpPr>
+          <p:cNvPr id="11" name="TextBox 10"/>
+          <p:cNvSpPr txBox="1"/>
+          <p:nvPr/>
+        </p:nvSpPr>
+        <p:spPr>
+          <a:xfrm>
+            <a:off x="681841" y="5189516"/>
+            <a:ext cx="3980577" cy="369332"/>
+          </a:xfrm>
+          <a:prstGeom prst="rect">
+            <a:avLst/>
+          </a:prstGeom>
+          <a:noFill/>
+        </p:spPr>
+        <p:txBody>
+          <a:bodyPr wrap="none" rtlCol="0">
+            <a:spAutoFit/>
+          </a:bodyPr>
+          <a:lstStyle/>
+          <a:p>
+            <a:r>
+              <a:rPr lang="en-US" dirty="0" smtClean="0">
+                <a:latin typeface="Arial" panose="020B0604020202020204" pitchFamily="34" charset="0"/>
+                <a:cs typeface="Arial" panose="020B0604020202020204" pitchFamily="34" charset="0"/>
+              </a:rPr>
+              <a:t>The file the code depends on is here:</a:t>
+            </a:r>
+            <a:endParaRPr lang="en-US" dirty="0">
+              <a:latin typeface="Arial" panose="020B0604020202020204" pitchFamily="34" charset="0"/>
+              <a:cs typeface="Arial" panose="020B0604020202020204" pitchFamily="34" charset="0"/>
+            </a:endParaRPr>
+          </a:p>
+        </p:txBody>
+      </p:sp>
+      <p:sp>
+        <p:nvSpPr>
+          <p:cNvPr id="12" name="Rectangle 11"/>
+          <p:cNvSpPr/>
+          <p:nvPr/>
+        </p:nvSpPr>
+        <p:spPr>
+          <a:xfrm>
+            <a:off x="221673" y="5459243"/>
+            <a:ext cx="11998036" cy="369332"/>
+          </a:xfrm>
+          <a:prstGeom prst="rect">
+            <a:avLst/>
+          </a:prstGeom>
+        </p:spPr>
+        <p:txBody>
+          <a:bodyPr wrap="square">
+            <a:spAutoFit/>
+          </a:bodyPr>
+          <a:lstStyle/>
+          <a:p>
+            <a:r>
+              <a:rPr lang="en-US" dirty="0">
+                <a:latin typeface="Arial" panose="020B0604020202020204" pitchFamily="34" charset="0"/>
+                <a:cs typeface="Arial" panose="020B0604020202020204" pitchFamily="34" charset="0"/>
+              </a:rPr>
+              <a:t>https://github.com/afodor/ChapelHillWorkshop/blob/master/humann2_genefamilies.LABELS2OnlyAbundant.txt.gz</a:t>
+            </a:r>
+            <a:endParaRPr lang="en-US" dirty="0">
+              <a:latin typeface="Arial" panose="020B0604020202020204" pitchFamily="34" charset="0"/>
+              <a:cs typeface="Arial" panose="020B0604020202020204" pitchFamily="34" charset="0"/>
+            </a:endParaRPr>
+          </a:p>
+        </p:txBody>
+      </p:sp>
+      <p:sp>
+        <p:nvSpPr>
+          <p:cNvPr id="13" name="TextBox 12"/>
+          <p:cNvSpPr txBox="1"/>
+          <p:nvPr/>
+        </p:nvSpPr>
+        <p:spPr>
+          <a:xfrm>
+            <a:off x="570016" y="6032668"/>
+            <a:ext cx="10606430" cy="646331"/>
+          </a:xfrm>
+          <a:prstGeom prst="rect">
+            <a:avLst/>
+          </a:prstGeom>
+          <a:noFill/>
+        </p:spPr>
+        <p:txBody>
+          <a:bodyPr wrap="none" rtlCol="0">
+            <a:spAutoFit/>
+          </a:bodyPr>
+          <a:lstStyle/>
+          <a:p>
+            <a:r>
+              <a:rPr lang="en-US" dirty="0" smtClean="0">
+                <a:latin typeface="Arial" panose="020B0604020202020204" pitchFamily="34" charset="0"/>
+                <a:cs typeface="Arial" panose="020B0604020202020204" pitchFamily="34" charset="0"/>
+              </a:rPr>
+              <a:t>How many genes are significantly different under BH and Bonferroni correction for the non-parametric </a:t>
+            </a:r>
+          </a:p>
+          <a:p>
+            <a:r>
+              <a:rPr lang="en-US" dirty="0" smtClean="0">
+                <a:latin typeface="Arial" panose="020B0604020202020204" pitchFamily="34" charset="0"/>
+                <a:cs typeface="Arial" panose="020B0604020202020204" pitchFamily="34" charset="0"/>
+              </a:rPr>
+              <a:t>Wilcoxon test (with </a:t>
+            </a:r>
+            <a:r>
+              <a:rPr lang="en-US" dirty="0" err="1" smtClean="0">
+                <a:latin typeface="Arial" panose="020B0604020202020204" pitchFamily="34" charset="0"/>
+                <a:cs typeface="Arial" panose="020B0604020202020204" pitchFamily="34" charset="0"/>
+              </a:rPr>
+              <a:t>pvalues</a:t>
+            </a:r>
+            <a:r>
+              <a:rPr lang="en-US" dirty="0" smtClean="0">
+                <a:latin typeface="Arial" panose="020B0604020202020204" pitchFamily="34" charset="0"/>
+                <a:cs typeface="Arial" panose="020B0604020202020204" pitchFamily="34" charset="0"/>
+              </a:rPr>
+              <a:t> held in </a:t>
+            </a:r>
+            <a:r>
+              <a:rPr lang="en-US" dirty="0" err="1" smtClean="0">
+                <a:latin typeface="Arial" panose="020B0604020202020204" pitchFamily="34" charset="0"/>
+                <a:cs typeface="Arial" panose="020B0604020202020204" pitchFamily="34" charset="0"/>
+              </a:rPr>
+              <a:t>pValuesWilcoxon</a:t>
+            </a:r>
+            <a:r>
+              <a:rPr lang="en-US" dirty="0" smtClean="0">
+                <a:latin typeface="Arial" panose="020B0604020202020204" pitchFamily="34" charset="0"/>
+                <a:cs typeface="Arial" panose="020B0604020202020204" pitchFamily="34" charset="0"/>
+              </a:rPr>
+              <a:t>)</a:t>
+            </a:r>
+            <a:endParaRPr lang="en-US" dirty="0">
+              <a:latin typeface="Arial" panose="020B0604020202020204" pitchFamily="34" charset="0"/>
+              <a:cs typeface="Arial" panose="020B0604020202020204" pitchFamily="34" charset="0"/>
+            </a:endParaRPr>
+          </a:p>
+        </p:txBody>
+      </p:sp>
+    </p:spTree>
+    <p:extLst>
+      <p:ext uri="{BB962C8B-B14F-4D97-AF65-F5344CB8AC3E}">
+        <p14:creationId xmlns:p14="http://schemas.microsoft.com/office/powerpoint/2010/main" val="2919522997"/>
+      </p:ext>
+    </p:extLst>
+  </p:cSld>
+  <p:clrMapOvr>
+    <a:masterClrMapping/>
+  </p:clrMapOvr>
+</p:sld>
+</file>
+
+<file path=ppt/slides/slide42.xml><?xml version="1.0" encoding="utf-8"?>
+<p:sld xmlns:a="http://schemas.openxmlformats.org/drawingml/2006/main" xmlns:r="http://schemas.openxmlformats.org/officeDocument/2006/relationships" xmlns:p="http://schemas.openxmlformats.org/presentationml/2006/main">
+  <p:cSld>
+    <p:spTree>
+      <p:nvGrpSpPr>
+        <p:cNvPr id="1" name=""/>
+        <p:cNvGrpSpPr/>
+        <p:nvPr/>
+      </p:nvGrpSpPr>
+      <p:grpSpPr>
+        <a:xfrm>
+          <a:off x="0" y="0"/>
+          <a:ext cx="0" cy="0"/>
+          <a:chOff x="0" y="0"/>
+          <a:chExt cx="0" cy="0"/>
+        </a:xfrm>
+      </p:grpSpPr>
+      <p:sp>
+        <p:nvSpPr>
+          <p:cNvPr id="4" name="TextBox 3"/>
+          <p:cNvSpPr txBox="1"/>
+          <p:nvPr/>
+        </p:nvSpPr>
+        <p:spPr>
+          <a:xfrm>
+            <a:off x="403761" y="0"/>
+            <a:ext cx="7357014" cy="369332"/>
+          </a:xfrm>
+          <a:prstGeom prst="rect">
+            <a:avLst/>
+          </a:prstGeom>
+          <a:noFill/>
+        </p:spPr>
+        <p:txBody>
+          <a:bodyPr wrap="none" rtlCol="0">
+            <a:spAutoFit/>
+          </a:bodyPr>
+          <a:lstStyle/>
+          <a:p>
+            <a:r>
+              <a:rPr lang="en-US" dirty="0" smtClean="0"/>
+              <a:t>One of </a:t>
+            </a:r>
+            <a:r>
+              <a:rPr lang="en-US" dirty="0" smtClean="0">
+                <a:latin typeface="Arial" panose="020B0604020202020204" pitchFamily="34" charset="0"/>
+                <a:cs typeface="Arial" panose="020B0604020202020204" pitchFamily="34" charset="0"/>
+              </a:rPr>
+              <a:t>my favorite visualizations is to plot the distribution of all </a:t>
+            </a:r>
+            <a:r>
+              <a:rPr lang="en-US" dirty="0" err="1" smtClean="0">
+                <a:latin typeface="Arial" panose="020B0604020202020204" pitchFamily="34" charset="0"/>
+                <a:cs typeface="Arial" panose="020B0604020202020204" pitchFamily="34" charset="0"/>
+              </a:rPr>
+              <a:t>pValues</a:t>
+            </a:r>
+            <a:endParaRPr lang="en-US" dirty="0"/>
+          </a:p>
+        </p:txBody>
+      </p:sp>
+      <p:sp>
+        <p:nvSpPr>
+          <p:cNvPr id="5" name="Rectangle 4"/>
+          <p:cNvSpPr/>
+          <p:nvPr/>
+        </p:nvSpPr>
+        <p:spPr>
+          <a:xfrm>
+            <a:off x="1216738" y="845518"/>
+            <a:ext cx="2419573" cy="369332"/>
+          </a:xfrm>
+          <a:prstGeom prst="rect">
+            <a:avLst/>
+          </a:prstGeom>
+        </p:spPr>
+        <p:txBody>
+          <a:bodyPr wrap="none">
+            <a:spAutoFit/>
+          </a:bodyPr>
+          <a:lstStyle/>
+          <a:p>
+            <a:r>
+              <a:rPr lang="en-US" dirty="0" err="1">
+                <a:solidFill>
+                  <a:srgbClr val="FF0000"/>
+                </a:solidFill>
+              </a:rPr>
+              <a:t>hist</a:t>
+            </a:r>
+            <a:r>
+              <a:rPr lang="en-US" dirty="0">
+                <a:solidFill>
+                  <a:srgbClr val="FF0000"/>
+                </a:solidFill>
+              </a:rPr>
+              <a:t>(</a:t>
+            </a:r>
+            <a:r>
+              <a:rPr lang="en-US" dirty="0" err="1">
+                <a:solidFill>
+                  <a:srgbClr val="FF0000"/>
+                </a:solidFill>
+              </a:rPr>
+              <a:t>pValues,breaks</a:t>
+            </a:r>
+            <a:r>
+              <a:rPr lang="en-US" dirty="0">
+                <a:solidFill>
+                  <a:srgbClr val="FF0000"/>
+                </a:solidFill>
+              </a:rPr>
+              <a:t>=30)</a:t>
+            </a:r>
+          </a:p>
+        </p:txBody>
+      </p:sp>
+      <p:pic>
+        <p:nvPicPr>
+          <p:cNvPr id="6" name="Picture 5"/>
+          <p:cNvPicPr>
+            <a:picLocks noChangeAspect="1"/>
+          </p:cNvPicPr>
+          <p:nvPr/>
+        </p:nvPicPr>
+        <p:blipFill>
+          <a:blip r:embed="rId2"/>
+          <a:stretch>
+            <a:fillRect/>
+          </a:stretch>
+        </p:blipFill>
+        <p:spPr>
+          <a:xfrm>
+            <a:off x="564533" y="1381101"/>
+            <a:ext cx="5004994" cy="5000880"/>
+          </a:xfrm>
+          <a:prstGeom prst="rect">
+            <a:avLst/>
+          </a:prstGeom>
+        </p:spPr>
+      </p:pic>
+      <p:pic>
+        <p:nvPicPr>
+          <p:cNvPr id="7" name="Picture 6"/>
+          <p:cNvPicPr>
+            <a:picLocks noChangeAspect="1"/>
+          </p:cNvPicPr>
+          <p:nvPr/>
+        </p:nvPicPr>
+        <p:blipFill>
+          <a:blip r:embed="rId3"/>
+          <a:stretch>
+            <a:fillRect/>
+          </a:stretch>
+        </p:blipFill>
+        <p:spPr>
+          <a:xfrm>
+            <a:off x="5826826" y="945884"/>
+            <a:ext cx="5597236" cy="5592635"/>
+          </a:xfrm>
+          <a:prstGeom prst="rect">
+            <a:avLst/>
+          </a:prstGeom>
+        </p:spPr>
+      </p:pic>
+      <p:sp>
+        <p:nvSpPr>
+          <p:cNvPr id="8" name="Rectangle 7"/>
+          <p:cNvSpPr/>
+          <p:nvPr/>
+        </p:nvSpPr>
+        <p:spPr>
+          <a:xfrm>
+            <a:off x="6035126" y="849684"/>
+            <a:ext cx="3280578" cy="369332"/>
+          </a:xfrm>
+          <a:prstGeom prst="rect">
+            <a:avLst/>
+          </a:prstGeom>
+        </p:spPr>
+        <p:txBody>
+          <a:bodyPr wrap="none">
+            <a:spAutoFit/>
+          </a:bodyPr>
+          <a:lstStyle/>
+          <a:p>
+            <a:r>
+              <a:rPr lang="en-US" dirty="0" err="1">
+                <a:solidFill>
+                  <a:srgbClr val="FF0000"/>
+                </a:solidFill>
+              </a:rPr>
+              <a:t>hist</a:t>
+            </a:r>
+            <a:r>
+              <a:rPr lang="en-US" dirty="0">
+                <a:solidFill>
+                  <a:srgbClr val="FF0000"/>
+                </a:solidFill>
+              </a:rPr>
+              <a:t>(</a:t>
+            </a:r>
+            <a:r>
+              <a:rPr lang="en-US" dirty="0" err="1">
+                <a:solidFill>
+                  <a:srgbClr val="FF0000"/>
+                </a:solidFill>
+              </a:rPr>
+              <a:t>pValuesWilcoxon,breaks</a:t>
+            </a:r>
+            <a:r>
+              <a:rPr lang="en-US" dirty="0">
+                <a:solidFill>
+                  <a:srgbClr val="FF0000"/>
+                </a:solidFill>
+              </a:rPr>
+              <a:t>=30)</a:t>
+            </a:r>
+          </a:p>
+        </p:txBody>
+      </p:sp>
+      <p:sp>
+        <p:nvSpPr>
+          <p:cNvPr id="9" name="TextBox 8"/>
+          <p:cNvSpPr txBox="1"/>
+          <p:nvPr/>
+        </p:nvSpPr>
+        <p:spPr>
+          <a:xfrm>
+            <a:off x="564533" y="6495805"/>
+            <a:ext cx="8298105" cy="369332"/>
+          </a:xfrm>
+          <a:prstGeom prst="rect">
+            <a:avLst/>
+          </a:prstGeom>
+          <a:noFill/>
+        </p:spPr>
+        <p:txBody>
+          <a:bodyPr wrap="none" rtlCol="0">
+            <a:spAutoFit/>
+          </a:bodyPr>
+          <a:lstStyle/>
+          <a:p>
+            <a:r>
+              <a:rPr lang="en-US" dirty="0" smtClean="0">
+                <a:latin typeface="Arial" panose="020B0604020202020204" pitchFamily="34" charset="0"/>
+                <a:cs typeface="Arial" panose="020B0604020202020204" pitchFamily="34" charset="0"/>
+              </a:rPr>
+              <a:t>This emphasizes how enormous the differences between the tissue types are…</a:t>
+            </a:r>
+            <a:endParaRPr lang="en-US" dirty="0">
+              <a:latin typeface="Arial" panose="020B0604020202020204" pitchFamily="34" charset="0"/>
+              <a:cs typeface="Arial" panose="020B0604020202020204" pitchFamily="34" charset="0"/>
+            </a:endParaRPr>
+          </a:p>
+        </p:txBody>
+      </p:sp>
+    </p:spTree>
+    <p:extLst>
+      <p:ext uri="{BB962C8B-B14F-4D97-AF65-F5344CB8AC3E}">
+        <p14:creationId xmlns:p14="http://schemas.microsoft.com/office/powerpoint/2010/main" val="2934545690"/>
+      </p:ext>
+    </p:extLst>
+  </p:cSld>
+  <p:clrMapOvr>
+    <a:masterClrMapping/>
+  </p:clrMapOvr>
+</p:sld>
+</file>
+
+<file path=ppt/slides/slide43.xml><?xml version="1.0" encoding="utf-8"?>
+<p:sld xmlns:a="http://schemas.openxmlformats.org/drawingml/2006/main" xmlns:r="http://schemas.openxmlformats.org/officeDocument/2006/relationships" xmlns:p="http://schemas.openxmlformats.org/presentationml/2006/main">
+  <p:cSld>
+    <p:spTree>
+      <p:nvGrpSpPr>
+        <p:cNvPr id="1" name=""/>
+        <p:cNvGrpSpPr/>
+        <p:nvPr/>
+      </p:nvGrpSpPr>
+      <p:grpSpPr>
+        <a:xfrm>
+          <a:off x="0" y="0"/>
+          <a:ext cx="0" cy="0"/>
+          <a:chOff x="0" y="0"/>
+          <a:chExt cx="0" cy="0"/>
+        </a:xfrm>
+      </p:grpSpPr>
+      <p:sp>
+        <p:nvSpPr>
+          <p:cNvPr id="4" name="TextBox 3"/>
+          <p:cNvSpPr txBox="1"/>
+          <p:nvPr/>
+        </p:nvSpPr>
+        <p:spPr>
+          <a:xfrm>
+            <a:off x="1413164" y="11876"/>
+            <a:ext cx="9255739" cy="369332"/>
+          </a:xfrm>
+          <a:prstGeom prst="rect">
+            <a:avLst/>
+          </a:prstGeom>
+          <a:noFill/>
+        </p:spPr>
+        <p:txBody>
+          <a:bodyPr wrap="none" rtlCol="0">
+            <a:spAutoFit/>
+          </a:bodyPr>
+          <a:lstStyle/>
+          <a:p>
+            <a:r>
+              <a:rPr lang="en-US" dirty="0" smtClean="0">
+                <a:latin typeface="Arial" panose="020B0604020202020204" pitchFamily="34" charset="0"/>
+                <a:cs typeface="Arial" panose="020B0604020202020204" pitchFamily="34" charset="0"/>
+              </a:rPr>
+              <a:t>Let’s switch to a more challenging dataset where the differences are much </a:t>
+            </a:r>
+            <a:r>
+              <a:rPr lang="en-US" smtClean="0">
+                <a:latin typeface="Arial" panose="020B0604020202020204" pitchFamily="34" charset="0"/>
+                <a:cs typeface="Arial" panose="020B0604020202020204" pitchFamily="34" charset="0"/>
+              </a:rPr>
+              <a:t>more subtle…</a:t>
+            </a:r>
+            <a:endParaRPr lang="en-US">
+              <a:latin typeface="Arial" panose="020B0604020202020204" pitchFamily="34" charset="0"/>
+              <a:cs typeface="Arial" panose="020B0604020202020204" pitchFamily="34" charset="0"/>
+            </a:endParaRPr>
+          </a:p>
+        </p:txBody>
+      </p:sp>
+    </p:spTree>
+    <p:extLst>
+      <p:ext uri="{BB962C8B-B14F-4D97-AF65-F5344CB8AC3E}">
+        <p14:creationId xmlns:p14="http://schemas.microsoft.com/office/powerpoint/2010/main" val="75156764"/>
       </p:ext>
     </p:extLst>
   </p:cSld>

</xml_diff>

<commit_message>
start on next dataset...
</commit_message>
<xml_diff>
--- a/classes/ChapelHill2016/ChapelHillWorkshop_Fodor.pptx
+++ b/classes/ChapelHill2016/ChapelHillWorkshop_Fodor.pptx
@@ -4,6 +4,9 @@
   <p:sldMasterIdLst>
     <p:sldMasterId id="2147483648" r:id="rId1"/>
   </p:sldMasterIdLst>
+  <p:notesMasterIdLst>
+    <p:notesMasterId r:id="rId48"/>
+  </p:notesMasterIdLst>
   <p:sldIdLst>
     <p:sldId id="256" r:id="rId2"/>
     <p:sldId id="257" r:id="rId3"/>
@@ -48,6 +51,9 @@
     <p:sldId id="298" r:id="rId42"/>
     <p:sldId id="299" r:id="rId43"/>
     <p:sldId id="300" r:id="rId44"/>
+    <p:sldId id="301" r:id="rId45"/>
+    <p:sldId id="302" r:id="rId46"/>
+    <p:sldId id="303" r:id="rId47"/>
   </p:sldIdLst>
   <p:sldSz cx="12192000" cy="6858000"/>
   <p:notesSz cx="6858000" cy="9144000"/>
@@ -152,6 +158,530 @@
     </p:ext>
   </p:extLst>
 </p:presentation>
+</file>
+
+<file path=ppt/notesMasters/notesMaster1.xml><?xml version="1.0" encoding="utf-8"?>
+<p:notesMaster xmlns:a="http://schemas.openxmlformats.org/drawingml/2006/main" xmlns:r="http://schemas.openxmlformats.org/officeDocument/2006/relationships" xmlns:p="http://schemas.openxmlformats.org/presentationml/2006/main">
+  <p:cSld>
+    <p:bg>
+      <p:bgRef idx="1001">
+        <a:schemeClr val="bg1"/>
+      </p:bgRef>
+    </p:bg>
+    <p:spTree>
+      <p:nvGrpSpPr>
+        <p:cNvPr id="1" name=""/>
+        <p:cNvGrpSpPr/>
+        <p:nvPr/>
+      </p:nvGrpSpPr>
+      <p:grpSpPr>
+        <a:xfrm>
+          <a:off x="0" y="0"/>
+          <a:ext cx="0" cy="0"/>
+          <a:chOff x="0" y="0"/>
+          <a:chExt cx="0" cy="0"/>
+        </a:xfrm>
+      </p:grpSpPr>
+      <p:sp>
+        <p:nvSpPr>
+          <p:cNvPr id="2" name="Header Placeholder 1"/>
+          <p:cNvSpPr>
+            <a:spLocks noGrp="1"/>
+          </p:cNvSpPr>
+          <p:nvPr>
+            <p:ph type="hdr" sz="quarter"/>
+          </p:nvPr>
+        </p:nvSpPr>
+        <p:spPr>
+          <a:xfrm>
+            <a:off x="0" y="0"/>
+            <a:ext cx="2971800" cy="458788"/>
+          </a:xfrm>
+          <a:prstGeom prst="rect">
+            <a:avLst/>
+          </a:prstGeom>
+        </p:spPr>
+        <p:txBody>
+          <a:bodyPr vert="horz" lIns="91440" tIns="45720" rIns="91440" bIns="45720" rtlCol="0"/>
+          <a:lstStyle>
+            <a:lvl1pPr algn="l">
+              <a:defRPr sz="1200"/>
+            </a:lvl1pPr>
+          </a:lstStyle>
+          <a:p>
+            <a:endParaRPr lang="en-US"/>
+          </a:p>
+        </p:txBody>
+      </p:sp>
+      <p:sp>
+        <p:nvSpPr>
+          <p:cNvPr id="3" name="Date Placeholder 2"/>
+          <p:cNvSpPr>
+            <a:spLocks noGrp="1"/>
+          </p:cNvSpPr>
+          <p:nvPr>
+            <p:ph type="dt" idx="1"/>
+          </p:nvPr>
+        </p:nvSpPr>
+        <p:spPr>
+          <a:xfrm>
+            <a:off x="3884613" y="0"/>
+            <a:ext cx="2971800" cy="458788"/>
+          </a:xfrm>
+          <a:prstGeom prst="rect">
+            <a:avLst/>
+          </a:prstGeom>
+        </p:spPr>
+        <p:txBody>
+          <a:bodyPr vert="horz" lIns="91440" tIns="45720" rIns="91440" bIns="45720" rtlCol="0"/>
+          <a:lstStyle>
+            <a:lvl1pPr algn="r">
+              <a:defRPr sz="1200"/>
+            </a:lvl1pPr>
+          </a:lstStyle>
+          <a:p>
+            <a:fld id="{FC459844-4342-429C-B527-6DFB8B6D8A2A}" type="datetimeFigureOut">
+              <a:rPr lang="en-US" smtClean="0"/>
+              <a:t>5/27/2016</a:t>
+            </a:fld>
+            <a:endParaRPr lang="en-US"/>
+          </a:p>
+        </p:txBody>
+      </p:sp>
+      <p:sp>
+        <p:nvSpPr>
+          <p:cNvPr id="4" name="Slide Image Placeholder 3"/>
+          <p:cNvSpPr>
+            <a:spLocks noGrp="1" noRot="1" noChangeAspect="1"/>
+          </p:cNvSpPr>
+          <p:nvPr>
+            <p:ph type="sldImg" idx="2"/>
+          </p:nvPr>
+        </p:nvSpPr>
+        <p:spPr>
+          <a:xfrm>
+            <a:off x="685800" y="1143000"/>
+            <a:ext cx="5486400" cy="3086100"/>
+          </a:xfrm>
+          <a:prstGeom prst="rect">
+            <a:avLst/>
+          </a:prstGeom>
+          <a:noFill/>
+          <a:ln w="12700">
+            <a:solidFill>
+              <a:prstClr val="black"/>
+            </a:solidFill>
+          </a:ln>
+        </p:spPr>
+        <p:txBody>
+          <a:bodyPr vert="horz" lIns="91440" tIns="45720" rIns="91440" bIns="45720" rtlCol="0" anchor="ctr"/>
+          <a:lstStyle/>
+          <a:p>
+            <a:endParaRPr lang="en-US"/>
+          </a:p>
+        </p:txBody>
+      </p:sp>
+      <p:sp>
+        <p:nvSpPr>
+          <p:cNvPr id="5" name="Notes Placeholder 4"/>
+          <p:cNvSpPr>
+            <a:spLocks noGrp="1"/>
+          </p:cNvSpPr>
+          <p:nvPr>
+            <p:ph type="body" sz="quarter" idx="3"/>
+          </p:nvPr>
+        </p:nvSpPr>
+        <p:spPr>
+          <a:xfrm>
+            <a:off x="685800" y="4400550"/>
+            <a:ext cx="5486400" cy="3600450"/>
+          </a:xfrm>
+          <a:prstGeom prst="rect">
+            <a:avLst/>
+          </a:prstGeom>
+        </p:spPr>
+        <p:txBody>
+          <a:bodyPr vert="horz" lIns="91440" tIns="45720" rIns="91440" bIns="45720" rtlCol="0"/>
+          <a:lstStyle/>
+          <a:p>
+            <a:pPr lvl="0"/>
+            <a:r>
+              <a:rPr lang="en-US" smtClean="0"/>
+              <a:t>Edit Master text styles</a:t>
+            </a:r>
+          </a:p>
+          <a:p>
+            <a:pPr lvl="1"/>
+            <a:r>
+              <a:rPr lang="en-US" smtClean="0"/>
+              <a:t>Second level</a:t>
+            </a:r>
+          </a:p>
+          <a:p>
+            <a:pPr lvl="2"/>
+            <a:r>
+              <a:rPr lang="en-US" smtClean="0"/>
+              <a:t>Third level</a:t>
+            </a:r>
+          </a:p>
+          <a:p>
+            <a:pPr lvl="3"/>
+            <a:r>
+              <a:rPr lang="en-US" smtClean="0"/>
+              <a:t>Fourth level</a:t>
+            </a:r>
+          </a:p>
+          <a:p>
+            <a:pPr lvl="4"/>
+            <a:r>
+              <a:rPr lang="en-US" smtClean="0"/>
+              <a:t>Fifth level</a:t>
+            </a:r>
+            <a:endParaRPr lang="en-US"/>
+          </a:p>
+        </p:txBody>
+      </p:sp>
+      <p:sp>
+        <p:nvSpPr>
+          <p:cNvPr id="6" name="Footer Placeholder 5"/>
+          <p:cNvSpPr>
+            <a:spLocks noGrp="1"/>
+          </p:cNvSpPr>
+          <p:nvPr>
+            <p:ph type="ftr" sz="quarter" idx="4"/>
+          </p:nvPr>
+        </p:nvSpPr>
+        <p:spPr>
+          <a:xfrm>
+            <a:off x="0" y="8685213"/>
+            <a:ext cx="2971800" cy="458787"/>
+          </a:xfrm>
+          <a:prstGeom prst="rect">
+            <a:avLst/>
+          </a:prstGeom>
+        </p:spPr>
+        <p:txBody>
+          <a:bodyPr vert="horz" lIns="91440" tIns="45720" rIns="91440" bIns="45720" rtlCol="0" anchor="b"/>
+          <a:lstStyle>
+            <a:lvl1pPr algn="l">
+              <a:defRPr sz="1200"/>
+            </a:lvl1pPr>
+          </a:lstStyle>
+          <a:p>
+            <a:endParaRPr lang="en-US"/>
+          </a:p>
+        </p:txBody>
+      </p:sp>
+      <p:sp>
+        <p:nvSpPr>
+          <p:cNvPr id="7" name="Slide Number Placeholder 6"/>
+          <p:cNvSpPr>
+            <a:spLocks noGrp="1"/>
+          </p:cNvSpPr>
+          <p:nvPr>
+            <p:ph type="sldNum" sz="quarter" idx="5"/>
+          </p:nvPr>
+        </p:nvSpPr>
+        <p:spPr>
+          <a:xfrm>
+            <a:off x="3884613" y="8685213"/>
+            <a:ext cx="2971800" cy="458787"/>
+          </a:xfrm>
+          <a:prstGeom prst="rect">
+            <a:avLst/>
+          </a:prstGeom>
+        </p:spPr>
+        <p:txBody>
+          <a:bodyPr vert="horz" lIns="91440" tIns="45720" rIns="91440" bIns="45720" rtlCol="0" anchor="b"/>
+          <a:lstStyle>
+            <a:lvl1pPr algn="r">
+              <a:defRPr sz="1200"/>
+            </a:lvl1pPr>
+          </a:lstStyle>
+          <a:p>
+            <a:fld id="{B5CDACDF-7826-4ADF-BE0E-0AD2634C0C48}" type="slidenum">
+              <a:rPr lang="en-US" smtClean="0"/>
+              <a:t>‹#›</a:t>
+            </a:fld>
+            <a:endParaRPr lang="en-US"/>
+          </a:p>
+        </p:txBody>
+      </p:sp>
+    </p:spTree>
+    <p:extLst>
+      <p:ext uri="{BB962C8B-B14F-4D97-AF65-F5344CB8AC3E}">
+        <p14:creationId xmlns:p14="http://schemas.microsoft.com/office/powerpoint/2010/main" val="1941275375"/>
+      </p:ext>
+    </p:extLst>
+  </p:cSld>
+  <p:clrMap bg1="lt1" tx1="dk1" bg2="lt2" tx2="dk2" accent1="accent1" accent2="accent2" accent3="accent3" accent4="accent4" accent5="accent5" accent6="accent6" hlink="hlink" folHlink="folHlink"/>
+  <p:notesStyle>
+    <a:lvl1pPr marL="0" algn="l" defTabSz="914400" rtl="0" eaLnBrk="1" latinLnBrk="0" hangingPunct="1">
+      <a:defRPr sz="1200" kern="1200">
+        <a:solidFill>
+          <a:schemeClr val="tx1"/>
+        </a:solidFill>
+        <a:latin typeface="+mn-lt"/>
+        <a:ea typeface="+mn-ea"/>
+        <a:cs typeface="+mn-cs"/>
+      </a:defRPr>
+    </a:lvl1pPr>
+    <a:lvl2pPr marL="457200" algn="l" defTabSz="914400" rtl="0" eaLnBrk="1" latinLnBrk="0" hangingPunct="1">
+      <a:defRPr sz="1200" kern="1200">
+        <a:solidFill>
+          <a:schemeClr val="tx1"/>
+        </a:solidFill>
+        <a:latin typeface="+mn-lt"/>
+        <a:ea typeface="+mn-ea"/>
+        <a:cs typeface="+mn-cs"/>
+      </a:defRPr>
+    </a:lvl2pPr>
+    <a:lvl3pPr marL="914400" algn="l" defTabSz="914400" rtl="0" eaLnBrk="1" latinLnBrk="0" hangingPunct="1">
+      <a:defRPr sz="1200" kern="1200">
+        <a:solidFill>
+          <a:schemeClr val="tx1"/>
+        </a:solidFill>
+        <a:latin typeface="+mn-lt"/>
+        <a:ea typeface="+mn-ea"/>
+        <a:cs typeface="+mn-cs"/>
+      </a:defRPr>
+    </a:lvl3pPr>
+    <a:lvl4pPr marL="1371600" algn="l" defTabSz="914400" rtl="0" eaLnBrk="1" latinLnBrk="0" hangingPunct="1">
+      <a:defRPr sz="1200" kern="1200">
+        <a:solidFill>
+          <a:schemeClr val="tx1"/>
+        </a:solidFill>
+        <a:latin typeface="+mn-lt"/>
+        <a:ea typeface="+mn-ea"/>
+        <a:cs typeface="+mn-cs"/>
+      </a:defRPr>
+    </a:lvl4pPr>
+    <a:lvl5pPr marL="1828800" algn="l" defTabSz="914400" rtl="0" eaLnBrk="1" latinLnBrk="0" hangingPunct="1">
+      <a:defRPr sz="1200" kern="1200">
+        <a:solidFill>
+          <a:schemeClr val="tx1"/>
+        </a:solidFill>
+        <a:latin typeface="+mn-lt"/>
+        <a:ea typeface="+mn-ea"/>
+        <a:cs typeface="+mn-cs"/>
+      </a:defRPr>
+    </a:lvl5pPr>
+    <a:lvl6pPr marL="2286000" algn="l" defTabSz="914400" rtl="0" eaLnBrk="1" latinLnBrk="0" hangingPunct="1">
+      <a:defRPr sz="1200" kern="1200">
+        <a:solidFill>
+          <a:schemeClr val="tx1"/>
+        </a:solidFill>
+        <a:latin typeface="+mn-lt"/>
+        <a:ea typeface="+mn-ea"/>
+        <a:cs typeface="+mn-cs"/>
+      </a:defRPr>
+    </a:lvl6pPr>
+    <a:lvl7pPr marL="2743200" algn="l" defTabSz="914400" rtl="0" eaLnBrk="1" latinLnBrk="0" hangingPunct="1">
+      <a:defRPr sz="1200" kern="1200">
+        <a:solidFill>
+          <a:schemeClr val="tx1"/>
+        </a:solidFill>
+        <a:latin typeface="+mn-lt"/>
+        <a:ea typeface="+mn-ea"/>
+        <a:cs typeface="+mn-cs"/>
+      </a:defRPr>
+    </a:lvl7pPr>
+    <a:lvl8pPr marL="3200400" algn="l" defTabSz="914400" rtl="0" eaLnBrk="1" latinLnBrk="0" hangingPunct="1">
+      <a:defRPr sz="1200" kern="1200">
+        <a:solidFill>
+          <a:schemeClr val="tx1"/>
+        </a:solidFill>
+        <a:latin typeface="+mn-lt"/>
+        <a:ea typeface="+mn-ea"/>
+        <a:cs typeface="+mn-cs"/>
+      </a:defRPr>
+    </a:lvl8pPr>
+    <a:lvl9pPr marL="3657600" algn="l" defTabSz="914400" rtl="0" eaLnBrk="1" latinLnBrk="0" hangingPunct="1">
+      <a:defRPr sz="1200" kern="1200">
+        <a:solidFill>
+          <a:schemeClr val="tx1"/>
+        </a:solidFill>
+        <a:latin typeface="+mn-lt"/>
+        <a:ea typeface="+mn-ea"/>
+        <a:cs typeface="+mn-cs"/>
+      </a:defRPr>
+    </a:lvl9pPr>
+  </p:notesStyle>
+</p:notesMaster>
+</file>
+
+<file path=ppt/notesSlides/notesSlide1.xml><?xml version="1.0" encoding="utf-8"?>
+<p:notes xmlns:a="http://schemas.openxmlformats.org/drawingml/2006/main" xmlns:r="http://schemas.openxmlformats.org/officeDocument/2006/relationships" xmlns:p="http://schemas.openxmlformats.org/presentationml/2006/main">
+  <p:cSld>
+    <p:spTree>
+      <p:nvGrpSpPr>
+        <p:cNvPr id="1" name=""/>
+        <p:cNvGrpSpPr/>
+        <p:nvPr/>
+      </p:nvGrpSpPr>
+      <p:grpSpPr>
+        <a:xfrm>
+          <a:off x="0" y="0"/>
+          <a:ext cx="0" cy="0"/>
+          <a:chOff x="0" y="0"/>
+          <a:chExt cx="0" cy="0"/>
+        </a:xfrm>
+      </p:grpSpPr>
+      <p:sp>
+        <p:nvSpPr>
+          <p:cNvPr id="2" name="Slide Image Placeholder 1"/>
+          <p:cNvSpPr>
+            <a:spLocks noGrp="1" noRot="1" noChangeAspect="1"/>
+          </p:cNvSpPr>
+          <p:nvPr>
+            <p:ph type="sldImg"/>
+          </p:nvPr>
+        </p:nvSpPr>
+        <p:spPr/>
+      </p:sp>
+      <p:sp>
+        <p:nvSpPr>
+          <p:cNvPr id="3" name="Notes Placeholder 2"/>
+          <p:cNvSpPr>
+            <a:spLocks noGrp="1"/>
+          </p:cNvSpPr>
+          <p:nvPr>
+            <p:ph type="body" idx="1"/>
+          </p:nvPr>
+        </p:nvSpPr>
+        <p:spPr/>
+        <p:txBody>
+          <a:bodyPr>
+            <a:normAutofit/>
+          </a:bodyPr>
+          <a:lstStyle/>
+          <a:p>
+            <a:endParaRPr lang="en-US"/>
+          </a:p>
+        </p:txBody>
+      </p:sp>
+      <p:sp>
+        <p:nvSpPr>
+          <p:cNvPr id="4" name="Slide Number Placeholder 3"/>
+          <p:cNvSpPr>
+            <a:spLocks noGrp="1"/>
+          </p:cNvSpPr>
+          <p:nvPr>
+            <p:ph type="sldNum" sz="quarter" idx="10"/>
+          </p:nvPr>
+        </p:nvSpPr>
+        <p:spPr/>
+        <p:txBody>
+          <a:bodyPr/>
+          <a:lstStyle/>
+          <a:p>
+            <a:fld id="{AB346639-E415-41BD-BB4E-0085BA32E2D5}" type="slidenum">
+              <a:rPr lang="en-US" smtClean="0"/>
+              <a:pPr/>
+              <a:t>44</a:t>
+            </a:fld>
+            <a:endParaRPr lang="en-US"/>
+          </a:p>
+        </p:txBody>
+      </p:sp>
+    </p:spTree>
+    <p:extLst>
+      <p:ext uri="{BB962C8B-B14F-4D97-AF65-F5344CB8AC3E}">
+        <p14:creationId xmlns:p14="http://schemas.microsoft.com/office/powerpoint/2010/main" val="1286379571"/>
+      </p:ext>
+    </p:extLst>
+  </p:cSld>
+  <p:clrMapOvr>
+    <a:masterClrMapping/>
+  </p:clrMapOvr>
+</p:notes>
+</file>
+
+<file path=ppt/notesSlides/notesSlide2.xml><?xml version="1.0" encoding="utf-8"?>
+<p:notes xmlns:a="http://schemas.openxmlformats.org/drawingml/2006/main" xmlns:r="http://schemas.openxmlformats.org/officeDocument/2006/relationships" xmlns:p="http://schemas.openxmlformats.org/presentationml/2006/main">
+  <p:cSld>
+    <p:spTree>
+      <p:nvGrpSpPr>
+        <p:cNvPr id="1" name=""/>
+        <p:cNvGrpSpPr/>
+        <p:nvPr/>
+      </p:nvGrpSpPr>
+      <p:grpSpPr>
+        <a:xfrm>
+          <a:off x="0" y="0"/>
+          <a:ext cx="0" cy="0"/>
+          <a:chOff x="0" y="0"/>
+          <a:chExt cx="0" cy="0"/>
+        </a:xfrm>
+      </p:grpSpPr>
+      <p:sp>
+        <p:nvSpPr>
+          <p:cNvPr id="2" name="Slide Image Placeholder 1"/>
+          <p:cNvSpPr>
+            <a:spLocks noGrp="1" noRot="1" noChangeAspect="1"/>
+          </p:cNvSpPr>
+          <p:nvPr>
+            <p:ph type="sldImg"/>
+          </p:nvPr>
+        </p:nvSpPr>
+        <p:spPr/>
+      </p:sp>
+      <p:sp>
+        <p:nvSpPr>
+          <p:cNvPr id="3" name="Notes Placeholder 2"/>
+          <p:cNvSpPr>
+            <a:spLocks noGrp="1"/>
+          </p:cNvSpPr>
+          <p:nvPr>
+            <p:ph type="body" idx="1"/>
+          </p:nvPr>
+        </p:nvSpPr>
+        <p:spPr/>
+        <p:txBody>
+          <a:bodyPr>
+            <a:normAutofit/>
+          </a:bodyPr>
+          <a:lstStyle/>
+          <a:p>
+            <a:endParaRPr lang="en-US"/>
+          </a:p>
+        </p:txBody>
+      </p:sp>
+      <p:sp>
+        <p:nvSpPr>
+          <p:cNvPr id="4" name="Slide Number Placeholder 3"/>
+          <p:cNvSpPr>
+            <a:spLocks noGrp="1"/>
+          </p:cNvSpPr>
+          <p:nvPr>
+            <p:ph type="sldNum" sz="quarter" idx="10"/>
+          </p:nvPr>
+        </p:nvSpPr>
+        <p:spPr/>
+        <p:txBody>
+          <a:bodyPr/>
+          <a:lstStyle/>
+          <a:p>
+            <a:fld id="{64B5200A-267F-4314-A1B3-689929883B77}" type="slidenum">
+              <a:rPr lang="en-US" smtClean="0"/>
+              <a:pPr/>
+              <a:t>45</a:t>
+            </a:fld>
+            <a:endParaRPr lang="en-US"/>
+          </a:p>
+        </p:txBody>
+      </p:sp>
+    </p:spTree>
+    <p:extLst>
+      <p:ext uri="{BB962C8B-B14F-4D97-AF65-F5344CB8AC3E}">
+        <p14:creationId xmlns:p14="http://schemas.microsoft.com/office/powerpoint/2010/main" val="144333662"/>
+      </p:ext>
+    </p:extLst>
+  </p:cSld>
+  <p:clrMapOvr>
+    <a:masterClrMapping/>
+  </p:clrMapOvr>
+</p:notes>
 </file>
 
 <file path=ppt/slideLayouts/slideLayout1.xml><?xml version="1.0" encoding="utf-8"?>
@@ -12479,10 +13009,6 @@
               </a:rPr>
               <a:t>https://github.com/afodor/ChapelHillWorkshop/blob/master/humann2_genefamilies.LABELS2OnlyAbundant.txt.gz</a:t>
             </a:r>
-            <a:endParaRPr lang="en-US" dirty="0">
-              <a:latin typeface="Arial" panose="020B0604020202020204" pitchFamily="34" charset="0"/>
-              <a:cs typeface="Arial" panose="020B0604020202020204" pitchFamily="34" charset="0"/>
-            </a:endParaRPr>
           </a:p>
         </p:txBody>
       </p:sp>
@@ -12867,7 +13393,7 @@
         </p:nvSpPr>
         <p:spPr>
           <a:xfrm>
-            <a:off x="1413164" y="11876"/>
+            <a:off x="1413164" y="2956954"/>
             <a:ext cx="9255739" cy="369332"/>
           </a:xfrm>
           <a:prstGeom prst="rect">
@@ -12886,16 +13412,9 @@
                 <a:latin typeface="Arial" panose="020B0604020202020204" pitchFamily="34" charset="0"/>
                 <a:cs typeface="Arial" panose="020B0604020202020204" pitchFamily="34" charset="0"/>
               </a:rPr>
-              <a:t>Let’s switch to a more challenging dataset where the differences are much </a:t>
-            </a:r>
-            <a:r>
-              <a:rPr lang="en-US" smtClean="0">
-                <a:latin typeface="Arial" panose="020B0604020202020204" pitchFamily="34" charset="0"/>
-                <a:cs typeface="Arial" panose="020B0604020202020204" pitchFamily="34" charset="0"/>
-              </a:rPr>
-              <a:t>more subtle…</a:t>
-            </a:r>
-            <a:endParaRPr lang="en-US">
+              <a:t>Let’s switch to a more challenging dataset where the differences are much more subtle…</a:t>
+            </a:r>
+            <a:endParaRPr lang="en-US" dirty="0">
               <a:latin typeface="Arial" panose="020B0604020202020204" pitchFamily="34" charset="0"/>
               <a:cs typeface="Arial" panose="020B0604020202020204" pitchFamily="34" charset="0"/>
             </a:endParaRPr>
@@ -12906,6 +13425,1165 @@
     <p:extLst>
       <p:ext uri="{BB962C8B-B14F-4D97-AF65-F5344CB8AC3E}">
         <p14:creationId xmlns:p14="http://schemas.microsoft.com/office/powerpoint/2010/main" val="75156764"/>
+      </p:ext>
+    </p:extLst>
+  </p:cSld>
+  <p:clrMapOvr>
+    <a:masterClrMapping/>
+  </p:clrMapOvr>
+</p:sld>
+</file>
+
+<file path=ppt/slides/slide44.xml><?xml version="1.0" encoding="utf-8"?>
+<p:sld xmlns:a="http://schemas.openxmlformats.org/drawingml/2006/main" xmlns:r="http://schemas.openxmlformats.org/officeDocument/2006/relationships" xmlns:p="http://schemas.openxmlformats.org/presentationml/2006/main">
+  <p:cSld>
+    <p:spTree>
+      <p:nvGrpSpPr>
+        <p:cNvPr id="1" name=""/>
+        <p:cNvGrpSpPr/>
+        <p:nvPr/>
+      </p:nvGrpSpPr>
+      <p:grpSpPr>
+        <a:xfrm>
+          <a:off x="0" y="0"/>
+          <a:ext cx="0" cy="0"/>
+          <a:chOff x="0" y="0"/>
+          <a:chExt cx="0" cy="0"/>
+        </a:xfrm>
+      </p:grpSpPr>
+      <p:sp>
+        <p:nvSpPr>
+          <p:cNvPr id="4" name="TextBox 3"/>
+          <p:cNvSpPr txBox="1"/>
+          <p:nvPr/>
+        </p:nvSpPr>
+        <p:spPr>
+          <a:xfrm>
+            <a:off x="2819401" y="1219201"/>
+            <a:ext cx="6058069" cy="646331"/>
+          </a:xfrm>
+          <a:prstGeom prst="rect">
+            <a:avLst/>
+          </a:prstGeom>
+          <a:noFill/>
+        </p:spPr>
+        <p:txBody>
+          <a:bodyPr wrap="none" rtlCol="0">
+            <a:spAutoFit/>
+          </a:bodyPr>
+          <a:lstStyle/>
+          <a:p>
+            <a:r>
+              <a:rPr lang="en-US" dirty="0">
+                <a:latin typeface="Arial" pitchFamily="34" charset="0"/>
+                <a:cs typeface="Arial" pitchFamily="34" charset="0"/>
+              </a:rPr>
+              <a:t>Mucosal biopsies from 33 “case” and 38 “control” patients</a:t>
+            </a:r>
+          </a:p>
+          <a:p>
+            <a:r>
+              <a:rPr lang="en-US" dirty="0">
+                <a:latin typeface="Arial" pitchFamily="34" charset="0"/>
+                <a:cs typeface="Arial" pitchFamily="34" charset="0"/>
+              </a:rPr>
+              <a:t>Tissue collected from same area in case and control</a:t>
+            </a:r>
+          </a:p>
+        </p:txBody>
+      </p:sp>
+      <p:sp>
+        <p:nvSpPr>
+          <p:cNvPr id="5" name="TextBox 4"/>
+          <p:cNvSpPr txBox="1"/>
+          <p:nvPr/>
+        </p:nvSpPr>
+        <p:spPr>
+          <a:xfrm>
+            <a:off x="3200401" y="2069068"/>
+            <a:ext cx="5955541" cy="369332"/>
+          </a:xfrm>
+          <a:prstGeom prst="rect">
+            <a:avLst/>
+          </a:prstGeom>
+          <a:noFill/>
+        </p:spPr>
+        <p:txBody>
+          <a:bodyPr wrap="none" rtlCol="0">
+            <a:spAutoFit/>
+          </a:bodyPr>
+          <a:lstStyle/>
+          <a:p>
+            <a:r>
+              <a:rPr lang="en-US" dirty="0">
+                <a:latin typeface="Arial" pitchFamily="34" charset="0"/>
+                <a:cs typeface="Arial" pitchFamily="34" charset="0"/>
+              </a:rPr>
+              <a:t>454 sequencing targeting the conserved 16S rRNA gene</a:t>
+            </a:r>
+            <a:endParaRPr lang="en-US" dirty="0">
+              <a:latin typeface="Arial" pitchFamily="34" charset="0"/>
+              <a:cs typeface="Arial" pitchFamily="34" charset="0"/>
+            </a:endParaRPr>
+          </a:p>
+        </p:txBody>
+      </p:sp>
+      <p:cxnSp>
+        <p:nvCxnSpPr>
+          <p:cNvPr id="6" name="Straight Arrow Connector 5"/>
+          <p:cNvCxnSpPr/>
+          <p:nvPr/>
+        </p:nvCxnSpPr>
+        <p:spPr>
+          <a:xfrm rot="5400000">
+            <a:off x="5067300" y="2564368"/>
+            <a:ext cx="228600" cy="1588"/>
+          </a:xfrm>
+          <a:prstGeom prst="straightConnector1">
+            <a:avLst/>
+          </a:prstGeom>
+          <a:ln>
+            <a:tailEnd type="arrow"/>
+          </a:ln>
+        </p:spPr>
+        <p:style>
+          <a:lnRef idx="1">
+            <a:schemeClr val="accent1"/>
+          </a:lnRef>
+          <a:fillRef idx="0">
+            <a:schemeClr val="accent1"/>
+          </a:fillRef>
+          <a:effectRef idx="0">
+            <a:schemeClr val="accent1"/>
+          </a:effectRef>
+          <a:fontRef idx="minor">
+            <a:schemeClr val="tx1"/>
+          </a:fontRef>
+        </p:style>
+      </p:cxnSp>
+      <p:sp>
+        <p:nvSpPr>
+          <p:cNvPr id="7" name="TextBox 6"/>
+          <p:cNvSpPr txBox="1"/>
+          <p:nvPr/>
+        </p:nvSpPr>
+        <p:spPr>
+          <a:xfrm>
+            <a:off x="3276601" y="2678668"/>
+            <a:ext cx="5057795" cy="369332"/>
+          </a:xfrm>
+          <a:prstGeom prst="rect">
+            <a:avLst/>
+          </a:prstGeom>
+          <a:noFill/>
+        </p:spPr>
+        <p:txBody>
+          <a:bodyPr wrap="none" rtlCol="0">
+            <a:spAutoFit/>
+          </a:bodyPr>
+          <a:lstStyle/>
+          <a:p>
+            <a:r>
+              <a:rPr lang="en-US" dirty="0">
+                <a:latin typeface="Arial" pitchFamily="34" charset="0"/>
+                <a:cs typeface="Arial" pitchFamily="34" charset="0"/>
+              </a:rPr>
+              <a:t>~1,200,000 sequences of ~400 basepairs each </a:t>
+            </a:r>
+            <a:endParaRPr lang="en-US" dirty="0">
+              <a:latin typeface="Arial" pitchFamily="34" charset="0"/>
+              <a:cs typeface="Arial" pitchFamily="34" charset="0"/>
+            </a:endParaRPr>
+          </a:p>
+        </p:txBody>
+      </p:sp>
+      <p:cxnSp>
+        <p:nvCxnSpPr>
+          <p:cNvPr id="8" name="Straight Arrow Connector 7"/>
+          <p:cNvCxnSpPr/>
+          <p:nvPr/>
+        </p:nvCxnSpPr>
+        <p:spPr>
+          <a:xfrm rot="5400000">
+            <a:off x="5068094" y="3173174"/>
+            <a:ext cx="228600" cy="1588"/>
+          </a:xfrm>
+          <a:prstGeom prst="straightConnector1">
+            <a:avLst/>
+          </a:prstGeom>
+          <a:ln>
+            <a:tailEnd type="arrow"/>
+          </a:ln>
+        </p:spPr>
+        <p:style>
+          <a:lnRef idx="1">
+            <a:schemeClr val="accent1"/>
+          </a:lnRef>
+          <a:fillRef idx="0">
+            <a:schemeClr val="accent1"/>
+          </a:fillRef>
+          <a:effectRef idx="0">
+            <a:schemeClr val="accent1"/>
+          </a:effectRef>
+          <a:fontRef idx="minor">
+            <a:schemeClr val="tx1"/>
+          </a:fontRef>
+        </p:style>
+      </p:cxnSp>
+      <p:sp>
+        <p:nvSpPr>
+          <p:cNvPr id="9" name="TextBox 8"/>
+          <p:cNvSpPr txBox="1"/>
+          <p:nvPr/>
+        </p:nvSpPr>
+        <p:spPr>
+          <a:xfrm>
+            <a:off x="2819400" y="3288268"/>
+            <a:ext cx="6571030" cy="369332"/>
+          </a:xfrm>
+          <a:prstGeom prst="rect">
+            <a:avLst/>
+          </a:prstGeom>
+          <a:noFill/>
+        </p:spPr>
+        <p:txBody>
+          <a:bodyPr wrap="none" rtlCol="0">
+            <a:spAutoFit/>
+          </a:bodyPr>
+          <a:lstStyle/>
+          <a:p>
+            <a:r>
+              <a:rPr lang="en-US" dirty="0">
+                <a:latin typeface="Arial" pitchFamily="34" charset="0"/>
+                <a:cs typeface="Arial" pitchFamily="34" charset="0"/>
+              </a:rPr>
+              <a:t>Group the sequences into 742 clusters (that are 97% identical)</a:t>
+            </a:r>
+            <a:endParaRPr lang="en-US" dirty="0">
+              <a:latin typeface="Arial" pitchFamily="34" charset="0"/>
+              <a:cs typeface="Arial" pitchFamily="34" charset="0"/>
+            </a:endParaRPr>
+          </a:p>
+        </p:txBody>
+      </p:sp>
+      <p:cxnSp>
+        <p:nvCxnSpPr>
+          <p:cNvPr id="10" name="Straight Arrow Connector 9"/>
+          <p:cNvCxnSpPr/>
+          <p:nvPr/>
+        </p:nvCxnSpPr>
+        <p:spPr>
+          <a:xfrm rot="5400000">
+            <a:off x="5068094" y="1953974"/>
+            <a:ext cx="228600" cy="1588"/>
+          </a:xfrm>
+          <a:prstGeom prst="straightConnector1">
+            <a:avLst/>
+          </a:prstGeom>
+          <a:ln>
+            <a:tailEnd type="arrow"/>
+          </a:ln>
+        </p:spPr>
+        <p:style>
+          <a:lnRef idx="1">
+            <a:schemeClr val="accent1"/>
+          </a:lnRef>
+          <a:fillRef idx="0">
+            <a:schemeClr val="accent1"/>
+          </a:fillRef>
+          <a:effectRef idx="0">
+            <a:schemeClr val="accent1"/>
+          </a:effectRef>
+          <a:fontRef idx="minor">
+            <a:schemeClr val="tx1"/>
+          </a:fontRef>
+        </p:style>
+      </p:cxnSp>
+      <p:sp>
+        <p:nvSpPr>
+          <p:cNvPr id="12" name="Rectangle 11"/>
+          <p:cNvSpPr/>
+          <p:nvPr/>
+        </p:nvSpPr>
+        <p:spPr>
+          <a:xfrm>
+            <a:off x="2362200" y="6324601"/>
+            <a:ext cx="8229600" cy="430887"/>
+          </a:xfrm>
+          <a:prstGeom prst="rect">
+            <a:avLst/>
+          </a:prstGeom>
+        </p:spPr>
+        <p:txBody>
+          <a:bodyPr wrap="square">
+            <a:spAutoFit/>
+          </a:bodyPr>
+          <a:lstStyle/>
+          <a:p>
+            <a:r>
+              <a:rPr lang="en-US" sz="1100" dirty="0">
+                <a:latin typeface="Arial" pitchFamily="34" charset="0"/>
+                <a:cs typeface="Arial" pitchFamily="34" charset="0"/>
+              </a:rPr>
+              <a:t>Nina </a:t>
+            </a:r>
+            <a:r>
+              <a:rPr lang="en-US" sz="1100" dirty="0" err="1">
+                <a:latin typeface="Arial" pitchFamily="34" charset="0"/>
+                <a:cs typeface="Arial" pitchFamily="34" charset="0"/>
+              </a:rPr>
+              <a:t>Sanapareddy</a:t>
+            </a:r>
+            <a:r>
+              <a:rPr lang="en-US" sz="1100" dirty="0">
+                <a:latin typeface="Arial" pitchFamily="34" charset="0"/>
+                <a:cs typeface="Arial" pitchFamily="34" charset="0"/>
+              </a:rPr>
+              <a:t>, Ryan M </a:t>
+            </a:r>
+            <a:r>
+              <a:rPr lang="en-US" sz="1100" dirty="0" err="1">
+                <a:latin typeface="Arial" pitchFamily="34" charset="0"/>
+                <a:cs typeface="Arial" pitchFamily="34" charset="0"/>
+              </a:rPr>
+              <a:t>Legge</a:t>
+            </a:r>
+            <a:r>
+              <a:rPr lang="en-US" sz="1100" dirty="0">
+                <a:latin typeface="Arial" pitchFamily="34" charset="0"/>
+                <a:cs typeface="Arial" pitchFamily="34" charset="0"/>
+              </a:rPr>
+              <a:t>, </a:t>
+            </a:r>
+            <a:r>
+              <a:rPr lang="en-US" sz="1100" dirty="0" err="1">
+                <a:latin typeface="Arial" pitchFamily="34" charset="0"/>
+                <a:cs typeface="Arial" pitchFamily="34" charset="0"/>
+              </a:rPr>
+              <a:t>Biljana</a:t>
+            </a:r>
+            <a:r>
+              <a:rPr lang="en-US" sz="1100" dirty="0">
+                <a:latin typeface="Arial" pitchFamily="34" charset="0"/>
+                <a:cs typeface="Arial" pitchFamily="34" charset="0"/>
+              </a:rPr>
+              <a:t> </a:t>
+            </a:r>
+            <a:r>
+              <a:rPr lang="en-US" sz="1100" dirty="0" err="1">
+                <a:latin typeface="Arial" pitchFamily="34" charset="0"/>
+                <a:cs typeface="Arial" pitchFamily="34" charset="0"/>
+              </a:rPr>
+              <a:t>Jovov</a:t>
+            </a:r>
+            <a:r>
+              <a:rPr lang="en-US" sz="1100" dirty="0">
+                <a:latin typeface="Arial" pitchFamily="34" charset="0"/>
+                <a:cs typeface="Arial" pitchFamily="34" charset="0"/>
+              </a:rPr>
+              <a:t>, Amber McCoy, Lauren </a:t>
+            </a:r>
+            <a:r>
+              <a:rPr lang="en-US" sz="1100" dirty="0" err="1">
+                <a:latin typeface="Arial" pitchFamily="34" charset="0"/>
+                <a:cs typeface="Arial" pitchFamily="34" charset="0"/>
+              </a:rPr>
+              <a:t>Burcal</a:t>
+            </a:r>
+            <a:r>
+              <a:rPr lang="en-US" sz="1100" dirty="0">
+                <a:latin typeface="Arial" pitchFamily="34" charset="0"/>
+                <a:cs typeface="Arial" pitchFamily="34" charset="0"/>
+              </a:rPr>
+              <a:t>, Felix </a:t>
+            </a:r>
+            <a:r>
+              <a:rPr lang="en-US" sz="1100" dirty="0" err="1">
+                <a:latin typeface="Arial" pitchFamily="34" charset="0"/>
+                <a:cs typeface="Arial" pitchFamily="34" charset="0"/>
+              </a:rPr>
+              <a:t>Araujo</a:t>
+            </a:r>
+            <a:r>
+              <a:rPr lang="en-US" sz="1100" dirty="0">
+                <a:latin typeface="Arial" pitchFamily="34" charset="0"/>
+                <a:cs typeface="Arial" pitchFamily="34" charset="0"/>
+              </a:rPr>
+              <a:t>-Perez, Thomas A Randall, Joseph </a:t>
+            </a:r>
+            <a:r>
+              <a:rPr lang="en-US" sz="1100" dirty="0" err="1">
+                <a:latin typeface="Arial" pitchFamily="34" charset="0"/>
+                <a:cs typeface="Arial" pitchFamily="34" charset="0"/>
+              </a:rPr>
+              <a:t>Galanko</a:t>
+            </a:r>
+            <a:r>
+              <a:rPr lang="en-US" sz="1100" dirty="0">
+                <a:latin typeface="Arial" pitchFamily="34" charset="0"/>
+                <a:cs typeface="Arial" pitchFamily="34" charset="0"/>
+              </a:rPr>
+              <a:t>, Andrew Benson, Robert S Sandler, John F Rawls, </a:t>
+            </a:r>
+            <a:r>
+              <a:rPr lang="en-US" sz="1100" dirty="0" err="1">
+                <a:latin typeface="Arial" pitchFamily="34" charset="0"/>
+                <a:cs typeface="Arial" pitchFamily="34" charset="0"/>
+              </a:rPr>
+              <a:t>Zaid</a:t>
+            </a:r>
+            <a:r>
+              <a:rPr lang="en-US" sz="1100" dirty="0">
+                <a:latin typeface="Arial" pitchFamily="34" charset="0"/>
+                <a:cs typeface="Arial" pitchFamily="34" charset="0"/>
+              </a:rPr>
+              <a:t> </a:t>
+            </a:r>
+            <a:r>
+              <a:rPr lang="en-US" sz="1100" dirty="0" err="1">
+                <a:latin typeface="Arial" pitchFamily="34" charset="0"/>
+                <a:cs typeface="Arial" pitchFamily="34" charset="0"/>
+              </a:rPr>
+              <a:t>Abdo</a:t>
+            </a:r>
+            <a:r>
+              <a:rPr lang="en-US" sz="1100" dirty="0">
+                <a:latin typeface="Arial" pitchFamily="34" charset="0"/>
+                <a:cs typeface="Arial" pitchFamily="34" charset="0"/>
+              </a:rPr>
+              <a:t>, Anthony A Fodor </a:t>
+            </a:r>
+            <a:r>
+              <a:rPr lang="en-US" sz="1100" dirty="0" err="1">
+                <a:latin typeface="Arial" pitchFamily="34" charset="0"/>
+                <a:cs typeface="Arial" pitchFamily="34" charset="0"/>
+              </a:rPr>
+              <a:t>Temitope</a:t>
+            </a:r>
+            <a:r>
+              <a:rPr lang="en-US" sz="1100" dirty="0">
+                <a:latin typeface="Arial" pitchFamily="34" charset="0"/>
+                <a:cs typeface="Arial" pitchFamily="34" charset="0"/>
+              </a:rPr>
+              <a:t> O </a:t>
+            </a:r>
+            <a:r>
+              <a:rPr lang="en-US" sz="1100" dirty="0" err="1">
+                <a:latin typeface="Arial" pitchFamily="34" charset="0"/>
+                <a:cs typeface="Arial" pitchFamily="34" charset="0"/>
+              </a:rPr>
+              <a:t>Keku</a:t>
+            </a:r>
+            <a:r>
+              <a:rPr lang="en-US" sz="1100" dirty="0">
+                <a:latin typeface="Arial" pitchFamily="34" charset="0"/>
+                <a:cs typeface="Arial" pitchFamily="34" charset="0"/>
+              </a:rPr>
+              <a:t>. ISME J. 2012</a:t>
+            </a:r>
+            <a:endParaRPr lang="en-US" sz="1100" dirty="0">
+              <a:latin typeface="Arial" pitchFamily="34" charset="0"/>
+              <a:cs typeface="Arial" pitchFamily="34" charset="0"/>
+            </a:endParaRPr>
+          </a:p>
+        </p:txBody>
+      </p:sp>
+      <p:sp>
+        <p:nvSpPr>
+          <p:cNvPr id="11" name="TextBox 10"/>
+          <p:cNvSpPr txBox="1"/>
+          <p:nvPr/>
+        </p:nvSpPr>
+        <p:spPr>
+          <a:xfrm>
+            <a:off x="1624396" y="76201"/>
+            <a:ext cx="9119804" cy="830997"/>
+          </a:xfrm>
+          <a:prstGeom prst="rect">
+            <a:avLst/>
+          </a:prstGeom>
+          <a:noFill/>
+        </p:spPr>
+        <p:txBody>
+          <a:bodyPr wrap="none" rtlCol="0">
+            <a:spAutoFit/>
+          </a:bodyPr>
+          <a:lstStyle/>
+          <a:p>
+            <a:r>
+              <a:rPr lang="en-US" sz="2400" dirty="0">
+                <a:latin typeface="Arial" pitchFamily="34" charset="0"/>
+                <a:cs typeface="Arial" pitchFamily="34" charset="0"/>
+              </a:rPr>
+              <a:t>Is there a microbial signature associated with the development of </a:t>
+            </a:r>
+          </a:p>
+          <a:p>
+            <a:r>
+              <a:rPr lang="en-US" sz="2400" b="1" dirty="0">
+                <a:solidFill>
+                  <a:srgbClr val="FF0000"/>
+                </a:solidFill>
+                <a:latin typeface="Arial" pitchFamily="34" charset="0"/>
+                <a:cs typeface="Arial" pitchFamily="34" charset="0"/>
+              </a:rPr>
+              <a:t>                             colorectal adenomas?</a:t>
+            </a:r>
+            <a:endParaRPr lang="en-US" sz="2400" dirty="0">
+              <a:solidFill>
+                <a:srgbClr val="FF0000"/>
+              </a:solidFill>
+              <a:latin typeface="Arial" pitchFamily="34" charset="0"/>
+              <a:cs typeface="Arial" pitchFamily="34" charset="0"/>
+            </a:endParaRPr>
+          </a:p>
+        </p:txBody>
+      </p:sp>
+      <p:sp>
+        <p:nvSpPr>
+          <p:cNvPr id="13" name="Rectangle 12"/>
+          <p:cNvSpPr/>
+          <p:nvPr/>
+        </p:nvSpPr>
+        <p:spPr>
+          <a:xfrm>
+            <a:off x="2667000" y="5943600"/>
+            <a:ext cx="7696200" cy="369332"/>
+          </a:xfrm>
+          <a:prstGeom prst="rect">
+            <a:avLst/>
+          </a:prstGeom>
+        </p:spPr>
+        <p:txBody>
+          <a:bodyPr wrap="square">
+            <a:spAutoFit/>
+          </a:bodyPr>
+          <a:lstStyle/>
+          <a:p>
+            <a:r>
+              <a:rPr lang="en-US" dirty="0">
+                <a:hlinkClick r:id="rId3"/>
+              </a:rPr>
+              <a:t>http://www.nature.com/ismej/journal/v6/n10/full/ismej201243a.html</a:t>
+            </a:r>
+            <a:endParaRPr lang="en-US" dirty="0"/>
+          </a:p>
+        </p:txBody>
+      </p:sp>
+      <p:sp>
+        <p:nvSpPr>
+          <p:cNvPr id="55298" name="AutoShape 2" descr="data:image/jpeg;base64,/9j/4AAQSkZJRgABAQAAAQABAAD/2wCEAAkGBhQSERQUEhMWFBQVFRoaGBQXGRUfIBoUFSAdHBUZGBgXICcfGx0mHB0VIzEgLycsLCwtGB49NTAsNSkrOCkBCQoKDgwOGg8PGiwkHyQ0LSwpLSwpKS0sLCwsKSwpLCwsNSwsKSwsLCwsKSwsKSwsLCwsKSwpKSwpLCksKSwsLP/AABEIAGMATwMBIgACEQEDEQH/xAAcAAABBAMBAAAAAAAAAAAAAAAGAwQFBwABAgj/xAA2EAACAQMCBAQEBQMEAwAAAAABAhEAAyEEEgUxQVEGByJhEzJxgUKRobHBFPDxFSOCklJicv/EABkBAAMBAQEAAAAAAAAAAAAAAAMEBQIBAP/EACARAAMAAgICAwEAAAAAAAAAAAABAgMRITESEwRBYSL/2gAMAwEAAhEDEQA/ALEC11trsLXRxzqjsjaGeu1qWbbXHPpUSf8AHecRVYeJPNxwzLpyqqPlYAMW7yW+UewH3pDzL8Z7nNmxdJVfmURG8yJ3HJMHpABqsbvbtzx+nvQMmXXCHcOBa3QXnzW4gDm8DBmNi/YGOdSmg859SrE3FR1MYPT3Uj9qr6zpT0GO3tS6cNkdQRQPdS+xn0y/ov3wf48ta47IKXByHRvp17mis268v6HU3bDq9p2R1MqVMEff+KuPwh5sWr4S1qQbd0+k3MbS3c/+M0xGVUKZcDnlB78OtFKWGRitFaKLaM2UKeYvG/6bSMZgkFR/yECJPejACqi86eNqQtgSSGDHtABH7k/lWXWk2FxxukiqHcdBJ55pbS6MsQT150hp8tFFXDdEO1TMlaLOKPLk1w/gJIkCR/eadXOFkdKKOEaVtuBiImuLunktIilKsfiFoCNXpIqKcG2ZHWf1/Y0XcX0uzLECeVQOrtBlMZjv7UzitimaEXv4D43/AFWltkmXRED/AP1HX8qJDbqtPIa9u019Ygo4nlkMDE/T+atLZVLyIlTpsSYQK82eZ+tNzXXSREmB09K4X9Bz969MNbkH+8da87+aHC4vC6QVDhj7SG9KjqTtK1iuZYTDxQHcKP8AuLJge/ejOztRQzH0nlEeozEDnH5fSoHhHDhFtyJmcxRO3Cw6gosHnK9x1qXkqdrZbxRSngY3eJtBKNcVREmXjMxuP0n8ql9PqLipDDKiTvOYx0+4poeHgzLH1GWw2T3IHM040WkLHaoJgQq9Y6kxyrFNaCxNbIvXXlMMoZrkFmLQIUwVVBzkZnv0rdviF1xbX4m7eM22kqoLQAwP5479K7/09txU49z+gM1s8Pa22+IYGR7Ecj71uaSB1jph15Q8MFq5qNgKqbjoATOLOGbdAn1tHtVoFaGPLDRheH2nj1Puljn8bHHtMn6mi0iqHkRbXLEwtV95peE31Kp8Nd7bgABzU5G73XlI9qsQCktbY3IwgkkEYMc8c66q0zK/DzZw22q2nV3IuLc9CxhkJYOy9oIAqZ4Xq9pE8qIeM+W974u4qxAYsNkEAARnAzEn3zyoOt3YNJ/KxJcor/Ezb4YW3tSLqhZhZkx1qKGiuAlhqGG35VUDbH/tiSfvTNLzEQhA+tdLdJHrulfYARSikedDTVaNt+57jEn3MR7D+aU4hrpWJnFNuIbfwXGY/bFOPD/BG1eptWEkyRubsgy7H7UaI20AyX4pl6eDdJ8PQaZe1lT929X81MEVlm3tAA5AAD6DArqnSO1s5ArcVG63jiW3W2Jd3MAAGBgmWYCBgNjnioHifGNQ0GGt2+ly31nGZzI7exrjpI1ONsfeL/GdnRWmBYNeI9FkHMnkWH4V96oW7aYjcue4/kUWce8IkM960C1n8Ts4Zt0lXfnJXcB6veoOxa2ypwQaWyW9j+LGkuCN0/EYMHB96ltPq7UerJptqtCjc1z3qNu8NjkT+dC/ljCdSP8AX6u3+HHvVzeWXh23Y0du8F/3b6BmY89pyqjsIzHfnVAFINFvhbiuptqrWb7IZjbMghTAlSSMD6fpTGPSFczdHoSK5YUAcM80dpZdXaKhDBuoJ9iSnOM9J+lGmh43ZvCbV1WkTE5/6nP6UUVcgZb0f9Nuf4jFCd6qAzfnuME9oA/U0pp9bp9QN103DA2kMSNrNnkpgNBwRH0ploPETXiqXHQXJ2qWVgrhJ3bmB2h94xGJXK5pQyl5fU7NcDgshX5gQ0sgEE7oJPKGJrC/Qx3xzTaghRYRLqozSCVClIzuYGQWwAeRJMxQxxrw4xVb9m26q07rTfPaK4ZW7ke0yM0TOEtqbl24u0AEsgYKBdIFwCOXpCiD0AzXfEOGkFfhG4i/ELIihe3Pc0yvP3AJEVm432bmnL2VjvpDUPRz4ut2vgJqNiF7jOdsMzNBnmkGAJ6cozUWOEop23bNs+uS63LmLZAlRGAJYQxgdzmg+ljHuWugHuWWZgqqWdjCqokk+wFFfA/Dl22hDAK5WdhIku3ykE+mCBt745SDRk3AdOhA06tbN6EO0ZUjLkXDJHYiY7U34pwpgyPdAbeCGUZQlWIEgcjHqI6GSKNK1wAutkNw+1uQEMxDBSVK28c90OZnaQT2hiM06u6BvVtS0z5AJknYphd55Ax1AkgCnT6Nrd2zsEtn0gjaQFIAyMTyDDn6dwpbhmrV7QYqxCGT6SChubvT6pDKScHlg9a0jATcW4bac+q2phlYYHzblWSORMM2T3qL41aFnS6j4QC7PiqsdFC4Gf3rKyvT0eOvBlkXNLa3CfiadHfpLqYDY6x160vwzVv/AKhqLW4/DW0rKnQMygsR9SSfvWVlDZwS4zaH9Izx6lWyQfcMBPvgkUGpb9HMiJXBYSqsSAYORKrg9qyso09HSduEiwlwFg5WSQSMxumAYmSf8Utf0yi1gfPqvVk5lASPYT05ZNZWVh9nhbh9kXLNhHypLqckHapfb6hnG1czOKaajTj4rWc/CLRtk8gu4CZmN2edarK9PTOH/9k="/>
+          <p:cNvSpPr>
+            <a:spLocks noChangeAspect="1" noChangeArrowheads="1"/>
+          </p:cNvSpPr>
+          <p:nvPr/>
+        </p:nvSpPr>
+        <p:spPr bwMode="auto">
+          <a:xfrm>
+            <a:off x="1679575" y="-144463"/>
+            <a:ext cx="304800" cy="304801"/>
+          </a:xfrm>
+          <a:prstGeom prst="rect">
+            <a:avLst/>
+          </a:prstGeom>
+          <a:noFill/>
+        </p:spPr>
+        <p:txBody>
+          <a:bodyPr vert="horz" wrap="square" lIns="91440" tIns="45720" rIns="91440" bIns="45720" numCol="1" anchor="t" anchorCtr="0" compatLnSpc="1">
+            <a:prstTxWarp prst="textNoShape">
+              <a:avLst/>
+            </a:prstTxWarp>
+          </a:bodyPr>
+          <a:lstStyle/>
+          <a:p>
+            <a:endParaRPr lang="en-US"/>
+          </a:p>
+        </p:txBody>
+      </p:sp>
+      <p:pic>
+        <p:nvPicPr>
+          <p:cNvPr id="55300" name="Picture 4" descr="http://www.med.unc.edu/oge/stad/transmed/current-trainees-1/mentor-photos/keku.jpg"/>
+          <p:cNvPicPr>
+            <a:picLocks noChangeAspect="1" noChangeArrowheads="1"/>
+          </p:cNvPicPr>
+          <p:nvPr/>
+        </p:nvPicPr>
+        <p:blipFill>
+          <a:blip r:embed="rId4" cstate="print"/>
+          <a:srcRect/>
+          <a:stretch>
+            <a:fillRect/>
+          </a:stretch>
+        </p:blipFill>
+        <p:spPr bwMode="auto">
+          <a:xfrm>
+            <a:off x="4220963" y="4114801"/>
+            <a:ext cx="942975" cy="1181101"/>
+          </a:xfrm>
+          <a:prstGeom prst="rect">
+            <a:avLst/>
+          </a:prstGeom>
+          <a:noFill/>
+        </p:spPr>
+      </p:pic>
+      <p:sp>
+        <p:nvSpPr>
+          <p:cNvPr id="14" name="Rectangle 13"/>
+          <p:cNvSpPr/>
+          <p:nvPr/>
+        </p:nvSpPr>
+        <p:spPr>
+          <a:xfrm>
+            <a:off x="3839962" y="5334000"/>
+            <a:ext cx="1570238" cy="369332"/>
+          </a:xfrm>
+          <a:prstGeom prst="rect">
+            <a:avLst/>
+          </a:prstGeom>
+        </p:spPr>
+        <p:txBody>
+          <a:bodyPr wrap="none">
+            <a:spAutoFit/>
+          </a:bodyPr>
+          <a:lstStyle/>
+          <a:p>
+            <a:r>
+              <a:rPr lang="en-US" dirty="0" err="1"/>
+              <a:t>Temitope</a:t>
+            </a:r>
+            <a:r>
+              <a:rPr lang="en-US" dirty="0"/>
+              <a:t> </a:t>
+            </a:r>
+            <a:r>
+              <a:rPr lang="en-US" dirty="0" err="1"/>
+              <a:t>Keku</a:t>
+            </a:r>
+            <a:endParaRPr lang="en-US" dirty="0"/>
+          </a:p>
+        </p:txBody>
+      </p:sp>
+      <p:pic>
+        <p:nvPicPr>
+          <p:cNvPr id="55301" name="Picture 5"/>
+          <p:cNvPicPr>
+            <a:picLocks noChangeAspect="1" noChangeArrowheads="1"/>
+          </p:cNvPicPr>
+          <p:nvPr/>
+        </p:nvPicPr>
+        <p:blipFill>
+          <a:blip r:embed="rId5" cstate="print"/>
+          <a:srcRect/>
+          <a:stretch>
+            <a:fillRect/>
+          </a:stretch>
+        </p:blipFill>
+        <p:spPr bwMode="auto">
+          <a:xfrm>
+            <a:off x="6512509" y="4038600"/>
+            <a:ext cx="793630" cy="1371600"/>
+          </a:xfrm>
+          <a:prstGeom prst="rect">
+            <a:avLst/>
+          </a:prstGeom>
+          <a:noFill/>
+          <a:ln w="9525">
+            <a:noFill/>
+            <a:miter lim="800000"/>
+            <a:headEnd/>
+            <a:tailEnd/>
+          </a:ln>
+        </p:spPr>
+      </p:pic>
+      <p:sp>
+        <p:nvSpPr>
+          <p:cNvPr id="16" name="Rectangle 15"/>
+          <p:cNvSpPr/>
+          <p:nvPr/>
+        </p:nvSpPr>
+        <p:spPr>
+          <a:xfrm>
+            <a:off x="6047170" y="5421868"/>
+            <a:ext cx="1877630" cy="369332"/>
+          </a:xfrm>
+          <a:prstGeom prst="rect">
+            <a:avLst/>
+          </a:prstGeom>
+        </p:spPr>
+        <p:txBody>
+          <a:bodyPr wrap="none">
+            <a:spAutoFit/>
+          </a:bodyPr>
+          <a:lstStyle/>
+          <a:p>
+            <a:r>
+              <a:rPr lang="en-US" dirty="0"/>
+              <a:t>Nina </a:t>
+            </a:r>
+            <a:r>
+              <a:rPr lang="en-US" dirty="0" err="1"/>
+              <a:t>Sanapareddy</a:t>
+            </a:r>
+            <a:endParaRPr lang="en-US" dirty="0"/>
+          </a:p>
+        </p:txBody>
+      </p:sp>
+    </p:spTree>
+    <p:extLst>
+      <p:ext uri="{BB962C8B-B14F-4D97-AF65-F5344CB8AC3E}">
+        <p14:creationId xmlns:p14="http://schemas.microsoft.com/office/powerpoint/2010/main" val="791063030"/>
+      </p:ext>
+    </p:extLst>
+  </p:cSld>
+  <p:clrMapOvr>
+    <a:masterClrMapping/>
+  </p:clrMapOvr>
+  <p:timing>
+    <p:tnLst>
+      <p:par>
+        <p:cTn id="1" dur="indefinite" restart="never" nodeType="tmRoot"/>
+      </p:par>
+    </p:tnLst>
+  </p:timing>
+</p:sld>
+</file>
+
+<file path=ppt/slides/slide45.xml><?xml version="1.0" encoding="utf-8"?>
+<p:sld xmlns:a="http://schemas.openxmlformats.org/drawingml/2006/main" xmlns:r="http://schemas.openxmlformats.org/officeDocument/2006/relationships" xmlns:p="http://schemas.openxmlformats.org/presentationml/2006/main">
+  <p:cSld>
+    <p:spTree>
+      <p:nvGrpSpPr>
+        <p:cNvPr id="1" name=""/>
+        <p:cNvGrpSpPr/>
+        <p:nvPr/>
+      </p:nvGrpSpPr>
+      <p:grpSpPr>
+        <a:xfrm>
+          <a:off x="0" y="0"/>
+          <a:ext cx="0" cy="0"/>
+          <a:chOff x="0" y="0"/>
+          <a:chExt cx="0" cy="0"/>
+        </a:xfrm>
+      </p:grpSpPr>
+      <p:pic>
+        <p:nvPicPr>
+          <p:cNvPr id="1026" name="Picture 2"/>
+          <p:cNvPicPr>
+            <a:picLocks noChangeAspect="1" noChangeArrowheads="1"/>
+          </p:cNvPicPr>
+          <p:nvPr/>
+        </p:nvPicPr>
+        <p:blipFill>
+          <a:blip r:embed="rId3" cstate="print"/>
+          <a:srcRect/>
+          <a:stretch>
+            <a:fillRect/>
+          </a:stretch>
+        </p:blipFill>
+        <p:spPr bwMode="auto">
+          <a:xfrm>
+            <a:off x="4215288" y="762000"/>
+            <a:ext cx="6147912" cy="5943600"/>
+          </a:xfrm>
+          <a:prstGeom prst="rect">
+            <a:avLst/>
+          </a:prstGeom>
+          <a:noFill/>
+          <a:ln w="9525">
+            <a:noFill/>
+            <a:miter lim="800000"/>
+            <a:headEnd/>
+            <a:tailEnd/>
+          </a:ln>
+        </p:spPr>
+      </p:pic>
+      <p:sp>
+        <p:nvSpPr>
+          <p:cNvPr id="5" name="TextBox 4"/>
+          <p:cNvSpPr txBox="1"/>
+          <p:nvPr/>
+        </p:nvSpPr>
+        <p:spPr>
+          <a:xfrm>
+            <a:off x="1550534" y="2133600"/>
+            <a:ext cx="2799164" cy="523220"/>
+          </a:xfrm>
+          <a:prstGeom prst="rect">
+            <a:avLst/>
+          </a:prstGeom>
+          <a:noFill/>
+        </p:spPr>
+        <p:txBody>
+          <a:bodyPr wrap="none" rtlCol="0">
+            <a:spAutoFit/>
+          </a:bodyPr>
+          <a:lstStyle/>
+          <a:p>
+            <a:r>
+              <a:rPr lang="en-US" sz="1400" dirty="0">
+                <a:latin typeface="Arial" pitchFamily="34" charset="0"/>
+              </a:rPr>
+              <a:t>87 </a:t>
+            </a:r>
+            <a:r>
+              <a:rPr lang="en-US" sz="1400" dirty="0" err="1">
+                <a:latin typeface="Arial" pitchFamily="34" charset="0"/>
+              </a:rPr>
+              <a:t>taxa</a:t>
+            </a:r>
+            <a:r>
+              <a:rPr lang="en-US" sz="1400" dirty="0">
+                <a:latin typeface="Arial" pitchFamily="34" charset="0"/>
+              </a:rPr>
+              <a:t> more abundant in case</a:t>
+            </a:r>
+          </a:p>
+          <a:p>
+            <a:r>
+              <a:rPr lang="en-US" sz="1400" dirty="0">
+                <a:latin typeface="Arial" pitchFamily="34" charset="0"/>
+              </a:rPr>
+              <a:t> 5 </a:t>
+            </a:r>
+            <a:r>
+              <a:rPr lang="en-US" sz="1400" dirty="0" err="1">
+                <a:latin typeface="Arial" pitchFamily="34" charset="0"/>
+              </a:rPr>
+              <a:t>taxa</a:t>
+            </a:r>
+            <a:r>
+              <a:rPr lang="en-US" sz="1400" dirty="0">
+                <a:latin typeface="Arial" pitchFamily="34" charset="0"/>
+              </a:rPr>
+              <a:t> more abundant in control</a:t>
+            </a:r>
+            <a:endParaRPr lang="en-US" sz="1400" dirty="0">
+              <a:latin typeface="Arial" pitchFamily="34" charset="0"/>
+            </a:endParaRPr>
+          </a:p>
+        </p:txBody>
+      </p:sp>
+      <p:sp>
+        <p:nvSpPr>
+          <p:cNvPr id="6" name="TextBox 5"/>
+          <p:cNvSpPr txBox="1"/>
+          <p:nvPr/>
+        </p:nvSpPr>
+        <p:spPr>
+          <a:xfrm>
+            <a:off x="2123403" y="152400"/>
+            <a:ext cx="6737807" cy="369332"/>
+          </a:xfrm>
+          <a:prstGeom prst="rect">
+            <a:avLst/>
+          </a:prstGeom>
+          <a:noFill/>
+        </p:spPr>
+        <p:txBody>
+          <a:bodyPr wrap="none" rtlCol="0">
+            <a:spAutoFit/>
+          </a:bodyPr>
+          <a:lstStyle/>
+          <a:p>
+            <a:r>
+              <a:rPr lang="en-US" dirty="0">
+                <a:latin typeface="Arial" pitchFamily="34" charset="0"/>
+                <a:cs typeface="Arial" pitchFamily="34" charset="0"/>
+              </a:rPr>
+              <a:t>A large number of taxa are </a:t>
+            </a:r>
+            <a:r>
+              <a:rPr lang="en-US" dirty="0">
+                <a:solidFill>
+                  <a:srgbClr val="FF0000"/>
+                </a:solidFill>
+                <a:latin typeface="Arial" pitchFamily="34" charset="0"/>
+                <a:cs typeface="Arial" pitchFamily="34" charset="0"/>
+              </a:rPr>
+              <a:t>associated </a:t>
+            </a:r>
+            <a:r>
+              <a:rPr lang="en-US" dirty="0">
+                <a:latin typeface="Arial" pitchFamily="34" charset="0"/>
+                <a:cs typeface="Arial" pitchFamily="34" charset="0"/>
+              </a:rPr>
+              <a:t>with </a:t>
+            </a:r>
+            <a:r>
+              <a:rPr lang="en-US" dirty="0">
+                <a:solidFill>
+                  <a:srgbClr val="FF0000"/>
+                </a:solidFill>
+                <a:latin typeface="Arial" pitchFamily="34" charset="0"/>
+                <a:cs typeface="Arial" pitchFamily="34" charset="0"/>
+              </a:rPr>
+              <a:t>colorectal adenomas</a:t>
+            </a:r>
+            <a:endParaRPr lang="en-US" dirty="0">
+              <a:solidFill>
+                <a:srgbClr val="FF0000"/>
+              </a:solidFill>
+              <a:latin typeface="Arial" pitchFamily="34" charset="0"/>
+              <a:cs typeface="Arial" pitchFamily="34" charset="0"/>
+            </a:endParaRPr>
+          </a:p>
+        </p:txBody>
+      </p:sp>
+    </p:spTree>
+    <p:extLst>
+      <p:ext uri="{BB962C8B-B14F-4D97-AF65-F5344CB8AC3E}">
+        <p14:creationId xmlns:p14="http://schemas.microsoft.com/office/powerpoint/2010/main" val="3607637606"/>
+      </p:ext>
+    </p:extLst>
+  </p:cSld>
+  <p:clrMapOvr>
+    <a:masterClrMapping/>
+  </p:clrMapOvr>
+  <p:timing>
+    <p:tnLst>
+      <p:par>
+        <p:cTn id="1" dur="indefinite" restart="never" nodeType="tmRoot"/>
+      </p:par>
+    </p:tnLst>
+  </p:timing>
+</p:sld>
+</file>
+
+<file path=ppt/slides/slide46.xml><?xml version="1.0" encoding="utf-8"?>
+<p:sld xmlns:a="http://schemas.openxmlformats.org/drawingml/2006/main" xmlns:r="http://schemas.openxmlformats.org/officeDocument/2006/relationships" xmlns:p="http://schemas.openxmlformats.org/presentationml/2006/main">
+  <p:cSld>
+    <p:spTree>
+      <p:nvGrpSpPr>
+        <p:cNvPr id="1" name=""/>
+        <p:cNvGrpSpPr/>
+        <p:nvPr/>
+      </p:nvGrpSpPr>
+      <p:grpSpPr>
+        <a:xfrm>
+          <a:off x="0" y="0"/>
+          <a:ext cx="0" cy="0"/>
+          <a:chOff x="0" y="0"/>
+          <a:chExt cx="0" cy="0"/>
+        </a:xfrm>
+      </p:grpSpPr>
+      <p:sp>
+        <p:nvSpPr>
+          <p:cNvPr id="2" name="TextBox 1"/>
+          <p:cNvSpPr txBox="1"/>
+          <p:nvPr/>
+        </p:nvSpPr>
+        <p:spPr>
+          <a:xfrm>
+            <a:off x="368135" y="237508"/>
+            <a:ext cx="10632141" cy="369332"/>
+          </a:xfrm>
+          <a:prstGeom prst="rect">
+            <a:avLst/>
+          </a:prstGeom>
+          <a:noFill/>
+        </p:spPr>
+        <p:txBody>
+          <a:bodyPr wrap="none" rtlCol="0">
+            <a:spAutoFit/>
+          </a:bodyPr>
+          <a:lstStyle/>
+          <a:p>
+            <a:r>
+              <a:rPr lang="en-US" dirty="0" smtClean="0">
+                <a:latin typeface="Arial" panose="020B0604020202020204" pitchFamily="34" charset="0"/>
+                <a:cs typeface="Arial" panose="020B0604020202020204" pitchFamily="34" charset="0"/>
+              </a:rPr>
+              <a:t>A version of the dataset is here..  (note this is a different taxonomic scheme than the published data…)</a:t>
+            </a:r>
+            <a:endParaRPr lang="en-US" dirty="0">
+              <a:latin typeface="Arial" panose="020B0604020202020204" pitchFamily="34" charset="0"/>
+              <a:cs typeface="Arial" panose="020B0604020202020204" pitchFamily="34" charset="0"/>
+            </a:endParaRPr>
+          </a:p>
+        </p:txBody>
+      </p:sp>
+      <p:pic>
+        <p:nvPicPr>
+          <p:cNvPr id="4" name="Picture 3"/>
+          <p:cNvPicPr>
+            <a:picLocks noChangeAspect="1"/>
+          </p:cNvPicPr>
+          <p:nvPr/>
+        </p:nvPicPr>
+        <p:blipFill>
+          <a:blip r:embed="rId2"/>
+          <a:stretch>
+            <a:fillRect/>
+          </a:stretch>
+        </p:blipFill>
+        <p:spPr>
+          <a:xfrm>
+            <a:off x="1475261" y="1150607"/>
+            <a:ext cx="9271907" cy="4710727"/>
+          </a:xfrm>
+          <a:prstGeom prst="rect">
+            <a:avLst/>
+          </a:prstGeom>
+        </p:spPr>
+      </p:pic>
+      <p:sp>
+        <p:nvSpPr>
+          <p:cNvPr id="5" name="TextBox 4"/>
+          <p:cNvSpPr txBox="1"/>
+          <p:nvPr/>
+        </p:nvSpPr>
+        <p:spPr>
+          <a:xfrm>
+            <a:off x="190005" y="1116281"/>
+            <a:ext cx="1236236" cy="369332"/>
+          </a:xfrm>
+          <a:prstGeom prst="rect">
+            <a:avLst/>
+          </a:prstGeom>
+          <a:noFill/>
+        </p:spPr>
+        <p:txBody>
+          <a:bodyPr wrap="none" rtlCol="0">
+            <a:spAutoFit/>
+          </a:bodyPr>
+          <a:lstStyle/>
+          <a:p>
+            <a:r>
+              <a:rPr lang="en-US" dirty="0" smtClean="0"/>
+              <a:t>71 samples</a:t>
+            </a:r>
+            <a:endParaRPr lang="en-US" dirty="0"/>
+          </a:p>
+        </p:txBody>
+      </p:sp>
+      <p:cxnSp>
+        <p:nvCxnSpPr>
+          <p:cNvPr id="7" name="Straight Arrow Connector 6"/>
+          <p:cNvCxnSpPr/>
+          <p:nvPr/>
+        </p:nvCxnSpPr>
+        <p:spPr>
+          <a:xfrm>
+            <a:off x="902525" y="1567543"/>
+            <a:ext cx="0" cy="4548249"/>
+          </a:xfrm>
+          <a:prstGeom prst="straightConnector1">
+            <a:avLst/>
+          </a:prstGeom>
+          <a:ln>
+            <a:tailEnd type="triangle"/>
+          </a:ln>
+        </p:spPr>
+        <p:style>
+          <a:lnRef idx="1">
+            <a:schemeClr val="accent1"/>
+          </a:lnRef>
+          <a:fillRef idx="0">
+            <a:schemeClr val="accent1"/>
+          </a:fillRef>
+          <a:effectRef idx="0">
+            <a:schemeClr val="accent1"/>
+          </a:effectRef>
+          <a:fontRef idx="minor">
+            <a:schemeClr val="tx1"/>
+          </a:fontRef>
+        </p:style>
+      </p:cxnSp>
+      <p:sp>
+        <p:nvSpPr>
+          <p:cNvPr id="8" name="TextBox 7"/>
+          <p:cNvSpPr txBox="1"/>
+          <p:nvPr/>
+        </p:nvSpPr>
+        <p:spPr>
+          <a:xfrm>
+            <a:off x="3942608" y="783773"/>
+            <a:ext cx="1117357" cy="369332"/>
+          </a:xfrm>
+          <a:prstGeom prst="rect">
+            <a:avLst/>
+          </a:prstGeom>
+          <a:noFill/>
+        </p:spPr>
+        <p:txBody>
+          <a:bodyPr wrap="none" rtlCol="0">
+            <a:spAutoFit/>
+          </a:bodyPr>
+          <a:lstStyle/>
+          <a:p>
+            <a:r>
+              <a:rPr lang="en-US" dirty="0" smtClean="0"/>
+              <a:t>92 genera</a:t>
+            </a:r>
+            <a:endParaRPr lang="en-US" dirty="0"/>
+          </a:p>
+        </p:txBody>
+      </p:sp>
+      <p:cxnSp>
+        <p:nvCxnSpPr>
+          <p:cNvPr id="10" name="Straight Arrow Connector 9"/>
+          <p:cNvCxnSpPr/>
+          <p:nvPr/>
+        </p:nvCxnSpPr>
+        <p:spPr>
+          <a:xfrm>
+            <a:off x="5284519" y="950026"/>
+            <a:ext cx="5130141" cy="0"/>
+          </a:xfrm>
+          <a:prstGeom prst="straightConnector1">
+            <a:avLst/>
+          </a:prstGeom>
+          <a:ln>
+            <a:tailEnd type="triangle"/>
+          </a:ln>
+        </p:spPr>
+        <p:style>
+          <a:lnRef idx="1">
+            <a:schemeClr val="accent1"/>
+          </a:lnRef>
+          <a:fillRef idx="0">
+            <a:schemeClr val="accent1"/>
+          </a:fillRef>
+          <a:effectRef idx="0">
+            <a:schemeClr val="accent1"/>
+          </a:effectRef>
+          <a:fontRef idx="minor">
+            <a:schemeClr val="tx1"/>
+          </a:fontRef>
+        </p:style>
+      </p:cxnSp>
+      <p:sp>
+        <p:nvSpPr>
+          <p:cNvPr id="11" name="Rectangle 10"/>
+          <p:cNvSpPr/>
+          <p:nvPr/>
+        </p:nvSpPr>
+        <p:spPr>
+          <a:xfrm>
+            <a:off x="0" y="6061914"/>
+            <a:ext cx="12326587" cy="369332"/>
+          </a:xfrm>
+          <a:prstGeom prst="rect">
+            <a:avLst/>
+          </a:prstGeom>
+        </p:spPr>
+        <p:txBody>
+          <a:bodyPr wrap="square">
+            <a:spAutoFit/>
+          </a:bodyPr>
+          <a:lstStyle/>
+          <a:p>
+            <a:r>
+              <a:rPr lang="en-US" dirty="0"/>
+              <a:t>https://github.com/afodor/metagenomicsTools/blob/master/src/gamlssDemo/genusPivotedTaxaAsColumnsNormCaseContol.txt</a:t>
+            </a:r>
+          </a:p>
+        </p:txBody>
+      </p:sp>
+    </p:spTree>
+    <p:extLst>
+      <p:ext uri="{BB962C8B-B14F-4D97-AF65-F5344CB8AC3E}">
+        <p14:creationId xmlns:p14="http://schemas.microsoft.com/office/powerpoint/2010/main" val="36487492"/>
       </p:ext>
     </p:extLst>
   </p:cSld>
@@ -15237,4 +16915,265 @@
     </a:ext>
   </a:extLst>
 </a:theme>
+</file>
+
+<file path=ppt/theme/theme2.xml><?xml version="1.0" encoding="utf-8"?>
+<a:theme xmlns:a="http://schemas.openxmlformats.org/drawingml/2006/main" name="Office Theme">
+  <a:themeElements>
+    <a:clrScheme name="Office">
+      <a:dk1>
+        <a:sysClr val="windowText" lastClr="000000"/>
+      </a:dk1>
+      <a:lt1>
+        <a:sysClr val="window" lastClr="FFFFFF"/>
+      </a:lt1>
+      <a:dk2>
+        <a:srgbClr val="44546A"/>
+      </a:dk2>
+      <a:lt2>
+        <a:srgbClr val="E7E6E6"/>
+      </a:lt2>
+      <a:accent1>
+        <a:srgbClr val="5B9BD5"/>
+      </a:accent1>
+      <a:accent2>
+        <a:srgbClr val="ED7D31"/>
+      </a:accent2>
+      <a:accent3>
+        <a:srgbClr val="A5A5A5"/>
+      </a:accent3>
+      <a:accent4>
+        <a:srgbClr val="FFC000"/>
+      </a:accent4>
+      <a:accent5>
+        <a:srgbClr val="4472C4"/>
+      </a:accent5>
+      <a:accent6>
+        <a:srgbClr val="70AD47"/>
+      </a:accent6>
+      <a:hlink>
+        <a:srgbClr val="0563C1"/>
+      </a:hlink>
+      <a:folHlink>
+        <a:srgbClr val="954F72"/>
+      </a:folHlink>
+    </a:clrScheme>
+    <a:fontScheme name="Office">
+      <a:majorFont>
+        <a:latin typeface="Calibri Light" panose="020F0302020204030204"/>
+        <a:ea typeface=""/>
+        <a:cs typeface=""/>
+        <a:font script="Jpan" typeface="游ゴシック Light"/>
+        <a:font script="Hang" typeface="맑은 고딕"/>
+        <a:font script="Hans" typeface="等线 Light"/>
+        <a:font script="Hant" typeface="新細明體"/>
+        <a:font script="Arab" typeface="Times New Roman"/>
+        <a:font script="Hebr" typeface="Times New Roman"/>
+        <a:font script="Thai" typeface="Angsana New"/>
+        <a:font script="Ethi" typeface="Nyala"/>
+        <a:font script="Beng" typeface="Vrinda"/>
+        <a:font script="Gujr" typeface="Shruti"/>
+        <a:font script="Khmr" typeface="MoolBoran"/>
+        <a:font script="Knda" typeface="Tunga"/>
+        <a:font script="Guru" typeface="Raavi"/>
+        <a:font script="Cans" typeface="Euphemia"/>
+        <a:font script="Cher" typeface="Plantagenet Cherokee"/>
+        <a:font script="Yiii" typeface="Microsoft Yi Baiti"/>
+        <a:font script="Tibt" typeface="Microsoft Himalaya"/>
+        <a:font script="Thaa" typeface="MV Boli"/>
+        <a:font script="Deva" typeface="Mangal"/>
+        <a:font script="Telu" typeface="Gautami"/>
+        <a:font script="Taml" typeface="Latha"/>
+        <a:font script="Syrc" typeface="Estrangelo Edessa"/>
+        <a:font script="Orya" typeface="Kalinga"/>
+        <a:font script="Mlym" typeface="Kartika"/>
+        <a:font script="Laoo" typeface="DokChampa"/>
+        <a:font script="Sinh" typeface="Iskoola Pota"/>
+        <a:font script="Mong" typeface="Mongolian Baiti"/>
+        <a:font script="Viet" typeface="Times New Roman"/>
+        <a:font script="Uigh" typeface="Microsoft Uighur"/>
+        <a:font script="Geor" typeface="Sylfaen"/>
+      </a:majorFont>
+      <a:minorFont>
+        <a:latin typeface="Calibri" panose="020F0502020204030204"/>
+        <a:ea typeface=""/>
+        <a:cs typeface=""/>
+        <a:font script="Jpan" typeface="游ゴシック"/>
+        <a:font script="Hang" typeface="맑은 고딕"/>
+        <a:font script="Hans" typeface="等线"/>
+        <a:font script="Hant" typeface="新細明體"/>
+        <a:font script="Arab" typeface="Arial"/>
+        <a:font script="Hebr" typeface="Arial"/>
+        <a:font script="Thai" typeface="Cordia New"/>
+        <a:font script="Ethi" typeface="Nyala"/>
+        <a:font script="Beng" typeface="Vrinda"/>
+        <a:font script="Gujr" typeface="Shruti"/>
+        <a:font script="Khmr" typeface="DaunPenh"/>
+        <a:font script="Knda" typeface="Tunga"/>
+        <a:font script="Guru" typeface="Raavi"/>
+        <a:font script="Cans" typeface="Euphemia"/>
+        <a:font script="Cher" typeface="Plantagenet Cherokee"/>
+        <a:font script="Yiii" typeface="Microsoft Yi Baiti"/>
+        <a:font script="Tibt" typeface="Microsoft Himalaya"/>
+        <a:font script="Thaa" typeface="MV Boli"/>
+        <a:font script="Deva" typeface="Mangal"/>
+        <a:font script="Telu" typeface="Gautami"/>
+        <a:font script="Taml" typeface="Latha"/>
+        <a:font script="Syrc" typeface="Estrangelo Edessa"/>
+        <a:font script="Orya" typeface="Kalinga"/>
+        <a:font script="Mlym" typeface="Kartika"/>
+        <a:font script="Laoo" typeface="DokChampa"/>
+        <a:font script="Sinh" typeface="Iskoola Pota"/>
+        <a:font script="Mong" typeface="Mongolian Baiti"/>
+        <a:font script="Viet" typeface="Arial"/>
+        <a:font script="Uigh" typeface="Microsoft Uighur"/>
+        <a:font script="Geor" typeface="Sylfaen"/>
+      </a:minorFont>
+    </a:fontScheme>
+    <a:fmtScheme name="Office">
+      <a:fillStyleLst>
+        <a:solidFill>
+          <a:schemeClr val="phClr"/>
+        </a:solidFill>
+        <a:gradFill rotWithShape="1">
+          <a:gsLst>
+            <a:gs pos="0">
+              <a:schemeClr val="phClr">
+                <a:lumMod val="110000"/>
+                <a:satMod val="105000"/>
+                <a:tint val="67000"/>
+              </a:schemeClr>
+            </a:gs>
+            <a:gs pos="50000">
+              <a:schemeClr val="phClr">
+                <a:lumMod val="105000"/>
+                <a:satMod val="103000"/>
+                <a:tint val="73000"/>
+              </a:schemeClr>
+            </a:gs>
+            <a:gs pos="100000">
+              <a:schemeClr val="phClr">
+                <a:lumMod val="105000"/>
+                <a:satMod val="109000"/>
+                <a:tint val="81000"/>
+              </a:schemeClr>
+            </a:gs>
+          </a:gsLst>
+          <a:lin ang="5400000" scaled="0"/>
+        </a:gradFill>
+        <a:gradFill rotWithShape="1">
+          <a:gsLst>
+            <a:gs pos="0">
+              <a:schemeClr val="phClr">
+                <a:satMod val="103000"/>
+                <a:lumMod val="102000"/>
+                <a:tint val="94000"/>
+              </a:schemeClr>
+            </a:gs>
+            <a:gs pos="50000">
+              <a:schemeClr val="phClr">
+                <a:satMod val="110000"/>
+                <a:lumMod val="100000"/>
+                <a:shade val="100000"/>
+              </a:schemeClr>
+            </a:gs>
+            <a:gs pos="100000">
+              <a:schemeClr val="phClr">
+                <a:lumMod val="99000"/>
+                <a:satMod val="120000"/>
+                <a:shade val="78000"/>
+              </a:schemeClr>
+            </a:gs>
+          </a:gsLst>
+          <a:lin ang="5400000" scaled="0"/>
+        </a:gradFill>
+      </a:fillStyleLst>
+      <a:lnStyleLst>
+        <a:ln w="6350" cap="flat" cmpd="sng" algn="ctr">
+          <a:solidFill>
+            <a:schemeClr val="phClr"/>
+          </a:solidFill>
+          <a:prstDash val="solid"/>
+          <a:miter lim="800000"/>
+        </a:ln>
+        <a:ln w="12700" cap="flat" cmpd="sng" algn="ctr">
+          <a:solidFill>
+            <a:schemeClr val="phClr"/>
+          </a:solidFill>
+          <a:prstDash val="solid"/>
+          <a:miter lim="800000"/>
+        </a:ln>
+        <a:ln w="19050" cap="flat" cmpd="sng" algn="ctr">
+          <a:solidFill>
+            <a:schemeClr val="phClr"/>
+          </a:solidFill>
+          <a:prstDash val="solid"/>
+          <a:miter lim="800000"/>
+        </a:ln>
+      </a:lnStyleLst>
+      <a:effectStyleLst>
+        <a:effectStyle>
+          <a:effectLst/>
+        </a:effectStyle>
+        <a:effectStyle>
+          <a:effectLst/>
+        </a:effectStyle>
+        <a:effectStyle>
+          <a:effectLst>
+            <a:outerShdw blurRad="57150" dist="19050" dir="5400000" algn="ctr" rotWithShape="0">
+              <a:srgbClr val="000000">
+                <a:alpha val="63000"/>
+              </a:srgbClr>
+            </a:outerShdw>
+          </a:effectLst>
+        </a:effectStyle>
+      </a:effectStyleLst>
+      <a:bgFillStyleLst>
+        <a:solidFill>
+          <a:schemeClr val="phClr"/>
+        </a:solidFill>
+        <a:solidFill>
+          <a:schemeClr val="phClr">
+            <a:tint val="95000"/>
+            <a:satMod val="170000"/>
+          </a:schemeClr>
+        </a:solidFill>
+        <a:gradFill rotWithShape="1">
+          <a:gsLst>
+            <a:gs pos="0">
+              <a:schemeClr val="phClr">
+                <a:tint val="93000"/>
+                <a:satMod val="150000"/>
+                <a:shade val="98000"/>
+                <a:lumMod val="102000"/>
+              </a:schemeClr>
+            </a:gs>
+            <a:gs pos="50000">
+              <a:schemeClr val="phClr">
+                <a:tint val="98000"/>
+                <a:satMod val="130000"/>
+                <a:shade val="90000"/>
+                <a:lumMod val="103000"/>
+              </a:schemeClr>
+            </a:gs>
+            <a:gs pos="100000">
+              <a:schemeClr val="phClr">
+                <a:shade val="63000"/>
+                <a:satMod val="120000"/>
+              </a:schemeClr>
+            </a:gs>
+          </a:gsLst>
+          <a:lin ang="5400000" scaled="0"/>
+        </a:gradFill>
+      </a:bgFillStyleLst>
+    </a:fmtScheme>
+  </a:themeElements>
+  <a:objectDefaults/>
+  <a:extraClrSchemeLst/>
+  <a:extLst>
+    <a:ext uri="{05A4C25C-085E-4340-85A3-A5531E510DB2}">
+      <thm15:themeFamily xmlns:thm15="http://schemas.microsoft.com/office/thememl/2012/main" name="Office Theme" id="{62F939B6-93AF-4DB8-9C6B-D6C7DFDC589F}" vid="{4A3C46E8-61CC-4603-A589-7422A47A8E4A}"/>
+    </a:ext>
+  </a:extLst>
+</a:theme>
 </file>
</xml_diff>

<commit_message>
halfway on new t-test
</commit_message>
<xml_diff>
--- a/classes/ChapelHill2016/ChapelHillWorkshop_Fodor.pptx
+++ b/classes/ChapelHill2016/ChapelHillWorkshop_Fodor.pptx
@@ -5,7 +5,7 @@
     <p:sldMasterId id="2147483648" r:id="rId1"/>
   </p:sldMasterIdLst>
   <p:notesMasterIdLst>
-    <p:notesMasterId r:id="rId48"/>
+    <p:notesMasterId r:id="rId52"/>
   </p:notesMasterIdLst>
   <p:sldIdLst>
     <p:sldId id="256" r:id="rId2"/>
@@ -54,6 +54,10 @@
     <p:sldId id="301" r:id="rId45"/>
     <p:sldId id="302" r:id="rId46"/>
     <p:sldId id="303" r:id="rId47"/>
+    <p:sldId id="304" r:id="rId48"/>
+    <p:sldId id="305" r:id="rId49"/>
+    <p:sldId id="306" r:id="rId50"/>
+    <p:sldId id="307" r:id="rId51"/>
   </p:sldIdLst>
   <p:sldSz cx="12192000" cy="6858000"/>
   <p:notesSz cx="6858000" cy="9144000"/>
@@ -551,6 +555,90 @@
         </p:nvSpPr>
         <p:spPr/>
         <p:txBody>
+          <a:bodyPr/>
+          <a:lstStyle/>
+          <a:p>
+            <a:endParaRPr lang="en-US" dirty="0"/>
+          </a:p>
+        </p:txBody>
+      </p:sp>
+      <p:sp>
+        <p:nvSpPr>
+          <p:cNvPr id="4" name="Slide Number Placeholder 3"/>
+          <p:cNvSpPr>
+            <a:spLocks noGrp="1"/>
+          </p:cNvSpPr>
+          <p:nvPr>
+            <p:ph type="sldNum" sz="quarter" idx="10"/>
+          </p:nvPr>
+        </p:nvSpPr>
+        <p:spPr/>
+        <p:txBody>
+          <a:bodyPr/>
+          <a:lstStyle/>
+          <a:p>
+            <a:fld id="{B5CDACDF-7826-4ADF-BE0E-0AD2634C0C48}" type="slidenum">
+              <a:rPr lang="en-US" smtClean="0"/>
+              <a:t>38</a:t>
+            </a:fld>
+            <a:endParaRPr lang="en-US"/>
+          </a:p>
+        </p:txBody>
+      </p:sp>
+    </p:spTree>
+    <p:extLst>
+      <p:ext uri="{BB962C8B-B14F-4D97-AF65-F5344CB8AC3E}">
+        <p14:creationId xmlns:p14="http://schemas.microsoft.com/office/powerpoint/2010/main" val="3490230056"/>
+      </p:ext>
+    </p:extLst>
+  </p:cSld>
+  <p:clrMapOvr>
+    <a:masterClrMapping/>
+  </p:clrMapOvr>
+</p:notes>
+</file>
+
+<file path=ppt/notesSlides/notesSlide2.xml><?xml version="1.0" encoding="utf-8"?>
+<p:notes xmlns:a="http://schemas.openxmlformats.org/drawingml/2006/main" xmlns:r="http://schemas.openxmlformats.org/officeDocument/2006/relationships" xmlns:p="http://schemas.openxmlformats.org/presentationml/2006/main">
+  <p:cSld>
+    <p:spTree>
+      <p:nvGrpSpPr>
+        <p:cNvPr id="1" name=""/>
+        <p:cNvGrpSpPr/>
+        <p:nvPr/>
+      </p:nvGrpSpPr>
+      <p:grpSpPr>
+        <a:xfrm>
+          <a:off x="0" y="0"/>
+          <a:ext cx="0" cy="0"/>
+          <a:chOff x="0" y="0"/>
+          <a:chExt cx="0" cy="0"/>
+        </a:xfrm>
+      </p:grpSpPr>
+      <p:sp>
+        <p:nvSpPr>
+          <p:cNvPr id="2" name="Slide Image Placeholder 1"/>
+          <p:cNvSpPr>
+            <a:spLocks noGrp="1" noRot="1" noChangeAspect="1"/>
+          </p:cNvSpPr>
+          <p:nvPr>
+            <p:ph type="sldImg"/>
+          </p:nvPr>
+        </p:nvSpPr>
+        <p:spPr/>
+      </p:sp>
+      <p:sp>
+        <p:nvSpPr>
+          <p:cNvPr id="3" name="Notes Placeholder 2"/>
+          <p:cNvSpPr>
+            <a:spLocks noGrp="1"/>
+          </p:cNvSpPr>
+          <p:nvPr>
+            <p:ph type="body" idx="1"/>
+          </p:nvPr>
+        </p:nvSpPr>
+        <p:spPr/>
+        <p:txBody>
           <a:bodyPr>
             <a:normAutofit/>
           </a:bodyPr>
@@ -597,7 +685,7 @@
 </p:notes>
 </file>
 
-<file path=ppt/notesSlides/notesSlide2.xml><?xml version="1.0" encoding="utf-8"?>
+<file path=ppt/notesSlides/notesSlide3.xml><?xml version="1.0" encoding="utf-8"?>
 <p:notes xmlns:a="http://schemas.openxmlformats.org/drawingml/2006/main" xmlns:r="http://schemas.openxmlformats.org/officeDocument/2006/relationships" xmlns:p="http://schemas.openxmlformats.org/presentationml/2006/main">
   <p:cSld>
     <p:spTree>
@@ -13521,10 +13609,6 @@
               </a:rPr>
               <a:t>454 sequencing targeting the conserved 16S rRNA gene</a:t>
             </a:r>
-            <a:endParaRPr lang="en-US" dirty="0">
-              <a:latin typeface="Arial" pitchFamily="34" charset="0"/>
-              <a:cs typeface="Arial" pitchFamily="34" charset="0"/>
-            </a:endParaRPr>
           </a:p>
         </p:txBody>
       </p:sp>
@@ -13590,10 +13674,6 @@
               </a:rPr>
               <a:t>~1,200,000 sequences of ~400 basepairs each </a:t>
             </a:r>
-            <a:endParaRPr lang="en-US" dirty="0">
-              <a:latin typeface="Arial" pitchFamily="34" charset="0"/>
-              <a:cs typeface="Arial" pitchFamily="34" charset="0"/>
-            </a:endParaRPr>
           </a:p>
         </p:txBody>
       </p:sp>
@@ -13659,10 +13739,6 @@
               </a:rPr>
               <a:t>Group the sequences into 742 clusters (that are 97% identical)</a:t>
             </a:r>
-            <a:endParaRPr lang="en-US" dirty="0">
-              <a:latin typeface="Arial" pitchFamily="34" charset="0"/>
-              <a:cs typeface="Arial" pitchFamily="34" charset="0"/>
-            </a:endParaRPr>
           </a:p>
         </p:txBody>
       </p:sp>
@@ -13881,10 +13957,6 @@
               </a:rPr>
               <a:t>. ISME J. 2012</a:t>
             </a:r>
-            <a:endParaRPr lang="en-US" sz="1100" dirty="0">
-              <a:latin typeface="Arial" pitchFamily="34" charset="0"/>
-              <a:cs typeface="Arial" pitchFamily="34" charset="0"/>
-            </a:endParaRPr>
           </a:p>
         </p:txBody>
       </p:sp>
@@ -14257,9 +14329,6 @@
               </a:rPr>
               <a:t> more abundant in control</a:t>
             </a:r>
-            <a:endParaRPr lang="en-US" sz="1400" dirty="0">
-              <a:latin typeface="Arial" pitchFamily="34" charset="0"/>
-            </a:endParaRPr>
           </a:p>
         </p:txBody>
       </p:sp>
@@ -14319,13 +14388,6 @@
               </a:rPr>
               <a:t>colorectal adenomas</a:t>
             </a:r>
-            <a:endParaRPr lang="en-US" dirty="0">
-              <a:solidFill>
-                <a:srgbClr val="FF0000"/>
-              </a:solidFill>
-              <a:latin typeface="Arial" pitchFamily="34" charset="0"/>
-              <a:cs typeface="Arial" pitchFamily="34" charset="0"/>
-            </a:endParaRPr>
           </a:p>
         </p:txBody>
       </p:sp>
@@ -14593,6 +14655,1162 @@
 </p:sld>
 </file>
 
+<file path=ppt/slides/slide47.xml><?xml version="1.0" encoding="utf-8"?>
+<p:sld xmlns:a="http://schemas.openxmlformats.org/drawingml/2006/main" xmlns:r="http://schemas.openxmlformats.org/officeDocument/2006/relationships" xmlns:p="http://schemas.openxmlformats.org/presentationml/2006/main">
+  <p:cSld>
+    <p:spTree>
+      <p:nvGrpSpPr>
+        <p:cNvPr id="1" name=""/>
+        <p:cNvGrpSpPr/>
+        <p:nvPr/>
+      </p:nvGrpSpPr>
+      <p:grpSpPr>
+        <a:xfrm>
+          <a:off x="0" y="0"/>
+          <a:ext cx="0" cy="0"/>
+          <a:chOff x="0" y="0"/>
+          <a:chExt cx="0" cy="0"/>
+        </a:xfrm>
+      </p:grpSpPr>
+      <p:pic>
+        <p:nvPicPr>
+          <p:cNvPr id="3" name="Picture 2"/>
+          <p:cNvPicPr>
+            <a:picLocks noChangeAspect="1"/>
+          </p:cNvPicPr>
+          <p:nvPr/>
+        </p:nvPicPr>
+        <p:blipFill>
+          <a:blip r:embed="rId2"/>
+          <a:stretch>
+            <a:fillRect/>
+          </a:stretch>
+        </p:blipFill>
+        <p:spPr>
+          <a:xfrm>
+            <a:off x="1070509" y="1330040"/>
+            <a:ext cx="7806503" cy="3555781"/>
+          </a:xfrm>
+          <a:prstGeom prst="rect">
+            <a:avLst/>
+          </a:prstGeom>
+        </p:spPr>
+      </p:pic>
+      <p:sp>
+        <p:nvSpPr>
+          <p:cNvPr id="2" name="TextBox 1"/>
+          <p:cNvSpPr txBox="1"/>
+          <p:nvPr/>
+        </p:nvSpPr>
+        <p:spPr>
+          <a:xfrm>
+            <a:off x="510640" y="0"/>
+            <a:ext cx="11585223" cy="369332"/>
+          </a:xfrm>
+          <a:prstGeom prst="rect">
+            <a:avLst/>
+          </a:prstGeom>
+          <a:noFill/>
+        </p:spPr>
+        <p:txBody>
+          <a:bodyPr wrap="none" rtlCol="0">
+            <a:spAutoFit/>
+          </a:bodyPr>
+          <a:lstStyle/>
+          <a:p>
+            <a:r>
+              <a:rPr lang="en-US" dirty="0" smtClean="0">
+                <a:latin typeface="Arial" panose="020B0604020202020204" pitchFamily="34" charset="0"/>
+                <a:cs typeface="Arial" panose="020B0604020202020204" pitchFamily="34" charset="0"/>
+              </a:rPr>
+              <a:t>Just as in the previous dataset, for each genus we can form a null hypothesis of no association with case/control</a:t>
+            </a:r>
+            <a:endParaRPr lang="en-US" dirty="0">
+              <a:latin typeface="Arial" panose="020B0604020202020204" pitchFamily="34" charset="0"/>
+              <a:cs typeface="Arial" panose="020B0604020202020204" pitchFamily="34" charset="0"/>
+            </a:endParaRPr>
+          </a:p>
+        </p:txBody>
+      </p:sp>
+      <p:sp>
+        <p:nvSpPr>
+          <p:cNvPr id="4" name="TextBox 3"/>
+          <p:cNvSpPr txBox="1"/>
+          <p:nvPr/>
+        </p:nvSpPr>
+        <p:spPr>
+          <a:xfrm>
+            <a:off x="700644" y="665020"/>
+            <a:ext cx="3168496" cy="369332"/>
+          </a:xfrm>
+          <a:prstGeom prst="rect">
+            <a:avLst/>
+          </a:prstGeom>
+          <a:noFill/>
+        </p:spPr>
+        <p:txBody>
+          <a:bodyPr wrap="none" rtlCol="0">
+            <a:spAutoFit/>
+          </a:bodyPr>
+          <a:lstStyle/>
+          <a:p>
+            <a:r>
+              <a:rPr lang="en-US" dirty="0" smtClean="0">
+                <a:latin typeface="Arial" panose="020B0604020202020204" pitchFamily="34" charset="0"/>
+                <a:cs typeface="Arial" panose="020B0604020202020204" pitchFamily="34" charset="0"/>
+              </a:rPr>
+              <a:t>We set up much as before….</a:t>
+            </a:r>
+            <a:endParaRPr lang="en-US" dirty="0">
+              <a:latin typeface="Arial" panose="020B0604020202020204" pitchFamily="34" charset="0"/>
+              <a:cs typeface="Arial" panose="020B0604020202020204" pitchFamily="34" charset="0"/>
+            </a:endParaRPr>
+          </a:p>
+        </p:txBody>
+      </p:sp>
+      <p:cxnSp>
+        <p:nvCxnSpPr>
+          <p:cNvPr id="6" name="Straight Arrow Connector 5"/>
+          <p:cNvCxnSpPr/>
+          <p:nvPr/>
+        </p:nvCxnSpPr>
+        <p:spPr>
+          <a:xfrm flipH="1">
+            <a:off x="3194460" y="4465124"/>
+            <a:ext cx="1306286" cy="0"/>
+          </a:xfrm>
+          <a:prstGeom prst="straightConnector1">
+            <a:avLst/>
+          </a:prstGeom>
+          <a:ln>
+            <a:tailEnd type="triangle"/>
+          </a:ln>
+        </p:spPr>
+        <p:style>
+          <a:lnRef idx="1">
+            <a:schemeClr val="accent1"/>
+          </a:lnRef>
+          <a:fillRef idx="0">
+            <a:schemeClr val="accent1"/>
+          </a:fillRef>
+          <a:effectRef idx="0">
+            <a:schemeClr val="accent1"/>
+          </a:effectRef>
+          <a:fontRef idx="minor">
+            <a:schemeClr val="tx1"/>
+          </a:fontRef>
+        </p:style>
+      </p:cxnSp>
+      <p:sp>
+        <p:nvSpPr>
+          <p:cNvPr id="7" name="TextBox 6"/>
+          <p:cNvSpPr txBox="1"/>
+          <p:nvPr/>
+        </p:nvSpPr>
+        <p:spPr>
+          <a:xfrm>
+            <a:off x="4512622" y="4239490"/>
+            <a:ext cx="5955476" cy="646331"/>
+          </a:xfrm>
+          <a:prstGeom prst="rect">
+            <a:avLst/>
+          </a:prstGeom>
+          <a:noFill/>
+        </p:spPr>
+        <p:txBody>
+          <a:bodyPr wrap="none" rtlCol="0">
+            <a:spAutoFit/>
+          </a:bodyPr>
+          <a:lstStyle/>
+          <a:p>
+            <a:r>
+              <a:rPr lang="en-US" dirty="0" smtClean="0">
+                <a:latin typeface="Arial" panose="020B0604020202020204" pitchFamily="34" charset="0"/>
+                <a:cs typeface="Arial" panose="020B0604020202020204" pitchFamily="34" charset="0"/>
+              </a:rPr>
+              <a:t>Here we will use a one-way ANOVA </a:t>
+            </a:r>
+          </a:p>
+          <a:p>
+            <a:r>
+              <a:rPr lang="en-US" dirty="0" smtClean="0">
+                <a:latin typeface="Arial" panose="020B0604020202020204" pitchFamily="34" charset="0"/>
+                <a:cs typeface="Arial" panose="020B0604020202020204" pitchFamily="34" charset="0"/>
+              </a:rPr>
+              <a:t>(equivalent to a t-test with assumption of equal variance)</a:t>
+            </a:r>
+            <a:endParaRPr lang="en-US" dirty="0">
+              <a:latin typeface="Arial" panose="020B0604020202020204" pitchFamily="34" charset="0"/>
+              <a:cs typeface="Arial" panose="020B0604020202020204" pitchFamily="34" charset="0"/>
+            </a:endParaRPr>
+          </a:p>
+        </p:txBody>
+      </p:sp>
+      <p:sp>
+        <p:nvSpPr>
+          <p:cNvPr id="8" name="TextBox 7"/>
+          <p:cNvSpPr txBox="1"/>
+          <p:nvPr/>
+        </p:nvSpPr>
+        <p:spPr>
+          <a:xfrm>
+            <a:off x="700644" y="5438899"/>
+            <a:ext cx="4533549" cy="369332"/>
+          </a:xfrm>
+          <a:prstGeom prst="rect">
+            <a:avLst/>
+          </a:prstGeom>
+          <a:noFill/>
+        </p:spPr>
+        <p:txBody>
+          <a:bodyPr wrap="none" rtlCol="0">
+            <a:spAutoFit/>
+          </a:bodyPr>
+          <a:lstStyle/>
+          <a:p>
+            <a:r>
+              <a:rPr lang="en-US" dirty="0" smtClean="0"/>
+              <a:t>We’ll talk about</a:t>
+            </a:r>
+            <a:r>
+              <a:rPr lang="en-US" dirty="0" smtClean="0">
+                <a:latin typeface="Arial" panose="020B0604020202020204" pitchFamily="34" charset="0"/>
+                <a:cs typeface="Arial" panose="020B0604020202020204" pitchFamily="34" charset="0"/>
+              </a:rPr>
+              <a:t> all those other tests in a bit!</a:t>
+            </a:r>
+            <a:endParaRPr lang="en-US" dirty="0"/>
+          </a:p>
+        </p:txBody>
+      </p:sp>
+      <p:sp>
+        <p:nvSpPr>
+          <p:cNvPr id="9" name="Rectangle 8"/>
+          <p:cNvSpPr/>
+          <p:nvPr/>
+        </p:nvSpPr>
+        <p:spPr>
+          <a:xfrm>
+            <a:off x="364176" y="6173832"/>
+            <a:ext cx="11095511" cy="369332"/>
+          </a:xfrm>
+          <a:prstGeom prst="rect">
+            <a:avLst/>
+          </a:prstGeom>
+        </p:spPr>
+        <p:txBody>
+          <a:bodyPr wrap="square">
+            <a:spAutoFit/>
+          </a:bodyPr>
+          <a:lstStyle/>
+          <a:p>
+            <a:r>
+              <a:rPr lang="en-US" dirty="0"/>
+              <a:t>https://github.com/afodor/metagenomicsTools/blob/master/src/gamlssDemo/quickFit.txt</a:t>
+            </a:r>
+          </a:p>
+        </p:txBody>
+      </p:sp>
+    </p:spTree>
+    <p:extLst>
+      <p:ext uri="{BB962C8B-B14F-4D97-AF65-F5344CB8AC3E}">
+        <p14:creationId xmlns:p14="http://schemas.microsoft.com/office/powerpoint/2010/main" val="3401895557"/>
+      </p:ext>
+    </p:extLst>
+  </p:cSld>
+  <p:clrMapOvr>
+    <a:masterClrMapping/>
+  </p:clrMapOvr>
+</p:sld>
+</file>
+
+<file path=ppt/slides/slide48.xml><?xml version="1.0" encoding="utf-8"?>
+<p:sld xmlns:a="http://schemas.openxmlformats.org/drawingml/2006/main" xmlns:r="http://schemas.openxmlformats.org/officeDocument/2006/relationships" xmlns:p="http://schemas.openxmlformats.org/presentationml/2006/main">
+  <p:cSld>
+    <p:spTree>
+      <p:nvGrpSpPr>
+        <p:cNvPr id="1" name=""/>
+        <p:cNvGrpSpPr/>
+        <p:nvPr/>
+      </p:nvGrpSpPr>
+      <p:grpSpPr>
+        <a:xfrm>
+          <a:off x="0" y="0"/>
+          <a:ext cx="0" cy="0"/>
+          <a:chOff x="0" y="0"/>
+          <a:chExt cx="0" cy="0"/>
+        </a:xfrm>
+      </p:grpSpPr>
+      <p:sp>
+        <p:nvSpPr>
+          <p:cNvPr id="2" name="TextBox 1"/>
+          <p:cNvSpPr txBox="1"/>
+          <p:nvPr/>
+        </p:nvSpPr>
+        <p:spPr>
+          <a:xfrm>
+            <a:off x="1163782" y="403761"/>
+            <a:ext cx="9909508" cy="369332"/>
+          </a:xfrm>
+          <a:prstGeom prst="rect">
+            <a:avLst/>
+          </a:prstGeom>
+          <a:noFill/>
+        </p:spPr>
+        <p:txBody>
+          <a:bodyPr wrap="none" rtlCol="0">
+            <a:spAutoFit/>
+          </a:bodyPr>
+          <a:lstStyle/>
+          <a:p>
+            <a:r>
+              <a:rPr lang="en-US" dirty="0" smtClean="0">
+                <a:latin typeface="Arial" panose="020B0604020202020204" pitchFamily="34" charset="0"/>
+                <a:cs typeface="Arial" panose="020B0604020202020204" pitchFamily="34" charset="0"/>
+              </a:rPr>
+              <a:t>Here we are taxa are in columns, but the same idea.  Walk through, build a model for each taxa</a:t>
+            </a:r>
+            <a:endParaRPr lang="en-US" dirty="0">
+              <a:latin typeface="Arial" panose="020B0604020202020204" pitchFamily="34" charset="0"/>
+              <a:cs typeface="Arial" panose="020B0604020202020204" pitchFamily="34" charset="0"/>
+            </a:endParaRPr>
+          </a:p>
+        </p:txBody>
+      </p:sp>
+      <p:sp>
+        <p:nvSpPr>
+          <p:cNvPr id="3" name="Rectangle 2"/>
+          <p:cNvSpPr/>
+          <p:nvPr/>
+        </p:nvSpPr>
+        <p:spPr>
+          <a:xfrm>
+            <a:off x="352301" y="773093"/>
+            <a:ext cx="11839699" cy="4247317"/>
+          </a:xfrm>
+          <a:prstGeom prst="rect">
+            <a:avLst/>
+          </a:prstGeom>
+        </p:spPr>
+        <p:txBody>
+          <a:bodyPr wrap="square">
+            <a:spAutoFit/>
+          </a:bodyPr>
+          <a:lstStyle/>
+          <a:p>
+            <a:endParaRPr lang="en-US" dirty="0">
+              <a:latin typeface="Courier New" panose="02070309020205020404" pitchFamily="49" charset="0"/>
+            </a:endParaRPr>
+          </a:p>
+          <a:p>
+            <a:r>
+              <a:rPr lang="en-US" dirty="0">
+                <a:latin typeface="Courier New" panose="02070309020205020404" pitchFamily="49" charset="0"/>
+              </a:rPr>
+              <a:t>for( </a:t>
+            </a:r>
+            <a:r>
+              <a:rPr lang="en-US" dirty="0" err="1">
+                <a:latin typeface="Courier New" panose="02070309020205020404" pitchFamily="49" charset="0"/>
+              </a:rPr>
+              <a:t>i</a:t>
+            </a:r>
+            <a:r>
+              <a:rPr lang="en-US" dirty="0">
+                <a:latin typeface="Courier New" panose="02070309020205020404" pitchFamily="49" charset="0"/>
+              </a:rPr>
+              <a:t> in 2:</a:t>
+            </a:r>
+            <a:r>
+              <a:rPr lang="en-US" dirty="0">
+                <a:solidFill>
+                  <a:srgbClr val="000000"/>
+                </a:solidFill>
+                <a:latin typeface="Courier New" panose="02070309020205020404" pitchFamily="49" charset="0"/>
+              </a:rPr>
+              <a:t>ncol(</a:t>
+            </a:r>
+            <a:r>
+              <a:rPr lang="en-US" dirty="0" err="1">
+                <a:solidFill>
+                  <a:srgbClr val="000000"/>
+                </a:solidFill>
+                <a:latin typeface="Courier New" panose="02070309020205020404" pitchFamily="49" charset="0"/>
+              </a:rPr>
+              <a:t>myT</a:t>
+            </a:r>
+            <a:r>
+              <a:rPr lang="en-US" dirty="0">
+                <a:solidFill>
+                  <a:srgbClr val="000000"/>
+                </a:solidFill>
+                <a:latin typeface="Courier New" panose="02070309020205020404" pitchFamily="49" charset="0"/>
+              </a:rPr>
+              <a:t>))</a:t>
+            </a:r>
+          </a:p>
+          <a:p>
+            <a:r>
+              <a:rPr lang="en-US" dirty="0">
+                <a:latin typeface="Courier New" panose="02070309020205020404" pitchFamily="49" charset="0"/>
+              </a:rPr>
+              <a:t>{</a:t>
+            </a:r>
+          </a:p>
+          <a:p>
+            <a:pPr lvl="1"/>
+            <a:r>
+              <a:rPr lang="en-US" dirty="0" err="1">
+                <a:latin typeface="Courier New" panose="02070309020205020404" pitchFamily="49" charset="0"/>
+              </a:rPr>
+              <a:t>myFrame</a:t>
+            </a:r>
+            <a:r>
+              <a:rPr lang="en-US" dirty="0">
+                <a:latin typeface="Courier New" panose="02070309020205020404" pitchFamily="49" charset="0"/>
+              </a:rPr>
+              <a:t> &lt;- </a:t>
+            </a:r>
+            <a:r>
+              <a:rPr lang="en-US" dirty="0" err="1">
+                <a:latin typeface="Courier New" panose="02070309020205020404" pitchFamily="49" charset="0"/>
+              </a:rPr>
+              <a:t>data.frame</a:t>
+            </a:r>
+            <a:r>
+              <a:rPr lang="en-US" dirty="0">
+                <a:latin typeface="Courier New" panose="02070309020205020404" pitchFamily="49" charset="0"/>
+              </a:rPr>
+              <a:t>( bug = </a:t>
+            </a:r>
+            <a:r>
+              <a:rPr lang="en-US" dirty="0" err="1">
+                <a:latin typeface="Courier New" panose="02070309020205020404" pitchFamily="49" charset="0"/>
+              </a:rPr>
+              <a:t>myT</a:t>
+            </a:r>
+            <a:r>
+              <a:rPr lang="en-US" dirty="0">
+                <a:latin typeface="Courier New" panose="02070309020205020404" pitchFamily="49" charset="0"/>
+              </a:rPr>
+              <a:t>[,</a:t>
+            </a:r>
+            <a:r>
+              <a:rPr lang="en-US" dirty="0" err="1">
+                <a:latin typeface="Courier New" panose="02070309020205020404" pitchFamily="49" charset="0"/>
+              </a:rPr>
+              <a:t>i</a:t>
+            </a:r>
+            <a:r>
+              <a:rPr lang="en-US" dirty="0">
+                <a:latin typeface="Courier New" panose="02070309020205020404" pitchFamily="49" charset="0"/>
+              </a:rPr>
+              <a:t>], </a:t>
+            </a:r>
+            <a:r>
+              <a:rPr lang="en-US" dirty="0" err="1">
+                <a:latin typeface="Courier New" panose="02070309020205020404" pitchFamily="49" charset="0"/>
+              </a:rPr>
+              <a:t>isCase</a:t>
+            </a:r>
+            <a:r>
+              <a:rPr lang="en-US" dirty="0">
+                <a:latin typeface="Courier New" panose="02070309020205020404" pitchFamily="49" charset="0"/>
+              </a:rPr>
+              <a:t> = </a:t>
+            </a:r>
+            <a:r>
+              <a:rPr lang="en-US" dirty="0" err="1">
+                <a:solidFill>
+                  <a:srgbClr val="000000"/>
+                </a:solidFill>
+                <a:latin typeface="Courier New" panose="02070309020205020404" pitchFamily="49" charset="0"/>
+              </a:rPr>
+              <a:t>grepl</a:t>
+            </a:r>
+            <a:r>
+              <a:rPr lang="en-US" dirty="0">
+                <a:solidFill>
+                  <a:srgbClr val="000000"/>
+                </a:solidFill>
+                <a:latin typeface="Courier New" panose="02070309020205020404" pitchFamily="49" charset="0"/>
+              </a:rPr>
+              <a:t>("case",</a:t>
+            </a:r>
+            <a:r>
+              <a:rPr lang="en-US" dirty="0" err="1">
+                <a:solidFill>
+                  <a:srgbClr val="000000"/>
+                </a:solidFill>
+                <a:latin typeface="Courier New" panose="02070309020205020404" pitchFamily="49" charset="0"/>
+              </a:rPr>
+              <a:t>row.names</a:t>
+            </a:r>
+            <a:r>
+              <a:rPr lang="en-US" dirty="0">
+                <a:solidFill>
+                  <a:srgbClr val="000000"/>
+                </a:solidFill>
+                <a:latin typeface="Courier New" panose="02070309020205020404" pitchFamily="49" charset="0"/>
+              </a:rPr>
+              <a:t>(</a:t>
+            </a:r>
+            <a:r>
+              <a:rPr lang="en-US" dirty="0" err="1">
+                <a:solidFill>
+                  <a:srgbClr val="000000"/>
+                </a:solidFill>
+                <a:latin typeface="Courier New" panose="02070309020205020404" pitchFamily="49" charset="0"/>
+              </a:rPr>
+              <a:t>myT</a:t>
+            </a:r>
+            <a:r>
+              <a:rPr lang="en-US" dirty="0">
+                <a:solidFill>
+                  <a:srgbClr val="000000"/>
+                </a:solidFill>
+                <a:latin typeface="Courier New" panose="02070309020205020404" pitchFamily="49" charset="0"/>
+              </a:rPr>
+              <a:t>)))</a:t>
+            </a:r>
+          </a:p>
+          <a:p>
+            <a:pPr lvl="1"/>
+            <a:endParaRPr lang="en-US" dirty="0" smtClean="0">
+              <a:latin typeface="Courier New" panose="02070309020205020404" pitchFamily="49" charset="0"/>
+            </a:endParaRPr>
+          </a:p>
+          <a:p>
+            <a:pPr lvl="1"/>
+            <a:r>
+              <a:rPr lang="en-US" dirty="0" smtClean="0">
+                <a:latin typeface="Courier New" panose="02070309020205020404" pitchFamily="49" charset="0"/>
+              </a:rPr>
+              <a:t># other models are fit</a:t>
+            </a:r>
+          </a:p>
+          <a:p>
+            <a:pPr lvl="1"/>
+            <a:endParaRPr lang="en-US" dirty="0">
+              <a:latin typeface="Courier New" panose="02070309020205020404" pitchFamily="49" charset="0"/>
+            </a:endParaRPr>
+          </a:p>
+          <a:p>
+            <a:pPr lvl="1"/>
+            <a:r>
+              <a:rPr lang="en-US" dirty="0" err="1">
+                <a:latin typeface="Courier New" panose="02070309020205020404" pitchFamily="49" charset="0"/>
+              </a:rPr>
+              <a:t>myLm</a:t>
+            </a:r>
+            <a:r>
+              <a:rPr lang="en-US" dirty="0">
+                <a:latin typeface="Courier New" panose="02070309020205020404" pitchFamily="49" charset="0"/>
+              </a:rPr>
+              <a:t> &lt;- </a:t>
+            </a:r>
+            <a:r>
+              <a:rPr lang="en-US" dirty="0">
+                <a:solidFill>
+                  <a:srgbClr val="000000"/>
+                </a:solidFill>
+                <a:latin typeface="Courier New" panose="02070309020205020404" pitchFamily="49" charset="0"/>
+              </a:rPr>
+              <a:t>lm( log10( </a:t>
+            </a:r>
+            <a:r>
+              <a:rPr lang="en-US" dirty="0" err="1">
+                <a:solidFill>
+                  <a:srgbClr val="000000"/>
+                </a:solidFill>
+                <a:latin typeface="Courier New" panose="02070309020205020404" pitchFamily="49" charset="0"/>
+              </a:rPr>
+              <a:t>myFrame$bug</a:t>
+            </a:r>
+            <a:r>
+              <a:rPr lang="en-US" dirty="0">
+                <a:solidFill>
+                  <a:srgbClr val="000000"/>
+                </a:solidFill>
+                <a:latin typeface="Courier New" panose="02070309020205020404" pitchFamily="49" charset="0"/>
+              </a:rPr>
+              <a:t> + 0.00001) ~ </a:t>
+            </a:r>
+            <a:r>
+              <a:rPr lang="en-US" dirty="0" err="1">
+                <a:solidFill>
+                  <a:srgbClr val="000000"/>
+                </a:solidFill>
+                <a:latin typeface="Courier New" panose="02070309020205020404" pitchFamily="49" charset="0"/>
+              </a:rPr>
+              <a:t>myFrame$isCase</a:t>
+            </a:r>
+            <a:r>
+              <a:rPr lang="en-US" dirty="0">
+                <a:solidFill>
+                  <a:srgbClr val="000000"/>
+                </a:solidFill>
+                <a:latin typeface="Courier New" panose="02070309020205020404" pitchFamily="49" charset="0"/>
+              </a:rPr>
+              <a:t> )</a:t>
+            </a:r>
+          </a:p>
+          <a:p>
+            <a:pPr lvl="1"/>
+            <a:r>
+              <a:rPr lang="en-US" dirty="0">
+                <a:latin typeface="Courier New" panose="02070309020205020404" pitchFamily="49" charset="0"/>
+              </a:rPr>
+              <a:t>index &lt;- </a:t>
+            </a:r>
+            <a:r>
+              <a:rPr lang="en-US" dirty="0" err="1">
+                <a:latin typeface="Courier New" panose="02070309020205020404" pitchFamily="49" charset="0"/>
+              </a:rPr>
+              <a:t>i</a:t>
+            </a:r>
+            <a:r>
+              <a:rPr lang="en-US" dirty="0">
+                <a:latin typeface="Courier New" panose="02070309020205020404" pitchFamily="49" charset="0"/>
+              </a:rPr>
+              <a:t> -1</a:t>
+            </a:r>
+          </a:p>
+          <a:p>
+            <a:pPr lvl="1"/>
+            <a:endParaRPr lang="en-US" dirty="0">
+              <a:latin typeface="Courier New" panose="02070309020205020404" pitchFamily="49" charset="0"/>
+            </a:endParaRPr>
+          </a:p>
+          <a:p>
+            <a:pPr lvl="1"/>
+            <a:r>
+              <a:rPr lang="en-US" dirty="0" err="1" smtClean="0">
+                <a:latin typeface="Courier New" panose="02070309020205020404" pitchFamily="49" charset="0"/>
+              </a:rPr>
+              <a:t>lmPValues</a:t>
+            </a:r>
+            <a:r>
+              <a:rPr lang="en-US" dirty="0" smtClean="0">
+                <a:latin typeface="Courier New" panose="02070309020205020404" pitchFamily="49" charset="0"/>
+              </a:rPr>
+              <a:t>[index</a:t>
+            </a:r>
+            <a:r>
+              <a:rPr lang="en-US" dirty="0">
+                <a:latin typeface="Courier New" panose="02070309020205020404" pitchFamily="49" charset="0"/>
+              </a:rPr>
+              <a:t>] &lt;- </a:t>
+            </a:r>
+            <a:r>
+              <a:rPr lang="en-US" dirty="0" err="1">
+                <a:solidFill>
+                  <a:srgbClr val="000000"/>
+                </a:solidFill>
+                <a:latin typeface="Courier New" panose="02070309020205020404" pitchFamily="49" charset="0"/>
+              </a:rPr>
+              <a:t>anova</a:t>
+            </a:r>
+            <a:r>
+              <a:rPr lang="en-US" dirty="0">
+                <a:solidFill>
+                  <a:srgbClr val="000000"/>
+                </a:solidFill>
+                <a:latin typeface="Courier New" panose="02070309020205020404" pitchFamily="49" charset="0"/>
+              </a:rPr>
+              <a:t>(</a:t>
+            </a:r>
+            <a:r>
+              <a:rPr lang="en-US" dirty="0" err="1">
+                <a:solidFill>
+                  <a:srgbClr val="000000"/>
+                </a:solidFill>
+                <a:latin typeface="Courier New" panose="02070309020205020404" pitchFamily="49" charset="0"/>
+              </a:rPr>
+              <a:t>myLm</a:t>
+            </a:r>
+            <a:r>
+              <a:rPr lang="en-US" dirty="0">
+                <a:solidFill>
+                  <a:srgbClr val="000000"/>
+                </a:solidFill>
+                <a:latin typeface="Courier New" panose="02070309020205020404" pitchFamily="49" charset="0"/>
+              </a:rPr>
+              <a:t>)$"</a:t>
+            </a:r>
+            <a:r>
+              <a:rPr lang="en-US" dirty="0" err="1">
+                <a:solidFill>
+                  <a:srgbClr val="000000"/>
+                </a:solidFill>
+                <a:latin typeface="Courier New" panose="02070309020205020404" pitchFamily="49" charset="0"/>
+              </a:rPr>
+              <a:t>Pr</a:t>
+            </a:r>
+            <a:r>
+              <a:rPr lang="en-US" dirty="0">
+                <a:solidFill>
+                  <a:srgbClr val="000000"/>
+                </a:solidFill>
+                <a:latin typeface="Courier New" panose="02070309020205020404" pitchFamily="49" charset="0"/>
+              </a:rPr>
+              <a:t>(&gt;F)"[1]</a:t>
+            </a:r>
+          </a:p>
+          <a:p>
+            <a:pPr lvl="1"/>
+            <a:r>
+              <a:rPr lang="en-US" dirty="0" smtClean="0">
+                <a:latin typeface="Courier New" panose="02070309020205020404" pitchFamily="49" charset="0"/>
+              </a:rPr>
+              <a:t>names[index</a:t>
+            </a:r>
+            <a:r>
+              <a:rPr lang="en-US" dirty="0">
+                <a:latin typeface="Courier New" panose="02070309020205020404" pitchFamily="49" charset="0"/>
+              </a:rPr>
+              <a:t>] &lt;- names( </a:t>
+            </a:r>
+            <a:r>
+              <a:rPr lang="en-US" dirty="0" err="1">
+                <a:latin typeface="Courier New" panose="02070309020205020404" pitchFamily="49" charset="0"/>
+              </a:rPr>
+              <a:t>myT</a:t>
+            </a:r>
+            <a:r>
+              <a:rPr lang="en-US" dirty="0">
+                <a:latin typeface="Courier New" panose="02070309020205020404" pitchFamily="49" charset="0"/>
+              </a:rPr>
+              <a:t>)[</a:t>
+            </a:r>
+            <a:r>
+              <a:rPr lang="en-US" dirty="0" err="1">
+                <a:latin typeface="Courier New" panose="02070309020205020404" pitchFamily="49" charset="0"/>
+              </a:rPr>
+              <a:t>i</a:t>
+            </a:r>
+            <a:r>
+              <a:rPr lang="en-US" dirty="0" smtClean="0">
+                <a:latin typeface="Courier New" panose="02070309020205020404" pitchFamily="49" charset="0"/>
+              </a:rPr>
+              <a:t>]</a:t>
+            </a:r>
+          </a:p>
+          <a:p>
+            <a:pPr lvl="1"/>
+            <a:endParaRPr lang="en-US" dirty="0">
+              <a:latin typeface="Courier New" panose="02070309020205020404" pitchFamily="49" charset="0"/>
+            </a:endParaRPr>
+          </a:p>
+          <a:p>
+            <a:pPr lvl="1"/>
+            <a:r>
+              <a:rPr lang="en-US" dirty="0" smtClean="0">
+                <a:latin typeface="Courier New" panose="02070309020205020404" pitchFamily="49" charset="0"/>
+              </a:rPr>
+              <a:t># other models are fit</a:t>
+            </a:r>
+            <a:endParaRPr lang="en-US" dirty="0">
+              <a:latin typeface="Courier New" panose="02070309020205020404" pitchFamily="49" charset="0"/>
+            </a:endParaRPr>
+          </a:p>
+          <a:p>
+            <a:r>
+              <a:rPr lang="en-US" dirty="0">
+                <a:latin typeface="Courier New" panose="02070309020205020404" pitchFamily="49" charset="0"/>
+              </a:rPr>
+              <a:t>}</a:t>
+            </a:r>
+          </a:p>
+        </p:txBody>
+      </p:sp>
+      <p:cxnSp>
+        <p:nvCxnSpPr>
+          <p:cNvPr id="5" name="Straight Arrow Connector 4"/>
+          <p:cNvCxnSpPr/>
+          <p:nvPr/>
+        </p:nvCxnSpPr>
+        <p:spPr>
+          <a:xfrm flipH="1" flipV="1">
+            <a:off x="6448302" y="3075709"/>
+            <a:ext cx="1935678" cy="534389"/>
+          </a:xfrm>
+          <a:prstGeom prst="straightConnector1">
+            <a:avLst/>
+          </a:prstGeom>
+          <a:ln>
+            <a:tailEnd type="triangle"/>
+          </a:ln>
+        </p:spPr>
+        <p:style>
+          <a:lnRef idx="1">
+            <a:schemeClr val="accent1"/>
+          </a:lnRef>
+          <a:fillRef idx="0">
+            <a:schemeClr val="accent1"/>
+          </a:fillRef>
+          <a:effectRef idx="0">
+            <a:schemeClr val="accent1"/>
+          </a:effectRef>
+          <a:fontRef idx="minor">
+            <a:schemeClr val="tx1"/>
+          </a:fontRef>
+        </p:style>
+      </p:cxnSp>
+      <p:sp>
+        <p:nvSpPr>
+          <p:cNvPr id="8" name="TextBox 7"/>
+          <p:cNvSpPr txBox="1"/>
+          <p:nvPr/>
+        </p:nvSpPr>
+        <p:spPr>
+          <a:xfrm>
+            <a:off x="7992094" y="3562598"/>
+            <a:ext cx="2929072" cy="646331"/>
+          </a:xfrm>
+          <a:prstGeom prst="rect">
+            <a:avLst/>
+          </a:prstGeom>
+          <a:noFill/>
+        </p:spPr>
+        <p:txBody>
+          <a:bodyPr wrap="none" rtlCol="0">
+            <a:spAutoFit/>
+          </a:bodyPr>
+          <a:lstStyle/>
+          <a:p>
+            <a:r>
+              <a:rPr lang="en-US" dirty="0" smtClean="0">
+                <a:latin typeface="Arial" panose="020B0604020202020204" pitchFamily="34" charset="0"/>
+                <a:cs typeface="Arial" panose="020B0604020202020204" pitchFamily="34" charset="0"/>
+              </a:rPr>
+              <a:t>A linear model:</a:t>
+            </a:r>
+          </a:p>
+          <a:p>
+            <a:r>
+              <a:rPr lang="en-US" dirty="0" smtClean="0">
+                <a:latin typeface="Arial" panose="020B0604020202020204" pitchFamily="34" charset="0"/>
+                <a:cs typeface="Arial" panose="020B0604020202020204" pitchFamily="34" charset="0"/>
+              </a:rPr>
+              <a:t>taxa = case/control + error</a:t>
+            </a:r>
+            <a:endParaRPr lang="en-US" dirty="0">
+              <a:latin typeface="Arial" panose="020B0604020202020204" pitchFamily="34" charset="0"/>
+              <a:cs typeface="Arial" panose="020B0604020202020204" pitchFamily="34" charset="0"/>
+            </a:endParaRPr>
+          </a:p>
+        </p:txBody>
+      </p:sp>
+      <p:cxnSp>
+        <p:nvCxnSpPr>
+          <p:cNvPr id="10" name="Straight Arrow Connector 9"/>
+          <p:cNvCxnSpPr/>
+          <p:nvPr/>
+        </p:nvCxnSpPr>
+        <p:spPr>
+          <a:xfrm flipH="1" flipV="1">
+            <a:off x="5973288" y="3859481"/>
+            <a:ext cx="581891" cy="890649"/>
+          </a:xfrm>
+          <a:prstGeom prst="straightConnector1">
+            <a:avLst/>
+          </a:prstGeom>
+          <a:ln>
+            <a:tailEnd type="triangle"/>
+          </a:ln>
+        </p:spPr>
+        <p:style>
+          <a:lnRef idx="1">
+            <a:schemeClr val="accent1"/>
+          </a:lnRef>
+          <a:fillRef idx="0">
+            <a:schemeClr val="accent1"/>
+          </a:fillRef>
+          <a:effectRef idx="0">
+            <a:schemeClr val="accent1"/>
+          </a:effectRef>
+          <a:fontRef idx="minor">
+            <a:schemeClr val="tx1"/>
+          </a:fontRef>
+        </p:style>
+      </p:cxnSp>
+      <p:sp>
+        <p:nvSpPr>
+          <p:cNvPr id="11" name="TextBox 10"/>
+          <p:cNvSpPr txBox="1"/>
+          <p:nvPr/>
+        </p:nvSpPr>
+        <p:spPr>
+          <a:xfrm>
+            <a:off x="6224650" y="4711652"/>
+            <a:ext cx="5810245" cy="646331"/>
+          </a:xfrm>
+          <a:prstGeom prst="rect">
+            <a:avLst/>
+          </a:prstGeom>
+          <a:noFill/>
+        </p:spPr>
+        <p:txBody>
+          <a:bodyPr wrap="none" rtlCol="0">
+            <a:spAutoFit/>
+          </a:bodyPr>
+          <a:lstStyle/>
+          <a:p>
+            <a:r>
+              <a:rPr lang="en-US" dirty="0" smtClean="0">
+                <a:latin typeface="Arial" panose="020B0604020202020204" pitchFamily="34" charset="0"/>
+                <a:cs typeface="Arial" panose="020B0604020202020204" pitchFamily="34" charset="0"/>
+              </a:rPr>
+              <a:t>Use ANOVA to test the hypothesis that the case/control</a:t>
+            </a:r>
+          </a:p>
+          <a:p>
+            <a:r>
+              <a:rPr lang="en-US" dirty="0" smtClean="0">
+                <a:latin typeface="Arial" panose="020B0604020202020204" pitchFamily="34" charset="0"/>
+                <a:cs typeface="Arial" panose="020B0604020202020204" pitchFamily="34" charset="0"/>
+              </a:rPr>
+              <a:t>parameter is == 0 </a:t>
+            </a:r>
+          </a:p>
+        </p:txBody>
+      </p:sp>
+      <p:sp>
+        <p:nvSpPr>
+          <p:cNvPr id="12" name="Rectangle 11"/>
+          <p:cNvSpPr/>
+          <p:nvPr/>
+        </p:nvSpPr>
+        <p:spPr>
+          <a:xfrm>
+            <a:off x="364176" y="6173832"/>
+            <a:ext cx="11095511" cy="369332"/>
+          </a:xfrm>
+          <a:prstGeom prst="rect">
+            <a:avLst/>
+          </a:prstGeom>
+        </p:spPr>
+        <p:txBody>
+          <a:bodyPr wrap="square">
+            <a:spAutoFit/>
+          </a:bodyPr>
+          <a:lstStyle/>
+          <a:p>
+            <a:r>
+              <a:rPr lang="en-US" dirty="0"/>
+              <a:t>https://github.com/afodor/metagenomicsTools/blob/master/src/gamlssDemo/quickFit.txt</a:t>
+            </a:r>
+          </a:p>
+        </p:txBody>
+      </p:sp>
+    </p:spTree>
+    <p:extLst>
+      <p:ext uri="{BB962C8B-B14F-4D97-AF65-F5344CB8AC3E}">
+        <p14:creationId xmlns:p14="http://schemas.microsoft.com/office/powerpoint/2010/main" val="635488335"/>
+      </p:ext>
+    </p:extLst>
+  </p:cSld>
+  <p:clrMapOvr>
+    <a:masterClrMapping/>
+  </p:clrMapOvr>
+</p:sld>
+</file>
+
+<file path=ppt/slides/slide49.xml><?xml version="1.0" encoding="utf-8"?>
+<p:sld xmlns:a="http://schemas.openxmlformats.org/drawingml/2006/main" xmlns:r="http://schemas.openxmlformats.org/officeDocument/2006/relationships" xmlns:p="http://schemas.openxmlformats.org/presentationml/2006/main">
+  <p:cSld>
+    <p:spTree>
+      <p:nvGrpSpPr>
+        <p:cNvPr id="1" name=""/>
+        <p:cNvGrpSpPr/>
+        <p:nvPr/>
+      </p:nvGrpSpPr>
+      <p:grpSpPr>
+        <a:xfrm>
+          <a:off x="0" y="0"/>
+          <a:ext cx="0" cy="0"/>
+          <a:chOff x="0" y="0"/>
+          <a:chExt cx="0" cy="0"/>
+        </a:xfrm>
+      </p:grpSpPr>
+      <p:sp>
+        <p:nvSpPr>
+          <p:cNvPr id="2" name="TextBox 1"/>
+          <p:cNvSpPr txBox="1"/>
+          <p:nvPr/>
+        </p:nvSpPr>
+        <p:spPr>
+          <a:xfrm>
+            <a:off x="771896" y="261257"/>
+            <a:ext cx="9571851" cy="369332"/>
+          </a:xfrm>
+          <a:prstGeom prst="rect">
+            <a:avLst/>
+          </a:prstGeom>
+          <a:noFill/>
+        </p:spPr>
+        <p:txBody>
+          <a:bodyPr wrap="none" rtlCol="0">
+            <a:spAutoFit/>
+          </a:bodyPr>
+          <a:lstStyle/>
+          <a:p>
+            <a:r>
+              <a:rPr lang="en-US" dirty="0" smtClean="0">
+                <a:latin typeface="Arial" panose="020B0604020202020204" pitchFamily="34" charset="0"/>
+                <a:cs typeface="Arial" panose="020B0604020202020204" pitchFamily="34" charset="0"/>
+              </a:rPr>
+              <a:t>If we look at all the p-values, there is strong evidence of a signature associated with disease</a:t>
+            </a:r>
+            <a:endParaRPr lang="en-US" dirty="0">
+              <a:latin typeface="Arial" panose="020B0604020202020204" pitchFamily="34" charset="0"/>
+              <a:cs typeface="Arial" panose="020B0604020202020204" pitchFamily="34" charset="0"/>
+            </a:endParaRPr>
+          </a:p>
+        </p:txBody>
+      </p:sp>
+      <p:pic>
+        <p:nvPicPr>
+          <p:cNvPr id="3" name="Picture 2"/>
+          <p:cNvPicPr>
+            <a:picLocks noChangeAspect="1"/>
+          </p:cNvPicPr>
+          <p:nvPr/>
+        </p:nvPicPr>
+        <p:blipFill>
+          <a:blip r:embed="rId2"/>
+          <a:stretch>
+            <a:fillRect/>
+          </a:stretch>
+        </p:blipFill>
+        <p:spPr>
+          <a:xfrm>
+            <a:off x="121536" y="1366404"/>
+            <a:ext cx="5483617" cy="5393722"/>
+          </a:xfrm>
+          <a:prstGeom prst="rect">
+            <a:avLst/>
+          </a:prstGeom>
+        </p:spPr>
+      </p:pic>
+      <p:sp>
+        <p:nvSpPr>
+          <p:cNvPr id="4" name="Rectangle 3"/>
+          <p:cNvSpPr/>
+          <p:nvPr/>
+        </p:nvSpPr>
+        <p:spPr>
+          <a:xfrm>
+            <a:off x="1598318" y="813830"/>
+            <a:ext cx="2652457" cy="369332"/>
+          </a:xfrm>
+          <a:prstGeom prst="rect">
+            <a:avLst/>
+          </a:prstGeom>
+        </p:spPr>
+        <p:txBody>
+          <a:bodyPr wrap="none">
+            <a:spAutoFit/>
+          </a:bodyPr>
+          <a:lstStyle/>
+          <a:p>
+            <a:r>
+              <a:rPr lang="en-US" dirty="0" err="1" smtClean="0"/>
+              <a:t>hist</a:t>
+            </a:r>
+            <a:r>
+              <a:rPr lang="en-US" dirty="0" smtClean="0"/>
+              <a:t>(</a:t>
+            </a:r>
+            <a:r>
+              <a:rPr lang="en-US" smtClean="0"/>
+              <a:t>lmPValues,breaks</a:t>
+            </a:r>
+            <a:r>
+              <a:rPr lang="en-US" dirty="0" smtClean="0"/>
+              <a:t>=30</a:t>
+            </a:r>
+            <a:r>
+              <a:rPr lang="en-US" dirty="0"/>
+              <a:t>)</a:t>
+            </a:r>
+          </a:p>
+        </p:txBody>
+      </p:sp>
+      <p:pic>
+        <p:nvPicPr>
+          <p:cNvPr id="5" name="Picture 4"/>
+          <p:cNvPicPr>
+            <a:picLocks noChangeAspect="1"/>
+          </p:cNvPicPr>
+          <p:nvPr/>
+        </p:nvPicPr>
+        <p:blipFill>
+          <a:blip r:embed="rId3"/>
+          <a:stretch>
+            <a:fillRect/>
+          </a:stretch>
+        </p:blipFill>
+        <p:spPr>
+          <a:xfrm>
+            <a:off x="5878719" y="1996106"/>
+            <a:ext cx="5560025" cy="687718"/>
+          </a:xfrm>
+          <a:prstGeom prst="rect">
+            <a:avLst/>
+          </a:prstGeom>
+        </p:spPr>
+      </p:pic>
+      <p:sp>
+        <p:nvSpPr>
+          <p:cNvPr id="6" name="TextBox 5"/>
+          <p:cNvSpPr txBox="1"/>
+          <p:nvPr/>
+        </p:nvSpPr>
+        <p:spPr>
+          <a:xfrm>
+            <a:off x="5628904" y="1520042"/>
+            <a:ext cx="6079549" cy="369332"/>
+          </a:xfrm>
+          <a:prstGeom prst="rect">
+            <a:avLst/>
+          </a:prstGeom>
+          <a:noFill/>
+        </p:spPr>
+        <p:txBody>
+          <a:bodyPr wrap="none" rtlCol="0">
+            <a:spAutoFit/>
+          </a:bodyPr>
+          <a:lstStyle/>
+          <a:p>
+            <a:r>
+              <a:rPr lang="en-US" dirty="0" smtClean="0">
+                <a:latin typeface="Arial" panose="020B0604020202020204" pitchFamily="34" charset="0"/>
+                <a:cs typeface="Arial" panose="020B0604020202020204" pitchFamily="34" charset="0"/>
+              </a:rPr>
+              <a:t>We show 32 taxa significant at a 10% FDR in this pipeline</a:t>
+            </a:r>
+            <a:endParaRPr lang="en-US" dirty="0">
+              <a:latin typeface="Arial" panose="020B0604020202020204" pitchFamily="34" charset="0"/>
+              <a:cs typeface="Arial" panose="020B0604020202020204" pitchFamily="34" charset="0"/>
+            </a:endParaRPr>
+          </a:p>
+        </p:txBody>
+      </p:sp>
+    </p:spTree>
+    <p:extLst>
+      <p:ext uri="{BB962C8B-B14F-4D97-AF65-F5344CB8AC3E}">
+        <p14:creationId xmlns:p14="http://schemas.microsoft.com/office/powerpoint/2010/main" val="1341895321"/>
+      </p:ext>
+    </p:extLst>
+  </p:cSld>
+  <p:clrMapOvr>
+    <a:masterClrMapping/>
+  </p:clrMapOvr>
+</p:sld>
+</file>
+
 <file path=ppt/slides/slide5.xml><?xml version="1.0" encoding="utf-8"?>
 <p:sld xmlns:a="http://schemas.openxmlformats.org/drawingml/2006/main" xmlns:r="http://schemas.openxmlformats.org/officeDocument/2006/relationships" xmlns:p="http://schemas.openxmlformats.org/presentationml/2006/main">
   <p:cSld>
@@ -14709,6 +15927,36 @@
     <p:extLst>
       <p:ext uri="{BB962C8B-B14F-4D97-AF65-F5344CB8AC3E}">
         <p14:creationId xmlns:p14="http://schemas.microsoft.com/office/powerpoint/2010/main" val="515734534"/>
+      </p:ext>
+    </p:extLst>
+  </p:cSld>
+  <p:clrMapOvr>
+    <a:masterClrMapping/>
+  </p:clrMapOvr>
+</p:sld>
+</file>
+
+<file path=ppt/slides/slide50.xml><?xml version="1.0" encoding="utf-8"?>
+<p:sld xmlns:a="http://schemas.openxmlformats.org/drawingml/2006/main" xmlns:r="http://schemas.openxmlformats.org/officeDocument/2006/relationships" xmlns:p="http://schemas.openxmlformats.org/presentationml/2006/main">
+  <p:cSld>
+    <p:spTree>
+      <p:nvGrpSpPr>
+        <p:cNvPr id="1" name=""/>
+        <p:cNvGrpSpPr/>
+        <p:nvPr/>
+      </p:nvGrpSpPr>
+      <p:grpSpPr>
+        <a:xfrm>
+          <a:off x="0" y="0"/>
+          <a:ext cx="0" cy="0"/>
+          <a:chOff x="0" y="0"/>
+          <a:chExt cx="0" cy="0"/>
+        </a:xfrm>
+      </p:grpSpPr>
+    </p:spTree>
+    <p:extLst>
+      <p:ext uri="{BB962C8B-B14F-4D97-AF65-F5344CB8AC3E}">
+        <p14:creationId xmlns:p14="http://schemas.microsoft.com/office/powerpoint/2010/main" val="3161399484"/>
       </p:ext>
     </p:extLst>
   </p:cSld>

</xml_diff>

<commit_message>
finish up with lm...
</commit_message>
<xml_diff>
--- a/classes/ChapelHill2016/ChapelHillWorkshop_Fodor.pptx
+++ b/classes/ChapelHill2016/ChapelHillWorkshop_Fodor.pptx
@@ -5,7 +5,7 @@
     <p:sldMasterId id="2147483648" r:id="rId1"/>
   </p:sldMasterIdLst>
   <p:notesMasterIdLst>
-    <p:notesMasterId r:id="rId52"/>
+    <p:notesMasterId r:id="rId55"/>
   </p:notesMasterIdLst>
   <p:sldIdLst>
     <p:sldId id="256" r:id="rId2"/>
@@ -52,12 +52,15 @@
     <p:sldId id="299" r:id="rId43"/>
     <p:sldId id="300" r:id="rId44"/>
     <p:sldId id="301" r:id="rId45"/>
-    <p:sldId id="302" r:id="rId46"/>
-    <p:sldId id="303" r:id="rId47"/>
-    <p:sldId id="304" r:id="rId48"/>
-    <p:sldId id="305" r:id="rId49"/>
-    <p:sldId id="306" r:id="rId50"/>
-    <p:sldId id="307" r:id="rId51"/>
+    <p:sldId id="303" r:id="rId46"/>
+    <p:sldId id="304" r:id="rId47"/>
+    <p:sldId id="305" r:id="rId48"/>
+    <p:sldId id="306" r:id="rId49"/>
+    <p:sldId id="307" r:id="rId50"/>
+    <p:sldId id="308" r:id="rId51"/>
+    <p:sldId id="309" r:id="rId52"/>
+    <p:sldId id="310" r:id="rId53"/>
+    <p:sldId id="311" r:id="rId54"/>
   </p:sldIdLst>
   <p:sldSz cx="12192000" cy="6858000"/>
   <p:notesSz cx="6858000" cy="9144000"/>
@@ -246,7 +249,7 @@
           <a:p>
             <a:fld id="{FC459844-4342-429C-B527-6DFB8B6D8A2A}" type="datetimeFigureOut">
               <a:rPr lang="en-US" smtClean="0"/>
-              <a:t>5/27/2016</a:t>
+              <a:t>5/28/2016</a:t>
             </a:fld>
             <a:endParaRPr lang="en-US"/>
           </a:p>
@@ -685,93 +688,6 @@
 </p:notes>
 </file>
 
-<file path=ppt/notesSlides/notesSlide3.xml><?xml version="1.0" encoding="utf-8"?>
-<p:notes xmlns:a="http://schemas.openxmlformats.org/drawingml/2006/main" xmlns:r="http://schemas.openxmlformats.org/officeDocument/2006/relationships" xmlns:p="http://schemas.openxmlformats.org/presentationml/2006/main">
-  <p:cSld>
-    <p:spTree>
-      <p:nvGrpSpPr>
-        <p:cNvPr id="1" name=""/>
-        <p:cNvGrpSpPr/>
-        <p:nvPr/>
-      </p:nvGrpSpPr>
-      <p:grpSpPr>
-        <a:xfrm>
-          <a:off x="0" y="0"/>
-          <a:ext cx="0" cy="0"/>
-          <a:chOff x="0" y="0"/>
-          <a:chExt cx="0" cy="0"/>
-        </a:xfrm>
-      </p:grpSpPr>
-      <p:sp>
-        <p:nvSpPr>
-          <p:cNvPr id="2" name="Slide Image Placeholder 1"/>
-          <p:cNvSpPr>
-            <a:spLocks noGrp="1" noRot="1" noChangeAspect="1"/>
-          </p:cNvSpPr>
-          <p:nvPr>
-            <p:ph type="sldImg"/>
-          </p:nvPr>
-        </p:nvSpPr>
-        <p:spPr/>
-      </p:sp>
-      <p:sp>
-        <p:nvSpPr>
-          <p:cNvPr id="3" name="Notes Placeholder 2"/>
-          <p:cNvSpPr>
-            <a:spLocks noGrp="1"/>
-          </p:cNvSpPr>
-          <p:nvPr>
-            <p:ph type="body" idx="1"/>
-          </p:nvPr>
-        </p:nvSpPr>
-        <p:spPr/>
-        <p:txBody>
-          <a:bodyPr>
-            <a:normAutofit/>
-          </a:bodyPr>
-          <a:lstStyle/>
-          <a:p>
-            <a:endParaRPr lang="en-US"/>
-          </a:p>
-        </p:txBody>
-      </p:sp>
-      <p:sp>
-        <p:nvSpPr>
-          <p:cNvPr id="4" name="Slide Number Placeholder 3"/>
-          <p:cNvSpPr>
-            <a:spLocks noGrp="1"/>
-          </p:cNvSpPr>
-          <p:nvPr>
-            <p:ph type="sldNum" sz="quarter" idx="10"/>
-          </p:nvPr>
-        </p:nvSpPr>
-        <p:spPr/>
-        <p:txBody>
-          <a:bodyPr/>
-          <a:lstStyle/>
-          <a:p>
-            <a:fld id="{64B5200A-267F-4314-A1B3-689929883B77}" type="slidenum">
-              <a:rPr lang="en-US" smtClean="0"/>
-              <a:pPr/>
-              <a:t>45</a:t>
-            </a:fld>
-            <a:endParaRPr lang="en-US"/>
-          </a:p>
-        </p:txBody>
-      </p:sp>
-    </p:spTree>
-    <p:extLst>
-      <p:ext uri="{BB962C8B-B14F-4D97-AF65-F5344CB8AC3E}">
-        <p14:creationId xmlns:p14="http://schemas.microsoft.com/office/powerpoint/2010/main" val="144333662"/>
-      </p:ext>
-    </p:extLst>
-  </p:cSld>
-  <p:clrMapOvr>
-    <a:masterClrMapping/>
-  </p:clrMapOvr>
-</p:notes>
-</file>
-
 <file path=ppt/slideLayouts/slideLayout1.xml><?xml version="1.0" encoding="utf-8"?>
 <p:sldLayout xmlns:a="http://schemas.openxmlformats.org/drawingml/2006/main" xmlns:r="http://schemas.openxmlformats.org/officeDocument/2006/relationships" xmlns:p="http://schemas.openxmlformats.org/presentationml/2006/main" type="title" preserve="1">
   <p:cSld name="Title Slide">
@@ -901,7 +817,7 @@
           <a:p>
             <a:fld id="{0270C37A-DC1B-4EF5-BFE7-3503C55803C4}" type="datetimeFigureOut">
               <a:rPr lang="en-US" smtClean="0"/>
-              <a:t>5/27/2016</a:t>
+              <a:t>5/28/2016</a:t>
             </a:fld>
             <a:endParaRPr lang="en-US"/>
           </a:p>
@@ -1069,7 +985,7 @@
           <a:p>
             <a:fld id="{0270C37A-DC1B-4EF5-BFE7-3503C55803C4}" type="datetimeFigureOut">
               <a:rPr lang="en-US" smtClean="0"/>
-              <a:t>5/27/2016</a:t>
+              <a:t>5/28/2016</a:t>
             </a:fld>
             <a:endParaRPr lang="en-US"/>
           </a:p>
@@ -1247,7 +1163,7 @@
           <a:p>
             <a:fld id="{0270C37A-DC1B-4EF5-BFE7-3503C55803C4}" type="datetimeFigureOut">
               <a:rPr lang="en-US" smtClean="0"/>
-              <a:t>5/27/2016</a:t>
+              <a:t>5/28/2016</a:t>
             </a:fld>
             <a:endParaRPr lang="en-US"/>
           </a:p>
@@ -1415,7 +1331,7 @@
           <a:p>
             <a:fld id="{0270C37A-DC1B-4EF5-BFE7-3503C55803C4}" type="datetimeFigureOut">
               <a:rPr lang="en-US" smtClean="0"/>
-              <a:t>5/27/2016</a:t>
+              <a:t>5/28/2016</a:t>
             </a:fld>
             <a:endParaRPr lang="en-US"/>
           </a:p>
@@ -1660,7 +1576,7 @@
           <a:p>
             <a:fld id="{0270C37A-DC1B-4EF5-BFE7-3503C55803C4}" type="datetimeFigureOut">
               <a:rPr lang="en-US" smtClean="0"/>
-              <a:t>5/27/2016</a:t>
+              <a:t>5/28/2016</a:t>
             </a:fld>
             <a:endParaRPr lang="en-US"/>
           </a:p>
@@ -1889,7 +1805,7 @@
           <a:p>
             <a:fld id="{0270C37A-DC1B-4EF5-BFE7-3503C55803C4}" type="datetimeFigureOut">
               <a:rPr lang="en-US" smtClean="0"/>
-              <a:t>5/27/2016</a:t>
+              <a:t>5/28/2016</a:t>
             </a:fld>
             <a:endParaRPr lang="en-US"/>
           </a:p>
@@ -2253,7 +2169,7 @@
           <a:p>
             <a:fld id="{0270C37A-DC1B-4EF5-BFE7-3503C55803C4}" type="datetimeFigureOut">
               <a:rPr lang="en-US" smtClean="0"/>
-              <a:t>5/27/2016</a:t>
+              <a:t>5/28/2016</a:t>
             </a:fld>
             <a:endParaRPr lang="en-US"/>
           </a:p>
@@ -2370,7 +2286,7 @@
           <a:p>
             <a:fld id="{0270C37A-DC1B-4EF5-BFE7-3503C55803C4}" type="datetimeFigureOut">
               <a:rPr lang="en-US" smtClean="0"/>
-              <a:t>5/27/2016</a:t>
+              <a:t>5/28/2016</a:t>
             </a:fld>
             <a:endParaRPr lang="en-US"/>
           </a:p>
@@ -2465,7 +2381,7 @@
           <a:p>
             <a:fld id="{0270C37A-DC1B-4EF5-BFE7-3503C55803C4}" type="datetimeFigureOut">
               <a:rPr lang="en-US" smtClean="0"/>
-              <a:t>5/27/2016</a:t>
+              <a:t>5/28/2016</a:t>
             </a:fld>
             <a:endParaRPr lang="en-US"/>
           </a:p>
@@ -2740,7 +2656,7 @@
           <a:p>
             <a:fld id="{0270C37A-DC1B-4EF5-BFE7-3503C55803C4}" type="datetimeFigureOut">
               <a:rPr lang="en-US" smtClean="0"/>
-              <a:t>5/27/2016</a:t>
+              <a:t>5/28/2016</a:t>
             </a:fld>
             <a:endParaRPr lang="en-US"/>
           </a:p>
@@ -2992,7 +2908,7 @@
           <a:p>
             <a:fld id="{0270C37A-DC1B-4EF5-BFE7-3503C55803C4}" type="datetimeFigureOut">
               <a:rPr lang="en-US" smtClean="0"/>
-              <a:t>5/27/2016</a:t>
+              <a:t>5/28/2016</a:t>
             </a:fld>
             <a:endParaRPr lang="en-US"/>
           </a:p>
@@ -3203,7 +3119,7 @@
           <a:p>
             <a:fld id="{0270C37A-DC1B-4EF5-BFE7-3503C55803C4}" type="datetimeFigureOut">
               <a:rPr lang="en-US" smtClean="0"/>
-              <a:t>5/27/2016</a:t>
+              <a:t>5/28/2016</a:t>
             </a:fld>
             <a:endParaRPr lang="en-US"/>
           </a:p>
@@ -3692,6 +3608,13 @@
   <p:clrMapOvr>
     <a:masterClrMapping/>
   </p:clrMapOvr>
+  <p:timing>
+    <p:tnLst>
+      <p:par>
+        <p:cTn id="1" dur="indefinite" restart="never" nodeType="tmRoot"/>
+      </p:par>
+    </p:tnLst>
+  </p:timing>
 </p:sld>
 </file>
 
@@ -3908,6 +3831,13 @@
   <p:clrMapOvr>
     <a:masterClrMapping/>
   </p:clrMapOvr>
+  <p:timing>
+    <p:tnLst>
+      <p:par>
+        <p:cTn id="1" dur="indefinite" restart="never" nodeType="tmRoot"/>
+      </p:par>
+    </p:tnLst>
+  </p:timing>
 </p:sld>
 </file>
 
@@ -3994,6 +3924,13 @@
   <p:clrMapOvr>
     <a:masterClrMapping/>
   </p:clrMapOvr>
+  <p:timing>
+    <p:tnLst>
+      <p:par>
+        <p:cTn id="1" dur="indefinite" restart="never" nodeType="tmRoot"/>
+      </p:par>
+    </p:tnLst>
+  </p:timing>
 </p:sld>
 </file>
 
@@ -4439,6 +4376,13 @@
   <p:clrMapOvr>
     <a:masterClrMapping/>
   </p:clrMapOvr>
+  <p:timing>
+    <p:tnLst>
+      <p:par>
+        <p:cTn id="1" dur="indefinite" restart="never" nodeType="tmRoot"/>
+      </p:par>
+    </p:tnLst>
+  </p:timing>
 </p:sld>
 </file>
 
@@ -4545,6 +4489,13 @@
   <p:clrMapOvr>
     <a:masterClrMapping/>
   </p:clrMapOvr>
+  <p:timing>
+    <p:tnLst>
+      <p:par>
+        <p:cTn id="1" dur="indefinite" restart="never" nodeType="tmRoot"/>
+      </p:par>
+    </p:tnLst>
+  </p:timing>
 </p:sld>
 </file>
 
@@ -4953,6 +4904,13 @@
   <p:clrMapOvr>
     <a:masterClrMapping/>
   </p:clrMapOvr>
+  <p:timing>
+    <p:tnLst>
+      <p:par>
+        <p:cTn id="1" dur="indefinite" restart="never" nodeType="tmRoot"/>
+      </p:par>
+    </p:tnLst>
+  </p:timing>
 </p:sld>
 </file>
 
@@ -5081,6 +5039,13 @@
   <p:clrMapOvr>
     <a:masterClrMapping/>
   </p:clrMapOvr>
+  <p:timing>
+    <p:tnLst>
+      <p:par>
+        <p:cTn id="1" dur="indefinite" restart="never" nodeType="tmRoot"/>
+      </p:par>
+    </p:tnLst>
+  </p:timing>
 </p:sld>
 </file>
 
@@ -5439,6 +5404,13 @@
   <p:clrMapOvr>
     <a:masterClrMapping/>
   </p:clrMapOvr>
+  <p:timing>
+    <p:tnLst>
+      <p:par>
+        <p:cTn id="1" dur="indefinite" restart="never" nodeType="tmRoot"/>
+      </p:par>
+    </p:tnLst>
+  </p:timing>
 </p:sld>
 </file>
 
@@ -5519,6 +5491,13 @@
   <p:clrMapOvr>
     <a:masterClrMapping/>
   </p:clrMapOvr>
+  <p:timing>
+    <p:tnLst>
+      <p:par>
+        <p:cTn id="1" dur="indefinite" restart="never" nodeType="tmRoot"/>
+      </p:par>
+    </p:tnLst>
+  </p:timing>
 </p:sld>
 </file>
 
@@ -5685,6 +5664,13 @@
   <p:clrMapOvr>
     <a:masterClrMapping/>
   </p:clrMapOvr>
+  <p:timing>
+    <p:tnLst>
+      <p:par>
+        <p:cTn id="1" dur="indefinite" restart="never" nodeType="tmRoot"/>
+      </p:par>
+    </p:tnLst>
+  </p:timing>
 </p:sld>
 </file>
 
@@ -5780,6 +5766,13 @@
   <p:clrMapOvr>
     <a:masterClrMapping/>
   </p:clrMapOvr>
+  <p:timing>
+    <p:tnLst>
+      <p:par>
+        <p:cTn id="1" dur="indefinite" restart="never" nodeType="tmRoot"/>
+      </p:par>
+    </p:tnLst>
+  </p:timing>
 </p:sld>
 </file>
 
@@ -6076,6 +6069,13 @@
   <p:clrMapOvr>
     <a:masterClrMapping/>
   </p:clrMapOvr>
+  <p:timing>
+    <p:tnLst>
+      <p:par>
+        <p:cTn id="1" dur="indefinite" restart="never" nodeType="tmRoot"/>
+      </p:par>
+    </p:tnLst>
+  </p:timing>
 </p:sld>
 </file>
 
@@ -6192,6 +6192,13 @@
   <p:clrMapOvr>
     <a:masterClrMapping/>
   </p:clrMapOvr>
+  <p:timing>
+    <p:tnLst>
+      <p:par>
+        <p:cTn id="1" dur="indefinite" restart="never" nodeType="tmRoot"/>
+      </p:par>
+    </p:tnLst>
+  </p:timing>
 </p:sld>
 </file>
 
@@ -6421,6 +6428,13 @@
   <p:clrMapOvr>
     <a:masterClrMapping/>
   </p:clrMapOvr>
+  <p:timing>
+    <p:tnLst>
+      <p:par>
+        <p:cTn id="1" dur="indefinite" restart="never" nodeType="tmRoot"/>
+      </p:par>
+    </p:tnLst>
+  </p:timing>
 </p:sld>
 </file>
 
@@ -6848,6 +6862,13 @@
   <p:clrMapOvr>
     <a:masterClrMapping/>
   </p:clrMapOvr>
+  <p:timing>
+    <p:tnLst>
+      <p:par>
+        <p:cTn id="1" dur="indefinite" restart="never" nodeType="tmRoot"/>
+      </p:par>
+    </p:tnLst>
+  </p:timing>
 </p:sld>
 </file>
 
@@ -7005,6 +7026,13 @@
   <p:clrMapOvr>
     <a:masterClrMapping/>
   </p:clrMapOvr>
+  <p:timing>
+    <p:tnLst>
+      <p:par>
+        <p:cTn id="1" dur="indefinite" restart="never" nodeType="tmRoot"/>
+      </p:par>
+    </p:tnLst>
+  </p:timing>
 </p:sld>
 </file>
 
@@ -7177,6 +7205,13 @@
   <p:clrMapOvr>
     <a:masterClrMapping/>
   </p:clrMapOvr>
+  <p:timing>
+    <p:tnLst>
+      <p:par>
+        <p:cTn id="1" dur="indefinite" restart="never" nodeType="tmRoot"/>
+      </p:par>
+    </p:tnLst>
+  </p:timing>
 </p:sld>
 </file>
 
@@ -7281,6 +7316,13 @@
   <p:clrMapOvr>
     <a:masterClrMapping/>
   </p:clrMapOvr>
+  <p:timing>
+    <p:tnLst>
+      <p:par>
+        <p:cTn id="1" dur="indefinite" restart="never" nodeType="tmRoot"/>
+      </p:par>
+    </p:tnLst>
+  </p:timing>
 </p:sld>
 </file>
 
@@ -7455,6 +7497,13 @@
   <p:clrMapOvr>
     <a:masterClrMapping/>
   </p:clrMapOvr>
+  <p:timing>
+    <p:tnLst>
+      <p:par>
+        <p:cTn id="1" dur="indefinite" restart="never" nodeType="tmRoot"/>
+      </p:par>
+    </p:tnLst>
+  </p:timing>
 </p:sld>
 </file>
 
@@ -7677,6 +7726,13 @@
   <p:clrMapOvr>
     <a:masterClrMapping/>
   </p:clrMapOvr>
+  <p:timing>
+    <p:tnLst>
+      <p:par>
+        <p:cTn id="1" dur="indefinite" restart="never" nodeType="tmRoot"/>
+      </p:par>
+    </p:tnLst>
+  </p:timing>
 </p:sld>
 </file>
 
@@ -7866,6 +7922,13 @@
   <p:clrMapOvr>
     <a:masterClrMapping/>
   </p:clrMapOvr>
+  <p:timing>
+    <p:tnLst>
+      <p:par>
+        <p:cTn id="1" dur="indefinite" restart="never" nodeType="tmRoot"/>
+      </p:par>
+    </p:tnLst>
+  </p:timing>
 </p:sld>
 </file>
 
@@ -8111,6 +8174,13 @@
   <p:clrMapOvr>
     <a:masterClrMapping/>
   </p:clrMapOvr>
+  <p:timing>
+    <p:tnLst>
+      <p:par>
+        <p:cTn id="1" dur="indefinite" restart="never" nodeType="tmRoot"/>
+      </p:par>
+    </p:tnLst>
+  </p:timing>
 </p:sld>
 </file>
 
@@ -8237,6 +8307,13 @@
   <p:clrMapOvr>
     <a:masterClrMapping/>
   </p:clrMapOvr>
+  <p:timing>
+    <p:tnLst>
+      <p:par>
+        <p:cTn id="1" dur="indefinite" restart="never" nodeType="tmRoot"/>
+      </p:par>
+    </p:tnLst>
+  </p:timing>
 </p:sld>
 </file>
 
@@ -8383,6 +8460,13 @@
   <p:clrMapOvr>
     <a:masterClrMapping/>
   </p:clrMapOvr>
+  <p:timing>
+    <p:tnLst>
+      <p:par>
+        <p:cTn id="1" dur="indefinite" restart="never" nodeType="tmRoot"/>
+      </p:par>
+    </p:tnLst>
+  </p:timing>
 </p:sld>
 </file>
 
@@ -8599,6 +8683,13 @@
   <p:clrMapOvr>
     <a:masterClrMapping/>
   </p:clrMapOvr>
+  <p:timing>
+    <p:tnLst>
+      <p:par>
+        <p:cTn id="1" dur="indefinite" restart="never" nodeType="tmRoot"/>
+      </p:par>
+    </p:tnLst>
+  </p:timing>
 </p:sld>
 </file>
 
@@ -8701,6 +8792,13 @@
   <p:clrMapOvr>
     <a:masterClrMapping/>
   </p:clrMapOvr>
+  <p:timing>
+    <p:tnLst>
+      <p:par>
+        <p:cTn id="1" dur="indefinite" restart="never" nodeType="tmRoot"/>
+      </p:par>
+    </p:tnLst>
+  </p:timing>
 </p:sld>
 </file>
 
@@ -8938,6 +9036,13 @@
   <p:clrMapOvr>
     <a:masterClrMapping/>
   </p:clrMapOvr>
+  <p:timing>
+    <p:tnLst>
+      <p:par>
+        <p:cTn id="1" dur="indefinite" restart="never" nodeType="tmRoot"/>
+      </p:par>
+    </p:tnLst>
+  </p:timing>
 </p:sld>
 </file>
 
@@ -9316,6 +9421,13 @@
   <p:clrMapOvr>
     <a:masterClrMapping/>
   </p:clrMapOvr>
+  <p:timing>
+    <p:tnLst>
+      <p:par>
+        <p:cTn id="1" dur="indefinite" restart="never" nodeType="tmRoot"/>
+      </p:par>
+    </p:tnLst>
+  </p:timing>
 </p:sld>
 </file>
 
@@ -9458,6 +9570,13 @@
   <p:clrMapOvr>
     <a:masterClrMapping/>
   </p:clrMapOvr>
+  <p:timing>
+    <p:tnLst>
+      <p:par>
+        <p:cTn id="1" dur="indefinite" restart="never" nodeType="tmRoot"/>
+      </p:par>
+    </p:tnLst>
+  </p:timing>
 </p:sld>
 </file>
 
@@ -9514,7 +9633,21 @@
                 <a:latin typeface="Arial" panose="020B0604020202020204" pitchFamily="34" charset="0"/>
                 <a:cs typeface="Arial" panose="020B0604020202020204" pitchFamily="34" charset="0"/>
               </a:rPr>
-              <a:t>(code note shown but is here: </a:t>
+              <a:t>(code </a:t>
+            </a:r>
+            <a:r>
+              <a:rPr lang="en-US" dirty="0" smtClean="0">
+                <a:latin typeface="Arial" panose="020B0604020202020204" pitchFamily="34" charset="0"/>
+                <a:cs typeface="Arial" panose="020B0604020202020204" pitchFamily="34" charset="0"/>
+              </a:rPr>
+              <a:t>not </a:t>
+            </a:r>
+            <a:r>
+              <a:rPr lang="en-US" dirty="0">
+                <a:latin typeface="Arial" panose="020B0604020202020204" pitchFamily="34" charset="0"/>
+                <a:cs typeface="Arial" panose="020B0604020202020204" pitchFamily="34" charset="0"/>
+              </a:rPr>
+              <a:t>shown but is here: </a:t>
             </a:r>
           </a:p>
           <a:p>
@@ -9762,6 +9895,13 @@
   <p:clrMapOvr>
     <a:masterClrMapping/>
   </p:clrMapOvr>
+  <p:timing>
+    <p:tnLst>
+      <p:par>
+        <p:cTn id="1" dur="indefinite" restart="never" nodeType="tmRoot"/>
+      </p:par>
+    </p:tnLst>
+  </p:timing>
 </p:sld>
 </file>
 
@@ -10572,6 +10712,13 @@
   <p:clrMapOvr>
     <a:masterClrMapping/>
   </p:clrMapOvr>
+  <p:timing>
+    <p:tnLst>
+      <p:par>
+        <p:cTn id="1" dur="indefinite" restart="never" nodeType="tmRoot"/>
+      </p:par>
+    </p:tnLst>
+  </p:timing>
 </p:sld>
 </file>
 
@@ -12600,6 +12747,13 @@
   <p:clrMapOvr>
     <a:masterClrMapping/>
   </p:clrMapOvr>
+  <p:timing>
+    <p:tnLst>
+      <p:par>
+        <p:cTn id="1" dur="indefinite" restart="never" nodeType="tmRoot"/>
+      </p:par>
+    </p:tnLst>
+  </p:timing>
 </p:sld>
 </file>
 
@@ -14237,36 +14391,64 @@
           <a:chExt cx="0" cy="0"/>
         </a:xfrm>
       </p:grpSpPr>
+      <p:sp>
+        <p:nvSpPr>
+          <p:cNvPr id="2" name="TextBox 1"/>
+          <p:cNvSpPr txBox="1"/>
+          <p:nvPr/>
+        </p:nvSpPr>
+        <p:spPr>
+          <a:xfrm>
+            <a:off x="368135" y="237508"/>
+            <a:ext cx="10632141" cy="369332"/>
+          </a:xfrm>
+          <a:prstGeom prst="rect">
+            <a:avLst/>
+          </a:prstGeom>
+          <a:noFill/>
+        </p:spPr>
+        <p:txBody>
+          <a:bodyPr wrap="none" rtlCol="0">
+            <a:spAutoFit/>
+          </a:bodyPr>
+          <a:lstStyle/>
+          <a:p>
+            <a:r>
+              <a:rPr lang="en-US" dirty="0" smtClean="0">
+                <a:latin typeface="Arial" panose="020B0604020202020204" pitchFamily="34" charset="0"/>
+                <a:cs typeface="Arial" panose="020B0604020202020204" pitchFamily="34" charset="0"/>
+              </a:rPr>
+              <a:t>A version of the dataset is here..  (note this is a different taxonomic scheme than the published data…)</a:t>
+            </a:r>
+            <a:endParaRPr lang="en-US" dirty="0">
+              <a:latin typeface="Arial" panose="020B0604020202020204" pitchFamily="34" charset="0"/>
+              <a:cs typeface="Arial" panose="020B0604020202020204" pitchFamily="34" charset="0"/>
+            </a:endParaRPr>
+          </a:p>
+        </p:txBody>
+      </p:sp>
       <p:pic>
         <p:nvPicPr>
-          <p:cNvPr id="1026" name="Picture 2"/>
+          <p:cNvPr id="4" name="Picture 3"/>
           <p:cNvPicPr>
-            <a:picLocks noChangeAspect="1" noChangeArrowheads="1"/>
+            <a:picLocks noChangeAspect="1"/>
           </p:cNvPicPr>
           <p:nvPr/>
         </p:nvPicPr>
         <p:blipFill>
-          <a:blip r:embed="rId3" cstate="print"/>
-          <a:srcRect/>
+          <a:blip r:embed="rId2"/>
           <a:stretch>
             <a:fillRect/>
           </a:stretch>
         </p:blipFill>
-        <p:spPr bwMode="auto">
-          <a:xfrm>
-            <a:off x="4215288" y="762000"/>
-            <a:ext cx="6147912" cy="5943600"/>
-          </a:xfrm>
-          <a:prstGeom prst="rect">
-            <a:avLst/>
-          </a:prstGeom>
-          <a:noFill/>
-          <a:ln w="9525">
-            <a:noFill/>
-            <a:miter lim="800000"/>
-            <a:headEnd/>
-            <a:tailEnd/>
-          </a:ln>
+        <p:spPr>
+          <a:xfrm>
+            <a:off x="1475261" y="1150607"/>
+            <a:ext cx="9271907" cy="4710727"/>
+          </a:xfrm>
+          <a:prstGeom prst="rect">
+            <a:avLst/>
+          </a:prstGeom>
         </p:spPr>
       </p:pic>
       <p:sp>
@@ -14277,8 +14459,8 @@
         </p:nvSpPr>
         <p:spPr>
           <a:xfrm>
-            <a:off x="1550534" y="2133600"/>
-            <a:ext cx="2799164" cy="523220"/>
+            <a:off x="190005" y="1116281"/>
+            <a:ext cx="1236236" cy="369332"/>
           </a:xfrm>
           <a:prstGeom prst="rect">
             <a:avLst/>
@@ -14292,56 +14474,56 @@
           <a:lstStyle/>
           <a:p>
             <a:r>
-              <a:rPr lang="en-US" sz="1400" dirty="0">
-                <a:latin typeface="Arial" pitchFamily="34" charset="0"/>
-              </a:rPr>
-              <a:t>87 </a:t>
-            </a:r>
-            <a:r>
-              <a:rPr lang="en-US" sz="1400" dirty="0" err="1">
-                <a:latin typeface="Arial" pitchFamily="34" charset="0"/>
-              </a:rPr>
-              <a:t>taxa</a:t>
-            </a:r>
-            <a:r>
-              <a:rPr lang="en-US" sz="1400" dirty="0">
-                <a:latin typeface="Arial" pitchFamily="34" charset="0"/>
-              </a:rPr>
-              <a:t> more abundant in case</a:t>
-            </a:r>
-          </a:p>
-          <a:p>
-            <a:r>
-              <a:rPr lang="en-US" sz="1400" dirty="0">
-                <a:latin typeface="Arial" pitchFamily="34" charset="0"/>
-              </a:rPr>
-              <a:t> 5 </a:t>
-            </a:r>
-            <a:r>
-              <a:rPr lang="en-US" sz="1400" dirty="0" err="1">
-                <a:latin typeface="Arial" pitchFamily="34" charset="0"/>
-              </a:rPr>
-              <a:t>taxa</a:t>
-            </a:r>
-            <a:r>
-              <a:rPr lang="en-US" sz="1400" dirty="0">
-                <a:latin typeface="Arial" pitchFamily="34" charset="0"/>
-              </a:rPr>
-              <a:t> more abundant in control</a:t>
-            </a:r>
-          </a:p>
-        </p:txBody>
-      </p:sp>
-      <p:sp>
-        <p:nvSpPr>
-          <p:cNvPr id="6" name="TextBox 5"/>
+              <a:rPr lang="en-US" dirty="0" smtClean="0"/>
+              <a:t>71 samples</a:t>
+            </a:r>
+            <a:endParaRPr lang="en-US" dirty="0"/>
+          </a:p>
+        </p:txBody>
+      </p:sp>
+      <p:cxnSp>
+        <p:nvCxnSpPr>
+          <p:cNvPr id="7" name="Straight Arrow Connector 6"/>
+          <p:cNvCxnSpPr/>
+          <p:nvPr/>
+        </p:nvCxnSpPr>
+        <p:spPr>
+          <a:xfrm>
+            <a:off x="902525" y="1567543"/>
+            <a:ext cx="0" cy="4548249"/>
+          </a:xfrm>
+          <a:prstGeom prst="straightConnector1">
+            <a:avLst/>
+          </a:prstGeom>
+          <a:ln>
+            <a:tailEnd type="triangle"/>
+          </a:ln>
+        </p:spPr>
+        <p:style>
+          <a:lnRef idx="1">
+            <a:schemeClr val="accent1"/>
+          </a:lnRef>
+          <a:fillRef idx="0">
+            <a:schemeClr val="accent1"/>
+          </a:fillRef>
+          <a:effectRef idx="0">
+            <a:schemeClr val="accent1"/>
+          </a:effectRef>
+          <a:fontRef idx="minor">
+            <a:schemeClr val="tx1"/>
+          </a:fontRef>
+        </p:style>
+      </p:cxnSp>
+      <p:sp>
+        <p:nvSpPr>
+          <p:cNvPr id="8" name="TextBox 7"/>
           <p:cNvSpPr txBox="1"/>
           <p:nvPr/>
         </p:nvSpPr>
         <p:spPr>
           <a:xfrm>
-            <a:off x="2123403" y="152400"/>
-            <a:ext cx="6737807" cy="369332"/>
+            <a:off x="3942608" y="783773"/>
+            <a:ext cx="1117357" cy="369332"/>
           </a:xfrm>
           <a:prstGeom prst="rect">
             <a:avLst/>
@@ -14355,38 +14537,70 @@
           <a:lstStyle/>
           <a:p>
             <a:r>
-              <a:rPr lang="en-US" dirty="0">
-                <a:latin typeface="Arial" pitchFamily="34" charset="0"/>
-                <a:cs typeface="Arial" pitchFamily="34" charset="0"/>
-              </a:rPr>
-              <a:t>A large number of taxa are </a:t>
-            </a:r>
-            <a:r>
-              <a:rPr lang="en-US" dirty="0">
-                <a:solidFill>
-                  <a:srgbClr val="FF0000"/>
-                </a:solidFill>
-                <a:latin typeface="Arial" pitchFamily="34" charset="0"/>
-                <a:cs typeface="Arial" pitchFamily="34" charset="0"/>
-              </a:rPr>
-              <a:t>associated </a:t>
-            </a:r>
-            <a:r>
-              <a:rPr lang="en-US" dirty="0">
-                <a:latin typeface="Arial" pitchFamily="34" charset="0"/>
-                <a:cs typeface="Arial" pitchFamily="34" charset="0"/>
-              </a:rPr>
-              <a:t>with </a:t>
-            </a:r>
-            <a:r>
-              <a:rPr lang="en-US" dirty="0">
-                <a:solidFill>
-                  <a:srgbClr val="FF0000"/>
-                </a:solidFill>
-                <a:latin typeface="Arial" pitchFamily="34" charset="0"/>
-                <a:cs typeface="Arial" pitchFamily="34" charset="0"/>
-              </a:rPr>
-              <a:t>colorectal adenomas</a:t>
+              <a:rPr lang="en-US" dirty="0" smtClean="0"/>
+              <a:t>92 genera</a:t>
+            </a:r>
+            <a:endParaRPr lang="en-US" dirty="0"/>
+          </a:p>
+        </p:txBody>
+      </p:sp>
+      <p:cxnSp>
+        <p:nvCxnSpPr>
+          <p:cNvPr id="10" name="Straight Arrow Connector 9"/>
+          <p:cNvCxnSpPr/>
+          <p:nvPr/>
+        </p:nvCxnSpPr>
+        <p:spPr>
+          <a:xfrm>
+            <a:off x="5284519" y="950026"/>
+            <a:ext cx="5130141" cy="0"/>
+          </a:xfrm>
+          <a:prstGeom prst="straightConnector1">
+            <a:avLst/>
+          </a:prstGeom>
+          <a:ln>
+            <a:tailEnd type="triangle"/>
+          </a:ln>
+        </p:spPr>
+        <p:style>
+          <a:lnRef idx="1">
+            <a:schemeClr val="accent1"/>
+          </a:lnRef>
+          <a:fillRef idx="0">
+            <a:schemeClr val="accent1"/>
+          </a:fillRef>
+          <a:effectRef idx="0">
+            <a:schemeClr val="accent1"/>
+          </a:effectRef>
+          <a:fontRef idx="minor">
+            <a:schemeClr val="tx1"/>
+          </a:fontRef>
+        </p:style>
+      </p:cxnSp>
+      <p:sp>
+        <p:nvSpPr>
+          <p:cNvPr id="11" name="Rectangle 10"/>
+          <p:cNvSpPr/>
+          <p:nvPr/>
+        </p:nvSpPr>
+        <p:spPr>
+          <a:xfrm>
+            <a:off x="0" y="6061914"/>
+            <a:ext cx="12326587" cy="369332"/>
+          </a:xfrm>
+          <a:prstGeom prst="rect">
+            <a:avLst/>
+          </a:prstGeom>
+        </p:spPr>
+        <p:txBody>
+          <a:bodyPr wrap="square">
+            <a:spAutoFit/>
+          </a:bodyPr>
+          <a:lstStyle/>
+          <a:p>
+            <a:r>
+              <a:rPr lang="en-US" dirty="0"/>
+              <a:t>https://github.com/afodor/metagenomicsTools/blob/master/src/gamlssDemo/genusPivotedTaxaAsColumnsNormCaseContol.txt</a:t>
             </a:r>
           </a:p>
         </p:txBody>
@@ -14394,20 +14608,13 @@
     </p:spTree>
     <p:extLst>
       <p:ext uri="{BB962C8B-B14F-4D97-AF65-F5344CB8AC3E}">
-        <p14:creationId xmlns:p14="http://schemas.microsoft.com/office/powerpoint/2010/main" val="3607637606"/>
+        <p14:creationId xmlns:p14="http://schemas.microsoft.com/office/powerpoint/2010/main" val="36487492"/>
       </p:ext>
     </p:extLst>
   </p:cSld>
   <p:clrMapOvr>
     <a:masterClrMapping/>
   </p:clrMapOvr>
-  <p:timing>
-    <p:tnLst>
-      <p:par>
-        <p:cTn id="1" dur="indefinite" restart="never" nodeType="tmRoot"/>
-      </p:par>
-    </p:tnLst>
-  </p:timing>
 </p:sld>
 </file>
 
@@ -14428,45 +14635,9 @@
           <a:chExt cx="0" cy="0"/>
         </a:xfrm>
       </p:grpSpPr>
-      <p:sp>
-        <p:nvSpPr>
-          <p:cNvPr id="2" name="TextBox 1"/>
-          <p:cNvSpPr txBox="1"/>
-          <p:nvPr/>
-        </p:nvSpPr>
-        <p:spPr>
-          <a:xfrm>
-            <a:off x="368135" y="237508"/>
-            <a:ext cx="10632141" cy="369332"/>
-          </a:xfrm>
-          <a:prstGeom prst="rect">
-            <a:avLst/>
-          </a:prstGeom>
-          <a:noFill/>
-        </p:spPr>
-        <p:txBody>
-          <a:bodyPr wrap="none" rtlCol="0">
-            <a:spAutoFit/>
-          </a:bodyPr>
-          <a:lstStyle/>
-          <a:p>
-            <a:r>
-              <a:rPr lang="en-US" dirty="0" smtClean="0">
-                <a:latin typeface="Arial" panose="020B0604020202020204" pitchFamily="34" charset="0"/>
-                <a:cs typeface="Arial" panose="020B0604020202020204" pitchFamily="34" charset="0"/>
-              </a:rPr>
-              <a:t>A version of the dataset is here..  (note this is a different taxonomic scheme than the published data…)</a:t>
-            </a:r>
-            <a:endParaRPr lang="en-US" dirty="0">
-              <a:latin typeface="Arial" panose="020B0604020202020204" pitchFamily="34" charset="0"/>
-              <a:cs typeface="Arial" panose="020B0604020202020204" pitchFamily="34" charset="0"/>
-            </a:endParaRPr>
-          </a:p>
-        </p:txBody>
-      </p:sp>
       <p:pic>
         <p:nvPicPr>
-          <p:cNvPr id="4" name="Picture 3"/>
+          <p:cNvPr id="3" name="Picture 2"/>
           <p:cNvPicPr>
             <a:picLocks noChangeAspect="1"/>
           </p:cNvPicPr>
@@ -14480,8 +14651,8 @@
         </p:blipFill>
         <p:spPr>
           <a:xfrm>
-            <a:off x="1475261" y="1150607"/>
-            <a:ext cx="9271907" cy="4710727"/>
+            <a:off x="1070509" y="1330040"/>
+            <a:ext cx="7806503" cy="3555781"/>
           </a:xfrm>
           <a:prstGeom prst="rect">
             <a:avLst/>
@@ -14490,14 +14661,14 @@
       </p:pic>
       <p:sp>
         <p:nvSpPr>
-          <p:cNvPr id="5" name="TextBox 4"/>
+          <p:cNvPr id="2" name="TextBox 1"/>
           <p:cNvSpPr txBox="1"/>
           <p:nvPr/>
         </p:nvSpPr>
         <p:spPr>
           <a:xfrm>
-            <a:off x="190005" y="1116281"/>
-            <a:ext cx="1236236" cy="369332"/>
+            <a:off x="510640" y="0"/>
+            <a:ext cx="11585223" cy="369332"/>
           </a:xfrm>
           <a:prstGeom prst="rect">
             <a:avLst/>
@@ -14511,23 +14682,65 @@
           <a:lstStyle/>
           <a:p>
             <a:r>
-              <a:rPr lang="en-US" dirty="0" smtClean="0"/>
-              <a:t>71 samples</a:t>
-            </a:r>
-            <a:endParaRPr lang="en-US" dirty="0"/>
+              <a:rPr lang="en-US" dirty="0" smtClean="0">
+                <a:latin typeface="Arial" panose="020B0604020202020204" pitchFamily="34" charset="0"/>
+                <a:cs typeface="Arial" panose="020B0604020202020204" pitchFamily="34" charset="0"/>
+              </a:rPr>
+              <a:t>Just as in the previous dataset, for each genus we can form a null hypothesis of no association with case/control</a:t>
+            </a:r>
+            <a:endParaRPr lang="en-US" dirty="0">
+              <a:latin typeface="Arial" panose="020B0604020202020204" pitchFamily="34" charset="0"/>
+              <a:cs typeface="Arial" panose="020B0604020202020204" pitchFamily="34" charset="0"/>
+            </a:endParaRPr>
+          </a:p>
+        </p:txBody>
+      </p:sp>
+      <p:sp>
+        <p:nvSpPr>
+          <p:cNvPr id="4" name="TextBox 3"/>
+          <p:cNvSpPr txBox="1"/>
+          <p:nvPr/>
+        </p:nvSpPr>
+        <p:spPr>
+          <a:xfrm>
+            <a:off x="700644" y="665020"/>
+            <a:ext cx="3168496" cy="369332"/>
+          </a:xfrm>
+          <a:prstGeom prst="rect">
+            <a:avLst/>
+          </a:prstGeom>
+          <a:noFill/>
+        </p:spPr>
+        <p:txBody>
+          <a:bodyPr wrap="none" rtlCol="0">
+            <a:spAutoFit/>
+          </a:bodyPr>
+          <a:lstStyle/>
+          <a:p>
+            <a:r>
+              <a:rPr lang="en-US" dirty="0" smtClean="0">
+                <a:latin typeface="Arial" panose="020B0604020202020204" pitchFamily="34" charset="0"/>
+                <a:cs typeface="Arial" panose="020B0604020202020204" pitchFamily="34" charset="0"/>
+              </a:rPr>
+              <a:t>We set up much as before….</a:t>
+            </a:r>
+            <a:endParaRPr lang="en-US" dirty="0">
+              <a:latin typeface="Arial" panose="020B0604020202020204" pitchFamily="34" charset="0"/>
+              <a:cs typeface="Arial" panose="020B0604020202020204" pitchFamily="34" charset="0"/>
+            </a:endParaRPr>
           </a:p>
         </p:txBody>
       </p:sp>
       <p:cxnSp>
         <p:nvCxnSpPr>
-          <p:cNvPr id="7" name="Straight Arrow Connector 6"/>
+          <p:cNvPr id="6" name="Straight Arrow Connector 5"/>
           <p:cNvCxnSpPr/>
           <p:nvPr/>
         </p:nvCxnSpPr>
         <p:spPr>
-          <a:xfrm>
-            <a:off x="902525" y="1567543"/>
-            <a:ext cx="0" cy="4548249"/>
+          <a:xfrm flipH="1">
+            <a:off x="3194460" y="4465124"/>
+            <a:ext cx="1306286" cy="0"/>
           </a:xfrm>
           <a:prstGeom prst="straightConnector1">
             <a:avLst/>
@@ -14553,14 +14766,14 @@
       </p:cxnSp>
       <p:sp>
         <p:nvSpPr>
-          <p:cNvPr id="8" name="TextBox 7"/>
+          <p:cNvPr id="7" name="TextBox 6"/>
           <p:cNvSpPr txBox="1"/>
           <p:nvPr/>
         </p:nvSpPr>
         <p:spPr>
           <a:xfrm>
-            <a:off x="3942608" y="783773"/>
-            <a:ext cx="1117357" cy="369332"/>
+            <a:off x="4512622" y="4239490"/>
+            <a:ext cx="5955476" cy="646331"/>
           </a:xfrm>
           <a:prstGeom prst="rect">
             <a:avLst/>
@@ -14574,56 +14787,75 @@
           <a:lstStyle/>
           <a:p>
             <a:r>
+              <a:rPr lang="en-US" dirty="0" smtClean="0">
+                <a:latin typeface="Arial" panose="020B0604020202020204" pitchFamily="34" charset="0"/>
+                <a:cs typeface="Arial" panose="020B0604020202020204" pitchFamily="34" charset="0"/>
+              </a:rPr>
+              <a:t>Here we will use a one-way ANOVA </a:t>
+            </a:r>
+          </a:p>
+          <a:p>
+            <a:r>
+              <a:rPr lang="en-US" dirty="0" smtClean="0">
+                <a:latin typeface="Arial" panose="020B0604020202020204" pitchFamily="34" charset="0"/>
+                <a:cs typeface="Arial" panose="020B0604020202020204" pitchFamily="34" charset="0"/>
+              </a:rPr>
+              <a:t>(equivalent to a t-test with assumption of equal variance)</a:t>
+            </a:r>
+            <a:endParaRPr lang="en-US" dirty="0">
+              <a:latin typeface="Arial" panose="020B0604020202020204" pitchFamily="34" charset="0"/>
+              <a:cs typeface="Arial" panose="020B0604020202020204" pitchFamily="34" charset="0"/>
+            </a:endParaRPr>
+          </a:p>
+        </p:txBody>
+      </p:sp>
+      <p:sp>
+        <p:nvSpPr>
+          <p:cNvPr id="8" name="TextBox 7"/>
+          <p:cNvSpPr txBox="1"/>
+          <p:nvPr/>
+        </p:nvSpPr>
+        <p:spPr>
+          <a:xfrm>
+            <a:off x="700644" y="5438899"/>
+            <a:ext cx="4533549" cy="369332"/>
+          </a:xfrm>
+          <a:prstGeom prst="rect">
+            <a:avLst/>
+          </a:prstGeom>
+          <a:noFill/>
+        </p:spPr>
+        <p:txBody>
+          <a:bodyPr wrap="none" rtlCol="0">
+            <a:spAutoFit/>
+          </a:bodyPr>
+          <a:lstStyle/>
+          <a:p>
+            <a:r>
               <a:rPr lang="en-US" dirty="0" smtClean="0"/>
-              <a:t>92 genera</a:t>
+              <a:t>We’ll talk about</a:t>
+            </a:r>
+            <a:r>
+              <a:rPr lang="en-US" dirty="0" smtClean="0">
+                <a:latin typeface="Arial" panose="020B0604020202020204" pitchFamily="34" charset="0"/>
+                <a:cs typeface="Arial" panose="020B0604020202020204" pitchFamily="34" charset="0"/>
+              </a:rPr>
+              <a:t> all those other tests in a bit!</a:t>
             </a:r>
             <a:endParaRPr lang="en-US" dirty="0"/>
           </a:p>
         </p:txBody>
       </p:sp>
-      <p:cxnSp>
-        <p:nvCxnSpPr>
-          <p:cNvPr id="10" name="Straight Arrow Connector 9"/>
-          <p:cNvCxnSpPr/>
-          <p:nvPr/>
-        </p:nvCxnSpPr>
-        <p:spPr>
-          <a:xfrm>
-            <a:off x="5284519" y="950026"/>
-            <a:ext cx="5130141" cy="0"/>
-          </a:xfrm>
-          <a:prstGeom prst="straightConnector1">
-            <a:avLst/>
-          </a:prstGeom>
-          <a:ln>
-            <a:tailEnd type="triangle"/>
-          </a:ln>
-        </p:spPr>
-        <p:style>
-          <a:lnRef idx="1">
-            <a:schemeClr val="accent1"/>
-          </a:lnRef>
-          <a:fillRef idx="0">
-            <a:schemeClr val="accent1"/>
-          </a:fillRef>
-          <a:effectRef idx="0">
-            <a:schemeClr val="accent1"/>
-          </a:effectRef>
-          <a:fontRef idx="minor">
-            <a:schemeClr val="tx1"/>
-          </a:fontRef>
-        </p:style>
-      </p:cxnSp>
-      <p:sp>
-        <p:nvSpPr>
-          <p:cNvPr id="11" name="Rectangle 10"/>
+      <p:sp>
+        <p:nvSpPr>
+          <p:cNvPr id="9" name="Rectangle 8"/>
           <p:cNvSpPr/>
           <p:nvPr/>
         </p:nvSpPr>
         <p:spPr>
           <a:xfrm>
-            <a:off x="0" y="6061914"/>
-            <a:ext cx="12326587" cy="369332"/>
+            <a:off x="364176" y="6173832"/>
+            <a:ext cx="11095511" cy="369332"/>
           </a:xfrm>
           <a:prstGeom prst="rect">
             <a:avLst/>
@@ -14637,7 +14869,7 @@
           <a:p>
             <a:r>
               <a:rPr lang="en-US" dirty="0"/>
-              <a:t>https://github.com/afodor/metagenomicsTools/blob/master/src/gamlssDemo/genusPivotedTaxaAsColumnsNormCaseContol.txt</a:t>
+              <a:t>https://github.com/afodor/metagenomicsTools/blob/master/src/gamlssDemo/quickFit.txt</a:t>
             </a:r>
           </a:p>
         </p:txBody>
@@ -14645,7 +14877,7 @@
     </p:spTree>
     <p:extLst>
       <p:ext uri="{BB962C8B-B14F-4D97-AF65-F5344CB8AC3E}">
-        <p14:creationId xmlns:p14="http://schemas.microsoft.com/office/powerpoint/2010/main" val="36487492"/>
+        <p14:creationId xmlns:p14="http://schemas.microsoft.com/office/powerpoint/2010/main" val="3401895557"/>
       </p:ext>
     </p:extLst>
   </p:cSld>
@@ -14672,30 +14904,6 @@
           <a:chExt cx="0" cy="0"/>
         </a:xfrm>
       </p:grpSpPr>
-      <p:pic>
-        <p:nvPicPr>
-          <p:cNvPr id="3" name="Picture 2"/>
-          <p:cNvPicPr>
-            <a:picLocks noChangeAspect="1"/>
-          </p:cNvPicPr>
-          <p:nvPr/>
-        </p:nvPicPr>
-        <p:blipFill>
-          <a:blip r:embed="rId2"/>
-          <a:stretch>
-            <a:fillRect/>
-          </a:stretch>
-        </p:blipFill>
-        <p:spPr>
-          <a:xfrm>
-            <a:off x="1070509" y="1330040"/>
-            <a:ext cx="7806503" cy="3555781"/>
-          </a:xfrm>
-          <a:prstGeom prst="rect">
-            <a:avLst/>
-          </a:prstGeom>
-        </p:spPr>
-      </p:pic>
       <p:sp>
         <p:nvSpPr>
           <p:cNvPr id="2" name="TextBox 1"/>
@@ -14704,8 +14912,8 @@
         </p:nvSpPr>
         <p:spPr>
           <a:xfrm>
-            <a:off x="510640" y="0"/>
-            <a:ext cx="11585223" cy="369332"/>
+            <a:off x="1163782" y="-71252"/>
+            <a:ext cx="9909508" cy="369332"/>
           </a:xfrm>
           <a:prstGeom prst="rect">
             <a:avLst/>
@@ -14723,7 +14931,7 @@
                 <a:latin typeface="Arial" panose="020B0604020202020204" pitchFamily="34" charset="0"/>
                 <a:cs typeface="Arial" panose="020B0604020202020204" pitchFamily="34" charset="0"/>
               </a:rPr>
-              <a:t>Just as in the previous dataset, for each genus we can form a null hypothesis of no association with case/control</a:t>
+              <a:t>Here we are taxa are in columns, but the same idea.  Walk through, build a model for each taxa</a:t>
             </a:r>
             <a:endParaRPr lang="en-US" dirty="0">
               <a:latin typeface="Arial" panose="020B0604020202020204" pitchFamily="34" charset="0"/>
@@ -14734,14 +14942,448 @@
       </p:sp>
       <p:sp>
         <p:nvSpPr>
-          <p:cNvPr id="4" name="TextBox 3"/>
+          <p:cNvPr id="3" name="Rectangle 2"/>
+          <p:cNvSpPr/>
+          <p:nvPr/>
+        </p:nvSpPr>
+        <p:spPr>
+          <a:xfrm>
+            <a:off x="352301" y="-46307"/>
+            <a:ext cx="11839699" cy="6463308"/>
+          </a:xfrm>
+          <a:prstGeom prst="rect">
+            <a:avLst/>
+          </a:prstGeom>
+        </p:spPr>
+        <p:txBody>
+          <a:bodyPr wrap="square">
+            <a:spAutoFit/>
+          </a:bodyPr>
+          <a:lstStyle/>
+          <a:p>
+            <a:endParaRPr lang="en-US" dirty="0"/>
+          </a:p>
+          <a:p>
+            <a:r>
+              <a:rPr lang="en-US" dirty="0"/>
+              <a:t>pdf("genus.pdf")</a:t>
+            </a:r>
+          </a:p>
+          <a:p>
+            <a:r>
+              <a:rPr lang="en-US" dirty="0" smtClean="0"/>
+              <a:t>par(</a:t>
+            </a:r>
+            <a:r>
+              <a:rPr lang="en-US" dirty="0" err="1" smtClean="0"/>
+              <a:t>mfrow</a:t>
+            </a:r>
+            <a:r>
+              <a:rPr lang="en-US" dirty="0" smtClean="0"/>
+              <a:t>=c(3,2</a:t>
+            </a:r>
+            <a:r>
+              <a:rPr lang="en-US" dirty="0"/>
+              <a:t>))</a:t>
+            </a:r>
+          </a:p>
+          <a:p>
+            <a:endParaRPr lang="en-US" dirty="0"/>
+          </a:p>
+          <a:p>
+            <a:r>
+              <a:rPr lang="en-US" dirty="0"/>
+              <a:t>for( </a:t>
+            </a:r>
+            <a:r>
+              <a:rPr lang="en-US" dirty="0" err="1"/>
+              <a:t>i</a:t>
+            </a:r>
+            <a:r>
+              <a:rPr lang="en-US" dirty="0"/>
+              <a:t> in 2:ncol(</a:t>
+            </a:r>
+            <a:r>
+              <a:rPr lang="en-US" dirty="0" err="1"/>
+              <a:t>myT</a:t>
+            </a:r>
+            <a:r>
+              <a:rPr lang="en-US" dirty="0"/>
+              <a:t>))</a:t>
+            </a:r>
+          </a:p>
+          <a:p>
+            <a:r>
+              <a:rPr lang="en-US" dirty="0"/>
+              <a:t>{</a:t>
+            </a:r>
+          </a:p>
+          <a:p>
+            <a:r>
+              <a:rPr lang="nn-NO" dirty="0" smtClean="0"/>
+              <a:t>	myFrame </a:t>
+            </a:r>
+            <a:r>
+              <a:rPr lang="nn-NO" dirty="0"/>
+              <a:t>&lt;- data.frame( bug = myT[,i], logBug = log10(myT[,i] + + 0.00001),</a:t>
+            </a:r>
+          </a:p>
+          <a:p>
+            <a:r>
+              <a:rPr lang="en-US" dirty="0" smtClean="0"/>
+              <a:t>	 </a:t>
+            </a:r>
+            <a:r>
+              <a:rPr lang="en-US" dirty="0" err="1"/>
+              <a:t>isCase</a:t>
+            </a:r>
+            <a:r>
+              <a:rPr lang="en-US" dirty="0"/>
+              <a:t> = </a:t>
+            </a:r>
+            <a:r>
+              <a:rPr lang="en-US" dirty="0" err="1"/>
+              <a:t>grepl</a:t>
+            </a:r>
+            <a:r>
+              <a:rPr lang="en-US" dirty="0"/>
+              <a:t>("case",</a:t>
+            </a:r>
+            <a:r>
+              <a:rPr lang="en-US" dirty="0" err="1"/>
+              <a:t>row.names</a:t>
+            </a:r>
+            <a:r>
+              <a:rPr lang="en-US" dirty="0"/>
+              <a:t>(</a:t>
+            </a:r>
+            <a:r>
+              <a:rPr lang="en-US" dirty="0" err="1"/>
+              <a:t>myT</a:t>
+            </a:r>
+            <a:r>
+              <a:rPr lang="en-US" dirty="0" smtClean="0"/>
+              <a:t>)))</a:t>
+            </a:r>
+            <a:endParaRPr lang="en-US" dirty="0"/>
+          </a:p>
+          <a:p>
+            <a:r>
+              <a:rPr lang="en-US" dirty="0" smtClean="0"/>
+              <a:t>	</a:t>
+            </a:r>
+            <a:r>
+              <a:rPr lang="en-US" dirty="0" err="1" smtClean="0"/>
+              <a:t>myLm</a:t>
+            </a:r>
+            <a:r>
+              <a:rPr lang="en-US" dirty="0" smtClean="0"/>
+              <a:t> </a:t>
+            </a:r>
+            <a:r>
+              <a:rPr lang="en-US" dirty="0"/>
+              <a:t>&lt;- lm( </a:t>
+            </a:r>
+            <a:r>
+              <a:rPr lang="en-US" dirty="0" err="1"/>
+              <a:t>myFrame$logBug</a:t>
+            </a:r>
+            <a:r>
+              <a:rPr lang="en-US" dirty="0"/>
+              <a:t> ~ </a:t>
+            </a:r>
+            <a:r>
+              <a:rPr lang="en-US" dirty="0" err="1"/>
+              <a:t>myFrame$isCase</a:t>
+            </a:r>
+            <a:r>
+              <a:rPr lang="en-US" dirty="0"/>
+              <a:t> )</a:t>
+            </a:r>
+          </a:p>
+          <a:p>
+            <a:r>
+              <a:rPr lang="en-US" dirty="0" smtClean="0"/>
+              <a:t>	index </a:t>
+            </a:r>
+            <a:r>
+              <a:rPr lang="en-US" dirty="0"/>
+              <a:t>&lt;- </a:t>
+            </a:r>
+            <a:r>
+              <a:rPr lang="en-US" dirty="0" err="1"/>
+              <a:t>i</a:t>
+            </a:r>
+            <a:r>
+              <a:rPr lang="en-US" dirty="0"/>
+              <a:t> -1</a:t>
+            </a:r>
+          </a:p>
+          <a:p>
+            <a:endParaRPr lang="en-US" dirty="0"/>
+          </a:p>
+          <a:p>
+            <a:r>
+              <a:rPr lang="en-US" dirty="0" smtClean="0"/>
+              <a:t>	</a:t>
+            </a:r>
+            <a:r>
+              <a:rPr lang="en-US" dirty="0" err="1" smtClean="0"/>
+              <a:t>lmPValues</a:t>
+            </a:r>
+            <a:r>
+              <a:rPr lang="en-US" dirty="0" smtClean="0"/>
+              <a:t>[index</a:t>
+            </a:r>
+            <a:r>
+              <a:rPr lang="en-US" dirty="0"/>
+              <a:t>] &lt;- </a:t>
+            </a:r>
+            <a:r>
+              <a:rPr lang="en-US" dirty="0" err="1"/>
+              <a:t>anova</a:t>
+            </a:r>
+            <a:r>
+              <a:rPr lang="en-US" dirty="0"/>
+              <a:t>(</a:t>
+            </a:r>
+            <a:r>
+              <a:rPr lang="en-US" dirty="0" err="1"/>
+              <a:t>myLm</a:t>
+            </a:r>
+            <a:r>
+              <a:rPr lang="en-US" dirty="0"/>
+              <a:t>)$"</a:t>
+            </a:r>
+            <a:r>
+              <a:rPr lang="en-US" dirty="0" err="1"/>
+              <a:t>Pr</a:t>
+            </a:r>
+            <a:r>
+              <a:rPr lang="en-US" dirty="0"/>
+              <a:t>(&gt;F)"[1]</a:t>
+            </a:r>
+          </a:p>
+          <a:p>
+            <a:r>
+              <a:rPr lang="en-US" dirty="0" smtClean="0"/>
+              <a:t>	names[index</a:t>
+            </a:r>
+            <a:r>
+              <a:rPr lang="en-US" dirty="0"/>
+              <a:t>] &lt;- names( </a:t>
+            </a:r>
+            <a:r>
+              <a:rPr lang="en-US" dirty="0" err="1"/>
+              <a:t>myT</a:t>
+            </a:r>
+            <a:r>
+              <a:rPr lang="en-US" dirty="0"/>
+              <a:t>)[</a:t>
+            </a:r>
+            <a:r>
+              <a:rPr lang="en-US" dirty="0" err="1"/>
+              <a:t>i</a:t>
+            </a:r>
+            <a:r>
+              <a:rPr lang="en-US" dirty="0"/>
+              <a:t>]</a:t>
+            </a:r>
+          </a:p>
+          <a:p>
+            <a:endParaRPr lang="en-US" dirty="0"/>
+          </a:p>
+          <a:p>
+            <a:r>
+              <a:rPr lang="en-US" dirty="0" smtClean="0"/>
+              <a:t>	if</a:t>
+            </a:r>
+            <a:r>
+              <a:rPr lang="en-US" dirty="0"/>
+              <a:t>( </a:t>
+            </a:r>
+            <a:r>
+              <a:rPr lang="en-US" dirty="0" err="1"/>
+              <a:t>lmPValues</a:t>
+            </a:r>
+            <a:r>
+              <a:rPr lang="en-US" dirty="0"/>
+              <a:t>[index] &lt; 0.05) </a:t>
+            </a:r>
+          </a:p>
+          <a:p>
+            <a:pPr lvl="2"/>
+            <a:r>
+              <a:rPr lang="en-US" dirty="0"/>
+              <a:t>{</a:t>
+            </a:r>
+          </a:p>
+          <a:p>
+            <a:pPr lvl="3"/>
+            <a:r>
+              <a:rPr lang="en-US" dirty="0" err="1"/>
+              <a:t>graphMain</a:t>
+            </a:r>
+            <a:r>
+              <a:rPr lang="en-US" dirty="0"/>
+              <a:t> &lt;- paste( "p=" , format(</a:t>
+            </a:r>
+            <a:r>
+              <a:rPr lang="en-US" dirty="0" err="1"/>
+              <a:t>lmPValues</a:t>
+            </a:r>
+            <a:r>
+              <a:rPr lang="en-US" dirty="0"/>
+              <a:t>[index],digits=3))</a:t>
+            </a:r>
+          </a:p>
+          <a:p>
+            <a:pPr lvl="3"/>
+            <a:r>
+              <a:rPr lang="en-US" dirty="0"/>
+              <a:t>boxplot( </a:t>
+            </a:r>
+            <a:r>
+              <a:rPr lang="en-US" dirty="0" err="1"/>
+              <a:t>as.numeric</a:t>
+            </a:r>
+            <a:r>
+              <a:rPr lang="en-US" dirty="0"/>
+              <a:t>(</a:t>
+            </a:r>
+            <a:r>
+              <a:rPr lang="en-US" dirty="0" err="1"/>
+              <a:t>myFrame$logBug</a:t>
+            </a:r>
+            <a:r>
+              <a:rPr lang="en-US" dirty="0"/>
+              <a:t>) ~ </a:t>
+            </a:r>
+            <a:r>
+              <a:rPr lang="en-US" dirty="0" err="1"/>
+              <a:t>myFrame$isCase</a:t>
+            </a:r>
+            <a:r>
+              <a:rPr lang="en-US" dirty="0"/>
+              <a:t>, </a:t>
+            </a:r>
+          </a:p>
+          <a:p>
+            <a:pPr lvl="3"/>
+            <a:r>
+              <a:rPr lang="en-US" dirty="0" err="1"/>
+              <a:t>ylab</a:t>
+            </a:r>
+            <a:r>
+              <a:rPr lang="en-US" dirty="0"/>
+              <a:t> = paste("log10(",names[index],")",</a:t>
+            </a:r>
+            <a:r>
+              <a:rPr lang="en-US" dirty="0" err="1"/>
+              <a:t>sep</a:t>
+            </a:r>
+            <a:r>
+              <a:rPr lang="en-US" dirty="0"/>
+              <a:t>=""),main = </a:t>
+            </a:r>
+            <a:r>
+              <a:rPr lang="en-US" dirty="0" err="1"/>
+              <a:t>graphMain</a:t>
+            </a:r>
+            <a:r>
+              <a:rPr lang="en-US" dirty="0"/>
+              <a:t> , </a:t>
+            </a:r>
+            <a:r>
+              <a:rPr lang="en-US" dirty="0" err="1"/>
+              <a:t>xlab</a:t>
+            </a:r>
+            <a:r>
+              <a:rPr lang="en-US" dirty="0"/>
+              <a:t>="is Case")</a:t>
+            </a:r>
+          </a:p>
+          <a:p>
+            <a:pPr lvl="3"/>
+            <a:r>
+              <a:rPr lang="en-US" dirty="0" err="1"/>
+              <a:t>stripchart</a:t>
+            </a:r>
+            <a:r>
+              <a:rPr lang="en-US" dirty="0"/>
+              <a:t>(</a:t>
+            </a:r>
+            <a:r>
+              <a:rPr lang="en-US" dirty="0" err="1"/>
+              <a:t>logBug</a:t>
+            </a:r>
+            <a:r>
+              <a:rPr lang="en-US" dirty="0"/>
+              <a:t> ~ </a:t>
+            </a:r>
+            <a:r>
+              <a:rPr lang="en-US" dirty="0" err="1"/>
+              <a:t>isCase</a:t>
+            </a:r>
+            <a:r>
+              <a:rPr lang="en-US" dirty="0"/>
+              <a:t>, data = </a:t>
+            </a:r>
+            <a:r>
+              <a:rPr lang="en-US" dirty="0" err="1"/>
+              <a:t>myFrame,vertical</a:t>
+            </a:r>
+            <a:r>
+              <a:rPr lang="en-US" dirty="0"/>
+              <a:t> = TRUE, </a:t>
+            </a:r>
+            <a:r>
+              <a:rPr lang="en-US" dirty="0" err="1"/>
+              <a:t>pch</a:t>
+            </a:r>
+            <a:r>
+              <a:rPr lang="en-US" dirty="0"/>
+              <a:t> = 21, add=TRUE )</a:t>
+            </a:r>
+          </a:p>
+          <a:p>
+            <a:pPr lvl="2"/>
+            <a:r>
+              <a:rPr lang="en-US" dirty="0"/>
+              <a:t>}</a:t>
+            </a:r>
+          </a:p>
+          <a:p>
+            <a:r>
+              <a:rPr lang="en-US" dirty="0"/>
+              <a:t>}</a:t>
+            </a:r>
+          </a:p>
+          <a:p>
+            <a:r>
+              <a:rPr lang="en-US" dirty="0" err="1" smtClean="0"/>
+              <a:t>dev.off</a:t>
+            </a:r>
+            <a:r>
+              <a:rPr lang="en-US" dirty="0" smtClean="0"/>
+              <a:t>()</a:t>
+            </a:r>
+            <a:endParaRPr lang="en-US" dirty="0">
+              <a:latin typeface="Courier New" panose="02070309020205020404" pitchFamily="49" charset="0"/>
+            </a:endParaRPr>
+          </a:p>
+        </p:txBody>
+      </p:sp>
+      <p:sp>
+        <p:nvSpPr>
+          <p:cNvPr id="8" name="TextBox 7"/>
           <p:cNvSpPr txBox="1"/>
           <p:nvPr/>
         </p:nvSpPr>
         <p:spPr>
           <a:xfrm>
-            <a:off x="700644" y="665020"/>
-            <a:ext cx="3168496" cy="369332"/>
+            <a:off x="8027721" y="1864424"/>
+            <a:ext cx="2929072" cy="646331"/>
           </a:xfrm>
           <a:prstGeom prst="rect">
             <a:avLst/>
@@ -14759,7 +15401,16 @@
                 <a:latin typeface="Arial" panose="020B0604020202020204" pitchFamily="34" charset="0"/>
                 <a:cs typeface="Arial" panose="020B0604020202020204" pitchFamily="34" charset="0"/>
               </a:rPr>
-              <a:t>We set up much as before….</a:t>
+              <a:t>A linear model:</a:t>
+            </a:r>
+          </a:p>
+          <a:p>
+            <a:r>
+              <a:rPr lang="en-US" dirty="0" smtClean="0">
+                <a:latin typeface="Arial" panose="020B0604020202020204" pitchFamily="34" charset="0"/>
+                <a:cs typeface="Arial" panose="020B0604020202020204" pitchFamily="34" charset="0"/>
+              </a:rPr>
+              <a:t>taxa = case/control + error</a:t>
             </a:r>
             <a:endParaRPr lang="en-US" dirty="0">
               <a:latin typeface="Arial" panose="020B0604020202020204" pitchFamily="34" charset="0"/>
@@ -14768,6 +15419,75 @@
           </a:p>
         </p:txBody>
       </p:sp>
+      <p:sp>
+        <p:nvSpPr>
+          <p:cNvPr id="11" name="TextBox 10"/>
+          <p:cNvSpPr txBox="1"/>
+          <p:nvPr/>
+        </p:nvSpPr>
+        <p:spPr>
+          <a:xfrm>
+            <a:off x="6200900" y="2870977"/>
+            <a:ext cx="5810245" cy="646331"/>
+          </a:xfrm>
+          <a:prstGeom prst="rect">
+            <a:avLst/>
+          </a:prstGeom>
+          <a:noFill/>
+        </p:spPr>
+        <p:txBody>
+          <a:bodyPr wrap="none" rtlCol="0">
+            <a:spAutoFit/>
+          </a:bodyPr>
+          <a:lstStyle/>
+          <a:p>
+            <a:r>
+              <a:rPr lang="en-US" dirty="0" smtClean="0">
+                <a:latin typeface="Arial" panose="020B0604020202020204" pitchFamily="34" charset="0"/>
+                <a:cs typeface="Arial" panose="020B0604020202020204" pitchFamily="34" charset="0"/>
+              </a:rPr>
+              <a:t>Use ANOVA to test the hypothesis that the case/control</a:t>
+            </a:r>
+          </a:p>
+          <a:p>
+            <a:r>
+              <a:rPr lang="en-US" dirty="0" smtClean="0">
+                <a:latin typeface="Arial" panose="020B0604020202020204" pitchFamily="34" charset="0"/>
+                <a:cs typeface="Arial" panose="020B0604020202020204" pitchFamily="34" charset="0"/>
+              </a:rPr>
+              <a:t>parameter is == 0 </a:t>
+            </a:r>
+          </a:p>
+        </p:txBody>
+      </p:sp>
+      <p:sp>
+        <p:nvSpPr>
+          <p:cNvPr id="12" name="Rectangle 11"/>
+          <p:cNvSpPr/>
+          <p:nvPr/>
+        </p:nvSpPr>
+        <p:spPr>
+          <a:xfrm>
+            <a:off x="364176" y="6268832"/>
+            <a:ext cx="11095511" cy="369332"/>
+          </a:xfrm>
+          <a:prstGeom prst="rect">
+            <a:avLst/>
+          </a:prstGeom>
+        </p:spPr>
+        <p:txBody>
+          <a:bodyPr wrap="square">
+            <a:spAutoFit/>
+          </a:bodyPr>
+          <a:lstStyle/>
+          <a:p>
+            <a:r>
+              <a:rPr lang="en-US" dirty="0"/>
+              <a:t>https://github.com/afodor/metagenomicsTools/blob/master/src/gamlssDemo/quickFit.txt</a:t>
+            </a:r>
+          </a:p>
+        </p:txBody>
+      </p:sp>
       <p:cxnSp>
         <p:nvCxnSpPr>
           <p:cNvPr id="6" name="Straight Arrow Connector 5"/>
@@ -14776,8 +15496,8 @@
         </p:nvCxnSpPr>
         <p:spPr>
           <a:xfrm flipH="1">
-            <a:off x="3194460" y="4465124"/>
-            <a:ext cx="1306286" cy="0"/>
+            <a:off x="6163294" y="2173182"/>
+            <a:ext cx="1805049" cy="0"/>
           </a:xfrm>
           <a:prstGeom prst="straightConnector1">
             <a:avLst/>
@@ -14801,16 +15521,82 @@
           </a:fontRef>
         </p:style>
       </p:cxnSp>
-      <p:sp>
-        <p:nvSpPr>
-          <p:cNvPr id="7" name="TextBox 6"/>
+      <p:cxnSp>
+        <p:nvCxnSpPr>
+          <p:cNvPr id="9" name="Straight Arrow Connector 8"/>
+          <p:cNvCxnSpPr/>
+          <p:nvPr/>
+        </p:nvCxnSpPr>
+        <p:spPr>
+          <a:xfrm flipH="1">
+            <a:off x="5747657" y="3087584"/>
+            <a:ext cx="415637" cy="23751"/>
+          </a:xfrm>
+          <a:prstGeom prst="straightConnector1">
+            <a:avLst/>
+          </a:prstGeom>
+          <a:ln>
+            <a:tailEnd type="triangle"/>
+          </a:ln>
+        </p:spPr>
+        <p:style>
+          <a:lnRef idx="1">
+            <a:schemeClr val="accent1"/>
+          </a:lnRef>
+          <a:fillRef idx="0">
+            <a:schemeClr val="accent1"/>
+          </a:fillRef>
+          <a:effectRef idx="0">
+            <a:schemeClr val="accent1"/>
+          </a:effectRef>
+          <a:fontRef idx="minor">
+            <a:schemeClr val="tx1"/>
+          </a:fontRef>
+        </p:style>
+      </p:cxnSp>
+      <p:cxnSp>
+        <p:nvCxnSpPr>
+          <p:cNvPr id="14" name="Straight Arrow Connector 13"/>
+          <p:cNvCxnSpPr/>
+          <p:nvPr/>
+        </p:nvCxnSpPr>
+        <p:spPr>
+          <a:xfrm flipH="1">
+            <a:off x="2303815" y="653143"/>
+            <a:ext cx="1294410" cy="0"/>
+          </a:xfrm>
+          <a:prstGeom prst="straightConnector1">
+            <a:avLst/>
+          </a:prstGeom>
+          <a:ln>
+            <a:tailEnd type="triangle"/>
+          </a:ln>
+        </p:spPr>
+        <p:style>
+          <a:lnRef idx="1">
+            <a:schemeClr val="accent1"/>
+          </a:lnRef>
+          <a:fillRef idx="0">
+            <a:schemeClr val="accent1"/>
+          </a:fillRef>
+          <a:effectRef idx="0">
+            <a:schemeClr val="accent1"/>
+          </a:effectRef>
+          <a:fontRef idx="minor">
+            <a:schemeClr val="tx1"/>
+          </a:fontRef>
+        </p:style>
+      </p:cxnSp>
+      <p:sp>
+        <p:nvSpPr>
+          <p:cNvPr id="15" name="TextBox 14"/>
           <p:cNvSpPr txBox="1"/>
           <p:nvPr/>
         </p:nvSpPr>
         <p:spPr>
           <a:xfrm>
-            <a:off x="4512622" y="4239490"/>
-            <a:ext cx="5955476" cy="646331"/>
+            <a:off x="3645724" y="510641"/>
+            <a:ext cx="2249334" cy="369332"/>
           </a:xfrm>
           <a:prstGeom prst="rect">
             <a:avLst/>
@@ -14828,16 +15614,7 @@
                 <a:latin typeface="Arial" panose="020B0604020202020204" pitchFamily="34" charset="0"/>
                 <a:cs typeface="Arial" panose="020B0604020202020204" pitchFamily="34" charset="0"/>
               </a:rPr>
-              <a:t>Here we will use a one-way ANOVA </a:t>
-            </a:r>
-          </a:p>
-          <a:p>
-            <a:r>
-              <a:rPr lang="en-US" dirty="0" smtClean="0">
-                <a:latin typeface="Arial" panose="020B0604020202020204" pitchFamily="34" charset="0"/>
-                <a:cs typeface="Arial" panose="020B0604020202020204" pitchFamily="34" charset="0"/>
-              </a:rPr>
-              <a:t>(equivalent to a t-test with assumption of equal variance)</a:t>
+              <a:t>Six graphs per page</a:t>
             </a:r>
             <a:endParaRPr lang="en-US" dirty="0">
               <a:latin typeface="Arial" panose="020B0604020202020204" pitchFamily="34" charset="0"/>
@@ -14846,16 +15623,49 @@
           </a:p>
         </p:txBody>
       </p:sp>
-      <p:sp>
-        <p:nvSpPr>
-          <p:cNvPr id="8" name="TextBox 7"/>
+      <p:cxnSp>
+        <p:nvCxnSpPr>
+          <p:cNvPr id="17" name="Straight Arrow Connector 16"/>
+          <p:cNvCxnSpPr/>
+          <p:nvPr/>
+        </p:nvCxnSpPr>
+        <p:spPr>
+          <a:xfrm flipH="1">
+            <a:off x="1282535" y="6139543"/>
+            <a:ext cx="665019" cy="11875"/>
+          </a:xfrm>
+          <a:prstGeom prst="straightConnector1">
+            <a:avLst/>
+          </a:prstGeom>
+          <a:ln>
+            <a:tailEnd type="triangle"/>
+          </a:ln>
+        </p:spPr>
+        <p:style>
+          <a:lnRef idx="1">
+            <a:schemeClr val="accent1"/>
+          </a:lnRef>
+          <a:fillRef idx="0">
+            <a:schemeClr val="accent1"/>
+          </a:fillRef>
+          <a:effectRef idx="0">
+            <a:schemeClr val="accent1"/>
+          </a:effectRef>
+          <a:fontRef idx="minor">
+            <a:schemeClr val="tx1"/>
+          </a:fontRef>
+        </p:style>
+      </p:cxnSp>
+      <p:sp>
+        <p:nvSpPr>
+          <p:cNvPr id="19" name="TextBox 18"/>
           <p:cNvSpPr txBox="1"/>
           <p:nvPr/>
         </p:nvSpPr>
         <p:spPr>
           <a:xfrm>
-            <a:off x="700644" y="5438899"/>
-            <a:ext cx="4533549" cy="369332"/>
+            <a:off x="1923811" y="5913910"/>
+            <a:ext cx="4720203" cy="369332"/>
           </a:xfrm>
           <a:prstGeom prst="rect">
             <a:avLst/>
@@ -14869,52 +15679,92 @@
           <a:lstStyle/>
           <a:p>
             <a:r>
-              <a:rPr lang="en-US" dirty="0" smtClean="0"/>
-              <a:t>We’ll talk about</a:t>
-            </a:r>
-            <a:r>
               <a:rPr lang="en-US" dirty="0" smtClean="0">
                 <a:latin typeface="Arial" panose="020B0604020202020204" pitchFamily="34" charset="0"/>
                 <a:cs typeface="Arial" panose="020B0604020202020204" pitchFamily="34" charset="0"/>
               </a:rPr>
-              <a:t> all those other tests in a bit!</a:t>
-            </a:r>
-            <a:endParaRPr lang="en-US" dirty="0"/>
-          </a:p>
-        </p:txBody>
-      </p:sp>
-      <p:sp>
-        <p:nvSpPr>
-          <p:cNvPr id="9" name="Rectangle 8"/>
-          <p:cNvSpPr/>
-          <p:nvPr/>
-        </p:nvSpPr>
-        <p:spPr>
-          <a:xfrm>
-            <a:off x="364176" y="6173832"/>
-            <a:ext cx="11095511" cy="369332"/>
-          </a:xfrm>
-          <a:prstGeom prst="rect">
-            <a:avLst/>
-          </a:prstGeom>
-        </p:spPr>
-        <p:txBody>
-          <a:bodyPr wrap="square">
+              <a:t>Don’t forget to turn off the pdf output stream!</a:t>
+            </a:r>
+            <a:endParaRPr lang="en-US" dirty="0">
+              <a:latin typeface="Arial" panose="020B0604020202020204" pitchFamily="34" charset="0"/>
+              <a:cs typeface="Arial" panose="020B0604020202020204" pitchFamily="34" charset="0"/>
+            </a:endParaRPr>
+          </a:p>
+        </p:txBody>
+      </p:sp>
+      <p:cxnSp>
+        <p:nvCxnSpPr>
+          <p:cNvPr id="21" name="Straight Arrow Connector 20"/>
+          <p:cNvCxnSpPr/>
+          <p:nvPr/>
+        </p:nvCxnSpPr>
+        <p:spPr>
+          <a:xfrm flipH="1" flipV="1">
+            <a:off x="4025735" y="3930732"/>
+            <a:ext cx="795647" cy="23750"/>
+          </a:xfrm>
+          <a:prstGeom prst="straightConnector1">
+            <a:avLst/>
+          </a:prstGeom>
+          <a:ln>
+            <a:tailEnd type="triangle"/>
+          </a:ln>
+        </p:spPr>
+        <p:style>
+          <a:lnRef idx="1">
+            <a:schemeClr val="accent1"/>
+          </a:lnRef>
+          <a:fillRef idx="0">
+            <a:schemeClr val="accent1"/>
+          </a:fillRef>
+          <a:effectRef idx="0">
+            <a:schemeClr val="accent1"/>
+          </a:effectRef>
+          <a:fontRef idx="minor">
+            <a:schemeClr val="tx1"/>
+          </a:fontRef>
+        </p:style>
+      </p:cxnSp>
+      <p:sp>
+        <p:nvSpPr>
+          <p:cNvPr id="22" name="TextBox 21"/>
+          <p:cNvSpPr txBox="1"/>
+          <p:nvPr/>
+        </p:nvSpPr>
+        <p:spPr>
+          <a:xfrm>
+            <a:off x="4892637" y="3788230"/>
+            <a:ext cx="4519186" cy="369332"/>
+          </a:xfrm>
+          <a:prstGeom prst="rect">
+            <a:avLst/>
+          </a:prstGeom>
+          <a:noFill/>
+        </p:spPr>
+        <p:txBody>
+          <a:bodyPr wrap="none" rtlCol="0">
             <a:spAutoFit/>
           </a:bodyPr>
           <a:lstStyle/>
           <a:p>
             <a:r>
-              <a:rPr lang="en-US" dirty="0"/>
-              <a:t>https://github.com/afodor/metagenomicsTools/blob/master/src/gamlssDemo/quickFit.txt</a:t>
-            </a:r>
+              <a:rPr lang="en-US" dirty="0" smtClean="0">
+                <a:latin typeface="Arial" panose="020B0604020202020204" pitchFamily="34" charset="0"/>
+                <a:cs typeface="Arial" panose="020B0604020202020204" pitchFamily="34" charset="0"/>
+              </a:rPr>
+              <a:t>Capture hits at an (uncorrected) threshold</a:t>
+            </a:r>
+            <a:endParaRPr lang="en-US" dirty="0">
+              <a:latin typeface="Arial" panose="020B0604020202020204" pitchFamily="34" charset="0"/>
+              <a:cs typeface="Arial" panose="020B0604020202020204" pitchFamily="34" charset="0"/>
+            </a:endParaRPr>
           </a:p>
         </p:txBody>
       </p:sp>
     </p:spTree>
     <p:extLst>
       <p:ext uri="{BB962C8B-B14F-4D97-AF65-F5344CB8AC3E}">
-        <p14:creationId xmlns:p14="http://schemas.microsoft.com/office/powerpoint/2010/main" val="3401895557"/>
+        <p14:creationId xmlns:p14="http://schemas.microsoft.com/office/powerpoint/2010/main" val="635488335"/>
       </p:ext>
     </p:extLst>
   </p:cSld>
@@ -14949,8 +15799,8 @@
         </p:nvSpPr>
         <p:spPr>
           <a:xfrm>
-            <a:off x="1163782" y="403761"/>
-            <a:ext cx="9909508" cy="369332"/>
+            <a:off x="771896" y="261257"/>
+            <a:ext cx="9571851" cy="369332"/>
           </a:xfrm>
           <a:prstGeom prst="rect">
             <a:avLst/>
@@ -14968,7 +15818,7 @@
                 <a:latin typeface="Arial" panose="020B0604020202020204" pitchFamily="34" charset="0"/>
                 <a:cs typeface="Arial" panose="020B0604020202020204" pitchFamily="34" charset="0"/>
               </a:rPr>
-              <a:t>Here we are taxa are in columns, but the same idea.  Walk through, build a model for each taxa</a:t>
+              <a:t>If we look at all the p-values, there is strong evidence of a signature associated with disease</a:t>
             </a:r>
             <a:endParaRPr lang="en-US" dirty="0">
               <a:latin typeface="Arial" panose="020B0604020202020204" pitchFamily="34" charset="0"/>
@@ -14977,496 +15827,84 @@
           </a:p>
         </p:txBody>
       </p:sp>
-      <p:sp>
-        <p:nvSpPr>
-          <p:cNvPr id="3" name="Rectangle 2"/>
+      <p:pic>
+        <p:nvPicPr>
+          <p:cNvPr id="3" name="Picture 2"/>
+          <p:cNvPicPr>
+            <a:picLocks noChangeAspect="1"/>
+          </p:cNvPicPr>
+          <p:nvPr/>
+        </p:nvPicPr>
+        <p:blipFill>
+          <a:blip r:embed="rId2"/>
+          <a:stretch>
+            <a:fillRect/>
+          </a:stretch>
+        </p:blipFill>
+        <p:spPr>
+          <a:xfrm>
+            <a:off x="121536" y="1366404"/>
+            <a:ext cx="5483617" cy="5393722"/>
+          </a:xfrm>
+          <a:prstGeom prst="rect">
+            <a:avLst/>
+          </a:prstGeom>
+        </p:spPr>
+      </p:pic>
+      <p:sp>
+        <p:nvSpPr>
+          <p:cNvPr id="4" name="Rectangle 3"/>
           <p:cNvSpPr/>
           <p:nvPr/>
         </p:nvSpPr>
         <p:spPr>
           <a:xfrm>
-            <a:off x="352301" y="773093"/>
-            <a:ext cx="11839699" cy="4247317"/>
-          </a:xfrm>
-          <a:prstGeom prst="rect">
-            <a:avLst/>
-          </a:prstGeom>
-        </p:spPr>
-        <p:txBody>
-          <a:bodyPr wrap="square">
+            <a:off x="1598318" y="813830"/>
+            <a:ext cx="2652457" cy="369332"/>
+          </a:xfrm>
+          <a:prstGeom prst="rect">
+            <a:avLst/>
+          </a:prstGeom>
+        </p:spPr>
+        <p:txBody>
+          <a:bodyPr wrap="none">
             <a:spAutoFit/>
           </a:bodyPr>
           <a:lstStyle/>
           <a:p>
-            <a:endParaRPr lang="en-US" dirty="0">
-              <a:latin typeface="Courier New" panose="02070309020205020404" pitchFamily="49" charset="0"/>
-            </a:endParaRPr>
-          </a:p>
-          <a:p>
-            <a:r>
-              <a:rPr lang="en-US" dirty="0">
-                <a:latin typeface="Courier New" panose="02070309020205020404" pitchFamily="49" charset="0"/>
-              </a:rPr>
-              <a:t>for( </a:t>
-            </a:r>
-            <a:r>
-              <a:rPr lang="en-US" dirty="0" err="1">
-                <a:latin typeface="Courier New" panose="02070309020205020404" pitchFamily="49" charset="0"/>
-              </a:rPr>
-              <a:t>i</a:t>
-            </a:r>
-            <a:r>
-              <a:rPr lang="en-US" dirty="0">
-                <a:latin typeface="Courier New" panose="02070309020205020404" pitchFamily="49" charset="0"/>
-              </a:rPr>
-              <a:t> in 2:</a:t>
-            </a:r>
-            <a:r>
-              <a:rPr lang="en-US" dirty="0">
-                <a:solidFill>
-                  <a:srgbClr val="000000"/>
-                </a:solidFill>
-                <a:latin typeface="Courier New" panose="02070309020205020404" pitchFamily="49" charset="0"/>
-              </a:rPr>
-              <a:t>ncol(</a:t>
-            </a:r>
-            <a:r>
-              <a:rPr lang="en-US" dirty="0" err="1">
-                <a:solidFill>
-                  <a:srgbClr val="000000"/>
-                </a:solidFill>
-                <a:latin typeface="Courier New" panose="02070309020205020404" pitchFamily="49" charset="0"/>
-              </a:rPr>
-              <a:t>myT</a:t>
-            </a:r>
-            <a:r>
-              <a:rPr lang="en-US" dirty="0">
-                <a:solidFill>
-                  <a:srgbClr val="000000"/>
-                </a:solidFill>
-                <a:latin typeface="Courier New" panose="02070309020205020404" pitchFamily="49" charset="0"/>
-              </a:rPr>
-              <a:t>))</a:t>
-            </a:r>
-          </a:p>
-          <a:p>
-            <a:r>
-              <a:rPr lang="en-US" dirty="0">
-                <a:latin typeface="Courier New" panose="02070309020205020404" pitchFamily="49" charset="0"/>
-              </a:rPr>
-              <a:t>{</a:t>
-            </a:r>
-          </a:p>
-          <a:p>
-            <a:pPr lvl="1"/>
-            <a:r>
-              <a:rPr lang="en-US" dirty="0" err="1">
-                <a:latin typeface="Courier New" panose="02070309020205020404" pitchFamily="49" charset="0"/>
-              </a:rPr>
-              <a:t>myFrame</a:t>
-            </a:r>
-            <a:r>
-              <a:rPr lang="en-US" dirty="0">
-                <a:latin typeface="Courier New" panose="02070309020205020404" pitchFamily="49" charset="0"/>
-              </a:rPr>
-              <a:t> &lt;- </a:t>
-            </a:r>
-            <a:r>
-              <a:rPr lang="en-US" dirty="0" err="1">
-                <a:latin typeface="Courier New" panose="02070309020205020404" pitchFamily="49" charset="0"/>
-              </a:rPr>
-              <a:t>data.frame</a:t>
-            </a:r>
-            <a:r>
-              <a:rPr lang="en-US" dirty="0">
-                <a:latin typeface="Courier New" panose="02070309020205020404" pitchFamily="49" charset="0"/>
-              </a:rPr>
-              <a:t>( bug = </a:t>
-            </a:r>
-            <a:r>
-              <a:rPr lang="en-US" dirty="0" err="1">
-                <a:latin typeface="Courier New" panose="02070309020205020404" pitchFamily="49" charset="0"/>
-              </a:rPr>
-              <a:t>myT</a:t>
-            </a:r>
-            <a:r>
-              <a:rPr lang="en-US" dirty="0">
-                <a:latin typeface="Courier New" panose="02070309020205020404" pitchFamily="49" charset="0"/>
-              </a:rPr>
-              <a:t>[,</a:t>
-            </a:r>
-            <a:r>
-              <a:rPr lang="en-US" dirty="0" err="1">
-                <a:latin typeface="Courier New" panose="02070309020205020404" pitchFamily="49" charset="0"/>
-              </a:rPr>
-              <a:t>i</a:t>
-            </a:r>
-            <a:r>
-              <a:rPr lang="en-US" dirty="0">
-                <a:latin typeface="Courier New" panose="02070309020205020404" pitchFamily="49" charset="0"/>
-              </a:rPr>
-              <a:t>], </a:t>
-            </a:r>
-            <a:r>
-              <a:rPr lang="en-US" dirty="0" err="1">
-                <a:latin typeface="Courier New" panose="02070309020205020404" pitchFamily="49" charset="0"/>
-              </a:rPr>
-              <a:t>isCase</a:t>
-            </a:r>
-            <a:r>
-              <a:rPr lang="en-US" dirty="0">
-                <a:latin typeface="Courier New" panose="02070309020205020404" pitchFamily="49" charset="0"/>
-              </a:rPr>
-              <a:t> = </a:t>
-            </a:r>
-            <a:r>
-              <a:rPr lang="en-US" dirty="0" err="1">
-                <a:solidFill>
-                  <a:srgbClr val="000000"/>
-                </a:solidFill>
-                <a:latin typeface="Courier New" panose="02070309020205020404" pitchFamily="49" charset="0"/>
-              </a:rPr>
-              <a:t>grepl</a:t>
-            </a:r>
-            <a:r>
-              <a:rPr lang="en-US" dirty="0">
-                <a:solidFill>
-                  <a:srgbClr val="000000"/>
-                </a:solidFill>
-                <a:latin typeface="Courier New" panose="02070309020205020404" pitchFamily="49" charset="0"/>
-              </a:rPr>
-              <a:t>("case",</a:t>
-            </a:r>
-            <a:r>
-              <a:rPr lang="en-US" dirty="0" err="1">
-                <a:solidFill>
-                  <a:srgbClr val="000000"/>
-                </a:solidFill>
-                <a:latin typeface="Courier New" panose="02070309020205020404" pitchFamily="49" charset="0"/>
-              </a:rPr>
-              <a:t>row.names</a:t>
-            </a:r>
-            <a:r>
-              <a:rPr lang="en-US" dirty="0">
-                <a:solidFill>
-                  <a:srgbClr val="000000"/>
-                </a:solidFill>
-                <a:latin typeface="Courier New" panose="02070309020205020404" pitchFamily="49" charset="0"/>
-              </a:rPr>
+            <a:r>
+              <a:rPr lang="en-US" dirty="0" err="1" smtClean="0"/>
+              <a:t>hist</a:t>
+            </a:r>
+            <a:r>
+              <a:rPr lang="en-US" dirty="0" smtClean="0"/>
               <a:t>(</a:t>
             </a:r>
             <a:r>
-              <a:rPr lang="en-US" dirty="0" err="1">
-                <a:solidFill>
-                  <a:srgbClr val="000000"/>
-                </a:solidFill>
-                <a:latin typeface="Courier New" panose="02070309020205020404" pitchFamily="49" charset="0"/>
-              </a:rPr>
-              <a:t>myT</a:t>
-            </a:r>
-            <a:r>
-              <a:rPr lang="en-US" dirty="0">
-                <a:solidFill>
-                  <a:srgbClr val="000000"/>
-                </a:solidFill>
-                <a:latin typeface="Courier New" panose="02070309020205020404" pitchFamily="49" charset="0"/>
-              </a:rPr>
-              <a:t>)))</a:t>
-            </a:r>
-          </a:p>
-          <a:p>
-            <a:pPr lvl="1"/>
-            <a:endParaRPr lang="en-US" dirty="0" smtClean="0">
-              <a:latin typeface="Courier New" panose="02070309020205020404" pitchFamily="49" charset="0"/>
-            </a:endParaRPr>
-          </a:p>
-          <a:p>
-            <a:pPr lvl="1"/>
-            <a:r>
-              <a:rPr lang="en-US" dirty="0" smtClean="0">
-                <a:latin typeface="Courier New" panose="02070309020205020404" pitchFamily="49" charset="0"/>
-              </a:rPr>
-              <a:t># other models are fit</a:t>
-            </a:r>
-          </a:p>
-          <a:p>
-            <a:pPr lvl="1"/>
-            <a:endParaRPr lang="en-US" dirty="0">
-              <a:latin typeface="Courier New" panose="02070309020205020404" pitchFamily="49" charset="0"/>
-            </a:endParaRPr>
-          </a:p>
-          <a:p>
-            <a:pPr lvl="1"/>
-            <a:r>
-              <a:rPr lang="en-US" dirty="0" err="1">
-                <a:latin typeface="Courier New" panose="02070309020205020404" pitchFamily="49" charset="0"/>
-              </a:rPr>
-              <a:t>myLm</a:t>
-            </a:r>
-            <a:r>
-              <a:rPr lang="en-US" dirty="0">
-                <a:latin typeface="Courier New" panose="02070309020205020404" pitchFamily="49" charset="0"/>
-              </a:rPr>
-              <a:t> &lt;- </a:t>
-            </a:r>
-            <a:r>
-              <a:rPr lang="en-US" dirty="0">
-                <a:solidFill>
-                  <a:srgbClr val="000000"/>
-                </a:solidFill>
-                <a:latin typeface="Courier New" panose="02070309020205020404" pitchFamily="49" charset="0"/>
-              </a:rPr>
-              <a:t>lm( log10( </a:t>
-            </a:r>
-            <a:r>
-              <a:rPr lang="en-US" dirty="0" err="1">
-                <a:solidFill>
-                  <a:srgbClr val="000000"/>
-                </a:solidFill>
-                <a:latin typeface="Courier New" panose="02070309020205020404" pitchFamily="49" charset="0"/>
-              </a:rPr>
-              <a:t>myFrame$bug</a:t>
-            </a:r>
-            <a:r>
-              <a:rPr lang="en-US" dirty="0">
-                <a:solidFill>
-                  <a:srgbClr val="000000"/>
-                </a:solidFill>
-                <a:latin typeface="Courier New" panose="02070309020205020404" pitchFamily="49" charset="0"/>
-              </a:rPr>
-              <a:t> + 0.00001) ~ </a:t>
-            </a:r>
-            <a:r>
-              <a:rPr lang="en-US" dirty="0" err="1">
-                <a:solidFill>
-                  <a:srgbClr val="000000"/>
-                </a:solidFill>
-                <a:latin typeface="Courier New" panose="02070309020205020404" pitchFamily="49" charset="0"/>
-              </a:rPr>
-              <a:t>myFrame$isCase</a:t>
-            </a:r>
-            <a:r>
-              <a:rPr lang="en-US" dirty="0">
-                <a:solidFill>
-                  <a:srgbClr val="000000"/>
-                </a:solidFill>
-                <a:latin typeface="Courier New" panose="02070309020205020404" pitchFamily="49" charset="0"/>
-              </a:rPr>
-              <a:t> )</a:t>
-            </a:r>
-          </a:p>
-          <a:p>
-            <a:pPr lvl="1"/>
-            <a:r>
-              <a:rPr lang="en-US" dirty="0">
-                <a:latin typeface="Courier New" panose="02070309020205020404" pitchFamily="49" charset="0"/>
-              </a:rPr>
-              <a:t>index &lt;- </a:t>
-            </a:r>
-            <a:r>
-              <a:rPr lang="en-US" dirty="0" err="1">
-                <a:latin typeface="Courier New" panose="02070309020205020404" pitchFamily="49" charset="0"/>
-              </a:rPr>
-              <a:t>i</a:t>
-            </a:r>
-            <a:r>
-              <a:rPr lang="en-US" dirty="0">
-                <a:latin typeface="Courier New" panose="02070309020205020404" pitchFamily="49" charset="0"/>
-              </a:rPr>
-              <a:t> -1</a:t>
-            </a:r>
-          </a:p>
-          <a:p>
-            <a:pPr lvl="1"/>
-            <a:endParaRPr lang="en-US" dirty="0">
-              <a:latin typeface="Courier New" panose="02070309020205020404" pitchFamily="49" charset="0"/>
-            </a:endParaRPr>
-          </a:p>
-          <a:p>
-            <a:pPr lvl="1"/>
-            <a:r>
-              <a:rPr lang="en-US" dirty="0" err="1" smtClean="0">
-                <a:latin typeface="Courier New" panose="02070309020205020404" pitchFamily="49" charset="0"/>
-              </a:rPr>
-              <a:t>lmPValues</a:t>
-            </a:r>
-            <a:r>
-              <a:rPr lang="en-US" dirty="0" smtClean="0">
-                <a:latin typeface="Courier New" panose="02070309020205020404" pitchFamily="49" charset="0"/>
-              </a:rPr>
-              <a:t>[index</a:t>
-            </a:r>
-            <a:r>
-              <a:rPr lang="en-US" dirty="0">
-                <a:latin typeface="Courier New" panose="02070309020205020404" pitchFamily="49" charset="0"/>
-              </a:rPr>
-              <a:t>] &lt;- </a:t>
-            </a:r>
-            <a:r>
-              <a:rPr lang="en-US" dirty="0" err="1">
-                <a:solidFill>
-                  <a:srgbClr val="000000"/>
-                </a:solidFill>
-                <a:latin typeface="Courier New" panose="02070309020205020404" pitchFamily="49" charset="0"/>
-              </a:rPr>
-              <a:t>anova</a:t>
-            </a:r>
-            <a:r>
-              <a:rPr lang="en-US" dirty="0">
-                <a:solidFill>
-                  <a:srgbClr val="000000"/>
-                </a:solidFill>
-                <a:latin typeface="Courier New" panose="02070309020205020404" pitchFamily="49" charset="0"/>
-              </a:rPr>
-              <a:t>(</a:t>
-            </a:r>
-            <a:r>
-              <a:rPr lang="en-US" dirty="0" err="1">
-                <a:solidFill>
-                  <a:srgbClr val="000000"/>
-                </a:solidFill>
-                <a:latin typeface="Courier New" panose="02070309020205020404" pitchFamily="49" charset="0"/>
-              </a:rPr>
-              <a:t>myLm</a:t>
-            </a:r>
-            <a:r>
-              <a:rPr lang="en-US" dirty="0">
-                <a:solidFill>
-                  <a:srgbClr val="000000"/>
-                </a:solidFill>
-                <a:latin typeface="Courier New" panose="02070309020205020404" pitchFamily="49" charset="0"/>
-              </a:rPr>
-              <a:t>)$"</a:t>
-            </a:r>
-            <a:r>
-              <a:rPr lang="en-US" dirty="0" err="1">
-                <a:solidFill>
-                  <a:srgbClr val="000000"/>
-                </a:solidFill>
-                <a:latin typeface="Courier New" panose="02070309020205020404" pitchFamily="49" charset="0"/>
-              </a:rPr>
-              <a:t>Pr</a:t>
-            </a:r>
-            <a:r>
-              <a:rPr lang="en-US" dirty="0">
-                <a:solidFill>
-                  <a:srgbClr val="000000"/>
-                </a:solidFill>
-                <a:latin typeface="Courier New" panose="02070309020205020404" pitchFamily="49" charset="0"/>
-              </a:rPr>
-              <a:t>(&gt;F)"[1]</a:t>
-            </a:r>
-          </a:p>
-          <a:p>
-            <a:pPr lvl="1"/>
-            <a:r>
-              <a:rPr lang="en-US" dirty="0" smtClean="0">
-                <a:latin typeface="Courier New" panose="02070309020205020404" pitchFamily="49" charset="0"/>
-              </a:rPr>
-              <a:t>names[index</a:t>
-            </a:r>
-            <a:r>
-              <a:rPr lang="en-US" dirty="0">
-                <a:latin typeface="Courier New" panose="02070309020205020404" pitchFamily="49" charset="0"/>
-              </a:rPr>
-              <a:t>] &lt;- names( </a:t>
-            </a:r>
-            <a:r>
-              <a:rPr lang="en-US" dirty="0" err="1">
-                <a:latin typeface="Courier New" panose="02070309020205020404" pitchFamily="49" charset="0"/>
-              </a:rPr>
-              <a:t>myT</a:t>
-            </a:r>
-            <a:r>
-              <a:rPr lang="en-US" dirty="0">
-                <a:latin typeface="Courier New" panose="02070309020205020404" pitchFamily="49" charset="0"/>
-              </a:rPr>
-              <a:t>)[</a:t>
-            </a:r>
-            <a:r>
-              <a:rPr lang="en-US" dirty="0" err="1">
-                <a:latin typeface="Courier New" panose="02070309020205020404" pitchFamily="49" charset="0"/>
-              </a:rPr>
-              <a:t>i</a:t>
-            </a:r>
-            <a:r>
-              <a:rPr lang="en-US" dirty="0" smtClean="0">
-                <a:latin typeface="Courier New" panose="02070309020205020404" pitchFamily="49" charset="0"/>
-              </a:rPr>
-              <a:t>]</a:t>
-            </a:r>
-          </a:p>
-          <a:p>
-            <a:pPr lvl="1"/>
-            <a:endParaRPr lang="en-US" dirty="0">
-              <a:latin typeface="Courier New" panose="02070309020205020404" pitchFamily="49" charset="0"/>
-            </a:endParaRPr>
-          </a:p>
-          <a:p>
-            <a:pPr lvl="1"/>
-            <a:r>
-              <a:rPr lang="en-US" dirty="0" smtClean="0">
-                <a:latin typeface="Courier New" panose="02070309020205020404" pitchFamily="49" charset="0"/>
-              </a:rPr>
-              <a:t># other models are fit</a:t>
-            </a:r>
-            <a:endParaRPr lang="en-US" dirty="0">
-              <a:latin typeface="Courier New" panose="02070309020205020404" pitchFamily="49" charset="0"/>
-            </a:endParaRPr>
-          </a:p>
-          <a:p>
-            <a:r>
-              <a:rPr lang="en-US" dirty="0">
-                <a:latin typeface="Courier New" panose="02070309020205020404" pitchFamily="49" charset="0"/>
-              </a:rPr>
-              <a:t>}</a:t>
-            </a:r>
-          </a:p>
-        </p:txBody>
-      </p:sp>
-      <p:cxnSp>
-        <p:nvCxnSpPr>
-          <p:cNvPr id="5" name="Straight Arrow Connector 4"/>
-          <p:cNvCxnSpPr/>
-          <p:nvPr/>
-        </p:nvCxnSpPr>
-        <p:spPr>
-          <a:xfrm flipH="1" flipV="1">
-            <a:off x="6448302" y="3075709"/>
-            <a:ext cx="1935678" cy="534389"/>
-          </a:xfrm>
-          <a:prstGeom prst="straightConnector1">
-            <a:avLst/>
-          </a:prstGeom>
-          <a:ln>
-            <a:tailEnd type="triangle"/>
-          </a:ln>
-        </p:spPr>
-        <p:style>
-          <a:lnRef idx="1">
-            <a:schemeClr val="accent1"/>
-          </a:lnRef>
-          <a:fillRef idx="0">
-            <a:schemeClr val="accent1"/>
-          </a:fillRef>
-          <a:effectRef idx="0">
-            <a:schemeClr val="accent1"/>
-          </a:effectRef>
-          <a:fontRef idx="minor">
-            <a:schemeClr val="tx1"/>
-          </a:fontRef>
-        </p:style>
-      </p:cxnSp>
-      <p:sp>
-        <p:nvSpPr>
-          <p:cNvPr id="8" name="TextBox 7"/>
+              <a:rPr lang="en-US" dirty="0" err="1" smtClean="0"/>
+              <a:t>lmPValues,breaks</a:t>
+            </a:r>
+            <a:r>
+              <a:rPr lang="en-US" dirty="0" smtClean="0"/>
+              <a:t>=30</a:t>
+            </a:r>
+            <a:r>
+              <a:rPr lang="en-US" dirty="0"/>
+              <a:t>)</a:t>
+            </a:r>
+          </a:p>
+        </p:txBody>
+      </p:sp>
+      <p:sp>
+        <p:nvSpPr>
+          <p:cNvPr id="6" name="TextBox 5"/>
           <p:cNvSpPr txBox="1"/>
           <p:nvPr/>
         </p:nvSpPr>
         <p:spPr>
           <a:xfrm>
-            <a:off x="7992094" y="3562598"/>
-            <a:ext cx="2929072" cy="646331"/>
+            <a:off x="5628904" y="1520042"/>
+            <a:ext cx="6079549" cy="369332"/>
           </a:xfrm>
           <a:prstGeom prst="rect">
             <a:avLst/>
@@ -15484,16 +15922,7 @@
                 <a:latin typeface="Arial" panose="020B0604020202020204" pitchFamily="34" charset="0"/>
                 <a:cs typeface="Arial" panose="020B0604020202020204" pitchFamily="34" charset="0"/>
               </a:rPr>
-              <a:t>A linear model:</a:t>
-            </a:r>
-          </a:p>
-          <a:p>
-            <a:r>
-              <a:rPr lang="en-US" dirty="0" smtClean="0">
-                <a:latin typeface="Arial" panose="020B0604020202020204" pitchFamily="34" charset="0"/>
-                <a:cs typeface="Arial" panose="020B0604020202020204" pitchFamily="34" charset="0"/>
-              </a:rPr>
-              <a:t>taxa = case/control + error</a:t>
+              <a:t>We show 32 taxa significant at a 10% FDR in this pipeline</a:t>
             </a:r>
             <a:endParaRPr lang="en-US" dirty="0">
               <a:latin typeface="Arial" panose="020B0604020202020204" pitchFamily="34" charset="0"/>
@@ -15502,112 +15931,34 @@
           </a:p>
         </p:txBody>
       </p:sp>
-      <p:cxnSp>
-        <p:nvCxnSpPr>
-          <p:cNvPr id="10" name="Straight Arrow Connector 9"/>
-          <p:cNvCxnSpPr/>
-          <p:nvPr/>
-        </p:nvCxnSpPr>
-        <p:spPr>
-          <a:xfrm flipH="1" flipV="1">
-            <a:off x="5973288" y="3859481"/>
-            <a:ext cx="581891" cy="890649"/>
-          </a:xfrm>
-          <a:prstGeom prst="straightConnector1">
-            <a:avLst/>
-          </a:prstGeom>
-          <a:ln>
-            <a:tailEnd type="triangle"/>
-          </a:ln>
-        </p:spPr>
-        <p:style>
-          <a:lnRef idx="1">
-            <a:schemeClr val="accent1"/>
-          </a:lnRef>
-          <a:fillRef idx="0">
-            <a:schemeClr val="accent1"/>
-          </a:fillRef>
-          <a:effectRef idx="0">
-            <a:schemeClr val="accent1"/>
-          </a:effectRef>
-          <a:fontRef idx="minor">
-            <a:schemeClr val="tx1"/>
-          </a:fontRef>
-        </p:style>
-      </p:cxnSp>
-      <p:sp>
-        <p:nvSpPr>
-          <p:cNvPr id="11" name="TextBox 10"/>
-          <p:cNvSpPr txBox="1"/>
-          <p:nvPr/>
-        </p:nvSpPr>
-        <p:spPr>
-          <a:xfrm>
-            <a:off x="6224650" y="4711652"/>
-            <a:ext cx="5810245" cy="646331"/>
-          </a:xfrm>
-          <a:prstGeom prst="rect">
-            <a:avLst/>
-          </a:prstGeom>
-          <a:noFill/>
-        </p:spPr>
-        <p:txBody>
-          <a:bodyPr wrap="none" rtlCol="0">
-            <a:spAutoFit/>
-          </a:bodyPr>
-          <a:lstStyle/>
-          <a:p>
-            <a:r>
-              <a:rPr lang="en-US" dirty="0" smtClean="0">
-                <a:latin typeface="Arial" panose="020B0604020202020204" pitchFamily="34" charset="0"/>
-                <a:cs typeface="Arial" panose="020B0604020202020204" pitchFamily="34" charset="0"/>
-              </a:rPr>
-              <a:t>Use ANOVA to test the hypothesis that the case/control</a:t>
-            </a:r>
-          </a:p>
-          <a:p>
-            <a:r>
-              <a:rPr lang="en-US" dirty="0" smtClean="0">
-                <a:latin typeface="Arial" panose="020B0604020202020204" pitchFamily="34" charset="0"/>
-                <a:cs typeface="Arial" panose="020B0604020202020204" pitchFamily="34" charset="0"/>
-              </a:rPr>
-              <a:t>parameter is == 0 </a:t>
-            </a:r>
-          </a:p>
-        </p:txBody>
-      </p:sp>
-      <p:sp>
-        <p:nvSpPr>
-          <p:cNvPr id="12" name="Rectangle 11"/>
-          <p:cNvSpPr/>
-          <p:nvPr/>
-        </p:nvSpPr>
-        <p:spPr>
-          <a:xfrm>
-            <a:off x="364176" y="6173832"/>
-            <a:ext cx="11095511" cy="369332"/>
-          </a:xfrm>
-          <a:prstGeom prst="rect">
-            <a:avLst/>
-          </a:prstGeom>
-        </p:spPr>
-        <p:txBody>
-          <a:bodyPr wrap="square">
-            <a:spAutoFit/>
-          </a:bodyPr>
-          <a:lstStyle/>
-          <a:p>
-            <a:r>
-              <a:rPr lang="en-US" dirty="0"/>
-              <a:t>https://github.com/afodor/metagenomicsTools/blob/master/src/gamlssDemo/quickFit.txt</a:t>
-            </a:r>
-          </a:p>
-        </p:txBody>
-      </p:sp>
+      <p:pic>
+        <p:nvPicPr>
+          <p:cNvPr id="7" name="Picture 6"/>
+          <p:cNvPicPr>
+            <a:picLocks noChangeAspect="1"/>
+          </p:cNvPicPr>
+          <p:nvPr/>
+        </p:nvPicPr>
+        <p:blipFill>
+          <a:blip r:embed="rId3"/>
+          <a:stretch>
+            <a:fillRect/>
+          </a:stretch>
+        </p:blipFill>
+        <p:spPr>
+          <a:xfrm>
+            <a:off x="6054250" y="2140652"/>
+            <a:ext cx="5679962" cy="768803"/>
+          </a:xfrm>
+          <a:prstGeom prst="rect">
+            <a:avLst/>
+          </a:prstGeom>
+        </p:spPr>
+      </p:pic>
     </p:spTree>
     <p:extLst>
       <p:ext uri="{BB962C8B-B14F-4D97-AF65-F5344CB8AC3E}">
-        <p14:creationId xmlns:p14="http://schemas.microsoft.com/office/powerpoint/2010/main" val="635488335"/>
+        <p14:creationId xmlns:p14="http://schemas.microsoft.com/office/powerpoint/2010/main" val="1341895321"/>
       </p:ext>
     </p:extLst>
   </p:cSld>
@@ -15634,45 +15985,9 @@
           <a:chExt cx="0" cy="0"/>
         </a:xfrm>
       </p:grpSpPr>
-      <p:sp>
-        <p:nvSpPr>
-          <p:cNvPr id="2" name="TextBox 1"/>
-          <p:cNvSpPr txBox="1"/>
-          <p:nvPr/>
-        </p:nvSpPr>
-        <p:spPr>
-          <a:xfrm>
-            <a:off x="771896" y="261257"/>
-            <a:ext cx="9571851" cy="369332"/>
-          </a:xfrm>
-          <a:prstGeom prst="rect">
-            <a:avLst/>
-          </a:prstGeom>
-          <a:noFill/>
-        </p:spPr>
-        <p:txBody>
-          <a:bodyPr wrap="none" rtlCol="0">
-            <a:spAutoFit/>
-          </a:bodyPr>
-          <a:lstStyle/>
-          <a:p>
-            <a:r>
-              <a:rPr lang="en-US" dirty="0" smtClean="0">
-                <a:latin typeface="Arial" panose="020B0604020202020204" pitchFamily="34" charset="0"/>
-                <a:cs typeface="Arial" panose="020B0604020202020204" pitchFamily="34" charset="0"/>
-              </a:rPr>
-              <a:t>If we look at all the p-values, there is strong evidence of a signature associated with disease</a:t>
-            </a:r>
-            <a:endParaRPr lang="en-US" dirty="0">
-              <a:latin typeface="Arial" panose="020B0604020202020204" pitchFamily="34" charset="0"/>
-              <a:cs typeface="Arial" panose="020B0604020202020204" pitchFamily="34" charset="0"/>
-            </a:endParaRPr>
-          </a:p>
-        </p:txBody>
-      </p:sp>
       <p:pic>
         <p:nvPicPr>
-          <p:cNvPr id="3" name="Picture 2"/>
+          <p:cNvPr id="2" name="Picture 1"/>
           <p:cNvPicPr>
             <a:picLocks noChangeAspect="1"/>
           </p:cNvPicPr>
@@ -15686,61 +16001,17 @@
         </p:blipFill>
         <p:spPr>
           <a:xfrm>
-            <a:off x="121536" y="1366404"/>
-            <a:ext cx="5483617" cy="5393722"/>
+            <a:off x="523876" y="975631"/>
+            <a:ext cx="5657850" cy="5429250"/>
           </a:xfrm>
           <a:prstGeom prst="rect">
             <a:avLst/>
           </a:prstGeom>
         </p:spPr>
       </p:pic>
-      <p:sp>
-        <p:nvSpPr>
-          <p:cNvPr id="4" name="Rectangle 3"/>
-          <p:cNvSpPr/>
-          <p:nvPr/>
-        </p:nvSpPr>
-        <p:spPr>
-          <a:xfrm>
-            <a:off x="1598318" y="813830"/>
-            <a:ext cx="2652457" cy="369332"/>
-          </a:xfrm>
-          <a:prstGeom prst="rect">
-            <a:avLst/>
-          </a:prstGeom>
-        </p:spPr>
-        <p:txBody>
-          <a:bodyPr wrap="none">
-            <a:spAutoFit/>
-          </a:bodyPr>
-          <a:lstStyle/>
-          <a:p>
-            <a:r>
-              <a:rPr lang="en-US" dirty="0" err="1" smtClean="0"/>
-              <a:t>hist</a:t>
-            </a:r>
-            <a:r>
-              <a:rPr lang="en-US" dirty="0" smtClean="0"/>
-              <a:t>(</a:t>
-            </a:r>
-            <a:r>
-              <a:rPr lang="en-US" smtClean="0"/>
-              <a:t>lmPValues,breaks</a:t>
-            </a:r>
-            <a:r>
-              <a:rPr lang="en-US" dirty="0" smtClean="0"/>
-              <a:t>=30</a:t>
-            </a:r>
-            <a:r>
-              <a:rPr lang="en-US" dirty="0"/>
-              <a:t>)</a:t>
-            </a:r>
-          </a:p>
-        </p:txBody>
-      </p:sp>
       <p:pic>
         <p:nvPicPr>
-          <p:cNvPr id="5" name="Picture 4"/>
+          <p:cNvPr id="3" name="Picture 2"/>
           <p:cNvPicPr>
             <a:picLocks noChangeAspect="1"/>
           </p:cNvPicPr>
@@ -15754,8 +16025,8 @@
         </p:blipFill>
         <p:spPr>
           <a:xfrm>
-            <a:off x="5878719" y="1996106"/>
-            <a:ext cx="5560025" cy="687718"/>
+            <a:off x="6419107" y="1035006"/>
+            <a:ext cx="5410200" cy="5410200"/>
           </a:xfrm>
           <a:prstGeom prst="rect">
             <a:avLst/>
@@ -15764,14 +16035,14 @@
       </p:pic>
       <p:sp>
         <p:nvSpPr>
-          <p:cNvPr id="6" name="TextBox 5"/>
+          <p:cNvPr id="4" name="TextBox 3"/>
           <p:cNvSpPr txBox="1"/>
           <p:nvPr/>
         </p:nvSpPr>
         <p:spPr>
           <a:xfrm>
-            <a:off x="5628904" y="1520042"/>
-            <a:ext cx="6079549" cy="369332"/>
+            <a:off x="3681350" y="368136"/>
+            <a:ext cx="5109091" cy="369332"/>
           </a:xfrm>
           <a:prstGeom prst="rect">
             <a:avLst/>
@@ -15789,7 +16060,7 @@
                 <a:latin typeface="Arial" panose="020B0604020202020204" pitchFamily="34" charset="0"/>
                 <a:cs typeface="Arial" panose="020B0604020202020204" pitchFamily="34" charset="0"/>
               </a:rPr>
-              <a:t>We show 32 taxa significant at a 10% FDR in this pipeline</a:t>
+              <a:t>Our bugs seem to be higher in case than control</a:t>
             </a:r>
             <a:endParaRPr lang="en-US" dirty="0">
               <a:latin typeface="Arial" panose="020B0604020202020204" pitchFamily="34" charset="0"/>
@@ -15801,7 +16072,7 @@
     </p:spTree>
     <p:extLst>
       <p:ext uri="{BB962C8B-B14F-4D97-AF65-F5344CB8AC3E}">
-        <p14:creationId xmlns:p14="http://schemas.microsoft.com/office/powerpoint/2010/main" val="1341895321"/>
+        <p14:creationId xmlns:p14="http://schemas.microsoft.com/office/powerpoint/2010/main" val="3161399484"/>
       </p:ext>
     </p:extLst>
   </p:cSld>
@@ -15933,6 +16204,13 @@
   <p:clrMapOvr>
     <a:masterClrMapping/>
   </p:clrMapOvr>
+  <p:timing>
+    <p:tnLst>
+      <p:par>
+        <p:cTn id="1" dur="indefinite" restart="never" nodeType="tmRoot"/>
+      </p:par>
+    </p:tnLst>
+  </p:timing>
 </p:sld>
 </file>
 
@@ -15953,10 +16231,682 @@
           <a:chExt cx="0" cy="0"/>
         </a:xfrm>
       </p:grpSpPr>
+      <p:pic>
+        <p:nvPicPr>
+          <p:cNvPr id="2" name="Picture 1"/>
+          <p:cNvPicPr>
+            <a:picLocks noChangeAspect="1"/>
+          </p:cNvPicPr>
+          <p:nvPr/>
+        </p:nvPicPr>
+        <p:blipFill>
+          <a:blip r:embed="rId2"/>
+          <a:stretch>
+            <a:fillRect/>
+          </a:stretch>
+        </p:blipFill>
+        <p:spPr>
+          <a:xfrm>
+            <a:off x="259463" y="360893"/>
+            <a:ext cx="10149918" cy="6419913"/>
+          </a:xfrm>
+          <a:prstGeom prst="rect">
+            <a:avLst/>
+          </a:prstGeom>
+        </p:spPr>
+      </p:pic>
+      <p:sp>
+        <p:nvSpPr>
+          <p:cNvPr id="5" name="TextBox 4"/>
+          <p:cNvSpPr txBox="1"/>
+          <p:nvPr/>
+        </p:nvSpPr>
+        <p:spPr>
+          <a:xfrm>
+            <a:off x="427513" y="-23750"/>
+            <a:ext cx="7579960" cy="369332"/>
+          </a:xfrm>
+          <a:prstGeom prst="rect">
+            <a:avLst/>
+          </a:prstGeom>
+          <a:noFill/>
+        </p:spPr>
+        <p:txBody>
+          <a:bodyPr wrap="none" rtlCol="0">
+            <a:spAutoFit/>
+          </a:bodyPr>
+          <a:lstStyle/>
+          <a:p>
+            <a:r>
+              <a:rPr lang="en-US" dirty="0" smtClean="0">
+                <a:latin typeface="Arial" panose="020B0604020202020204" pitchFamily="34" charset="0"/>
+                <a:cs typeface="Arial" panose="020B0604020202020204" pitchFamily="34" charset="0"/>
+              </a:rPr>
+              <a:t>We can keep track of which bug is higher in case and which </a:t>
+            </a:r>
+            <a:r>
+              <a:rPr lang="en-US" smtClean="0">
+                <a:latin typeface="Arial" panose="020B0604020202020204" pitchFamily="34" charset="0"/>
+                <a:cs typeface="Arial" panose="020B0604020202020204" pitchFamily="34" charset="0"/>
+              </a:rPr>
+              <a:t>in control….</a:t>
+            </a:r>
+            <a:endParaRPr lang="en-US">
+              <a:latin typeface="Arial" panose="020B0604020202020204" pitchFamily="34" charset="0"/>
+              <a:cs typeface="Arial" panose="020B0604020202020204" pitchFamily="34" charset="0"/>
+            </a:endParaRPr>
+          </a:p>
+        </p:txBody>
+      </p:sp>
+      <p:cxnSp>
+        <p:nvCxnSpPr>
+          <p:cNvPr id="7" name="Straight Arrow Connector 6"/>
+          <p:cNvCxnSpPr/>
+          <p:nvPr/>
+        </p:nvCxnSpPr>
+        <p:spPr>
+          <a:xfrm flipH="1">
+            <a:off x="2897575" y="1270660"/>
+            <a:ext cx="938151" cy="0"/>
+          </a:xfrm>
+          <a:prstGeom prst="straightConnector1">
+            <a:avLst/>
+          </a:prstGeom>
+          <a:ln>
+            <a:tailEnd type="triangle"/>
+          </a:ln>
+        </p:spPr>
+        <p:style>
+          <a:lnRef idx="1">
+            <a:schemeClr val="accent1"/>
+          </a:lnRef>
+          <a:fillRef idx="0">
+            <a:schemeClr val="accent1"/>
+          </a:fillRef>
+          <a:effectRef idx="0">
+            <a:schemeClr val="accent1"/>
+          </a:effectRef>
+          <a:fontRef idx="minor">
+            <a:schemeClr val="tx1"/>
+          </a:fontRef>
+        </p:style>
+      </p:cxnSp>
+      <p:cxnSp>
+        <p:nvCxnSpPr>
+          <p:cNvPr id="8" name="Straight Arrow Connector 7"/>
+          <p:cNvCxnSpPr/>
+          <p:nvPr/>
+        </p:nvCxnSpPr>
+        <p:spPr>
+          <a:xfrm flipH="1">
+            <a:off x="3192480" y="1482436"/>
+            <a:ext cx="938151" cy="0"/>
+          </a:xfrm>
+          <a:prstGeom prst="straightConnector1">
+            <a:avLst/>
+          </a:prstGeom>
+          <a:ln>
+            <a:tailEnd type="triangle"/>
+          </a:ln>
+        </p:spPr>
+        <p:style>
+          <a:lnRef idx="1">
+            <a:schemeClr val="accent1"/>
+          </a:lnRef>
+          <a:fillRef idx="0">
+            <a:schemeClr val="accent1"/>
+          </a:fillRef>
+          <a:effectRef idx="0">
+            <a:schemeClr val="accent1"/>
+          </a:effectRef>
+          <a:fontRef idx="minor">
+            <a:schemeClr val="tx1"/>
+          </a:fontRef>
+        </p:style>
+      </p:cxnSp>
+      <p:cxnSp>
+        <p:nvCxnSpPr>
+          <p:cNvPr id="10" name="Straight Arrow Connector 9"/>
+          <p:cNvCxnSpPr/>
+          <p:nvPr/>
+        </p:nvCxnSpPr>
+        <p:spPr>
+          <a:xfrm flipH="1">
+            <a:off x="6863938" y="5094513"/>
+            <a:ext cx="866898" cy="0"/>
+          </a:xfrm>
+          <a:prstGeom prst="straightConnector1">
+            <a:avLst/>
+          </a:prstGeom>
+          <a:ln>
+            <a:tailEnd type="triangle"/>
+          </a:ln>
+        </p:spPr>
+        <p:style>
+          <a:lnRef idx="1">
+            <a:schemeClr val="accent1"/>
+          </a:lnRef>
+          <a:fillRef idx="0">
+            <a:schemeClr val="accent1"/>
+          </a:fillRef>
+          <a:effectRef idx="0">
+            <a:schemeClr val="accent1"/>
+          </a:effectRef>
+          <a:fontRef idx="minor">
+            <a:schemeClr val="tx1"/>
+          </a:fontRef>
+        </p:style>
+      </p:cxnSp>
+      <p:cxnSp>
+        <p:nvCxnSpPr>
+          <p:cNvPr id="11" name="Straight Arrow Connector 10"/>
+          <p:cNvCxnSpPr/>
+          <p:nvPr/>
+        </p:nvCxnSpPr>
+        <p:spPr>
+          <a:xfrm flipH="1">
+            <a:off x="7230094" y="5341914"/>
+            <a:ext cx="866898" cy="0"/>
+          </a:xfrm>
+          <a:prstGeom prst="straightConnector1">
+            <a:avLst/>
+          </a:prstGeom>
+          <a:ln>
+            <a:tailEnd type="triangle"/>
+          </a:ln>
+        </p:spPr>
+        <p:style>
+          <a:lnRef idx="1">
+            <a:schemeClr val="accent1"/>
+          </a:lnRef>
+          <a:fillRef idx="0">
+            <a:schemeClr val="accent1"/>
+          </a:fillRef>
+          <a:effectRef idx="0">
+            <a:schemeClr val="accent1"/>
+          </a:effectRef>
+          <a:fontRef idx="minor">
+            <a:schemeClr val="tx1"/>
+          </a:fontRef>
+        </p:style>
+      </p:cxnSp>
     </p:spTree>
     <p:extLst>
       <p:ext uri="{BB962C8B-B14F-4D97-AF65-F5344CB8AC3E}">
-        <p14:creationId xmlns:p14="http://schemas.microsoft.com/office/powerpoint/2010/main" val="3161399484"/>
+        <p14:creationId xmlns:p14="http://schemas.microsoft.com/office/powerpoint/2010/main" val="3425420857"/>
+      </p:ext>
+    </p:extLst>
+  </p:cSld>
+  <p:clrMapOvr>
+    <a:masterClrMapping/>
+  </p:clrMapOvr>
+</p:sld>
+</file>
+
+<file path=ppt/slides/slide51.xml><?xml version="1.0" encoding="utf-8"?>
+<p:sld xmlns:a="http://schemas.openxmlformats.org/drawingml/2006/main" xmlns:r="http://schemas.openxmlformats.org/officeDocument/2006/relationships" xmlns:p="http://schemas.openxmlformats.org/presentationml/2006/main">
+  <p:cSld>
+    <p:spTree>
+      <p:nvGrpSpPr>
+        <p:cNvPr id="1" name=""/>
+        <p:cNvGrpSpPr/>
+        <p:nvPr/>
+      </p:nvGrpSpPr>
+      <p:grpSpPr>
+        <a:xfrm>
+          <a:off x="0" y="0"/>
+          <a:ext cx="0" cy="0"/>
+          <a:chOff x="0" y="0"/>
+          <a:chExt cx="0" cy="0"/>
+        </a:xfrm>
+      </p:grpSpPr>
+      <p:sp>
+        <p:nvSpPr>
+          <p:cNvPr id="2" name="TextBox 1"/>
+          <p:cNvSpPr txBox="1"/>
+          <p:nvPr/>
+        </p:nvSpPr>
+        <p:spPr>
+          <a:xfrm>
+            <a:off x="486888" y="71252"/>
+            <a:ext cx="6429965" cy="369332"/>
+          </a:xfrm>
+          <a:prstGeom prst="rect">
+            <a:avLst/>
+          </a:prstGeom>
+          <a:noFill/>
+        </p:spPr>
+        <p:txBody>
+          <a:bodyPr wrap="none" rtlCol="0">
+            <a:spAutoFit/>
+          </a:bodyPr>
+          <a:lstStyle/>
+          <a:p>
+            <a:r>
+              <a:rPr lang="en-US" dirty="0" smtClean="0">
+                <a:latin typeface="Arial" panose="020B0604020202020204" pitchFamily="34" charset="0"/>
+                <a:cs typeface="Arial" panose="020B0604020202020204" pitchFamily="34" charset="0"/>
+              </a:rPr>
+              <a:t>This allows us to make a volcano plot at the end of </a:t>
+            </a:r>
+            <a:r>
+              <a:rPr lang="en-US" smtClean="0">
+                <a:latin typeface="Arial" panose="020B0604020202020204" pitchFamily="34" charset="0"/>
+                <a:cs typeface="Arial" panose="020B0604020202020204" pitchFamily="34" charset="0"/>
+              </a:rPr>
+              <a:t>the run….</a:t>
+            </a:r>
+            <a:endParaRPr lang="en-US">
+              <a:latin typeface="Arial" panose="020B0604020202020204" pitchFamily="34" charset="0"/>
+              <a:cs typeface="Arial" panose="020B0604020202020204" pitchFamily="34" charset="0"/>
+            </a:endParaRPr>
+          </a:p>
+        </p:txBody>
+      </p:sp>
+      <p:pic>
+        <p:nvPicPr>
+          <p:cNvPr id="3" name="Picture 2"/>
+          <p:cNvPicPr>
+            <a:picLocks noChangeAspect="1"/>
+          </p:cNvPicPr>
+          <p:nvPr/>
+        </p:nvPicPr>
+        <p:blipFill>
+          <a:blip r:embed="rId2"/>
+          <a:stretch>
+            <a:fillRect/>
+          </a:stretch>
+        </p:blipFill>
+        <p:spPr>
+          <a:xfrm>
+            <a:off x="403761" y="440584"/>
+            <a:ext cx="5695950" cy="1790700"/>
+          </a:xfrm>
+          <a:prstGeom prst="rect">
+            <a:avLst/>
+          </a:prstGeom>
+        </p:spPr>
+      </p:pic>
+      <p:pic>
+        <p:nvPicPr>
+          <p:cNvPr id="4" name="Picture 3"/>
+          <p:cNvPicPr>
+            <a:picLocks noChangeAspect="1"/>
+          </p:cNvPicPr>
+          <p:nvPr/>
+        </p:nvPicPr>
+        <p:blipFill>
+          <a:blip r:embed="rId3"/>
+          <a:stretch>
+            <a:fillRect/>
+          </a:stretch>
+        </p:blipFill>
+        <p:spPr>
+          <a:xfrm>
+            <a:off x="5343896" y="440583"/>
+            <a:ext cx="5961413" cy="5961413"/>
+          </a:xfrm>
+          <a:prstGeom prst="rect">
+            <a:avLst/>
+          </a:prstGeom>
+        </p:spPr>
+      </p:pic>
+      <p:sp>
+        <p:nvSpPr>
+          <p:cNvPr id="5" name="TextBox 4"/>
+          <p:cNvSpPr txBox="1"/>
+          <p:nvPr/>
+        </p:nvSpPr>
+        <p:spPr>
+          <a:xfrm>
+            <a:off x="403761" y="2719449"/>
+            <a:ext cx="4611199" cy="369332"/>
+          </a:xfrm>
+          <a:prstGeom prst="rect">
+            <a:avLst/>
+          </a:prstGeom>
+          <a:noFill/>
+        </p:spPr>
+        <p:txBody>
+          <a:bodyPr wrap="none" rtlCol="0">
+            <a:spAutoFit/>
+          </a:bodyPr>
+          <a:lstStyle/>
+          <a:p>
+            <a:r>
+              <a:rPr lang="en-US" dirty="0" smtClean="0"/>
+              <a:t>Nearly all the significant hits are higher in case!</a:t>
+            </a:r>
+            <a:endParaRPr lang="en-US" dirty="0"/>
+          </a:p>
+        </p:txBody>
+      </p:sp>
+    </p:spTree>
+    <p:extLst>
+      <p:ext uri="{BB962C8B-B14F-4D97-AF65-F5344CB8AC3E}">
+        <p14:creationId xmlns:p14="http://schemas.microsoft.com/office/powerpoint/2010/main" val="3137438284"/>
+      </p:ext>
+    </p:extLst>
+  </p:cSld>
+  <p:clrMapOvr>
+    <a:masterClrMapping/>
+  </p:clrMapOvr>
+</p:sld>
+</file>
+
+<file path=ppt/slides/slide52.xml><?xml version="1.0" encoding="utf-8"?>
+<p:sld xmlns:a="http://schemas.openxmlformats.org/drawingml/2006/main" xmlns:r="http://schemas.openxmlformats.org/officeDocument/2006/relationships" xmlns:p="http://schemas.openxmlformats.org/presentationml/2006/main">
+  <p:cSld>
+    <p:spTree>
+      <p:nvGrpSpPr>
+        <p:cNvPr id="1" name=""/>
+        <p:cNvGrpSpPr/>
+        <p:nvPr/>
+      </p:nvGrpSpPr>
+      <p:grpSpPr>
+        <a:xfrm>
+          <a:off x="0" y="0"/>
+          <a:ext cx="0" cy="0"/>
+          <a:chOff x="0" y="0"/>
+          <a:chExt cx="0" cy="0"/>
+        </a:xfrm>
+      </p:grpSpPr>
+      <p:pic>
+        <p:nvPicPr>
+          <p:cNvPr id="2" name="Picture 1"/>
+          <p:cNvPicPr>
+            <a:picLocks noChangeAspect="1"/>
+          </p:cNvPicPr>
+          <p:nvPr/>
+        </p:nvPicPr>
+        <p:blipFill>
+          <a:blip r:embed="rId2"/>
+          <a:stretch>
+            <a:fillRect/>
+          </a:stretch>
+        </p:blipFill>
+        <p:spPr>
+          <a:xfrm>
+            <a:off x="356445" y="501360"/>
+            <a:ext cx="9678205" cy="5602593"/>
+          </a:xfrm>
+          <a:prstGeom prst="rect">
+            <a:avLst/>
+          </a:prstGeom>
+        </p:spPr>
+      </p:pic>
+      <p:cxnSp>
+        <p:nvCxnSpPr>
+          <p:cNvPr id="4" name="Straight Arrow Connector 3"/>
+          <p:cNvCxnSpPr/>
+          <p:nvPr/>
+        </p:nvCxnSpPr>
+        <p:spPr>
+          <a:xfrm flipH="1">
+            <a:off x="2814453" y="2232561"/>
+            <a:ext cx="653143" cy="0"/>
+          </a:xfrm>
+          <a:prstGeom prst="straightConnector1">
+            <a:avLst/>
+          </a:prstGeom>
+          <a:ln>
+            <a:tailEnd type="triangle"/>
+          </a:ln>
+        </p:spPr>
+        <p:style>
+          <a:lnRef idx="1">
+            <a:schemeClr val="accent1"/>
+          </a:lnRef>
+          <a:fillRef idx="0">
+            <a:schemeClr val="accent1"/>
+          </a:fillRef>
+          <a:effectRef idx="0">
+            <a:schemeClr val="accent1"/>
+          </a:effectRef>
+          <a:fontRef idx="minor">
+            <a:schemeClr val="tx1"/>
+          </a:fontRef>
+        </p:style>
+      </p:cxnSp>
+      <p:sp>
+        <p:nvSpPr>
+          <p:cNvPr id="5" name="TextBox 4"/>
+          <p:cNvSpPr txBox="1"/>
+          <p:nvPr/>
+        </p:nvSpPr>
+        <p:spPr>
+          <a:xfrm>
+            <a:off x="700644" y="47501"/>
+            <a:ext cx="5271636" cy="369332"/>
+          </a:xfrm>
+          <a:prstGeom prst="rect">
+            <a:avLst/>
+          </a:prstGeom>
+          <a:noFill/>
+        </p:spPr>
+        <p:txBody>
+          <a:bodyPr wrap="none" rtlCol="0">
+            <a:spAutoFit/>
+          </a:bodyPr>
+          <a:lstStyle/>
+          <a:p>
+            <a:r>
+              <a:rPr lang="en-US" dirty="0" smtClean="0">
+                <a:latin typeface="Arial" panose="020B0604020202020204" pitchFamily="34" charset="0"/>
+                <a:cs typeface="Arial" panose="020B0604020202020204" pitchFamily="34" charset="0"/>
+              </a:rPr>
+              <a:t>We can also keep track of the </a:t>
+            </a:r>
+            <a:r>
+              <a:rPr lang="en-US" smtClean="0">
+                <a:latin typeface="Arial" panose="020B0604020202020204" pitchFamily="34" charset="0"/>
+                <a:cs typeface="Arial" panose="020B0604020202020204" pitchFamily="34" charset="0"/>
+              </a:rPr>
+              <a:t>overall averages….</a:t>
+            </a:r>
+            <a:endParaRPr lang="en-US">
+              <a:latin typeface="Arial" panose="020B0604020202020204" pitchFamily="34" charset="0"/>
+              <a:cs typeface="Arial" panose="020B0604020202020204" pitchFamily="34" charset="0"/>
+            </a:endParaRPr>
+          </a:p>
+        </p:txBody>
+      </p:sp>
+      <p:cxnSp>
+        <p:nvCxnSpPr>
+          <p:cNvPr id="9" name="Straight Arrow Connector 8"/>
+          <p:cNvCxnSpPr/>
+          <p:nvPr/>
+        </p:nvCxnSpPr>
+        <p:spPr>
+          <a:xfrm flipH="1">
+            <a:off x="4809506" y="5973288"/>
+            <a:ext cx="736270" cy="0"/>
+          </a:xfrm>
+          <a:prstGeom prst="straightConnector1">
+            <a:avLst/>
+          </a:prstGeom>
+          <a:ln>
+            <a:tailEnd type="triangle"/>
+          </a:ln>
+        </p:spPr>
+        <p:style>
+          <a:lnRef idx="1">
+            <a:schemeClr val="accent1"/>
+          </a:lnRef>
+          <a:fillRef idx="0">
+            <a:schemeClr val="accent1"/>
+          </a:fillRef>
+          <a:effectRef idx="0">
+            <a:schemeClr val="accent1"/>
+          </a:effectRef>
+          <a:fontRef idx="minor">
+            <a:schemeClr val="tx1"/>
+          </a:fontRef>
+        </p:style>
+      </p:cxnSp>
+    </p:spTree>
+    <p:extLst>
+      <p:ext uri="{BB962C8B-B14F-4D97-AF65-F5344CB8AC3E}">
+        <p14:creationId xmlns:p14="http://schemas.microsoft.com/office/powerpoint/2010/main" val="1846944839"/>
+      </p:ext>
+    </p:extLst>
+  </p:cSld>
+  <p:clrMapOvr>
+    <a:masterClrMapping/>
+  </p:clrMapOvr>
+</p:sld>
+</file>
+
+<file path=ppt/slides/slide53.xml><?xml version="1.0" encoding="utf-8"?>
+<p:sld xmlns:a="http://schemas.openxmlformats.org/drawingml/2006/main" xmlns:r="http://schemas.openxmlformats.org/officeDocument/2006/relationships" xmlns:p="http://schemas.openxmlformats.org/presentationml/2006/main">
+  <p:cSld>
+    <p:spTree>
+      <p:nvGrpSpPr>
+        <p:cNvPr id="1" name=""/>
+        <p:cNvGrpSpPr/>
+        <p:nvPr/>
+      </p:nvGrpSpPr>
+      <p:grpSpPr>
+        <a:xfrm>
+          <a:off x="0" y="0"/>
+          <a:ext cx="0" cy="0"/>
+          <a:chOff x="0" y="0"/>
+          <a:chExt cx="0" cy="0"/>
+        </a:xfrm>
+      </p:grpSpPr>
+      <p:pic>
+        <p:nvPicPr>
+          <p:cNvPr id="2" name="Picture 1"/>
+          <p:cNvPicPr>
+            <a:picLocks noChangeAspect="1"/>
+          </p:cNvPicPr>
+          <p:nvPr/>
+        </p:nvPicPr>
+        <p:blipFill>
+          <a:blip r:embed="rId2"/>
+          <a:stretch>
+            <a:fillRect/>
+          </a:stretch>
+        </p:blipFill>
+        <p:spPr>
+          <a:xfrm>
+            <a:off x="523504" y="1090056"/>
+            <a:ext cx="5943600" cy="1447800"/>
+          </a:xfrm>
+          <a:prstGeom prst="rect">
+            <a:avLst/>
+          </a:prstGeom>
+        </p:spPr>
+      </p:pic>
+      <p:sp>
+        <p:nvSpPr>
+          <p:cNvPr id="3" name="TextBox 2"/>
+          <p:cNvSpPr txBox="1"/>
+          <p:nvPr/>
+        </p:nvSpPr>
+        <p:spPr>
+          <a:xfrm>
+            <a:off x="403761" y="201883"/>
+            <a:ext cx="10003701" cy="369332"/>
+          </a:xfrm>
+          <a:prstGeom prst="rect">
+            <a:avLst/>
+          </a:prstGeom>
+          <a:noFill/>
+        </p:spPr>
+        <p:txBody>
+          <a:bodyPr wrap="none" rtlCol="0">
+            <a:spAutoFit/>
+          </a:bodyPr>
+          <a:lstStyle/>
+          <a:p>
+            <a:r>
+              <a:rPr lang="en-US" dirty="0" smtClean="0">
+                <a:latin typeface="Arial" panose="020B0604020202020204" pitchFamily="34" charset="0"/>
+                <a:cs typeface="Arial" panose="020B0604020202020204" pitchFamily="34" charset="0"/>
+              </a:rPr>
+              <a:t>We can then ask are the changes associated with disease in high or low abundance organisms?</a:t>
+            </a:r>
+            <a:endParaRPr lang="en-US" dirty="0">
+              <a:latin typeface="Arial" panose="020B0604020202020204" pitchFamily="34" charset="0"/>
+              <a:cs typeface="Arial" panose="020B0604020202020204" pitchFamily="34" charset="0"/>
+            </a:endParaRPr>
+          </a:p>
+        </p:txBody>
+      </p:sp>
+      <p:pic>
+        <p:nvPicPr>
+          <p:cNvPr id="4" name="Picture 3"/>
+          <p:cNvPicPr>
+            <a:picLocks noChangeAspect="1"/>
+          </p:cNvPicPr>
+          <p:nvPr/>
+        </p:nvPicPr>
+        <p:blipFill>
+          <a:blip r:embed="rId3"/>
+          <a:stretch>
+            <a:fillRect/>
+          </a:stretch>
+        </p:blipFill>
+        <p:spPr>
+          <a:xfrm>
+            <a:off x="5779476" y="571215"/>
+            <a:ext cx="6072082" cy="6067091"/>
+          </a:xfrm>
+          <a:prstGeom prst="rect">
+            <a:avLst/>
+          </a:prstGeom>
+        </p:spPr>
+      </p:pic>
+      <p:sp>
+        <p:nvSpPr>
+          <p:cNvPr id="5" name="TextBox 4"/>
+          <p:cNvSpPr txBox="1"/>
+          <p:nvPr/>
+        </p:nvSpPr>
+        <p:spPr>
+          <a:xfrm>
+            <a:off x="523504" y="3075709"/>
+            <a:ext cx="5032147" cy="646331"/>
+          </a:xfrm>
+          <a:prstGeom prst="rect">
+            <a:avLst/>
+          </a:prstGeom>
+          <a:noFill/>
+        </p:spPr>
+        <p:txBody>
+          <a:bodyPr wrap="none" rtlCol="0">
+            <a:spAutoFit/>
+          </a:bodyPr>
+          <a:lstStyle/>
+          <a:p>
+            <a:r>
+              <a:rPr lang="en-US" dirty="0" smtClean="0">
+                <a:latin typeface="Arial" panose="020B0604020202020204" pitchFamily="34" charset="0"/>
+                <a:cs typeface="Arial" panose="020B0604020202020204" pitchFamily="34" charset="0"/>
+              </a:rPr>
+              <a:t>Most of the changes are in very low-abundance</a:t>
+            </a:r>
+          </a:p>
+          <a:p>
+            <a:r>
+              <a:rPr lang="en-US" dirty="0" smtClean="0">
+                <a:latin typeface="Arial" panose="020B0604020202020204" pitchFamily="34" charset="0"/>
+                <a:cs typeface="Arial" panose="020B0604020202020204" pitchFamily="34" charset="0"/>
+              </a:rPr>
+              <a:t>organisms (representing &lt; .1% of the reads)</a:t>
+            </a:r>
+            <a:endParaRPr lang="en-US" dirty="0">
+              <a:latin typeface="Arial" panose="020B0604020202020204" pitchFamily="34" charset="0"/>
+              <a:cs typeface="Arial" panose="020B0604020202020204" pitchFamily="34" charset="0"/>
+            </a:endParaRPr>
+          </a:p>
+        </p:txBody>
+      </p:sp>
+    </p:spTree>
+    <p:extLst>
+      <p:ext uri="{BB962C8B-B14F-4D97-AF65-F5344CB8AC3E}">
+        <p14:creationId xmlns:p14="http://schemas.microsoft.com/office/powerpoint/2010/main" val="1182658001"/>
       </p:ext>
     </p:extLst>
   </p:cSld>
@@ -16216,6 +17166,13 @@
   <p:clrMapOvr>
     <a:masterClrMapping/>
   </p:clrMapOvr>
+  <p:timing>
+    <p:tnLst>
+      <p:par>
+        <p:cTn id="1" dur="indefinite" restart="never" nodeType="tmRoot"/>
+      </p:par>
+    </p:tnLst>
+  </p:timing>
 </p:sld>
 </file>
 
@@ -16330,6 +17287,13 @@
   <p:clrMapOvr>
     <a:masterClrMapping/>
   </p:clrMapOvr>
+  <p:timing>
+    <p:tnLst>
+      <p:par>
+        <p:cTn id="1" dur="indefinite" restart="never" nodeType="tmRoot"/>
+      </p:par>
+    </p:tnLst>
+  </p:timing>
 </p:sld>
 </file>
 
@@ -16834,6 +17798,13 @@
   <p:clrMapOvr>
     <a:masterClrMapping/>
   </p:clrMapOvr>
+  <p:timing>
+    <p:tnLst>
+      <p:par>
+        <p:cTn id="1" dur="indefinite" restart="never" nodeType="tmRoot"/>
+      </p:par>
+    </p:tnLst>
+  </p:timing>
 </p:sld>
 </file>
 
@@ -17867,6 +18838,13 @@
   <p:clrMapOvr>
     <a:masterClrMapping/>
   </p:clrMapOvr>
+  <p:timing>
+    <p:tnLst>
+      <p:par>
+        <p:cTn id="1" dur="indefinite" restart="never" nodeType="tmRoot"/>
+      </p:par>
+    </p:tnLst>
+  </p:timing>
 </p:sld>
 </file>
 

</xml_diff>